<commit_message>
Minor changes to scenario slide.
</commit_message>
<xml_diff>
--- a/Temporal.pptx
+++ b/Temporal.pptx
@@ -211,7 +211,7 @@
           <a:p>
             <a:fld id="{3CD51548-82AA-4A2B-B152-1D3266E0F652}" type="datetimeFigureOut">
               <a:rPr lang="en-US" smtClean="0"/>
-              <a:t>05/19/2017</a:t>
+              <a:t>05/30/2017</a:t>
             </a:fld>
             <a:endParaRPr lang="en-US"/>
           </a:p>
@@ -1513,7 +1513,7 @@
           <a:graphicData uri="http://schemas.openxmlformats.org/presentationml/2006/ole">
             <mc:AlternateContent xmlns:mc="http://schemas.openxmlformats.org/markup-compatibility/2006">
               <mc:Choice xmlns:v="urn:schemas-microsoft-com:vml" Requires="v">
-                <p:oleObj spid="_x0000_s1027" name="Image" r:id="rId10" imgW="2279520" imgH="1310400" progId="Photoshop.Image.18">
+                <p:oleObj spid="_x0000_s1028" name="Image" r:id="rId10" imgW="2279520" imgH="1310400" progId="Photoshop.Image.18">
                   <p:embed/>
                 </p:oleObj>
               </mc:Choice>
@@ -1905,7 +1905,6 @@
               <a:rPr lang="en-US" sz="5400" dirty="0"/>
               <a:t>Remember Back When? Temporal Tables in SQL Server 2016</a:t>
             </a:r>
-            <a:endParaRPr lang="en-US" sz="5400" dirty="0"/>
           </a:p>
         </p:txBody>
       </p:sp>
@@ -1928,7 +1927,6 @@
               <a:rPr lang="en-US" dirty="0"/>
               <a:t>Brian Hansen</a:t>
             </a:r>
-            <a:endParaRPr lang="en-US" dirty="0"/>
           </a:p>
         </p:txBody>
       </p:sp>
@@ -2939,7 +2937,6 @@
               <a:rPr lang="en-US" sz="2835" dirty="0"/>
               <a:t>www.tf3604.com/temporal</a:t>
             </a:r>
-            <a:endParaRPr lang="en-US" sz="2835" dirty="0"/>
           </a:p>
         </p:txBody>
       </p:sp>
@@ -3024,11 +3021,23 @@
           <a:p>
             <a:r>
               <a:rPr lang="en-US" dirty="0" smtClean="0"/>
-              <a:t>Congratulations!  You have just been awarded a contract with the international automobile manufacturer </a:t>
+              <a:t>Congratulations!  You have just been awarded a contract with </a:t>
+            </a:r>
+            <a:r>
+              <a:rPr lang="en-US" dirty="0" smtClean="0"/>
+              <a:t>international </a:t>
+            </a:r>
+            <a:r>
+              <a:rPr lang="en-US" dirty="0" smtClean="0"/>
+              <a:t>automobile manufacturer </a:t>
             </a:r>
             <a:r>
               <a:rPr lang="en-US" dirty="0" err="1" smtClean="0"/>
-              <a:t>HondoyotaBenz</a:t>
+              <a:t>FordoyotaBenz</a:t>
+            </a:r>
+            <a:r>
+              <a:rPr lang="en-US" smtClean="0"/>
+              <a:t>.</a:t>
             </a:r>
             <a:endParaRPr lang="en-US" dirty="0"/>
           </a:p>

</xml_diff>

<commit_message>
Notes and additions to slides.
</commit_message>
<xml_diff>
--- a/Temporal.pptx
+++ b/Temporal.pptx
@@ -5,13 +5,15 @@
     <p:sldMasterId id="2147483648" r:id="rId1"/>
   </p:sldMasterIdLst>
   <p:notesMasterIdLst>
-    <p:notesMasterId r:id="rId6"/>
+    <p:notesMasterId r:id="rId8"/>
   </p:notesMasterIdLst>
   <p:sldIdLst>
     <p:sldId id="263" r:id="rId2"/>
     <p:sldId id="265" r:id="rId3"/>
-    <p:sldId id="266" r:id="rId4"/>
-    <p:sldId id="267" r:id="rId5"/>
+    <p:sldId id="268" r:id="rId4"/>
+    <p:sldId id="266" r:id="rId5"/>
+    <p:sldId id="269" r:id="rId6"/>
+    <p:sldId id="267" r:id="rId7"/>
   </p:sldIdLst>
   <p:sldSz cx="11520488" cy="6480175"/>
   <p:notesSz cx="6858000" cy="9144000"/>
@@ -129,6 +131,10 @@
 </p:presentation>
 </file>
 
+<file path=ppt/revisionInfo.xml><?xml version="1.0" encoding="utf-8"?>
+<p1510:revInfo xmlns:a="http://schemas.openxmlformats.org/drawingml/2006/main" xmlns:r="http://schemas.openxmlformats.org/officeDocument/2006/relationships" xmlns:p1510="http://schemas.microsoft.com/office/powerpoint/2015/10/main"/>
+</file>
+
 <file path=ppt/notesMasters/notesMaster1.xml><?xml version="1.0" encoding="utf-8"?>
 <p:notesMaster xmlns:a="http://schemas.openxmlformats.org/drawingml/2006/main" xmlns:r="http://schemas.openxmlformats.org/officeDocument/2006/relationships" xmlns:p="http://schemas.openxmlformats.org/presentationml/2006/main">
   <p:cSld>
@@ -211,7 +217,7 @@
           <a:p>
             <a:fld id="{3CD51548-82AA-4A2B-B152-1D3266E0F652}" type="datetimeFigureOut">
               <a:rPr lang="en-US" smtClean="0"/>
-              <a:t>05/30/2017</a:t>
+              <a:t>6/6/2017</a:t>
             </a:fld>
             <a:endParaRPr lang="en-US"/>
           </a:p>
@@ -275,38 +281,37 @@
           <a:p>
             <a:pPr lvl="0"/>
             <a:r>
-              <a:rPr lang="en-US" smtClean="0"/>
+              <a:rPr lang="en-US"/>
               <a:t>Click to edit Master text styles</a:t>
             </a:r>
           </a:p>
           <a:p>
             <a:pPr lvl="1"/>
             <a:r>
-              <a:rPr lang="en-US" smtClean="0"/>
+              <a:rPr lang="en-US"/>
               <a:t>Second level</a:t>
             </a:r>
           </a:p>
           <a:p>
             <a:pPr lvl="2"/>
             <a:r>
-              <a:rPr lang="en-US" smtClean="0"/>
+              <a:rPr lang="en-US"/>
               <a:t>Third level</a:t>
             </a:r>
           </a:p>
           <a:p>
             <a:pPr lvl="3"/>
             <a:r>
-              <a:rPr lang="en-US" smtClean="0"/>
+              <a:rPr lang="en-US"/>
               <a:t>Fourth level</a:t>
             </a:r>
           </a:p>
           <a:p>
             <a:pPr lvl="4"/>
             <a:r>
-              <a:rPr lang="en-US" smtClean="0"/>
+              <a:rPr lang="en-US"/>
               <a:t>Fifth level</a:t>
             </a:r>
-            <a:endParaRPr lang="en-US"/>
           </a:p>
         </p:txBody>
       </p:sp>
@@ -479,6 +484,504 @@
 </p:notesMaster>
 </file>
 
+<file path=ppt/notesSlides/notesSlide1.xml><?xml version="1.0" encoding="utf-8"?>
+<p:notes xmlns:a="http://schemas.openxmlformats.org/drawingml/2006/main" xmlns:r="http://schemas.openxmlformats.org/officeDocument/2006/relationships" xmlns:p="http://schemas.openxmlformats.org/presentationml/2006/main">
+  <p:cSld>
+    <p:spTree>
+      <p:nvGrpSpPr>
+        <p:cNvPr id="1" name=""/>
+        <p:cNvGrpSpPr/>
+        <p:nvPr/>
+      </p:nvGrpSpPr>
+      <p:grpSpPr>
+        <a:xfrm>
+          <a:off x="0" y="0"/>
+          <a:ext cx="0" cy="0"/>
+          <a:chOff x="0" y="0"/>
+          <a:chExt cx="0" cy="0"/>
+        </a:xfrm>
+      </p:grpSpPr>
+      <p:sp>
+        <p:nvSpPr>
+          <p:cNvPr id="2" name="Slide Image Placeholder 1"/>
+          <p:cNvSpPr>
+            <a:spLocks noGrp="1" noRot="1" noChangeAspect="1"/>
+          </p:cNvSpPr>
+          <p:nvPr>
+            <p:ph type="sldImg"/>
+          </p:nvPr>
+        </p:nvSpPr>
+        <p:spPr/>
+      </p:sp>
+      <p:sp>
+        <p:nvSpPr>
+          <p:cNvPr id="3" name="Notes Placeholder 2"/>
+          <p:cNvSpPr>
+            <a:spLocks noGrp="1"/>
+          </p:cNvSpPr>
+          <p:nvPr>
+            <p:ph type="body" idx="1"/>
+          </p:nvPr>
+        </p:nvSpPr>
+        <p:spPr/>
+        <p:txBody>
+          <a:bodyPr/>
+          <a:lstStyle/>
+          <a:p>
+            <a:r>
+              <a:rPr lang="en-US"/>
+              <a:t>Immediately </a:t>
+            </a:r>
+            <a:r>
+              <a:rPr lang="en-US" dirty="0"/>
+              <a:t>b</a:t>
+            </a:r>
+            <a:r>
+              <a:rPr lang="en-US"/>
+              <a:t>efore </a:t>
+            </a:r>
+            <a:r>
+              <a:rPr lang="en-US" dirty="0"/>
+              <a:t>the session</a:t>
+            </a:r>
+          </a:p>
+          <a:p>
+            <a:pPr marL="628650" lvl="1" indent="-171450">
+              <a:buFont typeface="Arial" panose="020B0604020202020204" pitchFamily="34" charset="0"/>
+              <a:buChar char="•"/>
+            </a:pPr>
+            <a:r>
+              <a:rPr lang="en-US" dirty="0"/>
+              <a:t>Restore the </a:t>
+            </a:r>
+            <a:r>
+              <a:rPr lang="en-US" dirty="0" err="1"/>
+              <a:t>bkhUtility</a:t>
+            </a:r>
+            <a:r>
+              <a:rPr lang="en-US" dirty="0"/>
+              <a:t> database (Script 000)</a:t>
+            </a:r>
+          </a:p>
+          <a:p>
+            <a:pPr marL="628650" lvl="1" indent="-171450">
+              <a:buFont typeface="Arial" panose="020B0604020202020204" pitchFamily="34" charset="0"/>
+              <a:buChar char="•"/>
+            </a:pPr>
+            <a:r>
+              <a:rPr lang="en-US" dirty="0"/>
+              <a:t>Create the </a:t>
+            </a:r>
+            <a:r>
+              <a:rPr lang="en-US" dirty="0" err="1"/>
+              <a:t>AutoTracker</a:t>
+            </a:r>
+            <a:r>
+              <a:rPr lang="en-US" dirty="0"/>
+              <a:t> database (Script 010)</a:t>
+            </a:r>
+          </a:p>
+          <a:p>
+            <a:pPr marL="628650" lvl="1" indent="-171450">
+              <a:buFont typeface="Arial" panose="020B0604020202020204" pitchFamily="34" charset="0"/>
+              <a:buChar char="•"/>
+            </a:pPr>
+            <a:r>
+              <a:rPr lang="en-US" dirty="0"/>
+              <a:t>Create workload stored procedures (Script 011)</a:t>
+            </a:r>
+          </a:p>
+          <a:p>
+            <a:pPr marL="628650" lvl="1" indent="-171450">
+              <a:buFont typeface="Arial" panose="020B0604020202020204" pitchFamily="34" charset="0"/>
+              <a:buChar char="•"/>
+            </a:pPr>
+            <a:r>
+              <a:rPr lang="en-US" dirty="0"/>
+              <a:t>Start the workload (Script 012)</a:t>
+            </a:r>
+          </a:p>
+          <a:p>
+            <a:pPr marL="628650" lvl="1" indent="-171450">
+              <a:buFont typeface="Arial" panose="020B0604020202020204" pitchFamily="34" charset="0"/>
+              <a:buChar char="•"/>
+            </a:pPr>
+            <a:r>
+              <a:rPr lang="en-US" dirty="0"/>
+              <a:t>Verify the workload is running (Script 013)</a:t>
+            </a:r>
+          </a:p>
+        </p:txBody>
+      </p:sp>
+      <p:sp>
+        <p:nvSpPr>
+          <p:cNvPr id="4" name="Slide Number Placeholder 3"/>
+          <p:cNvSpPr>
+            <a:spLocks noGrp="1"/>
+          </p:cNvSpPr>
+          <p:nvPr>
+            <p:ph type="sldNum" sz="quarter" idx="10"/>
+          </p:nvPr>
+        </p:nvSpPr>
+        <p:spPr/>
+        <p:txBody>
+          <a:bodyPr/>
+          <a:lstStyle/>
+          <a:p>
+            <a:fld id="{FF7EEA9B-F69F-4E8E-9D98-532317352FF8}" type="slidenum">
+              <a:rPr lang="en-US" smtClean="0"/>
+              <a:t>1</a:t>
+            </a:fld>
+            <a:endParaRPr lang="en-US"/>
+          </a:p>
+        </p:txBody>
+      </p:sp>
+    </p:spTree>
+    <p:extLst>
+      <p:ext uri="{BB962C8B-B14F-4D97-AF65-F5344CB8AC3E}">
+        <p14:creationId xmlns:p14="http://schemas.microsoft.com/office/powerpoint/2010/main" val="833275731"/>
+      </p:ext>
+    </p:extLst>
+  </p:cSld>
+  <p:clrMapOvr>
+    <a:masterClrMapping/>
+  </p:clrMapOvr>
+</p:notes>
+</file>
+
+<file path=ppt/notesSlides/notesSlide2.xml><?xml version="1.0" encoding="utf-8"?>
+<p:notes xmlns:a="http://schemas.openxmlformats.org/drawingml/2006/main" xmlns:r="http://schemas.openxmlformats.org/officeDocument/2006/relationships" xmlns:p="http://schemas.openxmlformats.org/presentationml/2006/main">
+  <p:cSld>
+    <p:spTree>
+      <p:nvGrpSpPr>
+        <p:cNvPr id="1" name=""/>
+        <p:cNvGrpSpPr/>
+        <p:nvPr/>
+      </p:nvGrpSpPr>
+      <p:grpSpPr>
+        <a:xfrm>
+          <a:off x="0" y="0"/>
+          <a:ext cx="0" cy="0"/>
+          <a:chOff x="0" y="0"/>
+          <a:chExt cx="0" cy="0"/>
+        </a:xfrm>
+      </p:grpSpPr>
+      <p:sp>
+        <p:nvSpPr>
+          <p:cNvPr id="2" name="Slide Image Placeholder 1"/>
+          <p:cNvSpPr>
+            <a:spLocks noGrp="1" noRot="1" noChangeAspect="1"/>
+          </p:cNvSpPr>
+          <p:nvPr>
+            <p:ph type="sldImg"/>
+          </p:nvPr>
+        </p:nvSpPr>
+        <p:spPr/>
+      </p:sp>
+      <p:sp>
+        <p:nvSpPr>
+          <p:cNvPr id="3" name="Notes Placeholder 2"/>
+          <p:cNvSpPr>
+            <a:spLocks noGrp="1"/>
+          </p:cNvSpPr>
+          <p:nvPr>
+            <p:ph type="body" idx="1"/>
+          </p:nvPr>
+        </p:nvSpPr>
+        <p:spPr/>
+        <p:txBody>
+          <a:bodyPr/>
+          <a:lstStyle/>
+          <a:p>
+            <a:r>
+              <a:rPr lang="en-US" dirty="0"/>
+              <a:t>Most real-world databases have long have temporal components:</a:t>
+            </a:r>
+          </a:p>
+          <a:p>
+            <a:pPr marL="628650" lvl="1" indent="-171450">
+              <a:buFont typeface="Arial" panose="020B0604020202020204" pitchFamily="34" charset="0"/>
+              <a:buChar char="•"/>
+            </a:pPr>
+            <a:r>
+              <a:rPr lang="en-US" dirty="0"/>
+              <a:t>We keep track of when a row was inserted or updated</a:t>
+            </a:r>
+          </a:p>
+          <a:p>
+            <a:pPr marL="628650" lvl="1" indent="-171450">
+              <a:buFont typeface="Arial" panose="020B0604020202020204" pitchFamily="34" charset="0"/>
+              <a:buChar char="•"/>
+            </a:pPr>
+            <a:r>
+              <a:rPr lang="en-US" dirty="0"/>
+              <a:t>We want to know what changed – when, what, who?</a:t>
+            </a:r>
+          </a:p>
+          <a:p>
+            <a:pPr marL="0" indent="0">
+              <a:buFont typeface="Arial" panose="020B0604020202020204" pitchFamily="34" charset="0"/>
+              <a:buNone/>
+            </a:pPr>
+            <a:r>
+              <a:rPr lang="en-US" dirty="0"/>
+              <a:t>Traditionally accomplished with triggers, CDC/CT or other methods</a:t>
+            </a:r>
+          </a:p>
+          <a:p>
+            <a:pPr marL="0" indent="0">
+              <a:buFont typeface="Arial" panose="020B0604020202020204" pitchFamily="34" charset="0"/>
+              <a:buNone/>
+            </a:pPr>
+            <a:r>
+              <a:rPr lang="en-US" dirty="0"/>
+              <a:t>These methods usually require some form of coding</a:t>
+            </a:r>
+          </a:p>
+        </p:txBody>
+      </p:sp>
+      <p:sp>
+        <p:nvSpPr>
+          <p:cNvPr id="4" name="Slide Number Placeholder 3"/>
+          <p:cNvSpPr>
+            <a:spLocks noGrp="1"/>
+          </p:cNvSpPr>
+          <p:nvPr>
+            <p:ph type="sldNum" sz="quarter" idx="10"/>
+          </p:nvPr>
+        </p:nvSpPr>
+        <p:spPr/>
+        <p:txBody>
+          <a:bodyPr/>
+          <a:lstStyle/>
+          <a:p>
+            <a:fld id="{FF7EEA9B-F69F-4E8E-9D98-532317352FF8}" type="slidenum">
+              <a:rPr lang="en-US" smtClean="0"/>
+              <a:t>3</a:t>
+            </a:fld>
+            <a:endParaRPr lang="en-US"/>
+          </a:p>
+        </p:txBody>
+      </p:sp>
+    </p:spTree>
+    <p:extLst>
+      <p:ext uri="{BB962C8B-B14F-4D97-AF65-F5344CB8AC3E}">
+        <p14:creationId xmlns:p14="http://schemas.microsoft.com/office/powerpoint/2010/main" val="1683110142"/>
+      </p:ext>
+    </p:extLst>
+  </p:cSld>
+  <p:clrMapOvr>
+    <a:masterClrMapping/>
+  </p:clrMapOvr>
+</p:notes>
+</file>
+
+<file path=ppt/notesSlides/notesSlide3.xml><?xml version="1.0" encoding="utf-8"?>
+<p:notes xmlns:a="http://schemas.openxmlformats.org/drawingml/2006/main" xmlns:r="http://schemas.openxmlformats.org/officeDocument/2006/relationships" xmlns:p="http://schemas.openxmlformats.org/presentationml/2006/main">
+  <p:cSld>
+    <p:spTree>
+      <p:nvGrpSpPr>
+        <p:cNvPr id="1" name=""/>
+        <p:cNvGrpSpPr/>
+        <p:nvPr/>
+      </p:nvGrpSpPr>
+      <p:grpSpPr>
+        <a:xfrm>
+          <a:off x="0" y="0"/>
+          <a:ext cx="0" cy="0"/>
+          <a:chOff x="0" y="0"/>
+          <a:chExt cx="0" cy="0"/>
+        </a:xfrm>
+      </p:grpSpPr>
+      <p:sp>
+        <p:nvSpPr>
+          <p:cNvPr id="2" name="Slide Image Placeholder 1"/>
+          <p:cNvSpPr>
+            <a:spLocks noGrp="1" noRot="1" noChangeAspect="1"/>
+          </p:cNvSpPr>
+          <p:nvPr>
+            <p:ph type="sldImg"/>
+          </p:nvPr>
+        </p:nvSpPr>
+        <p:spPr/>
+      </p:sp>
+      <p:sp>
+        <p:nvSpPr>
+          <p:cNvPr id="3" name="Notes Placeholder 2"/>
+          <p:cNvSpPr>
+            <a:spLocks noGrp="1"/>
+          </p:cNvSpPr>
+          <p:nvPr>
+            <p:ph type="body" idx="1"/>
+          </p:nvPr>
+        </p:nvSpPr>
+        <p:spPr/>
+        <p:txBody>
+          <a:bodyPr/>
+          <a:lstStyle/>
+          <a:p>
+            <a:r>
+              <a:rPr lang="en-US" dirty="0"/>
+              <a:t>Our assigned task is track ownership of automobiles for purposes of notifying customers of recalls.</a:t>
+            </a:r>
+          </a:p>
+          <a:p>
+            <a:r>
+              <a:rPr lang="en-US" dirty="0"/>
+              <a:t>I’ve never tracked automobiles, but I have tracked “things” before.</a:t>
+            </a:r>
+          </a:p>
+          <a:p>
+            <a:r>
+              <a:rPr lang="en-US" dirty="0"/>
+              <a:t>We’ll keep things really simple.</a:t>
+            </a:r>
+          </a:p>
+          <a:p>
+            <a:pPr marL="628650" lvl="1" indent="-171450">
+              <a:buFont typeface="Arial" panose="020B0604020202020204" pitchFamily="34" charset="0"/>
+              <a:buChar char="•"/>
+            </a:pPr>
+            <a:r>
+              <a:rPr lang="en-US" dirty="0"/>
+              <a:t>Just going to track automobiles, customers, dealers and who owns what car when.</a:t>
+            </a:r>
+          </a:p>
+          <a:p>
+            <a:pPr marL="0" lvl="0" indent="0">
+              <a:buFont typeface="Arial" panose="020B0604020202020204" pitchFamily="34" charset="0"/>
+              <a:buNone/>
+            </a:pPr>
+            <a:r>
+              <a:rPr lang="en-US" dirty="0"/>
+              <a:t>Real world would probably need a breakdown of parts -&gt; graph database?!</a:t>
+            </a:r>
+          </a:p>
+        </p:txBody>
+      </p:sp>
+      <p:sp>
+        <p:nvSpPr>
+          <p:cNvPr id="4" name="Slide Number Placeholder 3"/>
+          <p:cNvSpPr>
+            <a:spLocks noGrp="1"/>
+          </p:cNvSpPr>
+          <p:nvPr>
+            <p:ph type="sldNum" sz="quarter" idx="10"/>
+          </p:nvPr>
+        </p:nvSpPr>
+        <p:spPr/>
+        <p:txBody>
+          <a:bodyPr/>
+          <a:lstStyle/>
+          <a:p>
+            <a:fld id="{FF7EEA9B-F69F-4E8E-9D98-532317352FF8}" type="slidenum">
+              <a:rPr lang="en-US" smtClean="0"/>
+              <a:t>4</a:t>
+            </a:fld>
+            <a:endParaRPr lang="en-US"/>
+          </a:p>
+        </p:txBody>
+      </p:sp>
+    </p:spTree>
+    <p:extLst>
+      <p:ext uri="{BB962C8B-B14F-4D97-AF65-F5344CB8AC3E}">
+        <p14:creationId xmlns:p14="http://schemas.microsoft.com/office/powerpoint/2010/main" val="1641496011"/>
+      </p:ext>
+    </p:extLst>
+  </p:cSld>
+  <p:clrMapOvr>
+    <a:masterClrMapping/>
+  </p:clrMapOvr>
+</p:notes>
+</file>
+
+<file path=ppt/notesSlides/notesSlide4.xml><?xml version="1.0" encoding="utf-8"?>
+<p:notes xmlns:a="http://schemas.openxmlformats.org/drawingml/2006/main" xmlns:r="http://schemas.openxmlformats.org/officeDocument/2006/relationships" xmlns:p="http://schemas.openxmlformats.org/presentationml/2006/main">
+  <p:cSld>
+    <p:spTree>
+      <p:nvGrpSpPr>
+        <p:cNvPr id="1" name=""/>
+        <p:cNvGrpSpPr/>
+        <p:nvPr/>
+      </p:nvGrpSpPr>
+      <p:grpSpPr>
+        <a:xfrm>
+          <a:off x="0" y="0"/>
+          <a:ext cx="0" cy="0"/>
+          <a:chOff x="0" y="0"/>
+          <a:chExt cx="0" cy="0"/>
+        </a:xfrm>
+      </p:grpSpPr>
+      <p:sp>
+        <p:nvSpPr>
+          <p:cNvPr id="2" name="Slide Image Placeholder 1"/>
+          <p:cNvSpPr>
+            <a:spLocks noGrp="1" noRot="1" noChangeAspect="1"/>
+          </p:cNvSpPr>
+          <p:nvPr>
+            <p:ph type="sldImg"/>
+          </p:nvPr>
+        </p:nvSpPr>
+        <p:spPr/>
+      </p:sp>
+      <p:sp>
+        <p:nvSpPr>
+          <p:cNvPr id="3" name="Notes Placeholder 2"/>
+          <p:cNvSpPr>
+            <a:spLocks noGrp="1"/>
+          </p:cNvSpPr>
+          <p:nvPr>
+            <p:ph type="body" idx="1"/>
+          </p:nvPr>
+        </p:nvSpPr>
+        <p:spPr/>
+        <p:txBody>
+          <a:bodyPr/>
+          <a:lstStyle/>
+          <a:p>
+            <a:r>
+              <a:rPr lang="en-US" dirty="0"/>
+              <a:t>Scripts 020 through ???</a:t>
+            </a:r>
+          </a:p>
+        </p:txBody>
+      </p:sp>
+      <p:sp>
+        <p:nvSpPr>
+          <p:cNvPr id="4" name="Slide Number Placeholder 3"/>
+          <p:cNvSpPr>
+            <a:spLocks noGrp="1"/>
+          </p:cNvSpPr>
+          <p:nvPr>
+            <p:ph type="sldNum" sz="quarter" idx="10"/>
+          </p:nvPr>
+        </p:nvSpPr>
+        <p:spPr/>
+        <p:txBody>
+          <a:bodyPr/>
+          <a:lstStyle/>
+          <a:p>
+            <a:fld id="{FF7EEA9B-F69F-4E8E-9D98-532317352FF8}" type="slidenum">
+              <a:rPr lang="en-US" smtClean="0"/>
+              <a:t>5</a:t>
+            </a:fld>
+            <a:endParaRPr lang="en-US"/>
+          </a:p>
+        </p:txBody>
+      </p:sp>
+    </p:spTree>
+    <p:extLst>
+      <p:ext uri="{BB962C8B-B14F-4D97-AF65-F5344CB8AC3E}">
+        <p14:creationId xmlns:p14="http://schemas.microsoft.com/office/powerpoint/2010/main" val="2619065509"/>
+      </p:ext>
+    </p:extLst>
+  </p:cSld>
+  <p:clrMapOvr>
+    <a:masterClrMapping/>
+  </p:clrMapOvr>
+</p:notes>
+</file>
+
 <file path=ppt/slideLayouts/slideLayout1.xml><?xml version="1.0" encoding="utf-8"?>
 <p:sldLayout xmlns:a="http://schemas.openxmlformats.org/drawingml/2006/main" xmlns:r="http://schemas.openxmlformats.org/officeDocument/2006/relationships" xmlns:p="http://schemas.openxmlformats.org/presentationml/2006/main" showMasterSp="0" preserve="1" userDrawn="1">
   <p:cSld name="Title">
@@ -1513,7 +2016,7 @@
           <a:graphicData uri="http://schemas.openxmlformats.org/presentationml/2006/ole">
             <mc:AlternateContent xmlns:mc="http://schemas.openxmlformats.org/markup-compatibility/2006">
               <mc:Choice xmlns:v="urn:schemas-microsoft-com:vml" Requires="v">
-                <p:oleObj spid="_x0000_s1028" name="Image" r:id="rId10" imgW="2279520" imgH="1310400" progId="Photoshop.Image.18">
+                <p:oleObj spid="_x0000_s1037" name="Image" r:id="rId10" imgW="2279520" imgH="1310400" progId="Photoshop.Image.18">
                   <p:embed/>
                 </p:oleObj>
               </mc:Choice>
@@ -1930,6 +2433,56 @@
           </a:p>
         </p:txBody>
       </p:sp>
+      <p:sp>
+        <p:nvSpPr>
+          <p:cNvPr id="4" name="TextBox 3">
+            <a:extLst>
+              <a:ext uri="{FF2B5EF4-FFF2-40B4-BE49-F238E27FC236}">
+                <a16:creationId xmlns:a16="http://schemas.microsoft.com/office/drawing/2014/main" id="{4E95CA58-BC71-4CE1-ACB0-4410970492E6}"/>
+              </a:ext>
+            </a:extLst>
+          </p:cNvPr>
+          <p:cNvSpPr txBox="1"/>
+          <p:nvPr/>
+        </p:nvSpPr>
+        <p:spPr>
+          <a:xfrm>
+            <a:off x="8392886" y="1796144"/>
+            <a:ext cx="2768033" cy="923330"/>
+          </a:xfrm>
+          <a:prstGeom prst="rect">
+            <a:avLst/>
+          </a:prstGeom>
+          <a:noFill/>
+        </p:spPr>
+        <p:txBody>
+          <a:bodyPr wrap="square" rtlCol="0">
+            <a:spAutoFit/>
+          </a:bodyPr>
+          <a:lstStyle/>
+          <a:p>
+            <a:pPr algn="r"/>
+            <a:r>
+              <a:rPr lang="en-US" dirty="0"/>
+              <a:t>SQL Saturday #634</a:t>
+            </a:r>
+          </a:p>
+          <a:p>
+            <a:pPr algn="r"/>
+            <a:r>
+              <a:rPr lang="en-US" dirty="0"/>
+              <a:t>Iowa City, Iowa</a:t>
+            </a:r>
+          </a:p>
+          <a:p>
+            <a:pPr algn="r"/>
+            <a:r>
+              <a:rPr lang="en-US" dirty="0"/>
+              <a:t>10 June 2017</a:t>
+            </a:r>
+          </a:p>
+        </p:txBody>
+      </p:sp>
     </p:spTree>
     <p:extLst>
       <p:ext uri="{BB962C8B-B14F-4D97-AF65-F5344CB8AC3E}">
@@ -2950,13 +3503,6 @@
   <p:clrMapOvr>
     <a:masterClrMapping/>
   </p:clrMapOvr>
-  <p:timing>
-    <p:tnLst>
-      <p:par>
-        <p:cTn id="1" dur="indefinite" restart="never" nodeType="tmRoot"/>
-      </p:par>
-    </p:tnLst>
-  </p:timing>
 </p:sld>
 </file>
 
@@ -2979,7 +3525,13 @@
       </p:grpSpPr>
       <p:sp>
         <p:nvSpPr>
-          <p:cNvPr id="2" name="Title 1"/>
+          <p:cNvPr id="2" name="Title 1">
+            <a:extLst>
+              <a:ext uri="{FF2B5EF4-FFF2-40B4-BE49-F238E27FC236}">
+                <a16:creationId xmlns:a16="http://schemas.microsoft.com/office/drawing/2014/main" id="{C9BFF397-973F-4CF4-B089-7CF11ECD75B3}"/>
+              </a:ext>
+            </a:extLst>
+          </p:cNvPr>
           <p:cNvSpPr>
             <a:spLocks noGrp="1"/>
           </p:cNvSpPr>
@@ -2993,20 +3545,21 @@
           <a:lstStyle/>
           <a:p>
             <a:r>
-              <a:rPr lang="en-US" smtClean="0"/>
-              <a:t>The </a:t>
-            </a:r>
-            <a:r>
-              <a:rPr lang="en-US" dirty="0" smtClean="0"/>
-              <a:t>Scenario</a:t>
-            </a:r>
-            <a:endParaRPr lang="en-US" dirty="0"/>
+              <a:rPr lang="en-US" dirty="0"/>
+              <a:t>Temporal Tables</a:t>
+            </a:r>
           </a:p>
         </p:txBody>
       </p:sp>
       <p:sp>
         <p:nvSpPr>
-          <p:cNvPr id="3" name="Content Placeholder 2"/>
+          <p:cNvPr id="3" name="Content Placeholder 2">
+            <a:extLst>
+              <a:ext uri="{FF2B5EF4-FFF2-40B4-BE49-F238E27FC236}">
+                <a16:creationId xmlns:a16="http://schemas.microsoft.com/office/drawing/2014/main" id="{2C4E2FAE-1993-45F8-901A-679941B185E8}"/>
+              </a:ext>
+            </a:extLst>
+          </p:cNvPr>
           <p:cNvSpPr>
             <a:spLocks noGrp="1"/>
           </p:cNvSpPr>
@@ -3016,29 +3569,95 @@
         </p:nvSpPr>
         <p:spPr/>
         <p:txBody>
-          <a:bodyPr/>
+          <a:bodyPr>
+            <a:normAutofit lnSpcReduction="10000"/>
+          </a:bodyPr>
           <a:lstStyle/>
           <a:p>
-            <a:r>
-              <a:rPr lang="en-US" dirty="0" smtClean="0"/>
-              <a:t>Congratulations!  You have just been awarded a contract with </a:t>
-            </a:r>
-            <a:r>
-              <a:rPr lang="en-US" dirty="0" smtClean="0"/>
-              <a:t>international </a:t>
-            </a:r>
-            <a:r>
-              <a:rPr lang="en-US" dirty="0" smtClean="0"/>
-              <a:t>automobile manufacturer </a:t>
-            </a:r>
-            <a:r>
-              <a:rPr lang="en-US" dirty="0" err="1" smtClean="0"/>
-              <a:t>FordoyotaBenz</a:t>
-            </a:r>
-            <a:r>
-              <a:rPr lang="en-US" smtClean="0"/>
-              <a:t>.</a:t>
-            </a:r>
+            <a:pPr marL="571500" indent="-571500">
+              <a:buFont typeface="Arial" panose="020B0604020202020204" pitchFamily="34" charset="0"/>
+              <a:buChar char="•"/>
+            </a:pPr>
+            <a:r>
+              <a:rPr lang="en-US" dirty="0"/>
+              <a:t>Temporal = time-based = system versioned</a:t>
+            </a:r>
+          </a:p>
+          <a:p>
+            <a:pPr marL="571500" indent="-571500">
+              <a:buFont typeface="Arial" panose="020B0604020202020204" pitchFamily="34" charset="0"/>
+              <a:buChar char="•"/>
+            </a:pPr>
+            <a:r>
+              <a:rPr lang="en-US" dirty="0"/>
+              <a:t>Main purposes</a:t>
+            </a:r>
+          </a:p>
+          <a:p>
+            <a:pPr marL="1147527" lvl="1" indent="-571500">
+              <a:buFont typeface="Arial" panose="020B0604020202020204" pitchFamily="34" charset="0"/>
+              <a:buChar char="•"/>
+            </a:pPr>
+            <a:r>
+              <a:rPr lang="en-US" dirty="0"/>
+              <a:t>Logging / Reversal of changes</a:t>
+            </a:r>
+          </a:p>
+          <a:p>
+            <a:pPr marL="1147527" lvl="1" indent="-571500">
+              <a:buFont typeface="Arial" panose="020B0604020202020204" pitchFamily="34" charset="0"/>
+              <a:buChar char="•"/>
+            </a:pPr>
+            <a:r>
+              <a:rPr lang="en-US" dirty="0"/>
+              <a:t>Point-in-time business analytics</a:t>
+            </a:r>
+          </a:p>
+          <a:p>
+            <a:pPr marL="571500" indent="-571500">
+              <a:buFont typeface="Arial" panose="020B0604020202020204" pitchFamily="34" charset="0"/>
+              <a:buChar char="•"/>
+            </a:pPr>
+            <a:r>
+              <a:rPr lang="en-US" dirty="0"/>
+              <a:t>Other purposes – but with complexity</a:t>
+            </a:r>
+          </a:p>
+          <a:p>
+            <a:pPr marL="1147527" lvl="1" indent="-571500">
+              <a:buFont typeface="Arial" panose="020B0604020202020204" pitchFamily="34" charset="0"/>
+              <a:buChar char="•"/>
+            </a:pPr>
+            <a:r>
+              <a:rPr lang="en-US" dirty="0"/>
+              <a:t>Auditing</a:t>
+            </a:r>
+          </a:p>
+          <a:p>
+            <a:pPr marL="1147527" lvl="1" indent="-571500">
+              <a:buFont typeface="Arial" panose="020B0604020202020204" pitchFamily="34" charset="0"/>
+              <a:buChar char="•"/>
+            </a:pPr>
+            <a:r>
+              <a:rPr lang="en-US" dirty="0"/>
+              <a:t>Change tracking</a:t>
+            </a:r>
+          </a:p>
+          <a:p>
+            <a:pPr marL="1147527" lvl="1" indent="-571500">
+              <a:buFont typeface="Arial" panose="020B0604020202020204" pitchFamily="34" charset="0"/>
+              <a:buChar char="•"/>
+            </a:pPr>
+            <a:r>
+              <a:rPr lang="en-US" dirty="0"/>
+              <a:t>Slowly-changing dimensions</a:t>
+            </a:r>
+          </a:p>
+          <a:p>
+            <a:pPr marL="1147527" lvl="1" indent="-571500">
+              <a:buFont typeface="Arial" panose="020B0604020202020204" pitchFamily="34" charset="0"/>
+              <a:buChar char="•"/>
+            </a:pPr>
             <a:endParaRPr lang="en-US" dirty="0"/>
           </a:p>
         </p:txBody>
@@ -3046,7 +3665,7 @@
     </p:spTree>
     <p:extLst>
       <p:ext uri="{BB962C8B-B14F-4D97-AF65-F5344CB8AC3E}">
-        <p14:creationId xmlns:p14="http://schemas.microsoft.com/office/powerpoint/2010/main" val="2278920869"/>
+        <p14:creationId xmlns:p14="http://schemas.microsoft.com/office/powerpoint/2010/main" val="2111419373"/>
       </p:ext>
     </p:extLst>
   </p:cSld>
@@ -3089,6 +3708,213 @@
           <a:lstStyle/>
           <a:p>
             <a:r>
+              <a:rPr lang="en-US"/>
+              <a:t>The </a:t>
+            </a:r>
+            <a:r>
+              <a:rPr lang="en-US" dirty="0"/>
+              <a:t>Scenario</a:t>
+            </a:r>
+          </a:p>
+        </p:txBody>
+      </p:sp>
+      <p:sp>
+        <p:nvSpPr>
+          <p:cNvPr id="3" name="Content Placeholder 2"/>
+          <p:cNvSpPr>
+            <a:spLocks noGrp="1"/>
+          </p:cNvSpPr>
+          <p:nvPr>
+            <p:ph idx="1"/>
+          </p:nvPr>
+        </p:nvSpPr>
+        <p:spPr>
+          <a:xfrm>
+            <a:off x="360125" y="1439813"/>
+            <a:ext cx="10800000" cy="4680000"/>
+          </a:xfrm>
+        </p:spPr>
+        <p:txBody>
+          <a:bodyPr/>
+          <a:lstStyle/>
+          <a:p>
+            <a:r>
+              <a:rPr lang="en-US" dirty="0"/>
+              <a:t>Congratulations!  You have just been awarded a contract with international automobile manufacturer </a:t>
+            </a:r>
+            <a:r>
+              <a:rPr lang="en-US" dirty="0" err="1"/>
+              <a:t>FordoyotaBenz</a:t>
+            </a:r>
+            <a:r>
+              <a:rPr lang="en-US" dirty="0"/>
+              <a:t>.</a:t>
+            </a:r>
+          </a:p>
+        </p:txBody>
+      </p:sp>
+    </p:spTree>
+    <p:extLst>
+      <p:ext uri="{BB962C8B-B14F-4D97-AF65-F5344CB8AC3E}">
+        <p14:creationId xmlns:p14="http://schemas.microsoft.com/office/powerpoint/2010/main" val="2278920869"/>
+      </p:ext>
+    </p:extLst>
+  </p:cSld>
+  <p:clrMapOvr>
+    <a:masterClrMapping/>
+  </p:clrMapOvr>
+</p:sld>
+</file>
+
+<file path=ppt/slides/slide5.xml><?xml version="1.0" encoding="utf-8"?>
+<p:sld xmlns:a="http://schemas.openxmlformats.org/drawingml/2006/main" xmlns:r="http://schemas.openxmlformats.org/officeDocument/2006/relationships" xmlns:p="http://schemas.openxmlformats.org/presentationml/2006/main">
+  <p:cSld>
+    <p:spTree>
+      <p:nvGrpSpPr>
+        <p:cNvPr id="1" name=""/>
+        <p:cNvGrpSpPr/>
+        <p:nvPr/>
+      </p:nvGrpSpPr>
+      <p:grpSpPr>
+        <a:xfrm>
+          <a:off x="0" y="0"/>
+          <a:ext cx="0" cy="0"/>
+          <a:chOff x="0" y="0"/>
+          <a:chExt cx="0" cy="0"/>
+        </a:xfrm>
+      </p:grpSpPr>
+      <p:sp>
+        <p:nvSpPr>
+          <p:cNvPr id="2" name="Title 1">
+            <a:extLst>
+              <a:ext uri="{FF2B5EF4-FFF2-40B4-BE49-F238E27FC236}">
+                <a16:creationId xmlns:a16="http://schemas.microsoft.com/office/drawing/2014/main" id="{FEF5F440-7918-4A6B-9C7C-C25F5B4AB5DD}"/>
+              </a:ext>
+            </a:extLst>
+          </p:cNvPr>
+          <p:cNvSpPr>
+            <a:spLocks noGrp="1"/>
+          </p:cNvSpPr>
+          <p:nvPr>
+            <p:ph type="title"/>
+          </p:nvPr>
+        </p:nvSpPr>
+        <p:spPr/>
+        <p:txBody>
+          <a:bodyPr/>
+          <a:lstStyle/>
+          <a:p>
+            <a:r>
+              <a:rPr lang="en-US" dirty="0"/>
+              <a:t>Demo</a:t>
+            </a:r>
+          </a:p>
+        </p:txBody>
+      </p:sp>
+      <p:sp>
+        <p:nvSpPr>
+          <p:cNvPr id="3" name="Content Placeholder 2">
+            <a:extLst>
+              <a:ext uri="{FF2B5EF4-FFF2-40B4-BE49-F238E27FC236}">
+                <a16:creationId xmlns:a16="http://schemas.microsoft.com/office/drawing/2014/main" id="{9E20F2C1-4D76-4D3B-8502-4FA0575D48CD}"/>
+              </a:ext>
+            </a:extLst>
+          </p:cNvPr>
+          <p:cNvSpPr>
+            <a:spLocks noGrp="1"/>
+          </p:cNvSpPr>
+          <p:nvPr>
+            <p:ph idx="1"/>
+          </p:nvPr>
+        </p:nvSpPr>
+        <p:spPr/>
+        <p:txBody>
+          <a:bodyPr/>
+          <a:lstStyle/>
+          <a:p>
+            <a:r>
+              <a:rPr lang="en-US" dirty="0"/>
+              <a:t>Automobile Tracking</a:t>
+            </a:r>
+          </a:p>
+        </p:txBody>
+      </p:sp>
+      <p:pic>
+        <p:nvPicPr>
+          <p:cNvPr id="4" name="Picture 3">
+            <a:extLst>
+              <a:ext uri="{FF2B5EF4-FFF2-40B4-BE49-F238E27FC236}">
+                <a16:creationId xmlns:a16="http://schemas.microsoft.com/office/drawing/2014/main" id="{91F19CE3-C79C-4B4E-9DFB-953E12007E9A}"/>
+              </a:ext>
+            </a:extLst>
+          </p:cNvPr>
+          <p:cNvPicPr>
+            <a:picLocks noChangeAspect="1"/>
+          </p:cNvPicPr>
+          <p:nvPr/>
+        </p:nvPicPr>
+        <p:blipFill>
+          <a:blip r:embed="rId3"/>
+          <a:stretch>
+            <a:fillRect/>
+          </a:stretch>
+        </p:blipFill>
+        <p:spPr>
+          <a:xfrm>
+            <a:off x="2689551" y="2106386"/>
+            <a:ext cx="8650665" cy="4033570"/>
+          </a:xfrm>
+          <a:prstGeom prst="rect">
+            <a:avLst/>
+          </a:prstGeom>
+        </p:spPr>
+      </p:pic>
+    </p:spTree>
+    <p:extLst>
+      <p:ext uri="{BB962C8B-B14F-4D97-AF65-F5344CB8AC3E}">
+        <p14:creationId xmlns:p14="http://schemas.microsoft.com/office/powerpoint/2010/main" val="2154506968"/>
+      </p:ext>
+    </p:extLst>
+  </p:cSld>
+  <p:clrMapOvr>
+    <a:masterClrMapping/>
+  </p:clrMapOvr>
+</p:sld>
+</file>
+
+<file path=ppt/slides/slide6.xml><?xml version="1.0" encoding="utf-8"?>
+<p:sld xmlns:a="http://schemas.openxmlformats.org/drawingml/2006/main" xmlns:r="http://schemas.openxmlformats.org/officeDocument/2006/relationships" xmlns:p="http://schemas.openxmlformats.org/presentationml/2006/main">
+  <p:cSld>
+    <p:spTree>
+      <p:nvGrpSpPr>
+        <p:cNvPr id="1" name=""/>
+        <p:cNvGrpSpPr/>
+        <p:nvPr/>
+      </p:nvGrpSpPr>
+      <p:grpSpPr>
+        <a:xfrm>
+          <a:off x="0" y="0"/>
+          <a:ext cx="0" cy="0"/>
+          <a:chOff x="0" y="0"/>
+          <a:chExt cx="0" cy="0"/>
+        </a:xfrm>
+      </p:grpSpPr>
+      <p:sp>
+        <p:nvSpPr>
+          <p:cNvPr id="2" name="Title 1"/>
+          <p:cNvSpPr>
+            <a:spLocks noGrp="1"/>
+          </p:cNvSpPr>
+          <p:nvPr>
+            <p:ph type="title"/>
+          </p:nvPr>
+        </p:nvSpPr>
+        <p:spPr/>
+        <p:txBody>
+          <a:bodyPr/>
+          <a:lstStyle/>
+          <a:p>
+            <a:r>
               <a:rPr lang="en-US" dirty="0"/>
               <a:t>Thank You</a:t>
             </a:r>
@@ -3117,16 +3943,15 @@
               <a:t>This presentation and supporting materials can be found at </a:t>
             </a:r>
             <a:r>
-              <a:rPr lang="en-US" dirty="0" smtClean="0">
+              <a:rPr lang="en-US" dirty="0">
                 <a:hlinkClick r:id="rId2"/>
               </a:rPr>
               <a:t>www.tf3604.com/temporal</a:t>
             </a:r>
             <a:r>
-              <a:rPr lang="en-US" dirty="0" smtClean="0"/>
+              <a:rPr lang="en-US" dirty="0"/>
               <a:t>.</a:t>
             </a:r>
-            <a:endParaRPr lang="en-US" dirty="0"/>
           </a:p>
           <a:p>
             <a:pPr lvl="1"/>
@@ -3146,11 +3971,7 @@
             <a:pPr lvl="1"/>
             <a:r>
               <a:rPr lang="en-US" dirty="0"/>
-              <a:t>Sample </a:t>
-            </a:r>
-            <a:r>
-              <a:rPr lang="en-US" dirty="0" smtClean="0"/>
-              <a:t>database</a:t>
+              <a:t>Sample database</a:t>
             </a:r>
           </a:p>
           <a:p>
@@ -3186,13 +4007,6 @@
   <p:clrMapOvr>
     <a:masterClrMapping/>
   </p:clrMapOvr>
-  <p:timing>
-    <p:tnLst>
-      <p:par>
-        <p:cTn id="1" dur="indefinite" restart="never" nodeType="tmRoot"/>
-      </p:par>
-    </p:tnLst>
-  </p:timing>
 </p:sld>
 </file>
 

</xml_diff>

<commit_message>
Add script notes, update slide nodes, add extra workload script.
</commit_message>
<xml_diff>
--- a/Temporal.pptx
+++ b/Temporal.pptx
@@ -529,20 +529,8 @@
           <a:lstStyle/>
           <a:p>
             <a:r>
-              <a:rPr lang="en-US"/>
-              <a:t>Immediately </a:t>
-            </a:r>
-            <a:r>
-              <a:rPr lang="en-US" dirty="0"/>
-              <a:t>b</a:t>
-            </a:r>
-            <a:r>
-              <a:rPr lang="en-US"/>
-              <a:t>efore </a:t>
-            </a:r>
-            <a:r>
-              <a:rPr lang="en-US" dirty="0"/>
-              <a:t>the session</a:t>
+              <a:rPr lang="en-US" dirty="0"/>
+              <a:t>Immediately before the session</a:t>
             </a:r>
           </a:p>
           <a:p>
@@ -598,8 +586,13 @@
             </a:pPr>
             <a:r>
               <a:rPr lang="en-US" dirty="0"/>
-              <a:t>Start the workload (Script 012)</a:t>
-            </a:r>
+              <a:t>Start the workloads (Scripts 012a </a:t>
+            </a:r>
+            <a:r>
+              <a:rPr lang="en-US"/>
+              <a:t>and 012b)</a:t>
+            </a:r>
+            <a:endParaRPr lang="en-US" dirty="0"/>
           </a:p>
           <a:p>
             <a:pPr marL="628650" lvl="1" indent="-171450">
@@ -2016,7 +2009,7 @@
           <a:graphicData uri="http://schemas.openxmlformats.org/presentationml/2006/ole">
             <mc:AlternateContent xmlns:mc="http://schemas.openxmlformats.org/markup-compatibility/2006">
               <mc:Choice xmlns:v="urn:schemas-microsoft-com:vml" Requires="v">
-                <p:oleObj spid="_x0000_s1037" name="Image" r:id="rId10" imgW="2279520" imgH="1310400" progId="Photoshop.Image.18">
+                <p:oleObj spid="_x0000_s1038" name="Image" r:id="rId10" imgW="2279520" imgH="1310400" progId="Photoshop.Image.18">
                   <p:embed/>
                 </p:oleObj>
               </mc:Choice>

</xml_diff>

<commit_message>
Minor tweaks to scripts and slides.
</commit_message>
<xml_diff>
--- a/Temporal.pptx
+++ b/Temporal.pptx
@@ -217,7 +217,7 @@
           <a:p>
             <a:fld id="{3CD51548-82AA-4A2B-B152-1D3266E0F652}" type="datetimeFigureOut">
               <a:rPr lang="en-US" smtClean="0"/>
-              <a:t>6/6/2017</a:t>
+              <a:t>06/07/2017</a:t>
             </a:fld>
             <a:endParaRPr lang="en-US"/>
           </a:p>
@@ -718,8 +718,13 @@
             </a:pPr>
             <a:r>
               <a:rPr lang="en-US" dirty="0"/>
-              <a:t>Traditionally accomplished with triggers, CDC/CT or other methods</a:t>
-            </a:r>
+              <a:t>Traditionally accomplished with triggers, CDC/CT or other </a:t>
+            </a:r>
+            <a:r>
+              <a:rPr lang="en-US" dirty="0" smtClean="0"/>
+              <a:t>methods (in the app, for instance)</a:t>
+            </a:r>
+            <a:endParaRPr lang="en-US" dirty="0"/>
           </a:p>
           <a:p>
             <a:pPr marL="0" indent="0">
@@ -2009,7 +2014,7 @@
           <a:graphicData uri="http://schemas.openxmlformats.org/presentationml/2006/ole">
             <mc:AlternateContent xmlns:mc="http://schemas.openxmlformats.org/markup-compatibility/2006">
               <mc:Choice xmlns:v="urn:schemas-microsoft-com:vml" Requires="v">
-                <p:oleObj spid="_x0000_s1038" name="Image" r:id="rId10" imgW="2279520" imgH="1310400" progId="Photoshop.Image.18">
+                <p:oleObj spid="_x0000_s1040" name="Image" r:id="rId10" imgW="2279520" imgH="1310400" progId="Photoshop.Image.18">
                   <p:embed/>
                 </p:oleObj>
               </mc:Choice>
@@ -2431,7 +2436,7 @@
           <p:cNvPr id="4" name="TextBox 3">
             <a:extLst>
               <a:ext uri="{FF2B5EF4-FFF2-40B4-BE49-F238E27FC236}">
-                <a16:creationId xmlns:a16="http://schemas.microsoft.com/office/drawing/2014/main" id="{4E95CA58-BC71-4CE1-ACB0-4410970492E6}"/>
+                <a16:creationId xmlns:a16="http://schemas.microsoft.com/office/drawing/2014/main" xmlns="" id="{4E95CA58-BC71-4CE1-ACB0-4410970492E6}"/>
               </a:ext>
             </a:extLst>
           </p:cNvPr>
@@ -3521,7 +3526,7 @@
           <p:cNvPr id="2" name="Title 1">
             <a:extLst>
               <a:ext uri="{FF2B5EF4-FFF2-40B4-BE49-F238E27FC236}">
-                <a16:creationId xmlns:a16="http://schemas.microsoft.com/office/drawing/2014/main" id="{C9BFF397-973F-4CF4-B089-7CF11ECD75B3}"/>
+                <a16:creationId xmlns:a16="http://schemas.microsoft.com/office/drawing/2014/main" xmlns="" id="{C9BFF397-973F-4CF4-B089-7CF11ECD75B3}"/>
               </a:ext>
             </a:extLst>
           </p:cNvPr>
@@ -3549,7 +3554,7 @@
           <p:cNvPr id="3" name="Content Placeholder 2">
             <a:extLst>
               <a:ext uri="{FF2B5EF4-FFF2-40B4-BE49-F238E27FC236}">
-                <a16:creationId xmlns:a16="http://schemas.microsoft.com/office/drawing/2014/main" id="{2C4E2FAE-1993-45F8-901A-679941B185E8}"/>
+                <a16:creationId xmlns:a16="http://schemas.microsoft.com/office/drawing/2014/main" xmlns="" id="{2C4E2FAE-1993-45F8-901A-679941B185E8}"/>
               </a:ext>
             </a:extLst>
           </p:cNvPr>
@@ -3593,8 +3598,13 @@
             </a:pPr>
             <a:r>
               <a:rPr lang="en-US" dirty="0"/>
-              <a:t>Logging / Reversal of changes</a:t>
-            </a:r>
+              <a:t>Logging / Reversal of </a:t>
+            </a:r>
+            <a:r>
+              <a:rPr lang="en-US" dirty="0" smtClean="0"/>
+              <a:t>changes / Anomaly detection</a:t>
+            </a:r>
+            <a:endParaRPr lang="en-US" dirty="0"/>
           </a:p>
           <a:p>
             <a:pPr marL="1147527" lvl="1" indent="-571500">
@@ -3603,8 +3613,13 @@
             </a:pPr>
             <a:r>
               <a:rPr lang="en-US" dirty="0"/>
-              <a:t>Point-in-time business analytics</a:t>
-            </a:r>
+              <a:t>Point-in-time business </a:t>
+            </a:r>
+            <a:r>
+              <a:rPr lang="en-US" dirty="0" smtClean="0"/>
+              <a:t>analytics / trends</a:t>
+            </a:r>
+            <a:endParaRPr lang="en-US" dirty="0"/>
           </a:p>
           <a:p>
             <a:pPr marL="571500" indent="-571500">
@@ -3613,8 +3628,17 @@
             </a:pPr>
             <a:r>
               <a:rPr lang="en-US" dirty="0"/>
-              <a:t>Other purposes – but with complexity</a:t>
-            </a:r>
+              <a:t>Other purposes – but </a:t>
+            </a:r>
+            <a:r>
+              <a:rPr lang="en-US"/>
+              <a:t>with </a:t>
+            </a:r>
+            <a:r>
+              <a:rPr lang="en-US" smtClean="0"/>
+              <a:t>complexity / caveats</a:t>
+            </a:r>
+            <a:endParaRPr lang="en-US" dirty="0"/>
           </a:p>
           <a:p>
             <a:pPr marL="1147527" lvl="1" indent="-571500">
@@ -3633,8 +3657,13 @@
             </a:pPr>
             <a:r>
               <a:rPr lang="en-US" dirty="0"/>
-              <a:t>Change tracking</a:t>
-            </a:r>
+              <a:t>Change </a:t>
+            </a:r>
+            <a:r>
+              <a:rPr lang="en-US" dirty="0" smtClean="0"/>
+              <a:t>detection</a:t>
+            </a:r>
+            <a:endParaRPr lang="en-US" dirty="0"/>
           </a:p>
           <a:p>
             <a:pPr marL="1147527" lvl="1" indent="-571500">
@@ -3781,7 +3810,7 @@
           <p:cNvPr id="2" name="Title 1">
             <a:extLst>
               <a:ext uri="{FF2B5EF4-FFF2-40B4-BE49-F238E27FC236}">
-                <a16:creationId xmlns:a16="http://schemas.microsoft.com/office/drawing/2014/main" id="{FEF5F440-7918-4A6B-9C7C-C25F5B4AB5DD}"/>
+                <a16:creationId xmlns:a16="http://schemas.microsoft.com/office/drawing/2014/main" xmlns="" id="{FEF5F440-7918-4A6B-9C7C-C25F5B4AB5DD}"/>
               </a:ext>
             </a:extLst>
           </p:cNvPr>
@@ -3809,7 +3838,7 @@
           <p:cNvPr id="3" name="Content Placeholder 2">
             <a:extLst>
               <a:ext uri="{FF2B5EF4-FFF2-40B4-BE49-F238E27FC236}">
-                <a16:creationId xmlns:a16="http://schemas.microsoft.com/office/drawing/2014/main" id="{9E20F2C1-4D76-4D3B-8502-4FA0575D48CD}"/>
+                <a16:creationId xmlns:a16="http://schemas.microsoft.com/office/drawing/2014/main" xmlns="" id="{9E20F2C1-4D76-4D3B-8502-4FA0575D48CD}"/>
               </a:ext>
             </a:extLst>
           </p:cNvPr>
@@ -3837,7 +3866,7 @@
           <p:cNvPr id="4" name="Picture 3">
             <a:extLst>
               <a:ext uri="{FF2B5EF4-FFF2-40B4-BE49-F238E27FC236}">
-                <a16:creationId xmlns:a16="http://schemas.microsoft.com/office/drawing/2014/main" id="{91F19CE3-C79C-4B4E-9DFB-953E12007E9A}"/>
+                <a16:creationId xmlns:a16="http://schemas.microsoft.com/office/drawing/2014/main" xmlns="" id="{91F19CE3-C79C-4B4E-9DFB-953E12007E9A}"/>
               </a:ext>
             </a:extLst>
           </p:cNvPr>

</xml_diff>

<commit_message>
Add summary slides for reference purposes.
</commit_message>
<xml_diff>
--- a/Temporal.pptx
+++ b/Temporal.pptx
@@ -5,7 +5,7 @@
     <p:sldMasterId id="2147483648" r:id="rId1"/>
   </p:sldMasterIdLst>
   <p:notesMasterIdLst>
-    <p:notesMasterId r:id="rId10"/>
+    <p:notesMasterId r:id="rId14"/>
   </p:notesMasterIdLst>
   <p:sldIdLst>
     <p:sldId id="263" r:id="rId2"/>
@@ -15,7 +15,11 @@
     <p:sldId id="268" r:id="rId6"/>
     <p:sldId id="266" r:id="rId7"/>
     <p:sldId id="269" r:id="rId8"/>
-    <p:sldId id="267" r:id="rId9"/>
+    <p:sldId id="275" r:id="rId9"/>
+    <p:sldId id="276" r:id="rId10"/>
+    <p:sldId id="277" r:id="rId11"/>
+    <p:sldId id="278" r:id="rId12"/>
+    <p:sldId id="267" r:id="rId13"/>
   </p:sldIdLst>
   <p:sldSz cx="11520488" cy="6480175"/>
   <p:notesSz cx="6858000" cy="9144000"/>
@@ -2016,7 +2020,7 @@
           <a:graphicData uri="http://schemas.openxmlformats.org/presentationml/2006/ole">
             <mc:AlternateContent xmlns:mc="http://schemas.openxmlformats.org/markup-compatibility/2006">
               <mc:Choice xmlns:v="urn:schemas-microsoft-com:vml" Requires="v">
-                <p:oleObj spid="_x0000_s1044" name="Image" r:id="rId10" imgW="2279520" imgH="1310400" progId="Photoshop.Image.18">
+                <p:oleObj spid="_x0000_s1048" name="Image" r:id="rId10" imgW="2279520" imgH="1310400" progId="Photoshop.Image.18">
                   <p:embed/>
                 </p:oleObj>
               </mc:Choice>
@@ -2438,7 +2442,7 @@
           <p:cNvPr id="4" name="TextBox 3">
             <a:extLst>
               <a:ext uri="{FF2B5EF4-FFF2-40B4-BE49-F238E27FC236}">
-                <a16:creationId xmlns="" xmlns:a16="http://schemas.microsoft.com/office/drawing/2014/main" id="{4E95CA58-BC71-4CE1-ACB0-4410970492E6}"/>
+                <a16:creationId xmlns:a16="http://schemas.microsoft.com/office/drawing/2014/main" xmlns="" id="{4E95CA58-BC71-4CE1-ACB0-4410970492E6}"/>
               </a:ext>
             </a:extLst>
           </p:cNvPr>
@@ -2487,6 +2491,976 @@
     <p:extLst>
       <p:ext uri="{BB962C8B-B14F-4D97-AF65-F5344CB8AC3E}">
         <p14:creationId xmlns:p14="http://schemas.microsoft.com/office/powerpoint/2010/main" val="3947886400"/>
+      </p:ext>
+    </p:extLst>
+  </p:cSld>
+  <p:clrMapOvr>
+    <a:masterClrMapping/>
+  </p:clrMapOvr>
+</p:sld>
+</file>
+
+<file path=ppt/slides/slide10.xml><?xml version="1.0" encoding="utf-8"?>
+<p:sld xmlns:a="http://schemas.openxmlformats.org/drawingml/2006/main" xmlns:r="http://schemas.openxmlformats.org/officeDocument/2006/relationships" xmlns:p="http://schemas.openxmlformats.org/presentationml/2006/main">
+  <p:cSld>
+    <p:spTree>
+      <p:nvGrpSpPr>
+        <p:cNvPr id="1" name=""/>
+        <p:cNvGrpSpPr/>
+        <p:nvPr/>
+      </p:nvGrpSpPr>
+      <p:grpSpPr>
+        <a:xfrm>
+          <a:off x="0" y="0"/>
+          <a:ext cx="0" cy="0"/>
+          <a:chOff x="0" y="0"/>
+          <a:chExt cx="0" cy="0"/>
+        </a:xfrm>
+      </p:grpSpPr>
+      <p:sp>
+        <p:nvSpPr>
+          <p:cNvPr id="2" name="Title 1"/>
+          <p:cNvSpPr>
+            <a:spLocks noGrp="1"/>
+          </p:cNvSpPr>
+          <p:nvPr>
+            <p:ph type="title"/>
+          </p:nvPr>
+        </p:nvSpPr>
+        <p:spPr/>
+        <p:txBody>
+          <a:bodyPr/>
+          <a:lstStyle/>
+          <a:p>
+            <a:r>
+              <a:rPr lang="en-US" dirty="0" smtClean="0"/>
+              <a:t>Summary</a:t>
+            </a:r>
+            <a:endParaRPr lang="en-US" dirty="0"/>
+          </a:p>
+        </p:txBody>
+      </p:sp>
+      <p:sp>
+        <p:nvSpPr>
+          <p:cNvPr id="3" name="Content Placeholder 2"/>
+          <p:cNvSpPr>
+            <a:spLocks noGrp="1"/>
+          </p:cNvSpPr>
+          <p:nvPr>
+            <p:ph idx="1"/>
+          </p:nvPr>
+        </p:nvSpPr>
+        <p:spPr/>
+        <p:txBody>
+          <a:bodyPr/>
+          <a:lstStyle/>
+          <a:p>
+            <a:r>
+              <a:rPr lang="en-US" dirty="0">
+                <a:solidFill>
+                  <a:srgbClr val="0000FF"/>
+                </a:solidFill>
+                <a:highlight>
+                  <a:srgbClr val="FFFFFF"/>
+                </a:highlight>
+                <a:latin typeface="Consolas" panose="020B0609020204030204" pitchFamily="49" charset="0"/>
+              </a:rPr>
+              <a:t>select</a:t>
+            </a:r>
+            <a:r>
+              <a:rPr lang="en-US" dirty="0">
+                <a:solidFill>
+                  <a:srgbClr val="000000"/>
+                </a:solidFill>
+                <a:highlight>
+                  <a:srgbClr val="FFFFFF"/>
+                </a:highlight>
+                <a:latin typeface="Consolas" panose="020B0609020204030204" pitchFamily="49" charset="0"/>
+              </a:rPr>
+              <a:t> </a:t>
+            </a:r>
+            <a:endParaRPr lang="en-US" dirty="0" smtClean="0">
+              <a:solidFill>
+                <a:srgbClr val="000000"/>
+              </a:solidFill>
+              <a:highlight>
+                <a:srgbClr val="FFFFFF"/>
+              </a:highlight>
+              <a:latin typeface="Consolas" panose="020B0609020204030204" pitchFamily="49" charset="0"/>
+            </a:endParaRPr>
+          </a:p>
+          <a:p>
+            <a:r>
+              <a:rPr lang="en-US" dirty="0">
+                <a:solidFill>
+                  <a:srgbClr val="000000"/>
+                </a:solidFill>
+                <a:highlight>
+                  <a:srgbClr val="FFFFFF"/>
+                </a:highlight>
+                <a:latin typeface="Consolas" panose="020B0609020204030204" pitchFamily="49" charset="0"/>
+              </a:rPr>
+              <a:t>	</a:t>
+            </a:r>
+            <a:r>
+              <a:rPr lang="en-US" dirty="0" smtClean="0">
+                <a:solidFill>
+                  <a:srgbClr val="FF00FF"/>
+                </a:solidFill>
+                <a:highlight>
+                  <a:srgbClr val="FFFFFF"/>
+                </a:highlight>
+                <a:latin typeface="Consolas" panose="020B0609020204030204" pitchFamily="49" charset="0"/>
+              </a:rPr>
+              <a:t>cast</a:t>
+            </a:r>
+            <a:r>
+              <a:rPr lang="en-US" dirty="0">
+                <a:solidFill>
+                  <a:srgbClr val="808080"/>
+                </a:solidFill>
+                <a:highlight>
+                  <a:srgbClr val="FFFFFF"/>
+                </a:highlight>
+                <a:latin typeface="Consolas" panose="020B0609020204030204" pitchFamily="49" charset="0"/>
+              </a:rPr>
+              <a:t>(</a:t>
+            </a:r>
+            <a:r>
+              <a:rPr lang="en-US" dirty="0">
+                <a:solidFill>
+                  <a:srgbClr val="FF0000"/>
+                </a:solidFill>
+                <a:highlight>
+                  <a:srgbClr val="FFFFFF"/>
+                </a:highlight>
+                <a:latin typeface="Consolas" panose="020B0609020204030204" pitchFamily="49" charset="0"/>
+              </a:rPr>
+              <a:t>'2017-06-10 10:10:00'</a:t>
+            </a:r>
+            <a:r>
+              <a:rPr lang="en-US" dirty="0">
+                <a:solidFill>
+                  <a:srgbClr val="000000"/>
+                </a:solidFill>
+                <a:highlight>
+                  <a:srgbClr val="FFFFFF"/>
+                </a:highlight>
+                <a:latin typeface="Consolas" panose="020B0609020204030204" pitchFamily="49" charset="0"/>
+              </a:rPr>
+              <a:t> </a:t>
+            </a:r>
+            <a:r>
+              <a:rPr lang="en-US" dirty="0">
+                <a:solidFill>
+                  <a:srgbClr val="0000FF"/>
+                </a:solidFill>
+                <a:highlight>
+                  <a:srgbClr val="FFFFFF"/>
+                </a:highlight>
+                <a:latin typeface="Consolas" panose="020B0609020204030204" pitchFamily="49" charset="0"/>
+              </a:rPr>
+              <a:t>as</a:t>
+            </a:r>
+            <a:r>
+              <a:rPr lang="en-US" dirty="0">
+                <a:solidFill>
+                  <a:srgbClr val="000000"/>
+                </a:solidFill>
+                <a:highlight>
+                  <a:srgbClr val="FFFFFF"/>
+                </a:highlight>
+                <a:latin typeface="Consolas" panose="020B0609020204030204" pitchFamily="49" charset="0"/>
+              </a:rPr>
+              <a:t> </a:t>
+            </a:r>
+            <a:r>
+              <a:rPr lang="en-US" dirty="0">
+                <a:solidFill>
+                  <a:srgbClr val="0000FF"/>
+                </a:solidFill>
+                <a:highlight>
+                  <a:srgbClr val="FFFFFF"/>
+                </a:highlight>
+                <a:latin typeface="Consolas" panose="020B0609020204030204" pitchFamily="49" charset="0"/>
+              </a:rPr>
+              <a:t>datetime2</a:t>
+            </a:r>
+            <a:r>
+              <a:rPr lang="en-US" dirty="0">
+                <a:solidFill>
+                  <a:srgbClr val="808080"/>
+                </a:solidFill>
+                <a:highlight>
+                  <a:srgbClr val="FFFFFF"/>
+                </a:highlight>
+                <a:latin typeface="Consolas" panose="020B0609020204030204" pitchFamily="49" charset="0"/>
+              </a:rPr>
+              <a:t>)</a:t>
+            </a:r>
+            <a:endParaRPr lang="en-US" dirty="0" smtClean="0">
+              <a:solidFill>
+                <a:srgbClr val="FF0000"/>
+              </a:solidFill>
+              <a:highlight>
+                <a:srgbClr val="FFFFFF"/>
+              </a:highlight>
+              <a:latin typeface="Consolas" panose="020B0609020204030204" pitchFamily="49" charset="0"/>
+            </a:endParaRPr>
+          </a:p>
+          <a:p>
+            <a:r>
+              <a:rPr lang="en-US" dirty="0">
+                <a:solidFill>
+                  <a:srgbClr val="FF0000"/>
+                </a:solidFill>
+                <a:highlight>
+                  <a:srgbClr val="FFFFFF"/>
+                </a:highlight>
+                <a:latin typeface="Consolas" panose="020B0609020204030204" pitchFamily="49" charset="0"/>
+              </a:rPr>
+              <a:t>	</a:t>
+            </a:r>
+            <a:r>
+              <a:rPr lang="en-US" dirty="0" smtClean="0">
+                <a:solidFill>
+                  <a:srgbClr val="0000FF"/>
+                </a:solidFill>
+                <a:highlight>
+                  <a:srgbClr val="FFFFFF"/>
+                </a:highlight>
+                <a:latin typeface="Consolas" panose="020B0609020204030204" pitchFamily="49" charset="0"/>
+              </a:rPr>
+              <a:t>at</a:t>
+            </a:r>
+            <a:r>
+              <a:rPr lang="en-US" dirty="0" smtClean="0">
+                <a:solidFill>
+                  <a:srgbClr val="000000"/>
+                </a:solidFill>
+                <a:highlight>
+                  <a:srgbClr val="FFFFFF"/>
+                </a:highlight>
+                <a:latin typeface="Consolas" panose="020B0609020204030204" pitchFamily="49" charset="0"/>
+              </a:rPr>
+              <a:t> </a:t>
+            </a:r>
+            <a:r>
+              <a:rPr lang="en-US" dirty="0">
+                <a:solidFill>
+                  <a:srgbClr val="0000FF"/>
+                </a:solidFill>
+                <a:highlight>
+                  <a:srgbClr val="FFFFFF"/>
+                </a:highlight>
+                <a:latin typeface="Consolas" panose="020B0609020204030204" pitchFamily="49" charset="0"/>
+              </a:rPr>
+              <a:t>time</a:t>
+            </a:r>
+            <a:r>
+              <a:rPr lang="en-US" dirty="0">
+                <a:solidFill>
+                  <a:srgbClr val="000000"/>
+                </a:solidFill>
+                <a:highlight>
+                  <a:srgbClr val="FFFFFF"/>
+                </a:highlight>
+                <a:latin typeface="Consolas" panose="020B0609020204030204" pitchFamily="49" charset="0"/>
+              </a:rPr>
+              <a:t> </a:t>
+            </a:r>
+            <a:r>
+              <a:rPr lang="en-US" dirty="0">
+                <a:solidFill>
+                  <a:srgbClr val="0000FF"/>
+                </a:solidFill>
+                <a:highlight>
+                  <a:srgbClr val="FFFFFF"/>
+                </a:highlight>
+                <a:latin typeface="Consolas" panose="020B0609020204030204" pitchFamily="49" charset="0"/>
+              </a:rPr>
+              <a:t>zone</a:t>
+            </a:r>
+            <a:r>
+              <a:rPr lang="en-US" dirty="0">
+                <a:solidFill>
+                  <a:srgbClr val="000000"/>
+                </a:solidFill>
+                <a:highlight>
+                  <a:srgbClr val="FFFFFF"/>
+                </a:highlight>
+                <a:latin typeface="Consolas" panose="020B0609020204030204" pitchFamily="49" charset="0"/>
+              </a:rPr>
+              <a:t> </a:t>
+            </a:r>
+            <a:r>
+              <a:rPr lang="en-US" dirty="0">
+                <a:solidFill>
+                  <a:srgbClr val="FF0000"/>
+                </a:solidFill>
+                <a:highlight>
+                  <a:srgbClr val="FFFFFF"/>
+                </a:highlight>
+                <a:latin typeface="Consolas" panose="020B0609020204030204" pitchFamily="49" charset="0"/>
+              </a:rPr>
+              <a:t>'Central Standard </a:t>
+            </a:r>
+            <a:r>
+              <a:rPr lang="en-US" dirty="0" smtClean="0">
+                <a:solidFill>
+                  <a:srgbClr val="FF0000"/>
+                </a:solidFill>
+                <a:highlight>
+                  <a:srgbClr val="FFFFFF"/>
+                </a:highlight>
+                <a:latin typeface="Consolas" panose="020B0609020204030204" pitchFamily="49" charset="0"/>
+              </a:rPr>
+              <a:t>Time' </a:t>
+            </a:r>
+            <a:r>
+              <a:rPr lang="en-US" dirty="0">
+                <a:solidFill>
+                  <a:srgbClr val="FF0000"/>
+                </a:solidFill>
+                <a:highlight>
+                  <a:srgbClr val="FFFFFF"/>
+                </a:highlight>
+                <a:latin typeface="Consolas" panose="020B0609020204030204" pitchFamily="49" charset="0"/>
+              </a:rPr>
+              <a:t>	</a:t>
+            </a:r>
+            <a:r>
+              <a:rPr lang="en-US" dirty="0" smtClean="0">
+                <a:solidFill>
+                  <a:srgbClr val="0000FF"/>
+                </a:solidFill>
+                <a:highlight>
+                  <a:srgbClr val="FFFFFF"/>
+                </a:highlight>
+                <a:latin typeface="Consolas" panose="020B0609020204030204" pitchFamily="49" charset="0"/>
+              </a:rPr>
+              <a:t>at</a:t>
+            </a:r>
+            <a:r>
+              <a:rPr lang="en-US" dirty="0" smtClean="0">
+                <a:solidFill>
+                  <a:srgbClr val="000000"/>
+                </a:solidFill>
+                <a:highlight>
+                  <a:srgbClr val="FFFFFF"/>
+                </a:highlight>
+                <a:latin typeface="Consolas" panose="020B0609020204030204" pitchFamily="49" charset="0"/>
+              </a:rPr>
+              <a:t> </a:t>
+            </a:r>
+            <a:r>
+              <a:rPr lang="en-US" dirty="0">
+                <a:solidFill>
+                  <a:srgbClr val="0000FF"/>
+                </a:solidFill>
+                <a:highlight>
+                  <a:srgbClr val="FFFFFF"/>
+                </a:highlight>
+                <a:latin typeface="Consolas" panose="020B0609020204030204" pitchFamily="49" charset="0"/>
+              </a:rPr>
+              <a:t>time</a:t>
+            </a:r>
+            <a:r>
+              <a:rPr lang="en-US" dirty="0">
+                <a:solidFill>
+                  <a:srgbClr val="000000"/>
+                </a:solidFill>
+                <a:highlight>
+                  <a:srgbClr val="FFFFFF"/>
+                </a:highlight>
+                <a:latin typeface="Consolas" panose="020B0609020204030204" pitchFamily="49" charset="0"/>
+              </a:rPr>
+              <a:t> </a:t>
+            </a:r>
+            <a:r>
+              <a:rPr lang="en-US" dirty="0">
+                <a:solidFill>
+                  <a:srgbClr val="0000FF"/>
+                </a:solidFill>
+                <a:highlight>
+                  <a:srgbClr val="FFFFFF"/>
+                </a:highlight>
+                <a:latin typeface="Consolas" panose="020B0609020204030204" pitchFamily="49" charset="0"/>
+              </a:rPr>
+              <a:t>zone</a:t>
+            </a:r>
+            <a:r>
+              <a:rPr lang="en-US" dirty="0">
+                <a:solidFill>
+                  <a:srgbClr val="000000"/>
+                </a:solidFill>
+                <a:highlight>
+                  <a:srgbClr val="FFFFFF"/>
+                </a:highlight>
+                <a:latin typeface="Consolas" panose="020B0609020204030204" pitchFamily="49" charset="0"/>
+              </a:rPr>
+              <a:t> </a:t>
+            </a:r>
+            <a:r>
+              <a:rPr lang="en-US">
+                <a:solidFill>
+                  <a:srgbClr val="FF0000"/>
+                </a:solidFill>
+                <a:highlight>
+                  <a:srgbClr val="FFFFFF"/>
+                </a:highlight>
+                <a:latin typeface="Consolas" panose="020B0609020204030204" pitchFamily="49" charset="0"/>
+              </a:rPr>
+              <a:t>'UTC</a:t>
+            </a:r>
+            <a:r>
+              <a:rPr lang="en-US" smtClean="0">
+                <a:solidFill>
+                  <a:srgbClr val="FF0000"/>
+                </a:solidFill>
+                <a:highlight>
+                  <a:srgbClr val="FFFFFF"/>
+                </a:highlight>
+                <a:latin typeface="Consolas" panose="020B0609020204030204" pitchFamily="49" charset="0"/>
+              </a:rPr>
+              <a:t>'</a:t>
+            </a:r>
+            <a:r>
+              <a:rPr lang="en-US" smtClean="0">
+                <a:solidFill>
+                  <a:srgbClr val="808080"/>
+                </a:solidFill>
+                <a:highlight>
+                  <a:srgbClr val="FFFFFF"/>
+                </a:highlight>
+                <a:latin typeface="Consolas" panose="020B0609020204030204" pitchFamily="49" charset="0"/>
+              </a:rPr>
+              <a:t>;</a:t>
+            </a:r>
+          </a:p>
+          <a:p>
+            <a:endParaRPr lang="en-US" dirty="0" smtClean="0">
+              <a:solidFill>
+                <a:srgbClr val="808080"/>
+              </a:solidFill>
+              <a:highlight>
+                <a:srgbClr val="FFFFFF"/>
+              </a:highlight>
+              <a:latin typeface="Consolas" panose="020B0609020204030204" pitchFamily="49" charset="0"/>
+            </a:endParaRPr>
+          </a:p>
+          <a:p>
+            <a:r>
+              <a:rPr lang="en-US" dirty="0">
+                <a:solidFill>
+                  <a:srgbClr val="0000FF"/>
+                </a:solidFill>
+                <a:highlight>
+                  <a:srgbClr val="FFFFFF"/>
+                </a:highlight>
+                <a:latin typeface="Consolas" panose="020B0609020204030204" pitchFamily="49" charset="0"/>
+              </a:rPr>
+              <a:t>select</a:t>
+            </a:r>
+            <a:r>
+              <a:rPr lang="en-US" dirty="0">
+                <a:solidFill>
+                  <a:srgbClr val="000000"/>
+                </a:solidFill>
+                <a:highlight>
+                  <a:srgbClr val="FFFFFF"/>
+                </a:highlight>
+                <a:latin typeface="Consolas" panose="020B0609020204030204" pitchFamily="49" charset="0"/>
+              </a:rPr>
+              <a:t> </a:t>
+            </a:r>
+            <a:r>
+              <a:rPr lang="en-US" dirty="0">
+                <a:solidFill>
+                  <a:srgbClr val="808080"/>
+                </a:solidFill>
+                <a:highlight>
+                  <a:srgbClr val="FFFFFF"/>
+                </a:highlight>
+                <a:latin typeface="Consolas" panose="020B0609020204030204" pitchFamily="49" charset="0"/>
+              </a:rPr>
+              <a:t>*</a:t>
+            </a:r>
+            <a:r>
+              <a:rPr lang="en-US" dirty="0">
+                <a:solidFill>
+                  <a:srgbClr val="000000"/>
+                </a:solidFill>
+                <a:highlight>
+                  <a:srgbClr val="FFFFFF"/>
+                </a:highlight>
+                <a:latin typeface="Consolas" panose="020B0609020204030204" pitchFamily="49" charset="0"/>
+              </a:rPr>
+              <a:t> </a:t>
+            </a:r>
+            <a:r>
+              <a:rPr lang="en-US" dirty="0">
+                <a:solidFill>
+                  <a:srgbClr val="0000FF"/>
+                </a:solidFill>
+                <a:highlight>
+                  <a:srgbClr val="FFFFFF"/>
+                </a:highlight>
+                <a:latin typeface="Consolas" panose="020B0609020204030204" pitchFamily="49" charset="0"/>
+              </a:rPr>
+              <a:t>from</a:t>
+            </a:r>
+            <a:r>
+              <a:rPr lang="en-US" dirty="0">
+                <a:solidFill>
+                  <a:srgbClr val="000000"/>
+                </a:solidFill>
+                <a:highlight>
+                  <a:srgbClr val="FFFFFF"/>
+                </a:highlight>
+                <a:latin typeface="Consolas" panose="020B0609020204030204" pitchFamily="49" charset="0"/>
+              </a:rPr>
+              <a:t> </a:t>
+            </a:r>
+            <a:r>
+              <a:rPr lang="en-US" dirty="0" err="1">
+                <a:solidFill>
+                  <a:srgbClr val="00B050"/>
+                </a:solidFill>
+                <a:highlight>
+                  <a:srgbClr val="FFFFFF"/>
+                </a:highlight>
+                <a:latin typeface="Consolas" panose="020B0609020204030204" pitchFamily="49" charset="0"/>
+              </a:rPr>
+              <a:t>sys.time_zone_info</a:t>
+            </a:r>
+            <a:r>
+              <a:rPr lang="en-US" dirty="0">
+                <a:solidFill>
+                  <a:srgbClr val="808080"/>
+                </a:solidFill>
+                <a:highlight>
+                  <a:srgbClr val="FFFFFF"/>
+                </a:highlight>
+                <a:latin typeface="Consolas" panose="020B0609020204030204" pitchFamily="49" charset="0"/>
+              </a:rPr>
+              <a:t>;</a:t>
+            </a:r>
+            <a:endParaRPr lang="en-US" dirty="0"/>
+          </a:p>
+        </p:txBody>
+      </p:sp>
+    </p:spTree>
+    <p:extLst>
+      <p:ext uri="{BB962C8B-B14F-4D97-AF65-F5344CB8AC3E}">
+        <p14:creationId xmlns:p14="http://schemas.microsoft.com/office/powerpoint/2010/main" val="4235235981"/>
+      </p:ext>
+    </p:extLst>
+  </p:cSld>
+  <p:clrMapOvr>
+    <a:masterClrMapping/>
+  </p:clrMapOvr>
+</p:sld>
+</file>
+
+<file path=ppt/slides/slide11.xml><?xml version="1.0" encoding="utf-8"?>
+<p:sld xmlns:a="http://schemas.openxmlformats.org/drawingml/2006/main" xmlns:r="http://schemas.openxmlformats.org/officeDocument/2006/relationships" xmlns:p="http://schemas.openxmlformats.org/presentationml/2006/main">
+  <p:cSld>
+    <p:spTree>
+      <p:nvGrpSpPr>
+        <p:cNvPr id="1" name=""/>
+        <p:cNvGrpSpPr/>
+        <p:nvPr/>
+      </p:nvGrpSpPr>
+      <p:grpSpPr>
+        <a:xfrm>
+          <a:off x="0" y="0"/>
+          <a:ext cx="0" cy="0"/>
+          <a:chOff x="0" y="0"/>
+          <a:chExt cx="0" cy="0"/>
+        </a:xfrm>
+      </p:grpSpPr>
+      <p:sp>
+        <p:nvSpPr>
+          <p:cNvPr id="2" name="Title 1"/>
+          <p:cNvSpPr>
+            <a:spLocks noGrp="1"/>
+          </p:cNvSpPr>
+          <p:nvPr>
+            <p:ph type="title"/>
+          </p:nvPr>
+        </p:nvSpPr>
+        <p:spPr/>
+        <p:txBody>
+          <a:bodyPr/>
+          <a:lstStyle/>
+          <a:p>
+            <a:r>
+              <a:rPr lang="en-US" dirty="0" smtClean="0"/>
+              <a:t>Summary</a:t>
+            </a:r>
+            <a:endParaRPr lang="en-US" dirty="0"/>
+          </a:p>
+        </p:txBody>
+      </p:sp>
+      <p:sp>
+        <p:nvSpPr>
+          <p:cNvPr id="3" name="Content Placeholder 2"/>
+          <p:cNvSpPr>
+            <a:spLocks noGrp="1"/>
+          </p:cNvSpPr>
+          <p:nvPr>
+            <p:ph idx="1"/>
+          </p:nvPr>
+        </p:nvSpPr>
+        <p:spPr/>
+        <p:txBody>
+          <a:bodyPr/>
+          <a:lstStyle/>
+          <a:p>
+            <a:pPr marL="571500" indent="-571500">
+              <a:buFont typeface="Arial" panose="020B0604020202020204" pitchFamily="34" charset="0"/>
+              <a:buChar char="•"/>
+            </a:pPr>
+            <a:r>
+              <a:rPr lang="en-US" dirty="0" smtClean="0"/>
+              <a:t>New catalog objects</a:t>
+            </a:r>
+          </a:p>
+          <a:p>
+            <a:pPr marL="1147527" lvl="1" indent="-571500">
+              <a:buFont typeface="Arial" panose="020B0604020202020204" pitchFamily="34" charset="0"/>
+              <a:buChar char="•"/>
+            </a:pPr>
+            <a:r>
+              <a:rPr lang="en-US" dirty="0" err="1" smtClean="0"/>
+              <a:t>sys.</a:t>
+            </a:r>
+            <a:r>
+              <a:rPr lang="en-US" dirty="0" err="1" smtClean="0">
+                <a:solidFill>
+                  <a:srgbClr val="0070C0"/>
+                </a:solidFill>
+              </a:rPr>
+              <a:t>periods</a:t>
+            </a:r>
+            <a:r>
+              <a:rPr lang="en-US" dirty="0" smtClean="0"/>
+              <a:t> (view)</a:t>
+            </a:r>
+          </a:p>
+          <a:p>
+            <a:pPr marL="1147527" lvl="1" indent="-571500">
+              <a:buFont typeface="Arial" panose="020B0604020202020204" pitchFamily="34" charset="0"/>
+              <a:buChar char="•"/>
+            </a:pPr>
+            <a:r>
+              <a:rPr lang="en-US" dirty="0" err="1" smtClean="0"/>
+              <a:t>sys.</a:t>
+            </a:r>
+            <a:r>
+              <a:rPr lang="en-US" dirty="0" err="1" smtClean="0">
+                <a:solidFill>
+                  <a:srgbClr val="0070C0"/>
+                </a:solidFill>
+              </a:rPr>
+              <a:t>tables</a:t>
+            </a:r>
+            <a:r>
+              <a:rPr lang="en-US" dirty="0" err="1" smtClean="0"/>
+              <a:t>.</a:t>
+            </a:r>
+            <a:r>
+              <a:rPr lang="en-US" dirty="0" err="1" smtClean="0">
+                <a:solidFill>
+                  <a:srgbClr val="00B050"/>
+                </a:solidFill>
+              </a:rPr>
+              <a:t>temporal_type</a:t>
+            </a:r>
+            <a:r>
+              <a:rPr lang="en-US" dirty="0" smtClean="0"/>
+              <a:t> (column)</a:t>
+            </a:r>
+          </a:p>
+          <a:p>
+            <a:pPr marL="1147527" lvl="1" indent="-571500">
+              <a:buFont typeface="Arial" panose="020B0604020202020204" pitchFamily="34" charset="0"/>
+              <a:buChar char="•"/>
+            </a:pPr>
+            <a:r>
+              <a:rPr lang="en-US" dirty="0" err="1" smtClean="0"/>
+              <a:t>sys.</a:t>
+            </a:r>
+            <a:r>
+              <a:rPr lang="en-US" dirty="0" err="1" smtClean="0">
+                <a:solidFill>
+                  <a:srgbClr val="0070C0"/>
+                </a:solidFill>
+              </a:rPr>
+              <a:t>tables</a:t>
+            </a:r>
+            <a:r>
+              <a:rPr lang="en-US" dirty="0" err="1" smtClean="0"/>
+              <a:t>.</a:t>
+            </a:r>
+            <a:r>
+              <a:rPr lang="en-US" dirty="0" err="1" smtClean="0">
+                <a:solidFill>
+                  <a:srgbClr val="00B050"/>
+                </a:solidFill>
+              </a:rPr>
+              <a:t>temporal_type_desc</a:t>
+            </a:r>
+            <a:r>
+              <a:rPr lang="en-US" dirty="0" smtClean="0"/>
+              <a:t> (column)</a:t>
+            </a:r>
+          </a:p>
+          <a:p>
+            <a:pPr marL="1147527" lvl="1" indent="-571500">
+              <a:buFont typeface="Arial" panose="020B0604020202020204" pitchFamily="34" charset="0"/>
+              <a:buChar char="•"/>
+            </a:pPr>
+            <a:r>
+              <a:rPr lang="en-US" dirty="0" err="1" smtClean="0"/>
+              <a:t>sys.</a:t>
+            </a:r>
+            <a:r>
+              <a:rPr lang="en-US" dirty="0" err="1" smtClean="0">
+                <a:solidFill>
+                  <a:srgbClr val="0070C0"/>
+                </a:solidFill>
+              </a:rPr>
+              <a:t>tables</a:t>
+            </a:r>
+            <a:r>
+              <a:rPr lang="en-US" dirty="0" err="1" smtClean="0"/>
+              <a:t>.</a:t>
+            </a:r>
+            <a:r>
+              <a:rPr lang="en-US" dirty="0" err="1" smtClean="0">
+                <a:solidFill>
+                  <a:srgbClr val="00B050"/>
+                </a:solidFill>
+              </a:rPr>
+              <a:t>history_table_id</a:t>
+            </a:r>
+            <a:r>
+              <a:rPr lang="en-US" dirty="0" smtClean="0"/>
+              <a:t> (column)</a:t>
+            </a:r>
+          </a:p>
+          <a:p>
+            <a:pPr marL="1147527" lvl="1" indent="-571500">
+              <a:buFont typeface="Arial" panose="020B0604020202020204" pitchFamily="34" charset="0"/>
+              <a:buChar char="•"/>
+            </a:pPr>
+            <a:r>
+              <a:rPr lang="en-US" dirty="0" err="1"/>
+              <a:t>sys.</a:t>
+            </a:r>
+            <a:r>
+              <a:rPr lang="en-US" dirty="0" err="1">
+                <a:solidFill>
+                  <a:srgbClr val="0070C0"/>
+                </a:solidFill>
+              </a:rPr>
+              <a:t>columns</a:t>
+            </a:r>
+            <a:r>
+              <a:rPr lang="en-US" dirty="0" err="1"/>
+              <a:t>.</a:t>
+            </a:r>
+            <a:r>
+              <a:rPr lang="en-US" dirty="0" err="1">
+                <a:solidFill>
+                  <a:srgbClr val="00B050"/>
+                </a:solidFill>
+              </a:rPr>
+              <a:t>generated_always_type</a:t>
+            </a:r>
+            <a:r>
+              <a:rPr lang="en-US" dirty="0"/>
+              <a:t> (column)</a:t>
+            </a:r>
+          </a:p>
+          <a:p>
+            <a:pPr marL="1147527" lvl="1" indent="-571500">
+              <a:buFont typeface="Arial" panose="020B0604020202020204" pitchFamily="34" charset="0"/>
+              <a:buChar char="•"/>
+            </a:pPr>
+            <a:r>
+              <a:rPr lang="en-US" dirty="0" err="1" smtClean="0"/>
+              <a:t>sys.</a:t>
+            </a:r>
+            <a:r>
+              <a:rPr lang="en-US" dirty="0" err="1" smtClean="0">
+                <a:solidFill>
+                  <a:srgbClr val="0070C0"/>
+                </a:solidFill>
+              </a:rPr>
+              <a:t>columns</a:t>
+            </a:r>
+            <a:r>
+              <a:rPr lang="en-US" dirty="0" err="1" smtClean="0"/>
+              <a:t>.</a:t>
+            </a:r>
+            <a:r>
+              <a:rPr lang="en-US" dirty="0" err="1" smtClean="0">
+                <a:solidFill>
+                  <a:srgbClr val="00B050"/>
+                </a:solidFill>
+              </a:rPr>
+              <a:t>generated_always_type_desc</a:t>
+            </a:r>
+            <a:r>
+              <a:rPr lang="en-US" dirty="0" smtClean="0"/>
+              <a:t> </a:t>
+            </a:r>
+            <a:r>
+              <a:rPr lang="en-US" dirty="0"/>
+              <a:t>(column)</a:t>
+            </a:r>
+          </a:p>
+          <a:p>
+            <a:pPr lvl="1"/>
+            <a:endParaRPr lang="en-US" dirty="0"/>
+          </a:p>
+        </p:txBody>
+      </p:sp>
+    </p:spTree>
+    <p:extLst>
+      <p:ext uri="{BB962C8B-B14F-4D97-AF65-F5344CB8AC3E}">
+        <p14:creationId xmlns:p14="http://schemas.microsoft.com/office/powerpoint/2010/main" val="764752702"/>
+      </p:ext>
+    </p:extLst>
+  </p:cSld>
+  <p:clrMapOvr>
+    <a:masterClrMapping/>
+  </p:clrMapOvr>
+</p:sld>
+</file>
+
+<file path=ppt/slides/slide12.xml><?xml version="1.0" encoding="utf-8"?>
+<p:sld xmlns:a="http://schemas.openxmlformats.org/drawingml/2006/main" xmlns:r="http://schemas.openxmlformats.org/officeDocument/2006/relationships" xmlns:p="http://schemas.openxmlformats.org/presentationml/2006/main">
+  <p:cSld>
+    <p:spTree>
+      <p:nvGrpSpPr>
+        <p:cNvPr id="1" name=""/>
+        <p:cNvGrpSpPr/>
+        <p:nvPr/>
+      </p:nvGrpSpPr>
+      <p:grpSpPr>
+        <a:xfrm>
+          <a:off x="0" y="0"/>
+          <a:ext cx="0" cy="0"/>
+          <a:chOff x="0" y="0"/>
+          <a:chExt cx="0" cy="0"/>
+        </a:xfrm>
+      </p:grpSpPr>
+      <p:sp>
+        <p:nvSpPr>
+          <p:cNvPr id="2" name="Title 1"/>
+          <p:cNvSpPr>
+            <a:spLocks noGrp="1"/>
+          </p:cNvSpPr>
+          <p:nvPr>
+            <p:ph type="title"/>
+          </p:nvPr>
+        </p:nvSpPr>
+        <p:spPr/>
+        <p:txBody>
+          <a:bodyPr/>
+          <a:lstStyle/>
+          <a:p>
+            <a:r>
+              <a:rPr lang="en-US" dirty="0"/>
+              <a:t>Thank You</a:t>
+            </a:r>
+          </a:p>
+        </p:txBody>
+      </p:sp>
+      <p:sp>
+        <p:nvSpPr>
+          <p:cNvPr id="3" name="Content Placeholder 2"/>
+          <p:cNvSpPr>
+            <a:spLocks noGrp="1"/>
+          </p:cNvSpPr>
+          <p:nvPr>
+            <p:ph idx="1"/>
+          </p:nvPr>
+        </p:nvSpPr>
+        <p:spPr/>
+        <p:txBody>
+          <a:bodyPr>
+            <a:normAutofit lnSpcReduction="10000"/>
+          </a:bodyPr>
+          <a:lstStyle/>
+          <a:p>
+            <a:r>
+              <a:rPr lang="en-US" dirty="0"/>
+              <a:t>This presentation and supporting materials can be found at </a:t>
+            </a:r>
+            <a:r>
+              <a:rPr lang="en-US" dirty="0">
+                <a:hlinkClick r:id="rId2"/>
+              </a:rPr>
+              <a:t>www.tf3604.com/temporal</a:t>
+            </a:r>
+            <a:r>
+              <a:rPr lang="en-US" dirty="0"/>
+              <a:t>.</a:t>
+            </a:r>
+          </a:p>
+          <a:p>
+            <a:pPr lvl="1"/>
+            <a:r>
+              <a:rPr lang="en-US" dirty="0"/>
+              <a:t>Slide deck</a:t>
+            </a:r>
+          </a:p>
+          <a:p>
+            <a:pPr lvl="1"/>
+            <a:r>
+              <a:rPr lang="en-US" dirty="0"/>
+              <a:t>Scripts</a:t>
+            </a:r>
+          </a:p>
+          <a:p>
+            <a:pPr lvl="1"/>
+            <a:r>
+              <a:rPr lang="en-US" dirty="0"/>
+              <a:t>Sample database</a:t>
+            </a:r>
+          </a:p>
+          <a:p>
+            <a:pPr lvl="1"/>
+            <a:endParaRPr lang="en-US" dirty="0"/>
+          </a:p>
+          <a:p>
+            <a:endParaRPr lang="en-US" dirty="0"/>
+          </a:p>
+          <a:p>
+            <a:pPr algn="ctr"/>
+            <a:r>
+              <a:rPr lang="en-US" dirty="0">
+                <a:solidFill>
+                  <a:schemeClr val="accent1">
+                    <a:lumMod val="60000"/>
+                    <a:lumOff val="40000"/>
+                  </a:schemeClr>
+                </a:solidFill>
+              </a:rPr>
+              <a:t>brian@tf3604.com	• @tf3604</a:t>
+            </a:r>
+          </a:p>
+        </p:txBody>
+      </p:sp>
+    </p:spTree>
+    <p:extLst>
+      <p:ext uri="{BB962C8B-B14F-4D97-AF65-F5344CB8AC3E}">
+        <p14:creationId xmlns:p14="http://schemas.microsoft.com/office/powerpoint/2010/main" val="428730416"/>
       </p:ext>
     </p:extLst>
   </p:cSld>
@@ -3902,7 +4876,7 @@
           <p:cNvPr id="2" name="Title 1">
             <a:extLst>
               <a:ext uri="{FF2B5EF4-FFF2-40B4-BE49-F238E27FC236}">
-                <a16:creationId xmlns="" xmlns:a16="http://schemas.microsoft.com/office/drawing/2014/main" id="{C9BFF397-973F-4CF4-B089-7CF11ECD75B3}"/>
+                <a16:creationId xmlns:a16="http://schemas.microsoft.com/office/drawing/2014/main" xmlns="" id="{C9BFF397-973F-4CF4-B089-7CF11ECD75B3}"/>
               </a:ext>
             </a:extLst>
           </p:cNvPr>
@@ -3930,7 +4904,7 @@
           <p:cNvPr id="3" name="Content Placeholder 2">
             <a:extLst>
               <a:ext uri="{FF2B5EF4-FFF2-40B4-BE49-F238E27FC236}">
-                <a16:creationId xmlns="" xmlns:a16="http://schemas.microsoft.com/office/drawing/2014/main" id="{2C4E2FAE-1993-45F8-901A-679941B185E8}"/>
+                <a16:creationId xmlns:a16="http://schemas.microsoft.com/office/drawing/2014/main" xmlns="" id="{2C4E2FAE-1993-45F8-901A-679941B185E8}"/>
               </a:ext>
             </a:extLst>
           </p:cNvPr>
@@ -4224,7 +5198,7 @@
           <p:cNvPr id="2" name="Title 1">
             <a:extLst>
               <a:ext uri="{FF2B5EF4-FFF2-40B4-BE49-F238E27FC236}">
-                <a16:creationId xmlns="" xmlns:a16="http://schemas.microsoft.com/office/drawing/2014/main" id="{FEF5F440-7918-4A6B-9C7C-C25F5B4AB5DD}"/>
+                <a16:creationId xmlns:a16="http://schemas.microsoft.com/office/drawing/2014/main" xmlns="" id="{FEF5F440-7918-4A6B-9C7C-C25F5B4AB5DD}"/>
               </a:ext>
             </a:extLst>
           </p:cNvPr>
@@ -4252,7 +5226,7 @@
           <p:cNvPr id="3" name="Content Placeholder 2">
             <a:extLst>
               <a:ext uri="{FF2B5EF4-FFF2-40B4-BE49-F238E27FC236}">
-                <a16:creationId xmlns="" xmlns:a16="http://schemas.microsoft.com/office/drawing/2014/main" id="{9E20F2C1-4D76-4D3B-8502-4FA0575D48CD}"/>
+                <a16:creationId xmlns:a16="http://schemas.microsoft.com/office/drawing/2014/main" xmlns="" id="{9E20F2C1-4D76-4D3B-8502-4FA0575D48CD}"/>
               </a:ext>
             </a:extLst>
           </p:cNvPr>
@@ -4280,7 +5254,7 @@
           <p:cNvPr id="4" name="Picture 3">
             <a:extLst>
               <a:ext uri="{FF2B5EF4-FFF2-40B4-BE49-F238E27FC236}">
-                <a16:creationId xmlns="" xmlns:a16="http://schemas.microsoft.com/office/drawing/2014/main" id="{91F19CE3-C79C-4B4E-9DFB-953E12007E9A}"/>
+                <a16:creationId xmlns:a16="http://schemas.microsoft.com/office/drawing/2014/main" xmlns="" id="{91F19CE3-C79C-4B4E-9DFB-953E12007E9A}"/>
               </a:ext>
             </a:extLst>
           </p:cNvPr>
@@ -4351,92 +5325,918 @@
           <a:lstStyle/>
           <a:p>
             <a:r>
-              <a:rPr lang="en-US" dirty="0"/>
-              <a:t>Thank You</a:t>
-            </a:r>
+              <a:rPr lang="en-US" dirty="0" smtClean="0"/>
+              <a:t>Summary</a:t>
+            </a:r>
+            <a:endParaRPr lang="en-US" dirty="0"/>
           </a:p>
         </p:txBody>
       </p:sp>
+      <p:pic>
+        <p:nvPicPr>
+          <p:cNvPr id="3" name="Picture 2"/>
+          <p:cNvPicPr>
+            <a:picLocks noChangeAspect="1"/>
+          </p:cNvPicPr>
+          <p:nvPr/>
+        </p:nvPicPr>
+        <p:blipFill>
+          <a:blip r:embed="rId2"/>
+          <a:stretch>
+            <a:fillRect/>
+          </a:stretch>
+        </p:blipFill>
+        <p:spPr>
+          <a:xfrm>
+            <a:off x="1702675" y="1080363"/>
+            <a:ext cx="7692118" cy="5196739"/>
+          </a:xfrm>
+          <a:prstGeom prst="rect">
+            <a:avLst/>
+          </a:prstGeom>
+        </p:spPr>
+      </p:pic>
+    </p:spTree>
+    <p:extLst>
+      <p:ext uri="{BB962C8B-B14F-4D97-AF65-F5344CB8AC3E}">
+        <p14:creationId xmlns:p14="http://schemas.microsoft.com/office/powerpoint/2010/main" val="2249614066"/>
+      </p:ext>
+    </p:extLst>
+  </p:cSld>
+  <p:clrMapOvr>
+    <a:masterClrMapping/>
+  </p:clrMapOvr>
+</p:sld>
+</file>
+
+<file path=ppt/slides/slide9.xml><?xml version="1.0" encoding="utf-8"?>
+<p:sld xmlns:a="http://schemas.openxmlformats.org/drawingml/2006/main" xmlns:r="http://schemas.openxmlformats.org/officeDocument/2006/relationships" xmlns:p="http://schemas.openxmlformats.org/presentationml/2006/main">
+  <p:cSld>
+    <p:spTree>
+      <p:nvGrpSpPr>
+        <p:cNvPr id="1" name=""/>
+        <p:cNvGrpSpPr/>
+        <p:nvPr/>
+      </p:nvGrpSpPr>
+      <p:grpSpPr>
+        <a:xfrm>
+          <a:off x="0" y="0"/>
+          <a:ext cx="0" cy="0"/>
+          <a:chOff x="0" y="0"/>
+          <a:chExt cx="0" cy="0"/>
+        </a:xfrm>
+      </p:grpSpPr>
       <p:sp>
         <p:nvSpPr>
-          <p:cNvPr id="3" name="Content Placeholder 2"/>
+          <p:cNvPr id="2" name="Title 1"/>
           <p:cNvSpPr>
             <a:spLocks noGrp="1"/>
           </p:cNvSpPr>
           <p:nvPr>
-            <p:ph idx="1"/>
+            <p:ph type="title"/>
           </p:nvPr>
         </p:nvSpPr>
         <p:spPr/>
         <p:txBody>
-          <a:bodyPr>
-            <a:normAutofit lnSpcReduction="10000"/>
-          </a:bodyPr>
+          <a:bodyPr/>
           <a:lstStyle/>
           <a:p>
             <a:r>
-              <a:rPr lang="en-US" dirty="0"/>
-              <a:t>This presentation and supporting materials can be found at </a:t>
-            </a:r>
-            <a:r>
-              <a:rPr lang="en-US" dirty="0">
-                <a:hlinkClick r:id="rId2"/>
-              </a:rPr>
-              <a:t>www.tf3604.com/temporal</a:t>
-            </a:r>
-            <a:r>
-              <a:rPr lang="en-US" dirty="0"/>
-              <a:t>.</a:t>
-            </a:r>
-          </a:p>
-          <a:p>
-            <a:pPr lvl="1"/>
-            <a:r>
-              <a:rPr lang="en-US" dirty="0"/>
-              <a:t>Slide deck</a:t>
-            </a:r>
-          </a:p>
-          <a:p>
-            <a:pPr lvl="1"/>
-            <a:r>
-              <a:rPr lang="en-US" dirty="0"/>
-              <a:t>Scripts</a:t>
-            </a:r>
-          </a:p>
-          <a:p>
-            <a:pPr lvl="1"/>
-            <a:r>
-              <a:rPr lang="en-US" dirty="0"/>
-              <a:t>Sample database</a:t>
-            </a:r>
-          </a:p>
-          <a:p>
-            <a:pPr lvl="1"/>
+              <a:rPr lang="en-US" dirty="0" smtClean="0"/>
+              <a:t>Summary</a:t>
+            </a:r>
             <a:endParaRPr lang="en-US" dirty="0"/>
-          </a:p>
-          <a:p>
-            <a:endParaRPr lang="en-US" dirty="0"/>
-          </a:p>
-          <a:p>
-            <a:pPr algn="ctr"/>
-            <a:r>
-              <a:rPr lang="en-US" dirty="0">
-                <a:solidFill>
-                  <a:schemeClr val="accent1">
-                    <a:lumMod val="60000"/>
-                    <a:lumOff val="40000"/>
-                  </a:schemeClr>
-                </a:solidFill>
-              </a:rPr>
-              <a:t>brian@tf3604.com	• @tf3604</a:t>
-            </a:r>
           </a:p>
         </p:txBody>
       </p:sp>
+      <p:graphicFrame>
+        <p:nvGraphicFramePr>
+          <p:cNvPr id="3" name="Table 2"/>
+          <p:cNvGraphicFramePr>
+            <a:graphicFrameLocks noGrp="1"/>
+          </p:cNvGraphicFramePr>
+          <p:nvPr>
+            <p:extLst>
+              <p:ext uri="{D42A27DB-BD31-4B8C-83A1-F6EECF244321}">
+                <p14:modId xmlns:p14="http://schemas.microsoft.com/office/powerpoint/2010/main" val="1421733500"/>
+              </p:ext>
+            </p:extLst>
+          </p:nvPr>
+        </p:nvGraphicFramePr>
+        <p:xfrm>
+          <a:off x="361038" y="1395405"/>
+          <a:ext cx="11029616" cy="4904770"/>
+        </p:xfrm>
+        <a:graphic>
+          <a:graphicData uri="http://schemas.openxmlformats.org/drawingml/2006/table">
+            <a:tbl>
+              <a:tblPr firstRow="1" bandRow="1">
+                <a:tableStyleId>{5C22544A-7EE6-4342-B048-85BDC9FD1C3A}</a:tableStyleId>
+              </a:tblPr>
+              <a:tblGrid>
+                <a:gridCol w="5514808">
+                  <a:extLst>
+                    <a:ext uri="{9D8B030D-6E8A-4147-A177-3AD203B41FA5}">
+                      <a16:colId xmlns="" xmlns:a16="http://schemas.microsoft.com/office/drawing/2014/main" val="2893081794"/>
+                    </a:ext>
+                  </a:extLst>
+                </a:gridCol>
+                <a:gridCol w="5514808">
+                  <a:extLst>
+                    <a:ext uri="{9D8B030D-6E8A-4147-A177-3AD203B41FA5}">
+                      <a16:colId xmlns="" xmlns:a16="http://schemas.microsoft.com/office/drawing/2014/main" val="353638004"/>
+                    </a:ext>
+                  </a:extLst>
+                </a:gridCol>
+              </a:tblGrid>
+              <a:tr h="684070">
+                <a:tc gridSpan="2">
+                  <a:txBody>
+                    <a:bodyPr/>
+                    <a:lstStyle/>
+                    <a:p>
+                      <a:pPr marL="0" marR="0" indent="0" algn="l" defTabSz="457200" rtl="0" eaLnBrk="1" fontAlgn="auto" latinLnBrk="0" hangingPunct="1">
+                        <a:lnSpc>
+                          <a:spcPct val="100000"/>
+                        </a:lnSpc>
+                        <a:spcBef>
+                          <a:spcPts val="0"/>
+                        </a:spcBef>
+                        <a:spcAft>
+                          <a:spcPts val="0"/>
+                        </a:spcAft>
+                        <a:buClrTx/>
+                        <a:buSzTx/>
+                        <a:buFontTx/>
+                        <a:buNone/>
+                        <a:tabLst/>
+                        <a:defRPr/>
+                      </a:pPr>
+                      <a:r>
+                        <a:rPr lang="en-US" sz="2400" dirty="0"/>
+                        <a:t>Temporal querying:   </a:t>
+                      </a:r>
+                      <a:r>
+                        <a:rPr lang="en-US" sz="2400" dirty="0">
+                          <a:solidFill>
+                            <a:srgbClr val="0000FF"/>
+                          </a:solidFill>
+                          <a:highlight>
+                            <a:srgbClr val="FFFFFF"/>
+                          </a:highlight>
+                          <a:latin typeface="Consolas" panose="020B0609020204030204" pitchFamily="49" charset="0"/>
+                        </a:rPr>
+                        <a:t>FROM</a:t>
+                      </a:r>
+                      <a:r>
+                        <a:rPr lang="en-US" sz="2400" dirty="0">
+                          <a:solidFill>
+                            <a:srgbClr val="000000"/>
+                          </a:solidFill>
+                          <a:highlight>
+                            <a:srgbClr val="FFFFFF"/>
+                          </a:highlight>
+                          <a:latin typeface="Consolas" panose="020B0609020204030204" pitchFamily="49" charset="0"/>
+                        </a:rPr>
+                        <a:t> </a:t>
+                      </a:r>
+                      <a:r>
+                        <a:rPr lang="en-US" sz="2400" dirty="0" err="1">
+                          <a:solidFill>
+                            <a:srgbClr val="000000"/>
+                          </a:solidFill>
+                          <a:highlight>
+                            <a:srgbClr val="FFFFFF"/>
+                          </a:highlight>
+                          <a:latin typeface="Consolas" panose="020B0609020204030204" pitchFamily="49" charset="0"/>
+                        </a:rPr>
+                        <a:t>TableName</a:t>
+                      </a:r>
+                      <a:r>
+                        <a:rPr lang="en-US" sz="2400" dirty="0">
+                          <a:solidFill>
+                            <a:srgbClr val="000000"/>
+                          </a:solidFill>
+                          <a:highlight>
+                            <a:srgbClr val="FFFFFF"/>
+                          </a:highlight>
+                          <a:latin typeface="Consolas" panose="020B0609020204030204" pitchFamily="49" charset="0"/>
+                        </a:rPr>
+                        <a:t> </a:t>
+                      </a:r>
+                      <a:r>
+                        <a:rPr lang="en-US" sz="2400" dirty="0">
+                          <a:solidFill>
+                            <a:srgbClr val="0000FF"/>
+                          </a:solidFill>
+                          <a:highlight>
+                            <a:srgbClr val="FFFFFF"/>
+                          </a:highlight>
+                          <a:latin typeface="Consolas" panose="020B0609020204030204" pitchFamily="49" charset="0"/>
+                        </a:rPr>
+                        <a:t>FOR</a:t>
+                      </a:r>
+                      <a:r>
+                        <a:rPr lang="en-US" sz="2400" dirty="0">
+                          <a:solidFill>
+                            <a:srgbClr val="000000"/>
+                          </a:solidFill>
+                          <a:highlight>
+                            <a:srgbClr val="FFFFFF"/>
+                          </a:highlight>
+                          <a:latin typeface="Consolas" panose="020B0609020204030204" pitchFamily="49" charset="0"/>
+                        </a:rPr>
+                        <a:t> </a:t>
+                      </a:r>
+                      <a:r>
+                        <a:rPr lang="en-US" sz="2400" dirty="0">
+                          <a:solidFill>
+                            <a:srgbClr val="0000FF"/>
+                          </a:solidFill>
+                          <a:highlight>
+                            <a:srgbClr val="FFFFFF"/>
+                          </a:highlight>
+                          <a:latin typeface="Consolas" panose="020B0609020204030204" pitchFamily="49" charset="0"/>
+                        </a:rPr>
+                        <a:t>SYSTEM</a:t>
+                      </a:r>
+                      <a:r>
+                        <a:rPr lang="en-US" sz="2400" dirty="0">
+                          <a:solidFill>
+                            <a:srgbClr val="000000"/>
+                          </a:solidFill>
+                          <a:highlight>
+                            <a:srgbClr val="FFFFFF"/>
+                          </a:highlight>
+                          <a:latin typeface="Consolas" panose="020B0609020204030204" pitchFamily="49" charset="0"/>
+                        </a:rPr>
+                        <a:t>_</a:t>
+                      </a:r>
+                      <a:r>
+                        <a:rPr lang="en-US" sz="2400" dirty="0">
+                          <a:solidFill>
+                            <a:srgbClr val="0000FF"/>
+                          </a:solidFill>
+                          <a:highlight>
+                            <a:srgbClr val="FFFFFF"/>
+                          </a:highlight>
+                          <a:latin typeface="Consolas" panose="020B0609020204030204" pitchFamily="49" charset="0"/>
+                        </a:rPr>
+                        <a:t>TIME</a:t>
+                      </a:r>
+                      <a:r>
+                        <a:rPr lang="en-US" sz="2400" dirty="0">
+                          <a:solidFill>
+                            <a:srgbClr val="000000"/>
+                          </a:solidFill>
+                          <a:highlight>
+                            <a:srgbClr val="FFFFFF"/>
+                          </a:highlight>
+                          <a:latin typeface="Consolas" panose="020B0609020204030204" pitchFamily="49" charset="0"/>
+                        </a:rPr>
+                        <a:t> _____</a:t>
+                      </a:r>
+                    </a:p>
+                  </a:txBody>
+                  <a:tcPr anchor="ctr"/>
+                </a:tc>
+                <a:tc hMerge="1">
+                  <a:txBody>
+                    <a:bodyPr/>
+                    <a:lstStyle/>
+                    <a:p>
+                      <a:endParaRPr lang="en-US" dirty="0"/>
+                    </a:p>
+                  </a:txBody>
+                  <a:tcPr/>
+                </a:tc>
+                <a:extLst>
+                  <a:ext uri="{0D108BD9-81ED-4DB2-BD59-A6C34878D82A}">
+                    <a16:rowId xmlns="" xmlns:a16="http://schemas.microsoft.com/office/drawing/2014/main" val="2804491224"/>
+                  </a:ext>
+                </a:extLst>
+              </a:tr>
+              <a:tr h="684070">
+                <a:tc>
+                  <a:txBody>
+                    <a:bodyPr/>
+                    <a:lstStyle/>
+                    <a:p>
+                      <a:r>
+                        <a:rPr lang="en-US" sz="2400" dirty="0"/>
+                        <a:t>Point in time</a:t>
+                      </a:r>
+                    </a:p>
+                  </a:txBody>
+                  <a:tcPr anchor="ctr"/>
+                </a:tc>
+                <a:tc>
+                  <a:txBody>
+                    <a:bodyPr/>
+                    <a:lstStyle/>
+                    <a:p>
+                      <a:r>
+                        <a:rPr lang="en-US" sz="2400" dirty="0">
+                          <a:solidFill>
+                            <a:srgbClr val="0000FF"/>
+                          </a:solidFill>
+                          <a:highlight>
+                            <a:srgbClr val="FFFFFF"/>
+                          </a:highlight>
+                          <a:latin typeface="Consolas" panose="020B0609020204030204" pitchFamily="49" charset="0"/>
+                        </a:rPr>
+                        <a:t>AS</a:t>
+                      </a:r>
+                      <a:r>
+                        <a:rPr lang="en-US" sz="2400" dirty="0">
+                          <a:solidFill>
+                            <a:srgbClr val="000000"/>
+                          </a:solidFill>
+                          <a:highlight>
+                            <a:srgbClr val="FFFFFF"/>
+                          </a:highlight>
+                          <a:latin typeface="Consolas" panose="020B0609020204030204" pitchFamily="49" charset="0"/>
+                        </a:rPr>
+                        <a:t> </a:t>
+                      </a:r>
+                      <a:r>
+                        <a:rPr lang="en-US" sz="2400" dirty="0">
+                          <a:solidFill>
+                            <a:srgbClr val="0000FF"/>
+                          </a:solidFill>
+                          <a:highlight>
+                            <a:srgbClr val="FFFFFF"/>
+                          </a:highlight>
+                          <a:latin typeface="Consolas" panose="020B0609020204030204" pitchFamily="49" charset="0"/>
+                        </a:rPr>
+                        <a:t>OF</a:t>
+                      </a:r>
+                      <a:r>
+                        <a:rPr lang="en-US" sz="2400" dirty="0">
+                          <a:solidFill>
+                            <a:srgbClr val="000000"/>
+                          </a:solidFill>
+                          <a:highlight>
+                            <a:srgbClr val="FFFFFF"/>
+                          </a:highlight>
+                          <a:latin typeface="Consolas" panose="020B0609020204030204" pitchFamily="49" charset="0"/>
+                        </a:rPr>
+                        <a:t> </a:t>
+                      </a:r>
+                      <a:r>
+                        <a:rPr lang="en-US" sz="2400" dirty="0">
+                          <a:solidFill>
+                            <a:srgbClr val="FF0000"/>
+                          </a:solidFill>
+                          <a:highlight>
+                            <a:srgbClr val="FFFFFF"/>
+                          </a:highlight>
+                          <a:latin typeface="Consolas" panose="020B0609020204030204" pitchFamily="49" charset="0"/>
+                        </a:rPr>
+                        <a:t>'2017-02-06 11:30:00'</a:t>
+                      </a:r>
+                      <a:endParaRPr lang="en-US" sz="2400" dirty="0"/>
+                    </a:p>
+                  </a:txBody>
+                  <a:tcPr anchor="ctr"/>
+                </a:tc>
+                <a:extLst>
+                  <a:ext uri="{0D108BD9-81ED-4DB2-BD59-A6C34878D82A}">
+                    <a16:rowId xmlns="" xmlns:a16="http://schemas.microsoft.com/office/drawing/2014/main" val="2127768561"/>
+                  </a:ext>
+                </a:extLst>
+              </a:tr>
+              <a:tr h="684070">
+                <a:tc>
+                  <a:txBody>
+                    <a:bodyPr/>
+                    <a:lstStyle/>
+                    <a:p>
+                      <a:r>
+                        <a:rPr lang="en-US" sz="2400" dirty="0"/>
+                        <a:t>Full history</a:t>
+                      </a:r>
+                    </a:p>
+                  </a:txBody>
+                  <a:tcPr anchor="ctr"/>
+                </a:tc>
+                <a:tc>
+                  <a:txBody>
+                    <a:bodyPr/>
+                    <a:lstStyle/>
+                    <a:p>
+                      <a:r>
+                        <a:rPr lang="en-US" sz="2400" dirty="0">
+                          <a:solidFill>
+                            <a:srgbClr val="0000FF"/>
+                          </a:solidFill>
+                          <a:highlight>
+                            <a:srgbClr val="FFFFFF"/>
+                          </a:highlight>
+                          <a:latin typeface="Consolas" panose="020B0609020204030204" pitchFamily="49" charset="0"/>
+                        </a:rPr>
+                        <a:t>ALL</a:t>
+                      </a:r>
+                      <a:endParaRPr lang="en-US" sz="2400" dirty="0"/>
+                    </a:p>
+                  </a:txBody>
+                  <a:tcPr anchor="ctr"/>
+                </a:tc>
+                <a:extLst>
+                  <a:ext uri="{0D108BD9-81ED-4DB2-BD59-A6C34878D82A}">
+                    <a16:rowId xmlns="" xmlns:a16="http://schemas.microsoft.com/office/drawing/2014/main" val="1001698893"/>
+                  </a:ext>
+                </a:extLst>
+              </a:tr>
+              <a:tr h="831920">
+                <a:tc>
+                  <a:txBody>
+                    <a:bodyPr/>
+                    <a:lstStyle/>
+                    <a:p>
+                      <a:r>
+                        <a:rPr lang="en-US" sz="2400" dirty="0"/>
+                        <a:t>Between (‘start’ &lt; </a:t>
+                      </a:r>
+                      <a:r>
+                        <a:rPr lang="en-US" sz="2400" dirty="0" err="1"/>
+                        <a:t>EndTime</a:t>
+                      </a:r>
+                      <a:r>
+                        <a:rPr lang="en-US" sz="2400" dirty="0"/>
+                        <a:t> AND ‘end’ &gt;= </a:t>
+                      </a:r>
+                      <a:r>
+                        <a:rPr lang="en-US" sz="2400" dirty="0" err="1"/>
+                        <a:t>StartTime</a:t>
+                      </a:r>
+                      <a:r>
+                        <a:rPr lang="en-US" sz="2400" dirty="0"/>
+                        <a:t>)</a:t>
+                      </a:r>
+                    </a:p>
+                  </a:txBody>
+                  <a:tcPr anchor="ctr"/>
+                </a:tc>
+                <a:tc>
+                  <a:txBody>
+                    <a:bodyPr/>
+                    <a:lstStyle/>
+                    <a:p>
+                      <a:r>
+                        <a:rPr lang="en-US" sz="2400" kern="1200" dirty="0">
+                          <a:solidFill>
+                            <a:srgbClr val="0000FF"/>
+                          </a:solidFill>
+                          <a:highlight>
+                            <a:srgbClr val="FFFFFF"/>
+                          </a:highlight>
+                          <a:latin typeface="Consolas" panose="020B0609020204030204" pitchFamily="49" charset="0"/>
+                          <a:ea typeface="+mn-ea"/>
+                          <a:cs typeface="+mn-cs"/>
+                        </a:rPr>
+                        <a:t>BETWEEN</a:t>
+                      </a:r>
+                      <a:r>
+                        <a:rPr lang="en-US" sz="2400" dirty="0">
+                          <a:solidFill>
+                            <a:srgbClr val="000000"/>
+                          </a:solidFill>
+                          <a:highlight>
+                            <a:srgbClr val="FFFFFF"/>
+                          </a:highlight>
+                          <a:latin typeface="Consolas" panose="020B0609020204030204" pitchFamily="49" charset="0"/>
+                        </a:rPr>
+                        <a:t> </a:t>
+                      </a:r>
+                      <a:r>
+                        <a:rPr lang="en-US" sz="2400" dirty="0">
+                          <a:solidFill>
+                            <a:srgbClr val="FF0000"/>
+                          </a:solidFill>
+                          <a:highlight>
+                            <a:srgbClr val="FFFFFF"/>
+                          </a:highlight>
+                          <a:latin typeface="Consolas" panose="020B0609020204030204" pitchFamily="49" charset="0"/>
+                        </a:rPr>
+                        <a:t>'2017-01-11 18:55:04'</a:t>
+                      </a:r>
+                      <a:r>
+                        <a:rPr lang="en-US" sz="2400" dirty="0">
+                          <a:solidFill>
+                            <a:srgbClr val="000000"/>
+                          </a:solidFill>
+                          <a:highlight>
+                            <a:srgbClr val="FFFFFF"/>
+                          </a:highlight>
+                          <a:latin typeface="Consolas" panose="020B0609020204030204" pitchFamily="49" charset="0"/>
+                        </a:rPr>
+                        <a:t> </a:t>
+                      </a:r>
+                      <a:r>
+                        <a:rPr lang="en-US" sz="2400" kern="1200" dirty="0">
+                          <a:solidFill>
+                            <a:srgbClr val="0000FF"/>
+                          </a:solidFill>
+                          <a:highlight>
+                            <a:srgbClr val="FFFFFF"/>
+                          </a:highlight>
+                          <a:latin typeface="Consolas" panose="020B0609020204030204" pitchFamily="49" charset="0"/>
+                          <a:ea typeface="+mn-ea"/>
+                          <a:cs typeface="+mn-cs"/>
+                        </a:rPr>
+                        <a:t>AND</a:t>
+                      </a:r>
+                      <a:r>
+                        <a:rPr lang="en-US" sz="2400" dirty="0">
+                          <a:solidFill>
+                            <a:srgbClr val="000000"/>
+                          </a:solidFill>
+                          <a:highlight>
+                            <a:srgbClr val="FFFFFF"/>
+                          </a:highlight>
+                          <a:latin typeface="Consolas" panose="020B0609020204030204" pitchFamily="49" charset="0"/>
+                        </a:rPr>
+                        <a:t> </a:t>
+                      </a:r>
+                      <a:r>
+                        <a:rPr lang="en-US" sz="2400" dirty="0">
+                          <a:solidFill>
+                            <a:srgbClr val="FF0000"/>
+                          </a:solidFill>
+                          <a:highlight>
+                            <a:srgbClr val="FFFFFF"/>
+                          </a:highlight>
+                          <a:latin typeface="Consolas" panose="020B0609020204030204" pitchFamily="49" charset="0"/>
+                        </a:rPr>
+                        <a:t>'2017-05-06 11:30:00'</a:t>
+                      </a:r>
+                      <a:endParaRPr lang="en-US" sz="2400" dirty="0"/>
+                    </a:p>
+                  </a:txBody>
+                  <a:tcPr anchor="ctr"/>
+                </a:tc>
+                <a:extLst>
+                  <a:ext uri="{0D108BD9-81ED-4DB2-BD59-A6C34878D82A}">
+                    <a16:rowId xmlns="" xmlns:a16="http://schemas.microsoft.com/office/drawing/2014/main" val="2404271991"/>
+                  </a:ext>
+                </a:extLst>
+              </a:tr>
+              <a:tr h="831920">
+                <a:tc>
+                  <a:txBody>
+                    <a:bodyPr/>
+                    <a:lstStyle/>
+                    <a:p>
+                      <a:pPr marL="0" marR="0" indent="0" algn="l" defTabSz="457200" rtl="0" eaLnBrk="1" fontAlgn="auto" latinLnBrk="0" hangingPunct="1">
+                        <a:lnSpc>
+                          <a:spcPct val="100000"/>
+                        </a:lnSpc>
+                        <a:spcBef>
+                          <a:spcPts val="0"/>
+                        </a:spcBef>
+                        <a:spcAft>
+                          <a:spcPts val="0"/>
+                        </a:spcAft>
+                        <a:buClrTx/>
+                        <a:buSzTx/>
+                        <a:buFontTx/>
+                        <a:buNone/>
+                        <a:tabLst/>
+                        <a:defRPr/>
+                      </a:pPr>
+                      <a:r>
+                        <a:rPr lang="en-US" sz="2400" dirty="0"/>
+                        <a:t>From (‘start’ &lt; </a:t>
+                      </a:r>
+                      <a:r>
+                        <a:rPr lang="en-US" sz="2400" dirty="0" err="1"/>
+                        <a:t>EndTime</a:t>
+                      </a:r>
+                      <a:r>
+                        <a:rPr lang="en-US" sz="2400" dirty="0"/>
+                        <a:t> AND ‘end’ &gt; </a:t>
+                      </a:r>
+                      <a:r>
+                        <a:rPr lang="en-US" sz="2400" dirty="0" err="1"/>
+                        <a:t>StartTime</a:t>
+                      </a:r>
+                      <a:r>
+                        <a:rPr lang="en-US" sz="2400" dirty="0"/>
+                        <a:t>)</a:t>
+                      </a:r>
+                    </a:p>
+                  </a:txBody>
+                  <a:tcPr anchor="ctr"/>
+                </a:tc>
+                <a:tc>
+                  <a:txBody>
+                    <a:bodyPr/>
+                    <a:lstStyle/>
+                    <a:p>
+                      <a:r>
+                        <a:rPr lang="en-US" sz="2400" dirty="0">
+                          <a:solidFill>
+                            <a:srgbClr val="0000FF"/>
+                          </a:solidFill>
+                          <a:highlight>
+                            <a:srgbClr val="FFFFFF"/>
+                          </a:highlight>
+                          <a:latin typeface="Consolas" panose="020B0609020204030204" pitchFamily="49" charset="0"/>
+                        </a:rPr>
+                        <a:t>FROM</a:t>
+                      </a:r>
+                      <a:r>
+                        <a:rPr lang="en-US" sz="2400" dirty="0">
+                          <a:solidFill>
+                            <a:srgbClr val="000000"/>
+                          </a:solidFill>
+                          <a:highlight>
+                            <a:srgbClr val="FFFFFF"/>
+                          </a:highlight>
+                          <a:latin typeface="Consolas" panose="020B0609020204030204" pitchFamily="49" charset="0"/>
+                        </a:rPr>
+                        <a:t> </a:t>
+                      </a:r>
+                      <a:r>
+                        <a:rPr lang="en-US" sz="2400" dirty="0">
+                          <a:solidFill>
+                            <a:srgbClr val="FF0000"/>
+                          </a:solidFill>
+                          <a:highlight>
+                            <a:srgbClr val="FFFFFF"/>
+                          </a:highlight>
+                          <a:latin typeface="Consolas" panose="020B0609020204030204" pitchFamily="49" charset="0"/>
+                        </a:rPr>
+                        <a:t>'2017-01-11 18:55:04'</a:t>
+                      </a:r>
+                      <a:r>
+                        <a:rPr lang="en-US" sz="2400" dirty="0">
+                          <a:solidFill>
+                            <a:srgbClr val="000000"/>
+                          </a:solidFill>
+                          <a:highlight>
+                            <a:srgbClr val="FFFFFF"/>
+                          </a:highlight>
+                          <a:latin typeface="Consolas" panose="020B0609020204030204" pitchFamily="49" charset="0"/>
+                        </a:rPr>
+                        <a:t> </a:t>
+                      </a:r>
+                      <a:r>
+                        <a:rPr lang="en-US" sz="2400" dirty="0">
+                          <a:solidFill>
+                            <a:srgbClr val="0000FF"/>
+                          </a:solidFill>
+                          <a:highlight>
+                            <a:srgbClr val="FFFFFF"/>
+                          </a:highlight>
+                          <a:latin typeface="Consolas" panose="020B0609020204030204" pitchFamily="49" charset="0"/>
+                        </a:rPr>
+                        <a:t>TO</a:t>
+                      </a:r>
+                      <a:r>
+                        <a:rPr lang="en-US" sz="2400" dirty="0">
+                          <a:solidFill>
+                            <a:srgbClr val="000000"/>
+                          </a:solidFill>
+                          <a:highlight>
+                            <a:srgbClr val="FFFFFF"/>
+                          </a:highlight>
+                          <a:latin typeface="Consolas" panose="020B0609020204030204" pitchFamily="49" charset="0"/>
+                        </a:rPr>
+                        <a:t> </a:t>
+                      </a:r>
+                      <a:r>
+                        <a:rPr lang="en-US" sz="2400" dirty="0">
+                          <a:solidFill>
+                            <a:srgbClr val="FF0000"/>
+                          </a:solidFill>
+                          <a:highlight>
+                            <a:srgbClr val="FFFFFF"/>
+                          </a:highlight>
+                          <a:latin typeface="Consolas" panose="020B0609020204030204" pitchFamily="49" charset="0"/>
+                        </a:rPr>
+                        <a:t>'2017-05-06 11:30:00'</a:t>
+                      </a:r>
+                      <a:endParaRPr lang="en-US" sz="2400" dirty="0"/>
+                    </a:p>
+                  </a:txBody>
+                  <a:tcPr anchor="ctr"/>
+                </a:tc>
+                <a:extLst>
+                  <a:ext uri="{0D108BD9-81ED-4DB2-BD59-A6C34878D82A}">
+                    <a16:rowId xmlns="" xmlns:a16="http://schemas.microsoft.com/office/drawing/2014/main" val="671247449"/>
+                  </a:ext>
+                </a:extLst>
+              </a:tr>
+              <a:tr h="1188457">
+                <a:tc>
+                  <a:txBody>
+                    <a:bodyPr/>
+                    <a:lstStyle/>
+                    <a:p>
+                      <a:pPr marL="0" marR="0" indent="0" algn="l" defTabSz="457200" rtl="0" eaLnBrk="1" fontAlgn="auto" latinLnBrk="0" hangingPunct="1">
+                        <a:lnSpc>
+                          <a:spcPct val="100000"/>
+                        </a:lnSpc>
+                        <a:spcBef>
+                          <a:spcPts val="0"/>
+                        </a:spcBef>
+                        <a:spcAft>
+                          <a:spcPts val="0"/>
+                        </a:spcAft>
+                        <a:buClrTx/>
+                        <a:buSzTx/>
+                        <a:buFontTx/>
+                        <a:buNone/>
+                        <a:tabLst/>
+                        <a:defRPr/>
+                      </a:pPr>
+                      <a:r>
+                        <a:rPr lang="en-US" sz="2400" dirty="0"/>
+                        <a:t>Contained in (‘start’ </a:t>
+                      </a:r>
+                      <a:r>
+                        <a:rPr lang="en-US" sz="2400" dirty="0" smtClean="0"/>
+                        <a:t>&gt;= </a:t>
+                      </a:r>
+                      <a:r>
+                        <a:rPr lang="en-US" sz="2400" dirty="0" err="1"/>
+                        <a:t>EndTime</a:t>
+                      </a:r>
+                      <a:r>
+                        <a:rPr lang="en-US" sz="2400" dirty="0"/>
+                        <a:t> AND ‘end’ </a:t>
+                      </a:r>
+                      <a:r>
+                        <a:rPr lang="en-US" sz="2400" dirty="0" smtClean="0"/>
+                        <a:t>&lt;= </a:t>
+                      </a:r>
+                      <a:r>
+                        <a:rPr lang="en-US" sz="2400" dirty="0" err="1"/>
+                        <a:t>StartTime</a:t>
+                      </a:r>
+                      <a:r>
+                        <a:rPr lang="en-US" sz="2400" dirty="0"/>
+                        <a:t>)</a:t>
+                      </a:r>
+                    </a:p>
+                    <a:p>
+                      <a:endParaRPr lang="en-US" sz="2400" dirty="0"/>
+                    </a:p>
+                  </a:txBody>
+                  <a:tcPr anchor="ctr"/>
+                </a:tc>
+                <a:tc>
+                  <a:txBody>
+                    <a:bodyPr/>
+                    <a:lstStyle/>
+                    <a:p>
+                      <a:r>
+                        <a:rPr lang="en-US" sz="2400" kern="1200" dirty="0">
+                          <a:solidFill>
+                            <a:srgbClr val="0000FF"/>
+                          </a:solidFill>
+                          <a:highlight>
+                            <a:srgbClr val="FFFFFF"/>
+                          </a:highlight>
+                          <a:latin typeface="Consolas" panose="020B0609020204030204" pitchFamily="49" charset="0"/>
+                          <a:ea typeface="+mn-ea"/>
+                          <a:cs typeface="+mn-cs"/>
+                        </a:rPr>
+                        <a:t>CONTAINED</a:t>
+                      </a:r>
+                      <a:r>
+                        <a:rPr lang="en-US" sz="2400" dirty="0">
+                          <a:solidFill>
+                            <a:srgbClr val="000000"/>
+                          </a:solidFill>
+                          <a:highlight>
+                            <a:srgbClr val="FFFFFF"/>
+                          </a:highlight>
+                          <a:latin typeface="Consolas" panose="020B0609020204030204" pitchFamily="49" charset="0"/>
+                        </a:rPr>
+                        <a:t> </a:t>
+                      </a:r>
+                      <a:r>
+                        <a:rPr lang="en-US" sz="2400" kern="1200" dirty="0">
+                          <a:solidFill>
+                            <a:srgbClr val="0000FF"/>
+                          </a:solidFill>
+                          <a:highlight>
+                            <a:srgbClr val="FFFFFF"/>
+                          </a:highlight>
+                          <a:latin typeface="Consolas" panose="020B0609020204030204" pitchFamily="49" charset="0"/>
+                          <a:ea typeface="+mn-ea"/>
+                          <a:cs typeface="+mn-cs"/>
+                        </a:rPr>
+                        <a:t>IN</a:t>
+                      </a:r>
+                      <a:r>
+                        <a:rPr lang="en-US" sz="2400" dirty="0">
+                          <a:solidFill>
+                            <a:srgbClr val="0000FF"/>
+                          </a:solidFill>
+                          <a:highlight>
+                            <a:srgbClr val="FFFFFF"/>
+                          </a:highlight>
+                          <a:latin typeface="Consolas" panose="020B0609020204030204" pitchFamily="49" charset="0"/>
+                        </a:rPr>
+                        <a:t> </a:t>
+                      </a:r>
+                      <a:r>
+                        <a:rPr lang="en-US" sz="2400" dirty="0">
+                          <a:solidFill>
+                            <a:srgbClr val="808080"/>
+                          </a:solidFill>
+                          <a:highlight>
+                            <a:srgbClr val="FFFFFF"/>
+                          </a:highlight>
+                          <a:latin typeface="Consolas" panose="020B0609020204030204" pitchFamily="49" charset="0"/>
+                        </a:rPr>
+                        <a:t>(</a:t>
+                      </a:r>
+                      <a:r>
+                        <a:rPr lang="en-US" sz="2400" dirty="0">
+                          <a:solidFill>
+                            <a:srgbClr val="FF0000"/>
+                          </a:solidFill>
+                          <a:highlight>
+                            <a:srgbClr val="FFFFFF"/>
+                          </a:highlight>
+                          <a:latin typeface="Consolas" panose="020B0609020204030204" pitchFamily="49" charset="0"/>
+                        </a:rPr>
+                        <a:t>'2017-01-11 18:55:04'</a:t>
+                      </a:r>
+                      <a:r>
+                        <a:rPr lang="en-US" sz="2400" kern="1200" dirty="0">
+                          <a:solidFill>
+                            <a:srgbClr val="0000FF"/>
+                          </a:solidFill>
+                          <a:highlight>
+                            <a:srgbClr val="FFFFFF"/>
+                          </a:highlight>
+                          <a:latin typeface="Consolas" panose="020B0609020204030204" pitchFamily="49" charset="0"/>
+                          <a:ea typeface="+mn-ea"/>
+                          <a:cs typeface="+mn-cs"/>
+                        </a:rPr>
+                        <a:t>,</a:t>
+                      </a:r>
+                      <a:r>
+                        <a:rPr lang="en-US" sz="2400" dirty="0">
+                          <a:solidFill>
+                            <a:srgbClr val="000000"/>
+                          </a:solidFill>
+                          <a:highlight>
+                            <a:srgbClr val="FFFFFF"/>
+                          </a:highlight>
+                          <a:latin typeface="Consolas" panose="020B0609020204030204" pitchFamily="49" charset="0"/>
+                        </a:rPr>
+                        <a:t> </a:t>
+                      </a:r>
+                      <a:r>
+                        <a:rPr lang="en-US" sz="2400" dirty="0">
+                          <a:solidFill>
+                            <a:srgbClr val="FF0000"/>
+                          </a:solidFill>
+                          <a:highlight>
+                            <a:srgbClr val="FFFFFF"/>
+                          </a:highlight>
+                          <a:latin typeface="Consolas" panose="020B0609020204030204" pitchFamily="49" charset="0"/>
+                        </a:rPr>
+                        <a:t>'2017-05-06 11:30:00'</a:t>
+                      </a:r>
+                      <a:r>
+                        <a:rPr lang="en-US" sz="2400" dirty="0">
+                          <a:solidFill>
+                            <a:srgbClr val="808080"/>
+                          </a:solidFill>
+                          <a:highlight>
+                            <a:srgbClr val="FFFFFF"/>
+                          </a:highlight>
+                          <a:latin typeface="Consolas" panose="020B0609020204030204" pitchFamily="49" charset="0"/>
+                        </a:rPr>
+                        <a:t>)</a:t>
+                      </a:r>
+                      <a:endParaRPr lang="en-US" sz="2400" dirty="0"/>
+                    </a:p>
+                  </a:txBody>
+                  <a:tcPr anchor="ctr"/>
+                </a:tc>
+                <a:extLst>
+                  <a:ext uri="{0D108BD9-81ED-4DB2-BD59-A6C34878D82A}">
+                    <a16:rowId xmlns="" xmlns:a16="http://schemas.microsoft.com/office/drawing/2014/main" val="3036776198"/>
+                  </a:ext>
+                </a:extLst>
+              </a:tr>
+            </a:tbl>
+          </a:graphicData>
+        </a:graphic>
+      </p:graphicFrame>
     </p:spTree>
     <p:extLst>
       <p:ext uri="{BB962C8B-B14F-4D97-AF65-F5344CB8AC3E}">
-        <p14:creationId xmlns:p14="http://schemas.microsoft.com/office/powerpoint/2010/main" val="428730416"/>
+        <p14:creationId xmlns:p14="http://schemas.microsoft.com/office/powerpoint/2010/main" val="1702442489"/>
       </p:ext>
     </p:extLst>
   </p:cSld>

</xml_diff>

<commit_message>
Update title slide for Omaha.
</commit_message>
<xml_diff>
--- a/Temporal.pptx
+++ b/Temporal.pptx
@@ -223,7 +223,7 @@
           <a:p>
             <a:fld id="{3CD51548-82AA-4A2B-B152-1D3266E0F652}" type="datetimeFigureOut">
               <a:rPr lang="en-US" smtClean="0"/>
-              <a:t>07/20/2017</a:t>
+              <a:t>7/20/2017</a:t>
             </a:fld>
             <a:endParaRPr lang="en-US"/>
           </a:p>
@@ -724,13 +724,8 @@
             </a:pPr>
             <a:r>
               <a:rPr lang="en-US" dirty="0"/>
-              <a:t>Traditionally accomplished with triggers, CDC/CT or other </a:t>
-            </a:r>
-            <a:r>
-              <a:rPr lang="en-US" dirty="0" smtClean="0"/>
-              <a:t>methods (in the app, for instance)</a:t>
-            </a:r>
-            <a:endParaRPr lang="en-US" dirty="0"/>
+              <a:t>Traditionally accomplished with triggers, CDC/CT or other methods (in the app, for instance)</a:t>
+            </a:r>
           </a:p>
           <a:p>
             <a:pPr marL="0" indent="0">
@@ -2020,7 +2015,7 @@
           <a:graphicData uri="http://schemas.openxmlformats.org/presentationml/2006/ole">
             <mc:AlternateContent xmlns:mc="http://schemas.openxmlformats.org/markup-compatibility/2006">
               <mc:Choice xmlns:v="urn:schemas-microsoft-com:vml" Requires="v">
-                <p:oleObj spid="_x0000_s1048" name="Image" r:id="rId10" imgW="2279520" imgH="1310400" progId="Photoshop.Image.18">
+                <p:oleObj spid="_x0000_s1049" name="Image" r:id="rId10" imgW="2279520" imgH="1310400" progId="Photoshop.Image.18">
                   <p:embed/>
                 </p:oleObj>
               </mc:Choice>
@@ -2442,7 +2437,7 @@
           <p:cNvPr id="4" name="TextBox 3">
             <a:extLst>
               <a:ext uri="{FF2B5EF4-FFF2-40B4-BE49-F238E27FC236}">
-                <a16:creationId xmlns:a16="http://schemas.microsoft.com/office/drawing/2014/main" xmlns="" id="{4E95CA58-BC71-4CE1-ACB0-4410970492E6}"/>
+                <a16:creationId xmlns:a16="http://schemas.microsoft.com/office/drawing/2014/main" id="{4E95CA58-BC71-4CE1-ACB0-4410970492E6}"/>
               </a:ext>
             </a:extLst>
           </p:cNvPr>
@@ -2468,21 +2463,25 @@
             <a:pPr algn="r"/>
             <a:r>
               <a:rPr lang="en-US" dirty="0"/>
-              <a:t>SQL Saturday #634</a:t>
+              <a:t>SQL Saturday #654</a:t>
             </a:r>
           </a:p>
           <a:p>
             <a:pPr algn="r"/>
             <a:r>
               <a:rPr lang="en-US" dirty="0"/>
-              <a:t>Iowa City, Iowa</a:t>
+              <a:t>Omaha, Nebraska</a:t>
             </a:r>
           </a:p>
           <a:p>
             <a:pPr algn="r"/>
             <a:r>
-              <a:rPr lang="en-US" dirty="0"/>
-              <a:t>10 June 2017</a:t>
+              <a:rPr lang="en-US"/>
+              <a:t>22 </a:t>
+            </a:r>
+            <a:r>
+              <a:rPr lang="en-US" dirty="0"/>
+              <a:t>July 2017</a:t>
             </a:r>
           </a:p>
         </p:txBody>
@@ -2533,10 +2532,9 @@
           <a:lstStyle/>
           <a:p>
             <a:r>
-              <a:rPr lang="en-US" dirty="0" smtClean="0"/>
+              <a:rPr lang="en-US" dirty="0"/>
               <a:t>Summary</a:t>
             </a:r>
-            <a:endParaRPr lang="en-US" dirty="0"/>
           </a:p>
         </p:txBody>
       </p:sp>
@@ -2579,15 +2577,6 @@
               </a:rPr>
               <a:t> </a:t>
             </a:r>
-            <a:endParaRPr lang="en-US" dirty="0" smtClean="0">
-              <a:solidFill>
-                <a:srgbClr val="000000"/>
-              </a:solidFill>
-              <a:highlight>
-                <a:srgbClr val="FFFFFF"/>
-              </a:highlight>
-              <a:latin typeface="Consolas" panose="020B0609020204030204" pitchFamily="49" charset="0"/>
-            </a:endParaRPr>
           </a:p>
           <a:p>
             <a:r>
@@ -2603,7 +2592,7 @@
               <a:t>	</a:t>
             </a:r>
             <a:r>
-              <a:rPr lang="en-US" dirty="0" smtClean="0">
+              <a:rPr lang="en-US" dirty="0">
                 <a:solidFill>
                   <a:srgbClr val="FF00FF"/>
                 </a:solidFill>
@@ -2698,7 +2687,7 @@
               </a:rPr>
               <a:t>)</a:t>
             </a:r>
-            <a:endParaRPr lang="en-US" dirty="0" smtClean="0">
+            <a:endParaRPr lang="en-US" dirty="0">
               <a:solidFill>
                 <a:srgbClr val="FF0000"/>
               </a:solidFill>
@@ -2722,7 +2711,7 @@
               <a:t>	</a:t>
             </a:r>
             <a:r>
-              <a:rPr lang="en-US" dirty="0" smtClean="0">
+              <a:rPr lang="en-US" dirty="0">
                 <a:solidFill>
                   <a:srgbClr val="0000FF"/>
                 </a:solidFill>
@@ -2734,7 +2723,7 @@
               <a:t>at</a:t>
             </a:r>
             <a:r>
-              <a:rPr lang="en-US" dirty="0" smtClean="0">
+              <a:rPr lang="en-US" dirty="0">
                 <a:solidFill>
                   <a:srgbClr val="000000"/>
                 </a:solidFill>
@@ -2803,34 +2792,10 @@
                 </a:highlight>
                 <a:latin typeface="Consolas" panose="020B0609020204030204" pitchFamily="49" charset="0"/>
               </a:rPr>
-              <a:t>'Central Standard </a:t>
-            </a:r>
-            <a:r>
-              <a:rPr lang="en-US" dirty="0" smtClean="0">
-                <a:solidFill>
-                  <a:srgbClr val="FF0000"/>
-                </a:solidFill>
-                <a:highlight>
-                  <a:srgbClr val="FFFFFF"/>
-                </a:highlight>
-                <a:latin typeface="Consolas" panose="020B0609020204030204" pitchFamily="49" charset="0"/>
-              </a:rPr>
-              <a:t>Time' </a:t>
+              <a:t>'Central Standard Time' 	</a:t>
             </a:r>
             <a:r>
               <a:rPr lang="en-US" dirty="0">
-                <a:solidFill>
-                  <a:srgbClr val="FF0000"/>
-                </a:solidFill>
-                <a:highlight>
-                  <a:srgbClr val="FFFFFF"/>
-                </a:highlight>
-                <a:latin typeface="Consolas" panose="020B0609020204030204" pitchFamily="49" charset="0"/>
-              </a:rPr>
-              <a:t>	</a:t>
-            </a:r>
-            <a:r>
-              <a:rPr lang="en-US" dirty="0" smtClean="0">
                 <a:solidFill>
                   <a:srgbClr val="0000FF"/>
                 </a:solidFill>
@@ -2842,7 +2807,7 @@
               <a:t>at</a:t>
             </a:r>
             <a:r>
-              <a:rPr lang="en-US" dirty="0" smtClean="0">
+              <a:rPr lang="en-US" dirty="0">
                 <a:solidFill>
                   <a:srgbClr val="000000"/>
                 </a:solidFill>
@@ -2911,22 +2876,10 @@
                 </a:highlight>
                 <a:latin typeface="Consolas" panose="020B0609020204030204" pitchFamily="49" charset="0"/>
               </a:rPr>
-              <a:t>'UTC</a:t>
-            </a:r>
-            <a:r>
-              <a:rPr lang="en-US" smtClean="0">
-                <a:solidFill>
-                  <a:srgbClr val="FF0000"/>
-                </a:solidFill>
-                <a:highlight>
-                  <a:srgbClr val="FFFFFF"/>
-                </a:highlight>
-                <a:latin typeface="Consolas" panose="020B0609020204030204" pitchFamily="49" charset="0"/>
-              </a:rPr>
-              <a:t>'</a:t>
-            </a:r>
-            <a:r>
-              <a:rPr lang="en-US" smtClean="0">
+              <a:t>'UTC'</a:t>
+            </a:r>
+            <a:r>
+              <a:rPr lang="en-US">
                 <a:solidFill>
                   <a:srgbClr val="808080"/>
                 </a:solidFill>
@@ -2939,7 +2892,7 @@
             </a:r>
           </a:p>
           <a:p>
-            <a:endParaRPr lang="en-US" dirty="0" smtClean="0">
+            <a:endParaRPr lang="en-US" dirty="0">
               <a:solidFill>
                 <a:srgbClr val="808080"/>
               </a:solidFill>
@@ -3096,10 +3049,9 @@
           <a:lstStyle/>
           <a:p>
             <a:r>
-              <a:rPr lang="en-US" dirty="0" smtClean="0"/>
+              <a:rPr lang="en-US" dirty="0"/>
               <a:t>Summary</a:t>
             </a:r>
-            <a:endParaRPr lang="en-US" dirty="0"/>
           </a:p>
         </p:txBody>
       </p:sp>
@@ -3123,7 +3075,7 @@
               <a:buChar char="•"/>
             </a:pPr>
             <a:r>
-              <a:rPr lang="en-US" dirty="0" smtClean="0"/>
+              <a:rPr lang="en-US" dirty="0"/>
               <a:t>New catalog objects</a:t>
             </a:r>
           </a:p>
@@ -3133,11 +3085,11 @@
               <a:buChar char="•"/>
             </a:pPr>
             <a:r>
-              <a:rPr lang="en-US" dirty="0" err="1" smtClean="0"/>
+              <a:rPr lang="en-US" dirty="0" err="1"/>
               <a:t>sys.</a:t>
             </a:r>
             <a:r>
-              <a:rPr lang="en-US" dirty="0" err="1" smtClean="0">
+              <a:rPr lang="en-US" dirty="0" err="1">
                 <a:solidFill>
                   <a:srgbClr val="0070C0"/>
                 </a:solidFill>
@@ -3145,7 +3097,7 @@
               <a:t>periods</a:t>
             </a:r>
             <a:r>
-              <a:rPr lang="en-US" dirty="0" smtClean="0"/>
+              <a:rPr lang="en-US" dirty="0"/>
               <a:t> (view)</a:t>
             </a:r>
           </a:p>
@@ -3155,11 +3107,11 @@
               <a:buChar char="•"/>
             </a:pPr>
             <a:r>
-              <a:rPr lang="en-US" dirty="0" err="1" smtClean="0"/>
+              <a:rPr lang="en-US" dirty="0" err="1"/>
               <a:t>sys.</a:t>
             </a:r>
             <a:r>
-              <a:rPr lang="en-US" dirty="0" err="1" smtClean="0">
+              <a:rPr lang="en-US" dirty="0" err="1">
                 <a:solidFill>
                   <a:srgbClr val="0070C0"/>
                 </a:solidFill>
@@ -3167,11 +3119,11 @@
               <a:t>tables</a:t>
             </a:r>
             <a:r>
-              <a:rPr lang="en-US" dirty="0" err="1" smtClean="0"/>
+              <a:rPr lang="en-US" dirty="0" err="1"/>
               <a:t>.</a:t>
             </a:r>
             <a:r>
-              <a:rPr lang="en-US" dirty="0" err="1" smtClean="0">
+              <a:rPr lang="en-US" dirty="0" err="1">
                 <a:solidFill>
                   <a:srgbClr val="00B050"/>
                 </a:solidFill>
@@ -3179,7 +3131,7 @@
               <a:t>temporal_type</a:t>
             </a:r>
             <a:r>
-              <a:rPr lang="en-US" dirty="0" smtClean="0"/>
+              <a:rPr lang="en-US" dirty="0"/>
               <a:t> (column)</a:t>
             </a:r>
           </a:p>
@@ -3189,11 +3141,11 @@
               <a:buChar char="•"/>
             </a:pPr>
             <a:r>
-              <a:rPr lang="en-US" dirty="0" err="1" smtClean="0"/>
+              <a:rPr lang="en-US" dirty="0" err="1"/>
               <a:t>sys.</a:t>
             </a:r>
             <a:r>
-              <a:rPr lang="en-US" dirty="0" err="1" smtClean="0">
+              <a:rPr lang="en-US" dirty="0" err="1">
                 <a:solidFill>
                   <a:srgbClr val="0070C0"/>
                 </a:solidFill>
@@ -3201,11 +3153,11 @@
               <a:t>tables</a:t>
             </a:r>
             <a:r>
-              <a:rPr lang="en-US" dirty="0" err="1" smtClean="0"/>
+              <a:rPr lang="en-US" dirty="0" err="1"/>
               <a:t>.</a:t>
             </a:r>
             <a:r>
-              <a:rPr lang="en-US" dirty="0" err="1" smtClean="0">
+              <a:rPr lang="en-US" dirty="0" err="1">
                 <a:solidFill>
                   <a:srgbClr val="00B050"/>
                 </a:solidFill>
@@ -3213,7 +3165,7 @@
               <a:t>temporal_type_desc</a:t>
             </a:r>
             <a:r>
-              <a:rPr lang="en-US" dirty="0" smtClean="0"/>
+              <a:rPr lang="en-US" dirty="0"/>
               <a:t> (column)</a:t>
             </a:r>
           </a:p>
@@ -3223,11 +3175,11 @@
               <a:buChar char="•"/>
             </a:pPr>
             <a:r>
-              <a:rPr lang="en-US" dirty="0" err="1" smtClean="0"/>
+              <a:rPr lang="en-US" dirty="0" err="1"/>
               <a:t>sys.</a:t>
             </a:r>
             <a:r>
-              <a:rPr lang="en-US" dirty="0" err="1" smtClean="0">
+              <a:rPr lang="en-US" dirty="0" err="1">
                 <a:solidFill>
                   <a:srgbClr val="0070C0"/>
                 </a:solidFill>
@@ -3235,11 +3187,11 @@
               <a:t>tables</a:t>
             </a:r>
             <a:r>
-              <a:rPr lang="en-US" dirty="0" err="1" smtClean="0"/>
+              <a:rPr lang="en-US" dirty="0" err="1"/>
               <a:t>.</a:t>
             </a:r>
             <a:r>
-              <a:rPr lang="en-US" dirty="0" err="1" smtClean="0">
+              <a:rPr lang="en-US" dirty="0" err="1">
                 <a:solidFill>
                   <a:srgbClr val="00B050"/>
                 </a:solidFill>
@@ -3247,7 +3199,7 @@
               <a:t>history_table_id</a:t>
             </a:r>
             <a:r>
-              <a:rPr lang="en-US" dirty="0" smtClean="0"/>
+              <a:rPr lang="en-US" dirty="0"/>
               <a:t> (column)</a:t>
             </a:r>
           </a:p>
@@ -3291,11 +3243,11 @@
               <a:buChar char="•"/>
             </a:pPr>
             <a:r>
-              <a:rPr lang="en-US" dirty="0" err="1" smtClean="0"/>
+              <a:rPr lang="en-US" dirty="0" err="1"/>
               <a:t>sys.</a:t>
             </a:r>
             <a:r>
-              <a:rPr lang="en-US" dirty="0" err="1" smtClean="0">
+              <a:rPr lang="en-US" dirty="0" err="1">
                 <a:solidFill>
                   <a:srgbClr val="0070C0"/>
                 </a:solidFill>
@@ -3303,11 +3255,11 @@
               <a:t>columns</a:t>
             </a:r>
             <a:r>
-              <a:rPr lang="en-US" dirty="0" err="1" smtClean="0"/>
+              <a:rPr lang="en-US" dirty="0" err="1"/>
               <a:t>.</a:t>
             </a:r>
             <a:r>
-              <a:rPr lang="en-US" dirty="0" err="1" smtClean="0">
+              <a:rPr lang="en-US" dirty="0" err="1">
                 <a:solidFill>
                   <a:srgbClr val="00B050"/>
                 </a:solidFill>
@@ -3315,12 +3267,8 @@
               <a:t>generated_always_type_desc</a:t>
             </a:r>
             <a:r>
-              <a:rPr lang="en-US" dirty="0" smtClean="0"/>
-              <a:t> </a:t>
-            </a:r>
-            <a:r>
-              <a:rPr lang="en-US" dirty="0"/>
-              <a:t>(column)</a:t>
+              <a:rPr lang="en-US" dirty="0"/>
+              <a:t> (column)</a:t>
             </a:r>
           </a:p>
           <a:p>
@@ -4543,10 +4491,9 @@
           <a:lstStyle/>
           <a:p>
             <a:r>
-              <a:rPr lang="en-US" dirty="0" smtClean="0"/>
+              <a:rPr lang="en-US" dirty="0"/>
               <a:t>University of Nebraska at Omaha</a:t>
             </a:r>
-            <a:endParaRPr lang="en-US" dirty="0"/>
           </a:p>
         </p:txBody>
       </p:sp>
@@ -4571,10 +4518,9 @@
           <a:lstStyle/>
           <a:p>
             <a:r>
-              <a:rPr lang="en-US" dirty="0" smtClean="0"/>
+              <a:rPr lang="en-US" dirty="0"/>
               <a:t>Special thanks to UNO and the College of Business Administration for this awesome facility!</a:t>
             </a:r>
-            <a:endParaRPr lang="en-US" dirty="0"/>
           </a:p>
         </p:txBody>
       </p:sp>
@@ -4588,21 +4534,6 @@
   <p:clrMapOvr>
     <a:masterClrMapping/>
   </p:clrMapOvr>
-  <mc:AlternateContent xmlns:mc="http://schemas.openxmlformats.org/markup-compatibility/2006" xmlns:p14="http://schemas.microsoft.com/office/powerpoint/2010/main">
-    <mc:Choice Requires="p14">
-      <p:transition spd="slow" p14:dur="2000"/>
-    </mc:Choice>
-    <mc:Fallback xmlns="">
-      <p:transition spd="slow"/>
-    </mc:Fallback>
-  </mc:AlternateContent>
-  <p:timing>
-    <p:tnLst>
-      <p:par>
-        <p:cTn id="1" dur="indefinite" restart="never" nodeType="tmRoot"/>
-      </p:par>
-    </p:tnLst>
-  </p:timing>
 </p:sld>
 </file>
 
@@ -4639,10 +4570,9 @@
           <a:lstStyle/>
           <a:p>
             <a:r>
-              <a:rPr lang="en-US" dirty="0" smtClean="0"/>
+              <a:rPr lang="en-US" dirty="0"/>
               <a:t>Sponsors</a:t>
             </a:r>
-            <a:endParaRPr lang="en-US" dirty="0"/>
           </a:p>
         </p:txBody>
       </p:sp>
@@ -4836,21 +4766,6 @@
   <p:clrMapOvr>
     <a:masterClrMapping/>
   </p:clrMapOvr>
-  <mc:AlternateContent xmlns:mc="http://schemas.openxmlformats.org/markup-compatibility/2006" xmlns:p14="http://schemas.microsoft.com/office/powerpoint/2010/main">
-    <mc:Choice Requires="p14">
-      <p:transition spd="slow" p14:dur="2000"/>
-    </mc:Choice>
-    <mc:Fallback xmlns="">
-      <p:transition spd="slow"/>
-    </mc:Fallback>
-  </mc:AlternateContent>
-  <p:timing>
-    <p:tnLst>
-      <p:par>
-        <p:cTn id="1" dur="indefinite" restart="never" nodeType="tmRoot"/>
-      </p:par>
-    </p:tnLst>
-  </p:timing>
 </p:sld>
 </file>
 
@@ -4876,7 +4791,7 @@
           <p:cNvPr id="2" name="Title 1">
             <a:extLst>
               <a:ext uri="{FF2B5EF4-FFF2-40B4-BE49-F238E27FC236}">
-                <a16:creationId xmlns:a16="http://schemas.microsoft.com/office/drawing/2014/main" xmlns="" id="{C9BFF397-973F-4CF4-B089-7CF11ECD75B3}"/>
+                <a16:creationId xmlns:a16="http://schemas.microsoft.com/office/drawing/2014/main" id="{C9BFF397-973F-4CF4-B089-7CF11ECD75B3}"/>
               </a:ext>
             </a:extLst>
           </p:cNvPr>
@@ -4904,7 +4819,7 @@
           <p:cNvPr id="3" name="Content Placeholder 2">
             <a:extLst>
               <a:ext uri="{FF2B5EF4-FFF2-40B4-BE49-F238E27FC236}">
-                <a16:creationId xmlns:a16="http://schemas.microsoft.com/office/drawing/2014/main" xmlns="" id="{2C4E2FAE-1993-45F8-901A-679941B185E8}"/>
+                <a16:creationId xmlns:a16="http://schemas.microsoft.com/office/drawing/2014/main" id="{2C4E2FAE-1993-45F8-901A-679941B185E8}"/>
               </a:ext>
             </a:extLst>
           </p:cNvPr>
@@ -4948,13 +4863,8 @@
             </a:pPr>
             <a:r>
               <a:rPr lang="en-US" dirty="0"/>
-              <a:t>Logging / Reversal of </a:t>
-            </a:r>
-            <a:r>
-              <a:rPr lang="en-US" dirty="0" smtClean="0"/>
-              <a:t>changes / Anomaly detection</a:t>
-            </a:r>
-            <a:endParaRPr lang="en-US" dirty="0"/>
+              <a:t>Logging / Reversal of changes / Anomaly detection</a:t>
+            </a:r>
           </a:p>
           <a:p>
             <a:pPr marL="1147527" lvl="1" indent="-571500">
@@ -4963,13 +4873,8 @@
             </a:pPr>
             <a:r>
               <a:rPr lang="en-US" dirty="0"/>
-              <a:t>Point-in-time business </a:t>
-            </a:r>
-            <a:r>
-              <a:rPr lang="en-US" dirty="0" smtClean="0"/>
-              <a:t>analytics / trends</a:t>
-            </a:r>
-            <a:endParaRPr lang="en-US" dirty="0"/>
+              <a:t>Point-in-time business analytics / trends</a:t>
+            </a:r>
           </a:p>
           <a:p>
             <a:pPr marL="571500" indent="-571500">
@@ -4982,11 +4887,7 @@
             </a:r>
             <a:r>
               <a:rPr lang="en-US"/>
-              <a:t>with </a:t>
-            </a:r>
-            <a:r>
-              <a:rPr lang="en-US" smtClean="0"/>
-              <a:t>complexity / caveats</a:t>
+              <a:t>with complexity / caveats</a:t>
             </a:r>
             <a:endParaRPr lang="en-US" dirty="0"/>
           </a:p>
@@ -5007,13 +4908,8 @@
             </a:pPr>
             <a:r>
               <a:rPr lang="en-US" dirty="0"/>
-              <a:t>Change </a:t>
-            </a:r>
-            <a:r>
-              <a:rPr lang="en-US" dirty="0" smtClean="0"/>
-              <a:t>detection</a:t>
-            </a:r>
-            <a:endParaRPr lang="en-US" dirty="0"/>
+              <a:t>Change detection</a:t>
+            </a:r>
           </a:p>
           <a:p>
             <a:pPr marL="1147527" lvl="1" indent="-571500">
@@ -5112,15 +5008,7 @@
           <a:p>
             <a:r>
               <a:rPr lang="en-US" dirty="0"/>
-              <a:t>Congratulations!  You have just been awarded a </a:t>
-            </a:r>
-            <a:r>
-              <a:rPr lang="en-US" dirty="0" smtClean="0"/>
-              <a:t>lucrative contract </a:t>
-            </a:r>
-            <a:r>
-              <a:rPr lang="en-US" dirty="0"/>
-              <a:t>with international automobile manufacturer </a:t>
+              <a:t>Congratulations!  You have just been awarded a lucrative contract with international automobile manufacturer </a:t>
             </a:r>
             <a:r>
               <a:rPr lang="en-US" dirty="0" err="1"/>
@@ -5198,7 +5086,7 @@
           <p:cNvPr id="2" name="Title 1">
             <a:extLst>
               <a:ext uri="{FF2B5EF4-FFF2-40B4-BE49-F238E27FC236}">
-                <a16:creationId xmlns:a16="http://schemas.microsoft.com/office/drawing/2014/main" xmlns="" id="{FEF5F440-7918-4A6B-9C7C-C25F5B4AB5DD}"/>
+                <a16:creationId xmlns:a16="http://schemas.microsoft.com/office/drawing/2014/main" id="{FEF5F440-7918-4A6B-9C7C-C25F5B4AB5DD}"/>
               </a:ext>
             </a:extLst>
           </p:cNvPr>
@@ -5226,7 +5114,7 @@
           <p:cNvPr id="3" name="Content Placeholder 2">
             <a:extLst>
               <a:ext uri="{FF2B5EF4-FFF2-40B4-BE49-F238E27FC236}">
-                <a16:creationId xmlns:a16="http://schemas.microsoft.com/office/drawing/2014/main" xmlns="" id="{9E20F2C1-4D76-4D3B-8502-4FA0575D48CD}"/>
+                <a16:creationId xmlns:a16="http://schemas.microsoft.com/office/drawing/2014/main" id="{9E20F2C1-4D76-4D3B-8502-4FA0575D48CD}"/>
               </a:ext>
             </a:extLst>
           </p:cNvPr>
@@ -5254,7 +5142,7 @@
           <p:cNvPr id="4" name="Picture 3">
             <a:extLst>
               <a:ext uri="{FF2B5EF4-FFF2-40B4-BE49-F238E27FC236}">
-                <a16:creationId xmlns:a16="http://schemas.microsoft.com/office/drawing/2014/main" xmlns="" id="{91F19CE3-C79C-4B4E-9DFB-953E12007E9A}"/>
+                <a16:creationId xmlns:a16="http://schemas.microsoft.com/office/drawing/2014/main" id="{91F19CE3-C79C-4B4E-9DFB-953E12007E9A}"/>
               </a:ext>
             </a:extLst>
           </p:cNvPr>
@@ -5325,10 +5213,9 @@
           <a:lstStyle/>
           <a:p>
             <a:r>
-              <a:rPr lang="en-US" dirty="0" smtClean="0"/>
+              <a:rPr lang="en-US" dirty="0"/>
               <a:t>Summary</a:t>
             </a:r>
-            <a:endParaRPr lang="en-US" dirty="0"/>
           </a:p>
         </p:txBody>
       </p:sp>
@@ -5402,10 +5289,9 @@
           <a:lstStyle/>
           <a:p>
             <a:r>
-              <a:rPr lang="en-US" dirty="0" smtClean="0"/>
+              <a:rPr lang="en-US" dirty="0"/>
               <a:t>Summary</a:t>
             </a:r>
-            <a:endParaRPr lang="en-US" dirty="0"/>
           </a:p>
         </p:txBody>
       </p:sp>
@@ -5437,14 +5323,14 @@
                 <a:gridCol w="5514808">
                   <a:extLst>
                     <a:ext uri="{9D8B030D-6E8A-4147-A177-3AD203B41FA5}">
-                      <a16:colId xmlns="" xmlns:a16="http://schemas.microsoft.com/office/drawing/2014/main" val="2893081794"/>
+                      <a16:colId xmlns:a16="http://schemas.microsoft.com/office/drawing/2014/main" val="2893081794"/>
                     </a:ext>
                   </a:extLst>
                 </a:gridCol>
                 <a:gridCol w="5514808">
                   <a:extLst>
                     <a:ext uri="{9D8B030D-6E8A-4147-A177-3AD203B41FA5}">
-                      <a16:colId xmlns="" xmlns:a16="http://schemas.microsoft.com/office/drawing/2014/main" val="353638004"/>
+                      <a16:colId xmlns:a16="http://schemas.microsoft.com/office/drawing/2014/main" val="353638004"/>
                     </a:ext>
                   </a:extLst>
                 </a:gridCol>
@@ -5612,7 +5498,7 @@
                 </a:tc>
                 <a:extLst>
                   <a:ext uri="{0D108BD9-81ED-4DB2-BD59-A6C34878D82A}">
-                    <a16:rowId xmlns="" xmlns:a16="http://schemas.microsoft.com/office/drawing/2014/main" val="2804491224"/>
+                    <a16:rowId xmlns:a16="http://schemas.microsoft.com/office/drawing/2014/main" val="2804491224"/>
                   </a:ext>
                 </a:extLst>
               </a:tr>
@@ -5702,7 +5588,7 @@
                 </a:tc>
                 <a:extLst>
                   <a:ext uri="{0D108BD9-81ED-4DB2-BD59-A6C34878D82A}">
-                    <a16:rowId xmlns="" xmlns:a16="http://schemas.microsoft.com/office/drawing/2014/main" val="2127768561"/>
+                    <a16:rowId xmlns:a16="http://schemas.microsoft.com/office/drawing/2014/main" val="2127768561"/>
                   </a:ext>
                 </a:extLst>
               </a:tr>
@@ -5744,7 +5630,7 @@
                 </a:tc>
                 <a:extLst>
                   <a:ext uri="{0D108BD9-81ED-4DB2-BD59-A6C34878D82A}">
-                    <a16:rowId xmlns="" xmlns:a16="http://schemas.microsoft.com/office/drawing/2014/main" val="1001698893"/>
+                    <a16:rowId xmlns:a16="http://schemas.microsoft.com/office/drawing/2014/main" val="1001698893"/>
                   </a:ext>
                 </a:extLst>
               </a:tr>
@@ -5878,7 +5764,7 @@
                 </a:tc>
                 <a:extLst>
                   <a:ext uri="{0D108BD9-81ED-4DB2-BD59-A6C34878D82A}">
-                    <a16:rowId xmlns="" xmlns:a16="http://schemas.microsoft.com/office/drawing/2014/main" val="2404271991"/>
+                    <a16:rowId xmlns:a16="http://schemas.microsoft.com/office/drawing/2014/main" val="2404271991"/>
                   </a:ext>
                 </a:extLst>
               </a:tr>
@@ -6025,7 +5911,7 @@
                 </a:tc>
                 <a:extLst>
                   <a:ext uri="{0D108BD9-81ED-4DB2-BD59-A6C34878D82A}">
-                    <a16:rowId xmlns="" xmlns:a16="http://schemas.microsoft.com/office/drawing/2014/main" val="671247449"/>
+                    <a16:rowId xmlns:a16="http://schemas.microsoft.com/office/drawing/2014/main" val="671247449"/>
                   </a:ext>
                 </a:extLst>
               </a:tr>
@@ -6054,11 +5940,7 @@
                       </a:pPr>
                       <a:r>
                         <a:rPr lang="en-US" sz="2400" dirty="0"/>
-                        <a:t>Contained in (‘start’ </a:t>
-                      </a:r>
-                      <a:r>
-                        <a:rPr lang="en-US" sz="2400" dirty="0" smtClean="0"/>
-                        <a:t>&gt;= </a:t>
+                        <a:t>Contained in (‘start’ &gt;= </a:t>
                       </a:r>
                       <a:r>
                         <a:rPr lang="en-US" sz="2400" dirty="0" err="1"/>
@@ -6066,11 +5948,7 @@
                       </a:r>
                       <a:r>
                         <a:rPr lang="en-US" sz="2400" dirty="0"/>
-                        <a:t> AND ‘end’ </a:t>
-                      </a:r>
-                      <a:r>
-                        <a:rPr lang="en-US" sz="2400" dirty="0" smtClean="0"/>
-                        <a:t>&lt;= </a:t>
+                        <a:t> AND ‘end’ &lt;= </a:t>
                       </a:r>
                       <a:r>
                         <a:rPr lang="en-US" sz="2400" dirty="0" err="1"/>
@@ -6225,7 +6103,7 @@
                 </a:tc>
                 <a:extLst>
                   <a:ext uri="{0D108BD9-81ED-4DB2-BD59-A6C34878D82A}">
-                    <a16:rowId xmlns="" xmlns:a16="http://schemas.microsoft.com/office/drawing/2014/main" val="3036776198"/>
+                    <a16:rowId xmlns:a16="http://schemas.microsoft.com/office/drawing/2014/main" val="3036776198"/>
                   </a:ext>
                 </a:extLst>
               </a:tr>

</xml_diff>

<commit_message>
Tweaks to syntax summary diagram for readability.
</commit_message>
<xml_diff>
--- a/Temporal.pptx
+++ b/Temporal.pptx
@@ -223,7 +223,7 @@
           <a:p>
             <a:fld id="{3CD51548-82AA-4A2B-B152-1D3266E0F652}" type="datetimeFigureOut">
               <a:rPr lang="en-US" smtClean="0"/>
-              <a:t>7/20/2017</a:t>
+              <a:t>07/21/2017</a:t>
             </a:fld>
             <a:endParaRPr lang="en-US"/>
           </a:p>
@@ -2015,7 +2015,7 @@
           <a:graphicData uri="http://schemas.openxmlformats.org/presentationml/2006/ole">
             <mc:AlternateContent xmlns:mc="http://schemas.openxmlformats.org/markup-compatibility/2006">
               <mc:Choice xmlns:v="urn:schemas-microsoft-com:vml" Requires="v">
-                <p:oleObj spid="_x0000_s1049" name="Image" r:id="rId10" imgW="2279520" imgH="1310400" progId="Photoshop.Image.18">
+                <p:oleObj spid="_x0000_s1050" name="Image" r:id="rId10" imgW="2279520" imgH="1310400" progId="Photoshop.Image.18">
                   <p:embed/>
                 </p:oleObj>
               </mc:Choice>
@@ -2437,7 +2437,7 @@
           <p:cNvPr id="4" name="TextBox 3">
             <a:extLst>
               <a:ext uri="{FF2B5EF4-FFF2-40B4-BE49-F238E27FC236}">
-                <a16:creationId xmlns:a16="http://schemas.microsoft.com/office/drawing/2014/main" id="{4E95CA58-BC71-4CE1-ACB0-4410970492E6}"/>
+                <a16:creationId xmlns:a16="http://schemas.microsoft.com/office/drawing/2014/main" xmlns="" id="{4E95CA58-BC71-4CE1-ACB0-4410970492E6}"/>
               </a:ext>
             </a:extLst>
           </p:cNvPr>
@@ -4791,7 +4791,7 @@
           <p:cNvPr id="2" name="Title 1">
             <a:extLst>
               <a:ext uri="{FF2B5EF4-FFF2-40B4-BE49-F238E27FC236}">
-                <a16:creationId xmlns:a16="http://schemas.microsoft.com/office/drawing/2014/main" id="{C9BFF397-973F-4CF4-B089-7CF11ECD75B3}"/>
+                <a16:creationId xmlns:a16="http://schemas.microsoft.com/office/drawing/2014/main" xmlns="" id="{C9BFF397-973F-4CF4-B089-7CF11ECD75B3}"/>
               </a:ext>
             </a:extLst>
           </p:cNvPr>
@@ -4819,7 +4819,7 @@
           <p:cNvPr id="3" name="Content Placeholder 2">
             <a:extLst>
               <a:ext uri="{FF2B5EF4-FFF2-40B4-BE49-F238E27FC236}">
-                <a16:creationId xmlns:a16="http://schemas.microsoft.com/office/drawing/2014/main" id="{2C4E2FAE-1993-45F8-901A-679941B185E8}"/>
+                <a16:creationId xmlns:a16="http://schemas.microsoft.com/office/drawing/2014/main" xmlns="" id="{2C4E2FAE-1993-45F8-901A-679941B185E8}"/>
               </a:ext>
             </a:extLst>
           </p:cNvPr>
@@ -5086,7 +5086,7 @@
           <p:cNvPr id="2" name="Title 1">
             <a:extLst>
               <a:ext uri="{FF2B5EF4-FFF2-40B4-BE49-F238E27FC236}">
-                <a16:creationId xmlns:a16="http://schemas.microsoft.com/office/drawing/2014/main" id="{FEF5F440-7918-4A6B-9C7C-C25F5B4AB5DD}"/>
+                <a16:creationId xmlns:a16="http://schemas.microsoft.com/office/drawing/2014/main" xmlns="" id="{FEF5F440-7918-4A6B-9C7C-C25F5B4AB5DD}"/>
               </a:ext>
             </a:extLst>
           </p:cNvPr>
@@ -5114,7 +5114,7 @@
           <p:cNvPr id="3" name="Content Placeholder 2">
             <a:extLst>
               <a:ext uri="{FF2B5EF4-FFF2-40B4-BE49-F238E27FC236}">
-                <a16:creationId xmlns:a16="http://schemas.microsoft.com/office/drawing/2014/main" id="{9E20F2C1-4D76-4D3B-8502-4FA0575D48CD}"/>
+                <a16:creationId xmlns:a16="http://schemas.microsoft.com/office/drawing/2014/main" xmlns="" id="{9E20F2C1-4D76-4D3B-8502-4FA0575D48CD}"/>
               </a:ext>
             </a:extLst>
           </p:cNvPr>
@@ -5142,7 +5142,7 @@
           <p:cNvPr id="4" name="Picture 3">
             <a:extLst>
               <a:ext uri="{FF2B5EF4-FFF2-40B4-BE49-F238E27FC236}">
-                <a16:creationId xmlns:a16="http://schemas.microsoft.com/office/drawing/2014/main" id="{91F19CE3-C79C-4B4E-9DFB-953E12007E9A}"/>
+                <a16:creationId xmlns:a16="http://schemas.microsoft.com/office/drawing/2014/main" xmlns="" id="{91F19CE3-C79C-4B4E-9DFB-953E12007E9A}"/>
               </a:ext>
             </a:extLst>
           </p:cNvPr>
@@ -5221,7 +5221,7 @@
       </p:sp>
       <p:pic>
         <p:nvPicPr>
-          <p:cNvPr id="3" name="Picture 2"/>
+          <p:cNvPr id="4" name="Picture 3"/>
           <p:cNvPicPr>
             <a:picLocks noChangeAspect="1"/>
           </p:cNvPicPr>
@@ -5235,8 +5235,8 @@
         </p:blipFill>
         <p:spPr>
           <a:xfrm>
-            <a:off x="1702675" y="1080363"/>
-            <a:ext cx="7692118" cy="5196739"/>
+            <a:off x="2534404" y="1080363"/>
+            <a:ext cx="7855674" cy="5193792"/>
           </a:xfrm>
           <a:prstGeom prst="rect">
             <a:avLst/>
@@ -5323,14 +5323,14 @@
                 <a:gridCol w="5514808">
                   <a:extLst>
                     <a:ext uri="{9D8B030D-6E8A-4147-A177-3AD203B41FA5}">
-                      <a16:colId xmlns:a16="http://schemas.microsoft.com/office/drawing/2014/main" val="2893081794"/>
+                      <a16:colId xmlns:a16="http://schemas.microsoft.com/office/drawing/2014/main" xmlns="" val="2893081794"/>
                     </a:ext>
                   </a:extLst>
                 </a:gridCol>
                 <a:gridCol w="5514808">
                   <a:extLst>
                     <a:ext uri="{9D8B030D-6E8A-4147-A177-3AD203B41FA5}">
-                      <a16:colId xmlns:a16="http://schemas.microsoft.com/office/drawing/2014/main" val="353638004"/>
+                      <a16:colId xmlns:a16="http://schemas.microsoft.com/office/drawing/2014/main" xmlns="" val="353638004"/>
                     </a:ext>
                   </a:extLst>
                 </a:gridCol>
@@ -5498,7 +5498,7 @@
                 </a:tc>
                 <a:extLst>
                   <a:ext uri="{0D108BD9-81ED-4DB2-BD59-A6C34878D82A}">
-                    <a16:rowId xmlns:a16="http://schemas.microsoft.com/office/drawing/2014/main" val="2804491224"/>
+                    <a16:rowId xmlns:a16="http://schemas.microsoft.com/office/drawing/2014/main" xmlns="" val="2804491224"/>
                   </a:ext>
                 </a:extLst>
               </a:tr>
@@ -5588,7 +5588,7 @@
                 </a:tc>
                 <a:extLst>
                   <a:ext uri="{0D108BD9-81ED-4DB2-BD59-A6C34878D82A}">
-                    <a16:rowId xmlns:a16="http://schemas.microsoft.com/office/drawing/2014/main" val="2127768561"/>
+                    <a16:rowId xmlns:a16="http://schemas.microsoft.com/office/drawing/2014/main" xmlns="" val="2127768561"/>
                   </a:ext>
                 </a:extLst>
               </a:tr>
@@ -5630,7 +5630,7 @@
                 </a:tc>
                 <a:extLst>
                   <a:ext uri="{0D108BD9-81ED-4DB2-BD59-A6C34878D82A}">
-                    <a16:rowId xmlns:a16="http://schemas.microsoft.com/office/drawing/2014/main" val="1001698893"/>
+                    <a16:rowId xmlns:a16="http://schemas.microsoft.com/office/drawing/2014/main" xmlns="" val="1001698893"/>
                   </a:ext>
                 </a:extLst>
               </a:tr>
@@ -5764,7 +5764,7 @@
                 </a:tc>
                 <a:extLst>
                   <a:ext uri="{0D108BD9-81ED-4DB2-BD59-A6C34878D82A}">
-                    <a16:rowId xmlns:a16="http://schemas.microsoft.com/office/drawing/2014/main" val="2404271991"/>
+                    <a16:rowId xmlns:a16="http://schemas.microsoft.com/office/drawing/2014/main" xmlns="" val="2404271991"/>
                   </a:ext>
                 </a:extLst>
               </a:tr>
@@ -5911,7 +5911,7 @@
                 </a:tc>
                 <a:extLst>
                   <a:ext uri="{0D108BD9-81ED-4DB2-BD59-A6C34878D82A}">
-                    <a16:rowId xmlns:a16="http://schemas.microsoft.com/office/drawing/2014/main" val="671247449"/>
+                    <a16:rowId xmlns:a16="http://schemas.microsoft.com/office/drawing/2014/main" xmlns="" val="671247449"/>
                   </a:ext>
                 </a:extLst>
               </a:tr>
@@ -6103,7 +6103,7 @@
                 </a:tc>
                 <a:extLst>
                   <a:ext uri="{0D108BD9-81ED-4DB2-BD59-A6C34878D82A}">
-                    <a16:rowId xmlns:a16="http://schemas.microsoft.com/office/drawing/2014/main" val="3036776198"/>
+                    <a16:rowId xmlns:a16="http://schemas.microsoft.com/office/drawing/2014/main" xmlns="" val="3036776198"/>
                   </a:ext>
                 </a:extLst>
               </a:tr>

</xml_diff>

<commit_message>
Fixup title slide for Sioux Falls 2017.
</commit_message>
<xml_diff>
--- a/Temporal.pptx
+++ b/Temporal.pptx
@@ -223,7 +223,7 @@
           <a:p>
             <a:fld id="{3CD51548-82AA-4A2B-B152-1D3266E0F652}" type="datetimeFigureOut">
               <a:rPr lang="en-US" smtClean="0"/>
-              <a:t>07/21/2017</a:t>
+              <a:t>8/1/2017</a:t>
             </a:fld>
             <a:endParaRPr lang="en-US"/>
           </a:p>
@@ -2015,7 +2015,7 @@
           <a:graphicData uri="http://schemas.openxmlformats.org/presentationml/2006/ole">
             <mc:AlternateContent xmlns:mc="http://schemas.openxmlformats.org/markup-compatibility/2006">
               <mc:Choice xmlns:v="urn:schemas-microsoft-com:vml" Requires="v">
-                <p:oleObj spid="_x0000_s1050" name="Image" r:id="rId10" imgW="2279520" imgH="1310400" progId="Photoshop.Image.18">
+                <p:oleObj spid="_x0000_s1052" name="Image" r:id="rId10" imgW="2279520" imgH="1310400" progId="Photoshop.Image.18">
                   <p:embed/>
                 </p:oleObj>
               </mc:Choice>
@@ -2404,8 +2404,42 @@
           <a:lstStyle/>
           <a:p>
             <a:r>
-              <a:rPr lang="en-US" sz="5400" dirty="0"/>
-              <a:t>Remember Back When? Temporal Tables in SQL Server 2016</a:t>
+              <a:rPr lang="en-US" sz="3200" dirty="0">
+                <a:solidFill>
+                  <a:schemeClr val="accent1"/>
+                </a:solidFill>
+              </a:rPr>
+              <a:t>Brian Hansen</a:t>
+            </a:r>
+            <a:br>
+              <a:rPr lang="en-US" sz="3200" dirty="0">
+                <a:solidFill>
+                  <a:schemeClr val="accent1"/>
+                </a:solidFill>
+              </a:rPr>
+            </a:br>
+            <a:r>
+              <a:rPr lang="en-US" sz="3200" dirty="0">
+                <a:solidFill>
+                  <a:schemeClr val="accent1"/>
+                </a:solidFill>
+              </a:rPr>
+              <a:t>brian@tf3604.com</a:t>
+            </a:r>
+            <a:br>
+              <a:rPr lang="en-US" sz="3200" dirty="0">
+                <a:solidFill>
+                  <a:schemeClr val="accent1"/>
+                </a:solidFill>
+              </a:rPr>
+            </a:br>
+            <a:r>
+              <a:rPr lang="en-US" sz="3200" dirty="0">
+                <a:solidFill>
+                  <a:schemeClr val="accent1"/>
+                </a:solidFill>
+              </a:rPr>
+              <a:t>@tf3604</a:t>
             </a:r>
           </a:p>
         </p:txBody>
@@ -2420,14 +2454,25 @@
             <p:ph type="body" sz="quarter" idx="10"/>
           </p:nvPr>
         </p:nvSpPr>
-        <p:spPr/>
+        <p:spPr>
+          <a:xfrm>
+            <a:off x="361157" y="360587"/>
+            <a:ext cx="10799762" cy="2692855"/>
+          </a:xfrm>
+        </p:spPr>
         <p:txBody>
           <a:bodyPr/>
           <a:lstStyle/>
           <a:p>
             <a:r>
-              <a:rPr lang="en-US" dirty="0"/>
-              <a:t>Brian Hansen</a:t>
+              <a:rPr lang="en-US" sz="6000" dirty="0"/>
+              <a:t>Remember Back When?</a:t>
+            </a:r>
+          </a:p>
+          <a:p>
+            <a:r>
+              <a:rPr lang="en-US" dirty="0"/>
+              <a:t>Temporal Tables in SQL Server 2016</a:t>
             </a:r>
           </a:p>
         </p:txBody>
@@ -2437,7 +2482,7 @@
           <p:cNvPr id="4" name="TextBox 3">
             <a:extLst>
               <a:ext uri="{FF2B5EF4-FFF2-40B4-BE49-F238E27FC236}">
-                <a16:creationId xmlns:a16="http://schemas.microsoft.com/office/drawing/2014/main" xmlns="" id="{4E95CA58-BC71-4CE1-ACB0-4410970492E6}"/>
+                <a16:creationId xmlns:a16="http://schemas.microsoft.com/office/drawing/2014/main" id="{4E95CA58-BC71-4CE1-ACB0-4410970492E6}"/>
               </a:ext>
             </a:extLst>
           </p:cNvPr>
@@ -2446,7 +2491,7 @@
         </p:nvSpPr>
         <p:spPr>
           <a:xfrm>
-            <a:off x="8392886" y="1796144"/>
+            <a:off x="8392886" y="5196483"/>
             <a:ext cx="2768033" cy="923330"/>
           </a:xfrm>
           <a:prstGeom prst="rect">
@@ -2463,25 +2508,21 @@
             <a:pPr algn="r"/>
             <a:r>
               <a:rPr lang="en-US" dirty="0"/>
-              <a:t>SQL Saturday #654</a:t>
+              <a:t>SQL Saturday #662</a:t>
             </a:r>
           </a:p>
           <a:p>
             <a:pPr algn="r"/>
             <a:r>
               <a:rPr lang="en-US" dirty="0"/>
-              <a:t>Omaha, Nebraska</a:t>
+              <a:t>Sioux Falls, South Dakota</a:t>
             </a:r>
           </a:p>
           <a:p>
             <a:pPr algn="r"/>
             <a:r>
-              <a:rPr lang="en-US"/>
-              <a:t>22 </a:t>
-            </a:r>
-            <a:r>
-              <a:rPr lang="en-US" dirty="0"/>
-              <a:t>July 2017</a:t>
+              <a:rPr lang="en-US" dirty="0"/>
+              <a:t>19 August 2017</a:t>
             </a:r>
           </a:p>
         </p:txBody>
@@ -4791,7 +4832,7 @@
           <p:cNvPr id="2" name="Title 1">
             <a:extLst>
               <a:ext uri="{FF2B5EF4-FFF2-40B4-BE49-F238E27FC236}">
-                <a16:creationId xmlns:a16="http://schemas.microsoft.com/office/drawing/2014/main" xmlns="" id="{C9BFF397-973F-4CF4-B089-7CF11ECD75B3}"/>
+                <a16:creationId xmlns:a16="http://schemas.microsoft.com/office/drawing/2014/main" id="{C9BFF397-973F-4CF4-B089-7CF11ECD75B3}"/>
               </a:ext>
             </a:extLst>
           </p:cNvPr>
@@ -4819,7 +4860,7 @@
           <p:cNvPr id="3" name="Content Placeholder 2">
             <a:extLst>
               <a:ext uri="{FF2B5EF4-FFF2-40B4-BE49-F238E27FC236}">
-                <a16:creationId xmlns:a16="http://schemas.microsoft.com/office/drawing/2014/main" xmlns="" id="{2C4E2FAE-1993-45F8-901A-679941B185E8}"/>
+                <a16:creationId xmlns:a16="http://schemas.microsoft.com/office/drawing/2014/main" id="{2C4E2FAE-1993-45F8-901A-679941B185E8}"/>
               </a:ext>
             </a:extLst>
           </p:cNvPr>
@@ -5086,7 +5127,7 @@
           <p:cNvPr id="2" name="Title 1">
             <a:extLst>
               <a:ext uri="{FF2B5EF4-FFF2-40B4-BE49-F238E27FC236}">
-                <a16:creationId xmlns:a16="http://schemas.microsoft.com/office/drawing/2014/main" xmlns="" id="{FEF5F440-7918-4A6B-9C7C-C25F5B4AB5DD}"/>
+                <a16:creationId xmlns:a16="http://schemas.microsoft.com/office/drawing/2014/main" id="{FEF5F440-7918-4A6B-9C7C-C25F5B4AB5DD}"/>
               </a:ext>
             </a:extLst>
           </p:cNvPr>
@@ -5114,7 +5155,7 @@
           <p:cNvPr id="3" name="Content Placeholder 2">
             <a:extLst>
               <a:ext uri="{FF2B5EF4-FFF2-40B4-BE49-F238E27FC236}">
-                <a16:creationId xmlns:a16="http://schemas.microsoft.com/office/drawing/2014/main" xmlns="" id="{9E20F2C1-4D76-4D3B-8502-4FA0575D48CD}"/>
+                <a16:creationId xmlns:a16="http://schemas.microsoft.com/office/drawing/2014/main" id="{9E20F2C1-4D76-4D3B-8502-4FA0575D48CD}"/>
               </a:ext>
             </a:extLst>
           </p:cNvPr>
@@ -5142,7 +5183,7 @@
           <p:cNvPr id="4" name="Picture 3">
             <a:extLst>
               <a:ext uri="{FF2B5EF4-FFF2-40B4-BE49-F238E27FC236}">
-                <a16:creationId xmlns:a16="http://schemas.microsoft.com/office/drawing/2014/main" xmlns="" id="{91F19CE3-C79C-4B4E-9DFB-953E12007E9A}"/>
+                <a16:creationId xmlns:a16="http://schemas.microsoft.com/office/drawing/2014/main" id="{91F19CE3-C79C-4B4E-9DFB-953E12007E9A}"/>
               </a:ext>
             </a:extLst>
           </p:cNvPr>
@@ -5323,14 +5364,14 @@
                 <a:gridCol w="5514808">
                   <a:extLst>
                     <a:ext uri="{9D8B030D-6E8A-4147-A177-3AD203B41FA5}">
-                      <a16:colId xmlns:a16="http://schemas.microsoft.com/office/drawing/2014/main" xmlns="" val="2893081794"/>
+                      <a16:colId xmlns:a16="http://schemas.microsoft.com/office/drawing/2014/main" val="2893081794"/>
                     </a:ext>
                   </a:extLst>
                 </a:gridCol>
                 <a:gridCol w="5514808">
                   <a:extLst>
                     <a:ext uri="{9D8B030D-6E8A-4147-A177-3AD203B41FA5}">
-                      <a16:colId xmlns:a16="http://schemas.microsoft.com/office/drawing/2014/main" xmlns="" val="353638004"/>
+                      <a16:colId xmlns:a16="http://schemas.microsoft.com/office/drawing/2014/main" val="353638004"/>
                     </a:ext>
                   </a:extLst>
                 </a:gridCol>
@@ -5498,7 +5539,7 @@
                 </a:tc>
                 <a:extLst>
                   <a:ext uri="{0D108BD9-81ED-4DB2-BD59-A6C34878D82A}">
-                    <a16:rowId xmlns:a16="http://schemas.microsoft.com/office/drawing/2014/main" xmlns="" val="2804491224"/>
+                    <a16:rowId xmlns:a16="http://schemas.microsoft.com/office/drawing/2014/main" val="2804491224"/>
                   </a:ext>
                 </a:extLst>
               </a:tr>
@@ -5588,7 +5629,7 @@
                 </a:tc>
                 <a:extLst>
                   <a:ext uri="{0D108BD9-81ED-4DB2-BD59-A6C34878D82A}">
-                    <a16:rowId xmlns:a16="http://schemas.microsoft.com/office/drawing/2014/main" xmlns="" val="2127768561"/>
+                    <a16:rowId xmlns:a16="http://schemas.microsoft.com/office/drawing/2014/main" val="2127768561"/>
                   </a:ext>
                 </a:extLst>
               </a:tr>
@@ -5630,7 +5671,7 @@
                 </a:tc>
                 <a:extLst>
                   <a:ext uri="{0D108BD9-81ED-4DB2-BD59-A6C34878D82A}">
-                    <a16:rowId xmlns:a16="http://schemas.microsoft.com/office/drawing/2014/main" xmlns="" val="1001698893"/>
+                    <a16:rowId xmlns:a16="http://schemas.microsoft.com/office/drawing/2014/main" val="1001698893"/>
                   </a:ext>
                 </a:extLst>
               </a:tr>
@@ -5764,7 +5805,7 @@
                 </a:tc>
                 <a:extLst>
                   <a:ext uri="{0D108BD9-81ED-4DB2-BD59-A6C34878D82A}">
-                    <a16:rowId xmlns:a16="http://schemas.microsoft.com/office/drawing/2014/main" xmlns="" val="2404271991"/>
+                    <a16:rowId xmlns:a16="http://schemas.microsoft.com/office/drawing/2014/main" val="2404271991"/>
                   </a:ext>
                 </a:extLst>
               </a:tr>
@@ -5911,7 +5952,7 @@
                 </a:tc>
                 <a:extLst>
                   <a:ext uri="{0D108BD9-81ED-4DB2-BD59-A6C34878D82A}">
-                    <a16:rowId xmlns:a16="http://schemas.microsoft.com/office/drawing/2014/main" xmlns="" val="671247449"/>
+                    <a16:rowId xmlns:a16="http://schemas.microsoft.com/office/drawing/2014/main" val="671247449"/>
                   </a:ext>
                 </a:extLst>
               </a:tr>
@@ -6103,7 +6144,7 @@
                 </a:tc>
                 <a:extLst>
                   <a:ext uri="{0D108BD9-81ED-4DB2-BD59-A6C34878D82A}">
-                    <a16:rowId xmlns:a16="http://schemas.microsoft.com/office/drawing/2014/main" xmlns="" val="3036776198"/>
+                    <a16:rowId xmlns:a16="http://schemas.microsoft.com/office/drawing/2014/main" val="3036776198"/>
                   </a:ext>
                 </a:extLst>
               </a:tr>

</xml_diff>

<commit_message>
Removed Omaha event-specific slides.
</commit_message>
<xml_diff>
--- a/Temporal.pptx
+++ b/Temporal.pptx
@@ -5,21 +5,19 @@
     <p:sldMasterId id="2147483648" r:id="rId1"/>
   </p:sldMasterIdLst>
   <p:notesMasterIdLst>
-    <p:notesMasterId r:id="rId14"/>
+    <p:notesMasterId r:id="rId12"/>
   </p:notesMasterIdLst>
   <p:sldIdLst>
     <p:sldId id="263" r:id="rId2"/>
     <p:sldId id="265" r:id="rId3"/>
-    <p:sldId id="273" r:id="rId4"/>
-    <p:sldId id="274" r:id="rId5"/>
-    <p:sldId id="268" r:id="rId6"/>
-    <p:sldId id="266" r:id="rId7"/>
-    <p:sldId id="269" r:id="rId8"/>
-    <p:sldId id="275" r:id="rId9"/>
-    <p:sldId id="276" r:id="rId10"/>
-    <p:sldId id="277" r:id="rId11"/>
-    <p:sldId id="278" r:id="rId12"/>
-    <p:sldId id="267" r:id="rId13"/>
+    <p:sldId id="268" r:id="rId4"/>
+    <p:sldId id="266" r:id="rId5"/>
+    <p:sldId id="269" r:id="rId6"/>
+    <p:sldId id="275" r:id="rId7"/>
+    <p:sldId id="276" r:id="rId8"/>
+    <p:sldId id="277" r:id="rId9"/>
+    <p:sldId id="278" r:id="rId10"/>
+    <p:sldId id="267" r:id="rId11"/>
   </p:sldIdLst>
   <p:sldSz cx="11520488" cy="6480175"/>
   <p:notesSz cx="6858000" cy="9144000"/>
@@ -223,7 +221,7 @@
           <a:p>
             <a:fld id="{3CD51548-82AA-4A2B-B152-1D3266E0F652}" type="datetimeFigureOut">
               <a:rPr lang="en-US" smtClean="0"/>
-              <a:t>8/1/2017</a:t>
+              <a:t>8/4/2017</a:t>
             </a:fld>
             <a:endParaRPr lang="en-US"/>
           </a:p>
@@ -756,7 +754,7 @@
           <a:p>
             <a:fld id="{FF7EEA9B-F69F-4E8E-9D98-532317352FF8}" type="slidenum">
               <a:rPr lang="en-US" smtClean="0"/>
-              <a:t>5</a:t>
+              <a:t>3</a:t>
             </a:fld>
             <a:endParaRPr lang="en-US"/>
           </a:p>
@@ -875,7 +873,7 @@
           <a:p>
             <a:fld id="{FF7EEA9B-F69F-4E8E-9D98-532317352FF8}" type="slidenum">
               <a:rPr lang="en-US" smtClean="0"/>
-              <a:t>6</a:t>
+              <a:t>4</a:t>
             </a:fld>
             <a:endParaRPr lang="en-US"/>
           </a:p>
@@ -962,7 +960,7 @@
           <a:p>
             <a:fld id="{FF7EEA9B-F69F-4E8E-9D98-532317352FF8}" type="slidenum">
               <a:rPr lang="en-US" smtClean="0"/>
-              <a:t>7</a:t>
+              <a:t>5</a:t>
             </a:fld>
             <a:endParaRPr lang="en-US"/>
           </a:p>
@@ -2015,7 +2013,7 @@
           <a:graphicData uri="http://schemas.openxmlformats.org/presentationml/2006/ole">
             <mc:AlternateContent xmlns:mc="http://schemas.openxmlformats.org/markup-compatibility/2006">
               <mc:Choice xmlns:v="urn:schemas-microsoft-com:vml" Requires="v">
-                <p:oleObj spid="_x0000_s1052" name="Image" r:id="rId10" imgW="2279520" imgH="1310400" progId="Photoshop.Image.18">
+                <p:oleObj spid="_x0000_s1053" name="Image" r:id="rId10" imgW="2279520" imgH="1310400" progId="Photoshop.Image.18">
                   <p:embed/>
                 </p:oleObj>
               </mc:Choice>
@@ -2574,797 +2572,6 @@
           <a:p>
             <a:r>
               <a:rPr lang="en-US" dirty="0"/>
-              <a:t>Summary</a:t>
-            </a:r>
-          </a:p>
-        </p:txBody>
-      </p:sp>
-      <p:sp>
-        <p:nvSpPr>
-          <p:cNvPr id="3" name="Content Placeholder 2"/>
-          <p:cNvSpPr>
-            <a:spLocks noGrp="1"/>
-          </p:cNvSpPr>
-          <p:nvPr>
-            <p:ph idx="1"/>
-          </p:nvPr>
-        </p:nvSpPr>
-        <p:spPr/>
-        <p:txBody>
-          <a:bodyPr/>
-          <a:lstStyle/>
-          <a:p>
-            <a:r>
-              <a:rPr lang="en-US" dirty="0">
-                <a:solidFill>
-                  <a:srgbClr val="0000FF"/>
-                </a:solidFill>
-                <a:highlight>
-                  <a:srgbClr val="FFFFFF"/>
-                </a:highlight>
-                <a:latin typeface="Consolas" panose="020B0609020204030204" pitchFamily="49" charset="0"/>
-              </a:rPr>
-              <a:t>select</a:t>
-            </a:r>
-            <a:r>
-              <a:rPr lang="en-US" dirty="0">
-                <a:solidFill>
-                  <a:srgbClr val="000000"/>
-                </a:solidFill>
-                <a:highlight>
-                  <a:srgbClr val="FFFFFF"/>
-                </a:highlight>
-                <a:latin typeface="Consolas" panose="020B0609020204030204" pitchFamily="49" charset="0"/>
-              </a:rPr>
-              <a:t> </a:t>
-            </a:r>
-          </a:p>
-          <a:p>
-            <a:r>
-              <a:rPr lang="en-US" dirty="0">
-                <a:solidFill>
-                  <a:srgbClr val="000000"/>
-                </a:solidFill>
-                <a:highlight>
-                  <a:srgbClr val="FFFFFF"/>
-                </a:highlight>
-                <a:latin typeface="Consolas" panose="020B0609020204030204" pitchFamily="49" charset="0"/>
-              </a:rPr>
-              <a:t>	</a:t>
-            </a:r>
-            <a:r>
-              <a:rPr lang="en-US" dirty="0">
-                <a:solidFill>
-                  <a:srgbClr val="FF00FF"/>
-                </a:solidFill>
-                <a:highlight>
-                  <a:srgbClr val="FFFFFF"/>
-                </a:highlight>
-                <a:latin typeface="Consolas" panose="020B0609020204030204" pitchFamily="49" charset="0"/>
-              </a:rPr>
-              <a:t>cast</a:t>
-            </a:r>
-            <a:r>
-              <a:rPr lang="en-US" dirty="0">
-                <a:solidFill>
-                  <a:srgbClr val="808080"/>
-                </a:solidFill>
-                <a:highlight>
-                  <a:srgbClr val="FFFFFF"/>
-                </a:highlight>
-                <a:latin typeface="Consolas" panose="020B0609020204030204" pitchFamily="49" charset="0"/>
-              </a:rPr>
-              <a:t>(</a:t>
-            </a:r>
-            <a:r>
-              <a:rPr lang="en-US" dirty="0">
-                <a:solidFill>
-                  <a:srgbClr val="FF0000"/>
-                </a:solidFill>
-                <a:highlight>
-                  <a:srgbClr val="FFFFFF"/>
-                </a:highlight>
-                <a:latin typeface="Consolas" panose="020B0609020204030204" pitchFamily="49" charset="0"/>
-              </a:rPr>
-              <a:t>'2017-06-10 10:10:00'</a:t>
-            </a:r>
-            <a:r>
-              <a:rPr lang="en-US" dirty="0">
-                <a:solidFill>
-                  <a:srgbClr val="000000"/>
-                </a:solidFill>
-                <a:highlight>
-                  <a:srgbClr val="FFFFFF"/>
-                </a:highlight>
-                <a:latin typeface="Consolas" panose="020B0609020204030204" pitchFamily="49" charset="0"/>
-              </a:rPr>
-              <a:t> </a:t>
-            </a:r>
-            <a:r>
-              <a:rPr lang="en-US" dirty="0">
-                <a:solidFill>
-                  <a:srgbClr val="0000FF"/>
-                </a:solidFill>
-                <a:highlight>
-                  <a:srgbClr val="FFFFFF"/>
-                </a:highlight>
-                <a:latin typeface="Consolas" panose="020B0609020204030204" pitchFamily="49" charset="0"/>
-              </a:rPr>
-              <a:t>as</a:t>
-            </a:r>
-            <a:r>
-              <a:rPr lang="en-US" dirty="0">
-                <a:solidFill>
-                  <a:srgbClr val="000000"/>
-                </a:solidFill>
-                <a:highlight>
-                  <a:srgbClr val="FFFFFF"/>
-                </a:highlight>
-                <a:latin typeface="Consolas" panose="020B0609020204030204" pitchFamily="49" charset="0"/>
-              </a:rPr>
-              <a:t> </a:t>
-            </a:r>
-            <a:r>
-              <a:rPr lang="en-US" dirty="0">
-                <a:solidFill>
-                  <a:srgbClr val="0000FF"/>
-                </a:solidFill>
-                <a:highlight>
-                  <a:srgbClr val="FFFFFF"/>
-                </a:highlight>
-                <a:latin typeface="Consolas" panose="020B0609020204030204" pitchFamily="49" charset="0"/>
-              </a:rPr>
-              <a:t>datetime2</a:t>
-            </a:r>
-            <a:r>
-              <a:rPr lang="en-US" dirty="0">
-                <a:solidFill>
-                  <a:srgbClr val="808080"/>
-                </a:solidFill>
-                <a:highlight>
-                  <a:srgbClr val="FFFFFF"/>
-                </a:highlight>
-                <a:latin typeface="Consolas" panose="020B0609020204030204" pitchFamily="49" charset="0"/>
-              </a:rPr>
-              <a:t>)</a:t>
-            </a:r>
-            <a:endParaRPr lang="en-US" dirty="0">
-              <a:solidFill>
-                <a:srgbClr val="FF0000"/>
-              </a:solidFill>
-              <a:highlight>
-                <a:srgbClr val="FFFFFF"/>
-              </a:highlight>
-              <a:latin typeface="Consolas" panose="020B0609020204030204" pitchFamily="49" charset="0"/>
-            </a:endParaRPr>
-          </a:p>
-          <a:p>
-            <a:r>
-              <a:rPr lang="en-US" dirty="0">
-                <a:solidFill>
-                  <a:srgbClr val="FF0000"/>
-                </a:solidFill>
-                <a:highlight>
-                  <a:srgbClr val="FFFFFF"/>
-                </a:highlight>
-                <a:latin typeface="Consolas" panose="020B0609020204030204" pitchFamily="49" charset="0"/>
-              </a:rPr>
-              <a:t>	</a:t>
-            </a:r>
-            <a:r>
-              <a:rPr lang="en-US" dirty="0">
-                <a:solidFill>
-                  <a:srgbClr val="0000FF"/>
-                </a:solidFill>
-                <a:highlight>
-                  <a:srgbClr val="FFFFFF"/>
-                </a:highlight>
-                <a:latin typeface="Consolas" panose="020B0609020204030204" pitchFamily="49" charset="0"/>
-              </a:rPr>
-              <a:t>at</a:t>
-            </a:r>
-            <a:r>
-              <a:rPr lang="en-US" dirty="0">
-                <a:solidFill>
-                  <a:srgbClr val="000000"/>
-                </a:solidFill>
-                <a:highlight>
-                  <a:srgbClr val="FFFFFF"/>
-                </a:highlight>
-                <a:latin typeface="Consolas" panose="020B0609020204030204" pitchFamily="49" charset="0"/>
-              </a:rPr>
-              <a:t> </a:t>
-            </a:r>
-            <a:r>
-              <a:rPr lang="en-US" dirty="0">
-                <a:solidFill>
-                  <a:srgbClr val="0000FF"/>
-                </a:solidFill>
-                <a:highlight>
-                  <a:srgbClr val="FFFFFF"/>
-                </a:highlight>
-                <a:latin typeface="Consolas" panose="020B0609020204030204" pitchFamily="49" charset="0"/>
-              </a:rPr>
-              <a:t>time</a:t>
-            </a:r>
-            <a:r>
-              <a:rPr lang="en-US" dirty="0">
-                <a:solidFill>
-                  <a:srgbClr val="000000"/>
-                </a:solidFill>
-                <a:highlight>
-                  <a:srgbClr val="FFFFFF"/>
-                </a:highlight>
-                <a:latin typeface="Consolas" panose="020B0609020204030204" pitchFamily="49" charset="0"/>
-              </a:rPr>
-              <a:t> </a:t>
-            </a:r>
-            <a:r>
-              <a:rPr lang="en-US" dirty="0">
-                <a:solidFill>
-                  <a:srgbClr val="0000FF"/>
-                </a:solidFill>
-                <a:highlight>
-                  <a:srgbClr val="FFFFFF"/>
-                </a:highlight>
-                <a:latin typeface="Consolas" panose="020B0609020204030204" pitchFamily="49" charset="0"/>
-              </a:rPr>
-              <a:t>zone</a:t>
-            </a:r>
-            <a:r>
-              <a:rPr lang="en-US" dirty="0">
-                <a:solidFill>
-                  <a:srgbClr val="000000"/>
-                </a:solidFill>
-                <a:highlight>
-                  <a:srgbClr val="FFFFFF"/>
-                </a:highlight>
-                <a:latin typeface="Consolas" panose="020B0609020204030204" pitchFamily="49" charset="0"/>
-              </a:rPr>
-              <a:t> </a:t>
-            </a:r>
-            <a:r>
-              <a:rPr lang="en-US" dirty="0">
-                <a:solidFill>
-                  <a:srgbClr val="FF0000"/>
-                </a:solidFill>
-                <a:highlight>
-                  <a:srgbClr val="FFFFFF"/>
-                </a:highlight>
-                <a:latin typeface="Consolas" panose="020B0609020204030204" pitchFamily="49" charset="0"/>
-              </a:rPr>
-              <a:t>'Central Standard Time' 	</a:t>
-            </a:r>
-            <a:r>
-              <a:rPr lang="en-US" dirty="0">
-                <a:solidFill>
-                  <a:srgbClr val="0000FF"/>
-                </a:solidFill>
-                <a:highlight>
-                  <a:srgbClr val="FFFFFF"/>
-                </a:highlight>
-                <a:latin typeface="Consolas" panose="020B0609020204030204" pitchFamily="49" charset="0"/>
-              </a:rPr>
-              <a:t>at</a:t>
-            </a:r>
-            <a:r>
-              <a:rPr lang="en-US" dirty="0">
-                <a:solidFill>
-                  <a:srgbClr val="000000"/>
-                </a:solidFill>
-                <a:highlight>
-                  <a:srgbClr val="FFFFFF"/>
-                </a:highlight>
-                <a:latin typeface="Consolas" panose="020B0609020204030204" pitchFamily="49" charset="0"/>
-              </a:rPr>
-              <a:t> </a:t>
-            </a:r>
-            <a:r>
-              <a:rPr lang="en-US" dirty="0">
-                <a:solidFill>
-                  <a:srgbClr val="0000FF"/>
-                </a:solidFill>
-                <a:highlight>
-                  <a:srgbClr val="FFFFFF"/>
-                </a:highlight>
-                <a:latin typeface="Consolas" panose="020B0609020204030204" pitchFamily="49" charset="0"/>
-              </a:rPr>
-              <a:t>time</a:t>
-            </a:r>
-            <a:r>
-              <a:rPr lang="en-US" dirty="0">
-                <a:solidFill>
-                  <a:srgbClr val="000000"/>
-                </a:solidFill>
-                <a:highlight>
-                  <a:srgbClr val="FFFFFF"/>
-                </a:highlight>
-                <a:latin typeface="Consolas" panose="020B0609020204030204" pitchFamily="49" charset="0"/>
-              </a:rPr>
-              <a:t> </a:t>
-            </a:r>
-            <a:r>
-              <a:rPr lang="en-US" dirty="0">
-                <a:solidFill>
-                  <a:srgbClr val="0000FF"/>
-                </a:solidFill>
-                <a:highlight>
-                  <a:srgbClr val="FFFFFF"/>
-                </a:highlight>
-                <a:latin typeface="Consolas" panose="020B0609020204030204" pitchFamily="49" charset="0"/>
-              </a:rPr>
-              <a:t>zone</a:t>
-            </a:r>
-            <a:r>
-              <a:rPr lang="en-US" dirty="0">
-                <a:solidFill>
-                  <a:srgbClr val="000000"/>
-                </a:solidFill>
-                <a:highlight>
-                  <a:srgbClr val="FFFFFF"/>
-                </a:highlight>
-                <a:latin typeface="Consolas" panose="020B0609020204030204" pitchFamily="49" charset="0"/>
-              </a:rPr>
-              <a:t> </a:t>
-            </a:r>
-            <a:r>
-              <a:rPr lang="en-US">
-                <a:solidFill>
-                  <a:srgbClr val="FF0000"/>
-                </a:solidFill>
-                <a:highlight>
-                  <a:srgbClr val="FFFFFF"/>
-                </a:highlight>
-                <a:latin typeface="Consolas" panose="020B0609020204030204" pitchFamily="49" charset="0"/>
-              </a:rPr>
-              <a:t>'UTC'</a:t>
-            </a:r>
-            <a:r>
-              <a:rPr lang="en-US">
-                <a:solidFill>
-                  <a:srgbClr val="808080"/>
-                </a:solidFill>
-                <a:highlight>
-                  <a:srgbClr val="FFFFFF"/>
-                </a:highlight>
-                <a:latin typeface="Consolas" panose="020B0609020204030204" pitchFamily="49" charset="0"/>
-              </a:rPr>
-              <a:t>;</a:t>
-            </a:r>
-          </a:p>
-          <a:p>
-            <a:endParaRPr lang="en-US" dirty="0">
-              <a:solidFill>
-                <a:srgbClr val="808080"/>
-              </a:solidFill>
-              <a:highlight>
-                <a:srgbClr val="FFFFFF"/>
-              </a:highlight>
-              <a:latin typeface="Consolas" panose="020B0609020204030204" pitchFamily="49" charset="0"/>
-            </a:endParaRPr>
-          </a:p>
-          <a:p>
-            <a:r>
-              <a:rPr lang="en-US" dirty="0">
-                <a:solidFill>
-                  <a:srgbClr val="0000FF"/>
-                </a:solidFill>
-                <a:highlight>
-                  <a:srgbClr val="FFFFFF"/>
-                </a:highlight>
-                <a:latin typeface="Consolas" panose="020B0609020204030204" pitchFamily="49" charset="0"/>
-              </a:rPr>
-              <a:t>select</a:t>
-            </a:r>
-            <a:r>
-              <a:rPr lang="en-US" dirty="0">
-                <a:solidFill>
-                  <a:srgbClr val="000000"/>
-                </a:solidFill>
-                <a:highlight>
-                  <a:srgbClr val="FFFFFF"/>
-                </a:highlight>
-                <a:latin typeface="Consolas" panose="020B0609020204030204" pitchFamily="49" charset="0"/>
-              </a:rPr>
-              <a:t> </a:t>
-            </a:r>
-            <a:r>
-              <a:rPr lang="en-US" dirty="0">
-                <a:solidFill>
-                  <a:srgbClr val="808080"/>
-                </a:solidFill>
-                <a:highlight>
-                  <a:srgbClr val="FFFFFF"/>
-                </a:highlight>
-                <a:latin typeface="Consolas" panose="020B0609020204030204" pitchFamily="49" charset="0"/>
-              </a:rPr>
-              <a:t>*</a:t>
-            </a:r>
-            <a:r>
-              <a:rPr lang="en-US" dirty="0">
-                <a:solidFill>
-                  <a:srgbClr val="000000"/>
-                </a:solidFill>
-                <a:highlight>
-                  <a:srgbClr val="FFFFFF"/>
-                </a:highlight>
-                <a:latin typeface="Consolas" panose="020B0609020204030204" pitchFamily="49" charset="0"/>
-              </a:rPr>
-              <a:t> </a:t>
-            </a:r>
-            <a:r>
-              <a:rPr lang="en-US" dirty="0">
-                <a:solidFill>
-                  <a:srgbClr val="0000FF"/>
-                </a:solidFill>
-                <a:highlight>
-                  <a:srgbClr val="FFFFFF"/>
-                </a:highlight>
-                <a:latin typeface="Consolas" panose="020B0609020204030204" pitchFamily="49" charset="0"/>
-              </a:rPr>
-              <a:t>from</a:t>
-            </a:r>
-            <a:r>
-              <a:rPr lang="en-US" dirty="0">
-                <a:solidFill>
-                  <a:srgbClr val="000000"/>
-                </a:solidFill>
-                <a:highlight>
-                  <a:srgbClr val="FFFFFF"/>
-                </a:highlight>
-                <a:latin typeface="Consolas" panose="020B0609020204030204" pitchFamily="49" charset="0"/>
-              </a:rPr>
-              <a:t> </a:t>
-            </a:r>
-            <a:r>
-              <a:rPr lang="en-US" dirty="0" err="1">
-                <a:solidFill>
-                  <a:srgbClr val="00B050"/>
-                </a:solidFill>
-                <a:highlight>
-                  <a:srgbClr val="FFFFFF"/>
-                </a:highlight>
-                <a:latin typeface="Consolas" panose="020B0609020204030204" pitchFamily="49" charset="0"/>
-              </a:rPr>
-              <a:t>sys.time_zone_info</a:t>
-            </a:r>
-            <a:r>
-              <a:rPr lang="en-US" dirty="0">
-                <a:solidFill>
-                  <a:srgbClr val="808080"/>
-                </a:solidFill>
-                <a:highlight>
-                  <a:srgbClr val="FFFFFF"/>
-                </a:highlight>
-                <a:latin typeface="Consolas" panose="020B0609020204030204" pitchFamily="49" charset="0"/>
-              </a:rPr>
-              <a:t>;</a:t>
-            </a:r>
-            <a:endParaRPr lang="en-US" dirty="0"/>
-          </a:p>
-        </p:txBody>
-      </p:sp>
-    </p:spTree>
-    <p:extLst>
-      <p:ext uri="{BB962C8B-B14F-4D97-AF65-F5344CB8AC3E}">
-        <p14:creationId xmlns:p14="http://schemas.microsoft.com/office/powerpoint/2010/main" val="4235235981"/>
-      </p:ext>
-    </p:extLst>
-  </p:cSld>
-  <p:clrMapOvr>
-    <a:masterClrMapping/>
-  </p:clrMapOvr>
-</p:sld>
-</file>
-
-<file path=ppt/slides/slide11.xml><?xml version="1.0" encoding="utf-8"?>
-<p:sld xmlns:a="http://schemas.openxmlformats.org/drawingml/2006/main" xmlns:r="http://schemas.openxmlformats.org/officeDocument/2006/relationships" xmlns:p="http://schemas.openxmlformats.org/presentationml/2006/main">
-  <p:cSld>
-    <p:spTree>
-      <p:nvGrpSpPr>
-        <p:cNvPr id="1" name=""/>
-        <p:cNvGrpSpPr/>
-        <p:nvPr/>
-      </p:nvGrpSpPr>
-      <p:grpSpPr>
-        <a:xfrm>
-          <a:off x="0" y="0"/>
-          <a:ext cx="0" cy="0"/>
-          <a:chOff x="0" y="0"/>
-          <a:chExt cx="0" cy="0"/>
-        </a:xfrm>
-      </p:grpSpPr>
-      <p:sp>
-        <p:nvSpPr>
-          <p:cNvPr id="2" name="Title 1"/>
-          <p:cNvSpPr>
-            <a:spLocks noGrp="1"/>
-          </p:cNvSpPr>
-          <p:nvPr>
-            <p:ph type="title"/>
-          </p:nvPr>
-        </p:nvSpPr>
-        <p:spPr/>
-        <p:txBody>
-          <a:bodyPr/>
-          <a:lstStyle/>
-          <a:p>
-            <a:r>
-              <a:rPr lang="en-US" dirty="0"/>
-              <a:t>Summary</a:t>
-            </a:r>
-          </a:p>
-        </p:txBody>
-      </p:sp>
-      <p:sp>
-        <p:nvSpPr>
-          <p:cNvPr id="3" name="Content Placeholder 2"/>
-          <p:cNvSpPr>
-            <a:spLocks noGrp="1"/>
-          </p:cNvSpPr>
-          <p:nvPr>
-            <p:ph idx="1"/>
-          </p:nvPr>
-        </p:nvSpPr>
-        <p:spPr/>
-        <p:txBody>
-          <a:bodyPr/>
-          <a:lstStyle/>
-          <a:p>
-            <a:pPr marL="571500" indent="-571500">
-              <a:buFont typeface="Arial" panose="020B0604020202020204" pitchFamily="34" charset="0"/>
-              <a:buChar char="•"/>
-            </a:pPr>
-            <a:r>
-              <a:rPr lang="en-US" dirty="0"/>
-              <a:t>New catalog objects</a:t>
-            </a:r>
-          </a:p>
-          <a:p>
-            <a:pPr marL="1147527" lvl="1" indent="-571500">
-              <a:buFont typeface="Arial" panose="020B0604020202020204" pitchFamily="34" charset="0"/>
-              <a:buChar char="•"/>
-            </a:pPr>
-            <a:r>
-              <a:rPr lang="en-US" dirty="0" err="1"/>
-              <a:t>sys.</a:t>
-            </a:r>
-            <a:r>
-              <a:rPr lang="en-US" dirty="0" err="1">
-                <a:solidFill>
-                  <a:srgbClr val="0070C0"/>
-                </a:solidFill>
-              </a:rPr>
-              <a:t>periods</a:t>
-            </a:r>
-            <a:r>
-              <a:rPr lang="en-US" dirty="0"/>
-              <a:t> (view)</a:t>
-            </a:r>
-          </a:p>
-          <a:p>
-            <a:pPr marL="1147527" lvl="1" indent="-571500">
-              <a:buFont typeface="Arial" panose="020B0604020202020204" pitchFamily="34" charset="0"/>
-              <a:buChar char="•"/>
-            </a:pPr>
-            <a:r>
-              <a:rPr lang="en-US" dirty="0" err="1"/>
-              <a:t>sys.</a:t>
-            </a:r>
-            <a:r>
-              <a:rPr lang="en-US" dirty="0" err="1">
-                <a:solidFill>
-                  <a:srgbClr val="0070C0"/>
-                </a:solidFill>
-              </a:rPr>
-              <a:t>tables</a:t>
-            </a:r>
-            <a:r>
-              <a:rPr lang="en-US" dirty="0" err="1"/>
-              <a:t>.</a:t>
-            </a:r>
-            <a:r>
-              <a:rPr lang="en-US" dirty="0" err="1">
-                <a:solidFill>
-                  <a:srgbClr val="00B050"/>
-                </a:solidFill>
-              </a:rPr>
-              <a:t>temporal_type</a:t>
-            </a:r>
-            <a:r>
-              <a:rPr lang="en-US" dirty="0"/>
-              <a:t> (column)</a:t>
-            </a:r>
-          </a:p>
-          <a:p>
-            <a:pPr marL="1147527" lvl="1" indent="-571500">
-              <a:buFont typeface="Arial" panose="020B0604020202020204" pitchFamily="34" charset="0"/>
-              <a:buChar char="•"/>
-            </a:pPr>
-            <a:r>
-              <a:rPr lang="en-US" dirty="0" err="1"/>
-              <a:t>sys.</a:t>
-            </a:r>
-            <a:r>
-              <a:rPr lang="en-US" dirty="0" err="1">
-                <a:solidFill>
-                  <a:srgbClr val="0070C0"/>
-                </a:solidFill>
-              </a:rPr>
-              <a:t>tables</a:t>
-            </a:r>
-            <a:r>
-              <a:rPr lang="en-US" dirty="0" err="1"/>
-              <a:t>.</a:t>
-            </a:r>
-            <a:r>
-              <a:rPr lang="en-US" dirty="0" err="1">
-                <a:solidFill>
-                  <a:srgbClr val="00B050"/>
-                </a:solidFill>
-              </a:rPr>
-              <a:t>temporal_type_desc</a:t>
-            </a:r>
-            <a:r>
-              <a:rPr lang="en-US" dirty="0"/>
-              <a:t> (column)</a:t>
-            </a:r>
-          </a:p>
-          <a:p>
-            <a:pPr marL="1147527" lvl="1" indent="-571500">
-              <a:buFont typeface="Arial" panose="020B0604020202020204" pitchFamily="34" charset="0"/>
-              <a:buChar char="•"/>
-            </a:pPr>
-            <a:r>
-              <a:rPr lang="en-US" dirty="0" err="1"/>
-              <a:t>sys.</a:t>
-            </a:r>
-            <a:r>
-              <a:rPr lang="en-US" dirty="0" err="1">
-                <a:solidFill>
-                  <a:srgbClr val="0070C0"/>
-                </a:solidFill>
-              </a:rPr>
-              <a:t>tables</a:t>
-            </a:r>
-            <a:r>
-              <a:rPr lang="en-US" dirty="0" err="1"/>
-              <a:t>.</a:t>
-            </a:r>
-            <a:r>
-              <a:rPr lang="en-US" dirty="0" err="1">
-                <a:solidFill>
-                  <a:srgbClr val="00B050"/>
-                </a:solidFill>
-              </a:rPr>
-              <a:t>history_table_id</a:t>
-            </a:r>
-            <a:r>
-              <a:rPr lang="en-US" dirty="0"/>
-              <a:t> (column)</a:t>
-            </a:r>
-          </a:p>
-          <a:p>
-            <a:pPr marL="1147527" lvl="1" indent="-571500">
-              <a:buFont typeface="Arial" panose="020B0604020202020204" pitchFamily="34" charset="0"/>
-              <a:buChar char="•"/>
-            </a:pPr>
-            <a:r>
-              <a:rPr lang="en-US" dirty="0" err="1"/>
-              <a:t>sys.</a:t>
-            </a:r>
-            <a:r>
-              <a:rPr lang="en-US" dirty="0" err="1">
-                <a:solidFill>
-                  <a:srgbClr val="0070C0"/>
-                </a:solidFill>
-              </a:rPr>
-              <a:t>columns</a:t>
-            </a:r>
-            <a:r>
-              <a:rPr lang="en-US" dirty="0" err="1"/>
-              <a:t>.</a:t>
-            </a:r>
-            <a:r>
-              <a:rPr lang="en-US" dirty="0" err="1">
-                <a:solidFill>
-                  <a:srgbClr val="00B050"/>
-                </a:solidFill>
-              </a:rPr>
-              <a:t>generated_always_type</a:t>
-            </a:r>
-            <a:r>
-              <a:rPr lang="en-US" dirty="0"/>
-              <a:t> (column)</a:t>
-            </a:r>
-          </a:p>
-          <a:p>
-            <a:pPr marL="1147527" lvl="1" indent="-571500">
-              <a:buFont typeface="Arial" panose="020B0604020202020204" pitchFamily="34" charset="0"/>
-              <a:buChar char="•"/>
-            </a:pPr>
-            <a:r>
-              <a:rPr lang="en-US" dirty="0" err="1"/>
-              <a:t>sys.</a:t>
-            </a:r>
-            <a:r>
-              <a:rPr lang="en-US" dirty="0" err="1">
-                <a:solidFill>
-                  <a:srgbClr val="0070C0"/>
-                </a:solidFill>
-              </a:rPr>
-              <a:t>columns</a:t>
-            </a:r>
-            <a:r>
-              <a:rPr lang="en-US" dirty="0" err="1"/>
-              <a:t>.</a:t>
-            </a:r>
-            <a:r>
-              <a:rPr lang="en-US" dirty="0" err="1">
-                <a:solidFill>
-                  <a:srgbClr val="00B050"/>
-                </a:solidFill>
-              </a:rPr>
-              <a:t>generated_always_type_desc</a:t>
-            </a:r>
-            <a:r>
-              <a:rPr lang="en-US" dirty="0"/>
-              <a:t> (column)</a:t>
-            </a:r>
-          </a:p>
-          <a:p>
-            <a:pPr lvl="1"/>
-            <a:endParaRPr lang="en-US" dirty="0"/>
-          </a:p>
-        </p:txBody>
-      </p:sp>
-    </p:spTree>
-    <p:extLst>
-      <p:ext uri="{BB962C8B-B14F-4D97-AF65-F5344CB8AC3E}">
-        <p14:creationId xmlns:p14="http://schemas.microsoft.com/office/powerpoint/2010/main" val="764752702"/>
-      </p:ext>
-    </p:extLst>
-  </p:cSld>
-  <p:clrMapOvr>
-    <a:masterClrMapping/>
-  </p:clrMapOvr>
-</p:sld>
-</file>
-
-<file path=ppt/slides/slide12.xml><?xml version="1.0" encoding="utf-8"?>
-<p:sld xmlns:a="http://schemas.openxmlformats.org/drawingml/2006/main" xmlns:r="http://schemas.openxmlformats.org/officeDocument/2006/relationships" xmlns:p="http://schemas.openxmlformats.org/presentationml/2006/main">
-  <p:cSld>
-    <p:spTree>
-      <p:nvGrpSpPr>
-        <p:cNvPr id="1" name=""/>
-        <p:cNvGrpSpPr/>
-        <p:nvPr/>
-      </p:nvGrpSpPr>
-      <p:grpSpPr>
-        <a:xfrm>
-          <a:off x="0" y="0"/>
-          <a:ext cx="0" cy="0"/>
-          <a:chOff x="0" y="0"/>
-          <a:chExt cx="0" cy="0"/>
-        </a:xfrm>
-      </p:grpSpPr>
-      <p:sp>
-        <p:nvSpPr>
-          <p:cNvPr id="2" name="Title 1"/>
-          <p:cNvSpPr>
-            <a:spLocks noGrp="1"/>
-          </p:cNvSpPr>
-          <p:nvPr>
-            <p:ph type="title"/>
-          </p:nvPr>
-        </p:nvSpPr>
-        <p:spPr/>
-        <p:txBody>
-          <a:bodyPr/>
-          <a:lstStyle/>
-          <a:p>
-            <a:r>
-              <a:rPr lang="en-US" dirty="0"/>
               <a:t>Thank You</a:t>
             </a:r>
           </a:p>
@@ -4486,347 +3693,6 @@
           <a:chExt cx="0" cy="0"/>
         </a:xfrm>
       </p:grpSpPr>
-      <p:pic>
-        <p:nvPicPr>
-          <p:cNvPr id="2" name="Picture 1"/>
-          <p:cNvPicPr>
-            <a:picLocks noChangeAspect="1"/>
-          </p:cNvPicPr>
-          <p:nvPr/>
-        </p:nvPicPr>
-        <p:blipFill>
-          <a:blip r:embed="rId2">
-            <a:extLst>
-              <a:ext uri="{28A0092B-C50C-407E-A947-70E740481C1C}">
-                <a14:useLocalDpi xmlns:a14="http://schemas.microsoft.com/office/drawing/2010/main" val="0"/>
-              </a:ext>
-            </a:extLst>
-          </a:blip>
-          <a:stretch>
-            <a:fillRect/>
-          </a:stretch>
-        </p:blipFill>
-        <p:spPr>
-          <a:xfrm>
-            <a:off x="5474110" y="1439813"/>
-            <a:ext cx="5699369" cy="3797205"/>
-          </a:xfrm>
-          <a:prstGeom prst="rect">
-            <a:avLst/>
-          </a:prstGeom>
-        </p:spPr>
-      </p:pic>
-      <p:sp>
-        <p:nvSpPr>
-          <p:cNvPr id="18" name="Title 17"/>
-          <p:cNvSpPr>
-            <a:spLocks noGrp="1"/>
-          </p:cNvSpPr>
-          <p:nvPr>
-            <p:ph type="title"/>
-          </p:nvPr>
-        </p:nvSpPr>
-        <p:spPr/>
-        <p:txBody>
-          <a:bodyPr/>
-          <a:lstStyle/>
-          <a:p>
-            <a:r>
-              <a:rPr lang="en-US" dirty="0"/>
-              <a:t>University of Nebraska at Omaha</a:t>
-            </a:r>
-          </a:p>
-        </p:txBody>
-      </p:sp>
-      <p:sp>
-        <p:nvSpPr>
-          <p:cNvPr id="19" name="Content Placeholder 18"/>
-          <p:cNvSpPr>
-            <a:spLocks noGrp="1"/>
-          </p:cNvSpPr>
-          <p:nvPr>
-            <p:ph idx="1"/>
-          </p:nvPr>
-        </p:nvSpPr>
-        <p:spPr>
-          <a:xfrm>
-            <a:off x="360125" y="1439813"/>
-            <a:ext cx="5375657" cy="4680000"/>
-          </a:xfrm>
-        </p:spPr>
-        <p:txBody>
-          <a:bodyPr/>
-          <a:lstStyle/>
-          <a:p>
-            <a:r>
-              <a:rPr lang="en-US" dirty="0"/>
-              <a:t>Special thanks to UNO and the College of Business Administration for this awesome facility!</a:t>
-            </a:r>
-          </a:p>
-        </p:txBody>
-      </p:sp>
-    </p:spTree>
-    <p:extLst>
-      <p:ext uri="{BB962C8B-B14F-4D97-AF65-F5344CB8AC3E}">
-        <p14:creationId xmlns:p14="http://schemas.microsoft.com/office/powerpoint/2010/main" val="3336481752"/>
-      </p:ext>
-    </p:extLst>
-  </p:cSld>
-  <p:clrMapOvr>
-    <a:masterClrMapping/>
-  </p:clrMapOvr>
-</p:sld>
-</file>
-
-<file path=ppt/slides/slide4.xml><?xml version="1.0" encoding="utf-8"?>
-<p:sld xmlns:a="http://schemas.openxmlformats.org/drawingml/2006/main" xmlns:r="http://schemas.openxmlformats.org/officeDocument/2006/relationships" xmlns:p="http://schemas.openxmlformats.org/presentationml/2006/main">
-  <p:cSld>
-    <p:spTree>
-      <p:nvGrpSpPr>
-        <p:cNvPr id="1" name=""/>
-        <p:cNvGrpSpPr/>
-        <p:nvPr/>
-      </p:nvGrpSpPr>
-      <p:grpSpPr>
-        <a:xfrm>
-          <a:off x="0" y="0"/>
-          <a:ext cx="0" cy="0"/>
-          <a:chOff x="0" y="0"/>
-          <a:chExt cx="0" cy="0"/>
-        </a:xfrm>
-      </p:grpSpPr>
-      <p:sp>
-        <p:nvSpPr>
-          <p:cNvPr id="18" name="Title 17"/>
-          <p:cNvSpPr>
-            <a:spLocks noGrp="1"/>
-          </p:cNvSpPr>
-          <p:nvPr>
-            <p:ph type="title"/>
-          </p:nvPr>
-        </p:nvSpPr>
-        <p:spPr/>
-        <p:txBody>
-          <a:bodyPr/>
-          <a:lstStyle/>
-          <a:p>
-            <a:r>
-              <a:rPr lang="en-US" dirty="0"/>
-              <a:t>Sponsors</a:t>
-            </a:r>
-          </a:p>
-        </p:txBody>
-      </p:sp>
-      <p:pic>
-        <p:nvPicPr>
-          <p:cNvPr id="3" name="Picture 2"/>
-          <p:cNvPicPr>
-            <a:picLocks noChangeAspect="1"/>
-          </p:cNvPicPr>
-          <p:nvPr/>
-        </p:nvPicPr>
-        <p:blipFill>
-          <a:blip r:embed="rId2">
-            <a:extLst>
-              <a:ext uri="{28A0092B-C50C-407E-A947-70E740481C1C}">
-                <a14:useLocalDpi xmlns:a14="http://schemas.microsoft.com/office/drawing/2010/main" val="0"/>
-              </a:ext>
-            </a:extLst>
-          </a:blip>
-          <a:stretch>
-            <a:fillRect/>
-          </a:stretch>
-        </p:blipFill>
-        <p:spPr>
-          <a:xfrm>
-            <a:off x="7224645" y="2106137"/>
-            <a:ext cx="3340100" cy="609600"/>
-          </a:xfrm>
-          <a:prstGeom prst="rect">
-            <a:avLst/>
-          </a:prstGeom>
-        </p:spPr>
-      </p:pic>
-      <p:pic>
-        <p:nvPicPr>
-          <p:cNvPr id="4" name="Picture 3"/>
-          <p:cNvPicPr>
-            <a:picLocks noChangeAspect="1"/>
-          </p:cNvPicPr>
-          <p:nvPr/>
-        </p:nvPicPr>
-        <p:blipFill>
-          <a:blip r:embed="rId3">
-            <a:extLst>
-              <a:ext uri="{28A0092B-C50C-407E-A947-70E740481C1C}">
-                <a14:useLocalDpi xmlns:a14="http://schemas.microsoft.com/office/drawing/2010/main" val="0"/>
-              </a:ext>
-            </a:extLst>
-          </a:blip>
-          <a:stretch>
-            <a:fillRect/>
-          </a:stretch>
-        </p:blipFill>
-        <p:spPr>
-          <a:xfrm>
-            <a:off x="7599873" y="3538351"/>
-            <a:ext cx="2755900" cy="1206500"/>
-          </a:xfrm>
-          <a:prstGeom prst="rect">
-            <a:avLst/>
-          </a:prstGeom>
-        </p:spPr>
-      </p:pic>
-      <p:pic>
-        <p:nvPicPr>
-          <p:cNvPr id="5" name="Picture 4"/>
-          <p:cNvPicPr>
-            <a:picLocks noChangeAspect="1"/>
-          </p:cNvPicPr>
-          <p:nvPr/>
-        </p:nvPicPr>
-        <p:blipFill>
-          <a:blip r:embed="rId4">
-            <a:extLst>
-              <a:ext uri="{28A0092B-C50C-407E-A947-70E740481C1C}">
-                <a14:useLocalDpi xmlns:a14="http://schemas.microsoft.com/office/drawing/2010/main" val="0"/>
-              </a:ext>
-            </a:extLst>
-          </a:blip>
-          <a:stretch>
-            <a:fillRect/>
-          </a:stretch>
-        </p:blipFill>
-        <p:spPr>
-          <a:xfrm>
-            <a:off x="597060" y="3700400"/>
-            <a:ext cx="2540000" cy="1270000"/>
-          </a:xfrm>
-          <a:prstGeom prst="rect">
-            <a:avLst/>
-          </a:prstGeom>
-        </p:spPr>
-      </p:pic>
-      <p:pic>
-        <p:nvPicPr>
-          <p:cNvPr id="6" name="Picture 5"/>
-          <p:cNvPicPr>
-            <a:picLocks noChangeAspect="1"/>
-          </p:cNvPicPr>
-          <p:nvPr/>
-        </p:nvPicPr>
-        <p:blipFill>
-          <a:blip r:embed="rId5">
-            <a:extLst>
-              <a:ext uri="{28A0092B-C50C-407E-A947-70E740481C1C}">
-                <a14:useLocalDpi xmlns:a14="http://schemas.microsoft.com/office/drawing/2010/main" val="0"/>
-              </a:ext>
-            </a:extLst>
-          </a:blip>
-          <a:stretch>
-            <a:fillRect/>
-          </a:stretch>
-        </p:blipFill>
-        <p:spPr>
-          <a:xfrm>
-            <a:off x="4463468" y="3093851"/>
-            <a:ext cx="2209800" cy="444500"/>
-          </a:xfrm>
-          <a:prstGeom prst="rect">
-            <a:avLst/>
-          </a:prstGeom>
-        </p:spPr>
-      </p:pic>
-      <p:pic>
-        <p:nvPicPr>
-          <p:cNvPr id="7" name="Picture 6"/>
-          <p:cNvPicPr>
-            <a:picLocks noChangeAspect="1"/>
-          </p:cNvPicPr>
-          <p:nvPr/>
-        </p:nvPicPr>
-        <p:blipFill>
-          <a:blip r:embed="rId6">
-            <a:extLst>
-              <a:ext uri="{28A0092B-C50C-407E-A947-70E740481C1C}">
-                <a14:useLocalDpi xmlns:a14="http://schemas.microsoft.com/office/drawing/2010/main" val="0"/>
-              </a:ext>
-            </a:extLst>
-          </a:blip>
-          <a:stretch>
-            <a:fillRect/>
-          </a:stretch>
-        </p:blipFill>
-        <p:spPr>
-          <a:xfrm>
-            <a:off x="361038" y="1907646"/>
-            <a:ext cx="3924300" cy="1006583"/>
-          </a:xfrm>
-          <a:prstGeom prst="rect">
-            <a:avLst/>
-          </a:prstGeom>
-        </p:spPr>
-      </p:pic>
-      <p:pic>
-        <p:nvPicPr>
-          <p:cNvPr id="2" name="Picture 1"/>
-          <p:cNvPicPr>
-            <a:picLocks noChangeAspect="1"/>
-          </p:cNvPicPr>
-          <p:nvPr/>
-        </p:nvPicPr>
-        <p:blipFill>
-          <a:blip r:embed="rId7">
-            <a:extLst>
-              <a:ext uri="{28A0092B-C50C-407E-A947-70E740481C1C}">
-                <a14:useLocalDpi xmlns:a14="http://schemas.microsoft.com/office/drawing/2010/main" val="0"/>
-              </a:ext>
-            </a:extLst>
-          </a:blip>
-          <a:stretch>
-            <a:fillRect/>
-          </a:stretch>
-        </p:blipFill>
-        <p:spPr>
-          <a:xfrm>
-            <a:off x="3536368" y="4729225"/>
-            <a:ext cx="4064000" cy="685800"/>
-          </a:xfrm>
-          <a:prstGeom prst="rect">
-            <a:avLst/>
-          </a:prstGeom>
-        </p:spPr>
-      </p:pic>
-    </p:spTree>
-    <p:extLst>
-      <p:ext uri="{BB962C8B-B14F-4D97-AF65-F5344CB8AC3E}">
-        <p14:creationId xmlns:p14="http://schemas.microsoft.com/office/powerpoint/2010/main" val="1505353825"/>
-      </p:ext>
-    </p:extLst>
-  </p:cSld>
-  <p:clrMapOvr>
-    <a:masterClrMapping/>
-  </p:clrMapOvr>
-</p:sld>
-</file>
-
-<file path=ppt/slides/slide5.xml><?xml version="1.0" encoding="utf-8"?>
-<p:sld xmlns:a="http://schemas.openxmlformats.org/drawingml/2006/main" xmlns:r="http://schemas.openxmlformats.org/officeDocument/2006/relationships" xmlns:p="http://schemas.openxmlformats.org/presentationml/2006/main">
-  <p:cSld>
-    <p:spTree>
-      <p:nvGrpSpPr>
-        <p:cNvPr id="1" name=""/>
-        <p:cNvGrpSpPr/>
-        <p:nvPr/>
-      </p:nvGrpSpPr>
-      <p:grpSpPr>
-        <a:xfrm>
-          <a:off x="0" y="0"/>
-          <a:ext cx="0" cy="0"/>
-          <a:chOff x="0" y="0"/>
-          <a:chExt cx="0" cy="0"/>
-        </a:xfrm>
-      </p:grpSpPr>
       <p:sp>
         <p:nvSpPr>
           <p:cNvPr id="2" name="Title 1">
@@ -4984,7 +3850,7 @@
 </p:sld>
 </file>
 
-<file path=ppt/slides/slide6.xml><?xml version="1.0" encoding="utf-8"?>
+<file path=ppt/slides/slide4.xml><?xml version="1.0" encoding="utf-8"?>
 <p:sld xmlns:a="http://schemas.openxmlformats.org/drawingml/2006/main" xmlns:r="http://schemas.openxmlformats.org/officeDocument/2006/relationships" xmlns:p="http://schemas.openxmlformats.org/presentationml/2006/main">
   <p:cSld>
     <p:spTree>
@@ -5105,7 +3971,7 @@
 </p:sld>
 </file>
 
-<file path=ppt/slides/slide7.xml><?xml version="1.0" encoding="utf-8"?>
+<file path=ppt/slides/slide5.xml><?xml version="1.0" encoding="utf-8"?>
 <p:sld xmlns:a="http://schemas.openxmlformats.org/drawingml/2006/main" xmlns:r="http://schemas.openxmlformats.org/officeDocument/2006/relationships" xmlns:p="http://schemas.openxmlformats.org/presentationml/2006/main">
   <p:cSld>
     <p:spTree>
@@ -5221,7 +4087,7 @@
 </p:sld>
 </file>
 
-<file path=ppt/slides/slide8.xml><?xml version="1.0" encoding="utf-8"?>
+<file path=ppt/slides/slide6.xml><?xml version="1.0" encoding="utf-8"?>
 <p:sld xmlns:a="http://schemas.openxmlformats.org/drawingml/2006/main" xmlns:r="http://schemas.openxmlformats.org/officeDocument/2006/relationships" xmlns:p="http://schemas.openxmlformats.org/presentationml/2006/main">
   <p:cSld>
     <p:spTree>
@@ -5297,7 +4163,7 @@
 </p:sld>
 </file>
 
-<file path=ppt/slides/slide9.xml><?xml version="1.0" encoding="utf-8"?>
+<file path=ppt/slides/slide7.xml><?xml version="1.0" encoding="utf-8"?>
 <p:sld xmlns:a="http://schemas.openxmlformats.org/drawingml/2006/main" xmlns:r="http://schemas.openxmlformats.org/officeDocument/2006/relationships" xmlns:p="http://schemas.openxmlformats.org/presentationml/2006/main">
   <p:cSld>
     <p:spTree>
@@ -6165,6 +5031,797 @@
 </p:sld>
 </file>
 
+<file path=ppt/slides/slide8.xml><?xml version="1.0" encoding="utf-8"?>
+<p:sld xmlns:a="http://schemas.openxmlformats.org/drawingml/2006/main" xmlns:r="http://schemas.openxmlformats.org/officeDocument/2006/relationships" xmlns:p="http://schemas.openxmlformats.org/presentationml/2006/main">
+  <p:cSld>
+    <p:spTree>
+      <p:nvGrpSpPr>
+        <p:cNvPr id="1" name=""/>
+        <p:cNvGrpSpPr/>
+        <p:nvPr/>
+      </p:nvGrpSpPr>
+      <p:grpSpPr>
+        <a:xfrm>
+          <a:off x="0" y="0"/>
+          <a:ext cx="0" cy="0"/>
+          <a:chOff x="0" y="0"/>
+          <a:chExt cx="0" cy="0"/>
+        </a:xfrm>
+      </p:grpSpPr>
+      <p:sp>
+        <p:nvSpPr>
+          <p:cNvPr id="2" name="Title 1"/>
+          <p:cNvSpPr>
+            <a:spLocks noGrp="1"/>
+          </p:cNvSpPr>
+          <p:nvPr>
+            <p:ph type="title"/>
+          </p:nvPr>
+        </p:nvSpPr>
+        <p:spPr/>
+        <p:txBody>
+          <a:bodyPr/>
+          <a:lstStyle/>
+          <a:p>
+            <a:r>
+              <a:rPr lang="en-US" dirty="0"/>
+              <a:t>Summary</a:t>
+            </a:r>
+          </a:p>
+        </p:txBody>
+      </p:sp>
+      <p:sp>
+        <p:nvSpPr>
+          <p:cNvPr id="3" name="Content Placeholder 2"/>
+          <p:cNvSpPr>
+            <a:spLocks noGrp="1"/>
+          </p:cNvSpPr>
+          <p:nvPr>
+            <p:ph idx="1"/>
+          </p:nvPr>
+        </p:nvSpPr>
+        <p:spPr/>
+        <p:txBody>
+          <a:bodyPr/>
+          <a:lstStyle/>
+          <a:p>
+            <a:r>
+              <a:rPr lang="en-US" dirty="0">
+                <a:solidFill>
+                  <a:srgbClr val="0000FF"/>
+                </a:solidFill>
+                <a:highlight>
+                  <a:srgbClr val="FFFFFF"/>
+                </a:highlight>
+                <a:latin typeface="Consolas" panose="020B0609020204030204" pitchFamily="49" charset="0"/>
+              </a:rPr>
+              <a:t>select</a:t>
+            </a:r>
+            <a:r>
+              <a:rPr lang="en-US" dirty="0">
+                <a:solidFill>
+                  <a:srgbClr val="000000"/>
+                </a:solidFill>
+                <a:highlight>
+                  <a:srgbClr val="FFFFFF"/>
+                </a:highlight>
+                <a:latin typeface="Consolas" panose="020B0609020204030204" pitchFamily="49" charset="0"/>
+              </a:rPr>
+              <a:t> </a:t>
+            </a:r>
+          </a:p>
+          <a:p>
+            <a:r>
+              <a:rPr lang="en-US" dirty="0">
+                <a:solidFill>
+                  <a:srgbClr val="000000"/>
+                </a:solidFill>
+                <a:highlight>
+                  <a:srgbClr val="FFFFFF"/>
+                </a:highlight>
+                <a:latin typeface="Consolas" panose="020B0609020204030204" pitchFamily="49" charset="0"/>
+              </a:rPr>
+              <a:t>	</a:t>
+            </a:r>
+            <a:r>
+              <a:rPr lang="en-US" dirty="0">
+                <a:solidFill>
+                  <a:srgbClr val="FF00FF"/>
+                </a:solidFill>
+                <a:highlight>
+                  <a:srgbClr val="FFFFFF"/>
+                </a:highlight>
+                <a:latin typeface="Consolas" panose="020B0609020204030204" pitchFamily="49" charset="0"/>
+              </a:rPr>
+              <a:t>cast</a:t>
+            </a:r>
+            <a:r>
+              <a:rPr lang="en-US" dirty="0">
+                <a:solidFill>
+                  <a:srgbClr val="808080"/>
+                </a:solidFill>
+                <a:highlight>
+                  <a:srgbClr val="FFFFFF"/>
+                </a:highlight>
+                <a:latin typeface="Consolas" panose="020B0609020204030204" pitchFamily="49" charset="0"/>
+              </a:rPr>
+              <a:t>(</a:t>
+            </a:r>
+            <a:r>
+              <a:rPr lang="en-US" dirty="0">
+                <a:solidFill>
+                  <a:srgbClr val="FF0000"/>
+                </a:solidFill>
+                <a:highlight>
+                  <a:srgbClr val="FFFFFF"/>
+                </a:highlight>
+                <a:latin typeface="Consolas" panose="020B0609020204030204" pitchFamily="49" charset="0"/>
+              </a:rPr>
+              <a:t>'2017-06-10 10:10:00'</a:t>
+            </a:r>
+            <a:r>
+              <a:rPr lang="en-US" dirty="0">
+                <a:solidFill>
+                  <a:srgbClr val="000000"/>
+                </a:solidFill>
+                <a:highlight>
+                  <a:srgbClr val="FFFFFF"/>
+                </a:highlight>
+                <a:latin typeface="Consolas" panose="020B0609020204030204" pitchFamily="49" charset="0"/>
+              </a:rPr>
+              <a:t> </a:t>
+            </a:r>
+            <a:r>
+              <a:rPr lang="en-US" dirty="0">
+                <a:solidFill>
+                  <a:srgbClr val="0000FF"/>
+                </a:solidFill>
+                <a:highlight>
+                  <a:srgbClr val="FFFFFF"/>
+                </a:highlight>
+                <a:latin typeface="Consolas" panose="020B0609020204030204" pitchFamily="49" charset="0"/>
+              </a:rPr>
+              <a:t>as</a:t>
+            </a:r>
+            <a:r>
+              <a:rPr lang="en-US" dirty="0">
+                <a:solidFill>
+                  <a:srgbClr val="000000"/>
+                </a:solidFill>
+                <a:highlight>
+                  <a:srgbClr val="FFFFFF"/>
+                </a:highlight>
+                <a:latin typeface="Consolas" panose="020B0609020204030204" pitchFamily="49" charset="0"/>
+              </a:rPr>
+              <a:t> </a:t>
+            </a:r>
+            <a:r>
+              <a:rPr lang="en-US" dirty="0">
+                <a:solidFill>
+                  <a:srgbClr val="0000FF"/>
+                </a:solidFill>
+                <a:highlight>
+                  <a:srgbClr val="FFFFFF"/>
+                </a:highlight>
+                <a:latin typeface="Consolas" panose="020B0609020204030204" pitchFamily="49" charset="0"/>
+              </a:rPr>
+              <a:t>datetime2</a:t>
+            </a:r>
+            <a:r>
+              <a:rPr lang="en-US" dirty="0">
+                <a:solidFill>
+                  <a:srgbClr val="808080"/>
+                </a:solidFill>
+                <a:highlight>
+                  <a:srgbClr val="FFFFFF"/>
+                </a:highlight>
+                <a:latin typeface="Consolas" panose="020B0609020204030204" pitchFamily="49" charset="0"/>
+              </a:rPr>
+              <a:t>)</a:t>
+            </a:r>
+            <a:endParaRPr lang="en-US" dirty="0">
+              <a:solidFill>
+                <a:srgbClr val="FF0000"/>
+              </a:solidFill>
+              <a:highlight>
+                <a:srgbClr val="FFFFFF"/>
+              </a:highlight>
+              <a:latin typeface="Consolas" panose="020B0609020204030204" pitchFamily="49" charset="0"/>
+            </a:endParaRPr>
+          </a:p>
+          <a:p>
+            <a:r>
+              <a:rPr lang="en-US" dirty="0">
+                <a:solidFill>
+                  <a:srgbClr val="FF0000"/>
+                </a:solidFill>
+                <a:highlight>
+                  <a:srgbClr val="FFFFFF"/>
+                </a:highlight>
+                <a:latin typeface="Consolas" panose="020B0609020204030204" pitchFamily="49" charset="0"/>
+              </a:rPr>
+              <a:t>	</a:t>
+            </a:r>
+            <a:r>
+              <a:rPr lang="en-US" dirty="0">
+                <a:solidFill>
+                  <a:srgbClr val="0000FF"/>
+                </a:solidFill>
+                <a:highlight>
+                  <a:srgbClr val="FFFFFF"/>
+                </a:highlight>
+                <a:latin typeface="Consolas" panose="020B0609020204030204" pitchFamily="49" charset="0"/>
+              </a:rPr>
+              <a:t>at</a:t>
+            </a:r>
+            <a:r>
+              <a:rPr lang="en-US" dirty="0">
+                <a:solidFill>
+                  <a:srgbClr val="000000"/>
+                </a:solidFill>
+                <a:highlight>
+                  <a:srgbClr val="FFFFFF"/>
+                </a:highlight>
+                <a:latin typeface="Consolas" panose="020B0609020204030204" pitchFamily="49" charset="0"/>
+              </a:rPr>
+              <a:t> </a:t>
+            </a:r>
+            <a:r>
+              <a:rPr lang="en-US" dirty="0">
+                <a:solidFill>
+                  <a:srgbClr val="0000FF"/>
+                </a:solidFill>
+                <a:highlight>
+                  <a:srgbClr val="FFFFFF"/>
+                </a:highlight>
+                <a:latin typeface="Consolas" panose="020B0609020204030204" pitchFamily="49" charset="0"/>
+              </a:rPr>
+              <a:t>time</a:t>
+            </a:r>
+            <a:r>
+              <a:rPr lang="en-US" dirty="0">
+                <a:solidFill>
+                  <a:srgbClr val="000000"/>
+                </a:solidFill>
+                <a:highlight>
+                  <a:srgbClr val="FFFFFF"/>
+                </a:highlight>
+                <a:latin typeface="Consolas" panose="020B0609020204030204" pitchFamily="49" charset="0"/>
+              </a:rPr>
+              <a:t> </a:t>
+            </a:r>
+            <a:r>
+              <a:rPr lang="en-US" dirty="0">
+                <a:solidFill>
+                  <a:srgbClr val="0000FF"/>
+                </a:solidFill>
+                <a:highlight>
+                  <a:srgbClr val="FFFFFF"/>
+                </a:highlight>
+                <a:latin typeface="Consolas" panose="020B0609020204030204" pitchFamily="49" charset="0"/>
+              </a:rPr>
+              <a:t>zone</a:t>
+            </a:r>
+            <a:r>
+              <a:rPr lang="en-US" dirty="0">
+                <a:solidFill>
+                  <a:srgbClr val="000000"/>
+                </a:solidFill>
+                <a:highlight>
+                  <a:srgbClr val="FFFFFF"/>
+                </a:highlight>
+                <a:latin typeface="Consolas" panose="020B0609020204030204" pitchFamily="49" charset="0"/>
+              </a:rPr>
+              <a:t> </a:t>
+            </a:r>
+            <a:r>
+              <a:rPr lang="en-US" dirty="0">
+                <a:solidFill>
+                  <a:srgbClr val="FF0000"/>
+                </a:solidFill>
+                <a:highlight>
+                  <a:srgbClr val="FFFFFF"/>
+                </a:highlight>
+                <a:latin typeface="Consolas" panose="020B0609020204030204" pitchFamily="49" charset="0"/>
+              </a:rPr>
+              <a:t>'Central Standard Time' 	</a:t>
+            </a:r>
+            <a:r>
+              <a:rPr lang="en-US" dirty="0">
+                <a:solidFill>
+                  <a:srgbClr val="0000FF"/>
+                </a:solidFill>
+                <a:highlight>
+                  <a:srgbClr val="FFFFFF"/>
+                </a:highlight>
+                <a:latin typeface="Consolas" panose="020B0609020204030204" pitchFamily="49" charset="0"/>
+              </a:rPr>
+              <a:t>at</a:t>
+            </a:r>
+            <a:r>
+              <a:rPr lang="en-US" dirty="0">
+                <a:solidFill>
+                  <a:srgbClr val="000000"/>
+                </a:solidFill>
+                <a:highlight>
+                  <a:srgbClr val="FFFFFF"/>
+                </a:highlight>
+                <a:latin typeface="Consolas" panose="020B0609020204030204" pitchFamily="49" charset="0"/>
+              </a:rPr>
+              <a:t> </a:t>
+            </a:r>
+            <a:r>
+              <a:rPr lang="en-US" dirty="0">
+                <a:solidFill>
+                  <a:srgbClr val="0000FF"/>
+                </a:solidFill>
+                <a:highlight>
+                  <a:srgbClr val="FFFFFF"/>
+                </a:highlight>
+                <a:latin typeface="Consolas" panose="020B0609020204030204" pitchFamily="49" charset="0"/>
+              </a:rPr>
+              <a:t>time</a:t>
+            </a:r>
+            <a:r>
+              <a:rPr lang="en-US" dirty="0">
+                <a:solidFill>
+                  <a:srgbClr val="000000"/>
+                </a:solidFill>
+                <a:highlight>
+                  <a:srgbClr val="FFFFFF"/>
+                </a:highlight>
+                <a:latin typeface="Consolas" panose="020B0609020204030204" pitchFamily="49" charset="0"/>
+              </a:rPr>
+              <a:t> </a:t>
+            </a:r>
+            <a:r>
+              <a:rPr lang="en-US" dirty="0">
+                <a:solidFill>
+                  <a:srgbClr val="0000FF"/>
+                </a:solidFill>
+                <a:highlight>
+                  <a:srgbClr val="FFFFFF"/>
+                </a:highlight>
+                <a:latin typeface="Consolas" panose="020B0609020204030204" pitchFamily="49" charset="0"/>
+              </a:rPr>
+              <a:t>zone</a:t>
+            </a:r>
+            <a:r>
+              <a:rPr lang="en-US" dirty="0">
+                <a:solidFill>
+                  <a:srgbClr val="000000"/>
+                </a:solidFill>
+                <a:highlight>
+                  <a:srgbClr val="FFFFFF"/>
+                </a:highlight>
+                <a:latin typeface="Consolas" panose="020B0609020204030204" pitchFamily="49" charset="0"/>
+              </a:rPr>
+              <a:t> </a:t>
+            </a:r>
+            <a:r>
+              <a:rPr lang="en-US">
+                <a:solidFill>
+                  <a:srgbClr val="FF0000"/>
+                </a:solidFill>
+                <a:highlight>
+                  <a:srgbClr val="FFFFFF"/>
+                </a:highlight>
+                <a:latin typeface="Consolas" panose="020B0609020204030204" pitchFamily="49" charset="0"/>
+              </a:rPr>
+              <a:t>'UTC'</a:t>
+            </a:r>
+            <a:r>
+              <a:rPr lang="en-US">
+                <a:solidFill>
+                  <a:srgbClr val="808080"/>
+                </a:solidFill>
+                <a:highlight>
+                  <a:srgbClr val="FFFFFF"/>
+                </a:highlight>
+                <a:latin typeface="Consolas" panose="020B0609020204030204" pitchFamily="49" charset="0"/>
+              </a:rPr>
+              <a:t>;</a:t>
+            </a:r>
+          </a:p>
+          <a:p>
+            <a:endParaRPr lang="en-US" dirty="0">
+              <a:solidFill>
+                <a:srgbClr val="808080"/>
+              </a:solidFill>
+              <a:highlight>
+                <a:srgbClr val="FFFFFF"/>
+              </a:highlight>
+              <a:latin typeface="Consolas" panose="020B0609020204030204" pitchFamily="49" charset="0"/>
+            </a:endParaRPr>
+          </a:p>
+          <a:p>
+            <a:r>
+              <a:rPr lang="en-US" dirty="0">
+                <a:solidFill>
+                  <a:srgbClr val="0000FF"/>
+                </a:solidFill>
+                <a:highlight>
+                  <a:srgbClr val="FFFFFF"/>
+                </a:highlight>
+                <a:latin typeface="Consolas" panose="020B0609020204030204" pitchFamily="49" charset="0"/>
+              </a:rPr>
+              <a:t>select</a:t>
+            </a:r>
+            <a:r>
+              <a:rPr lang="en-US" dirty="0">
+                <a:solidFill>
+                  <a:srgbClr val="000000"/>
+                </a:solidFill>
+                <a:highlight>
+                  <a:srgbClr val="FFFFFF"/>
+                </a:highlight>
+                <a:latin typeface="Consolas" panose="020B0609020204030204" pitchFamily="49" charset="0"/>
+              </a:rPr>
+              <a:t> </a:t>
+            </a:r>
+            <a:r>
+              <a:rPr lang="en-US" dirty="0">
+                <a:solidFill>
+                  <a:srgbClr val="808080"/>
+                </a:solidFill>
+                <a:highlight>
+                  <a:srgbClr val="FFFFFF"/>
+                </a:highlight>
+                <a:latin typeface="Consolas" panose="020B0609020204030204" pitchFamily="49" charset="0"/>
+              </a:rPr>
+              <a:t>*</a:t>
+            </a:r>
+            <a:r>
+              <a:rPr lang="en-US" dirty="0">
+                <a:solidFill>
+                  <a:srgbClr val="000000"/>
+                </a:solidFill>
+                <a:highlight>
+                  <a:srgbClr val="FFFFFF"/>
+                </a:highlight>
+                <a:latin typeface="Consolas" panose="020B0609020204030204" pitchFamily="49" charset="0"/>
+              </a:rPr>
+              <a:t> </a:t>
+            </a:r>
+            <a:r>
+              <a:rPr lang="en-US" dirty="0">
+                <a:solidFill>
+                  <a:srgbClr val="0000FF"/>
+                </a:solidFill>
+                <a:highlight>
+                  <a:srgbClr val="FFFFFF"/>
+                </a:highlight>
+                <a:latin typeface="Consolas" panose="020B0609020204030204" pitchFamily="49" charset="0"/>
+              </a:rPr>
+              <a:t>from</a:t>
+            </a:r>
+            <a:r>
+              <a:rPr lang="en-US" dirty="0">
+                <a:solidFill>
+                  <a:srgbClr val="000000"/>
+                </a:solidFill>
+                <a:highlight>
+                  <a:srgbClr val="FFFFFF"/>
+                </a:highlight>
+                <a:latin typeface="Consolas" panose="020B0609020204030204" pitchFamily="49" charset="0"/>
+              </a:rPr>
+              <a:t> </a:t>
+            </a:r>
+            <a:r>
+              <a:rPr lang="en-US" dirty="0" err="1">
+                <a:solidFill>
+                  <a:srgbClr val="00B050"/>
+                </a:solidFill>
+                <a:highlight>
+                  <a:srgbClr val="FFFFFF"/>
+                </a:highlight>
+                <a:latin typeface="Consolas" panose="020B0609020204030204" pitchFamily="49" charset="0"/>
+              </a:rPr>
+              <a:t>sys.time_zone_info</a:t>
+            </a:r>
+            <a:r>
+              <a:rPr lang="en-US" dirty="0">
+                <a:solidFill>
+                  <a:srgbClr val="808080"/>
+                </a:solidFill>
+                <a:highlight>
+                  <a:srgbClr val="FFFFFF"/>
+                </a:highlight>
+                <a:latin typeface="Consolas" panose="020B0609020204030204" pitchFamily="49" charset="0"/>
+              </a:rPr>
+              <a:t>;</a:t>
+            </a:r>
+            <a:endParaRPr lang="en-US" dirty="0"/>
+          </a:p>
+        </p:txBody>
+      </p:sp>
+    </p:spTree>
+    <p:extLst>
+      <p:ext uri="{BB962C8B-B14F-4D97-AF65-F5344CB8AC3E}">
+        <p14:creationId xmlns:p14="http://schemas.microsoft.com/office/powerpoint/2010/main" val="4235235981"/>
+      </p:ext>
+    </p:extLst>
+  </p:cSld>
+  <p:clrMapOvr>
+    <a:masterClrMapping/>
+  </p:clrMapOvr>
+</p:sld>
+</file>
+
+<file path=ppt/slides/slide9.xml><?xml version="1.0" encoding="utf-8"?>
+<p:sld xmlns:a="http://schemas.openxmlformats.org/drawingml/2006/main" xmlns:r="http://schemas.openxmlformats.org/officeDocument/2006/relationships" xmlns:p="http://schemas.openxmlformats.org/presentationml/2006/main">
+  <p:cSld>
+    <p:spTree>
+      <p:nvGrpSpPr>
+        <p:cNvPr id="1" name=""/>
+        <p:cNvGrpSpPr/>
+        <p:nvPr/>
+      </p:nvGrpSpPr>
+      <p:grpSpPr>
+        <a:xfrm>
+          <a:off x="0" y="0"/>
+          <a:ext cx="0" cy="0"/>
+          <a:chOff x="0" y="0"/>
+          <a:chExt cx="0" cy="0"/>
+        </a:xfrm>
+      </p:grpSpPr>
+      <p:sp>
+        <p:nvSpPr>
+          <p:cNvPr id="2" name="Title 1"/>
+          <p:cNvSpPr>
+            <a:spLocks noGrp="1"/>
+          </p:cNvSpPr>
+          <p:nvPr>
+            <p:ph type="title"/>
+          </p:nvPr>
+        </p:nvSpPr>
+        <p:spPr/>
+        <p:txBody>
+          <a:bodyPr/>
+          <a:lstStyle/>
+          <a:p>
+            <a:r>
+              <a:rPr lang="en-US" dirty="0"/>
+              <a:t>Summary</a:t>
+            </a:r>
+          </a:p>
+        </p:txBody>
+      </p:sp>
+      <p:sp>
+        <p:nvSpPr>
+          <p:cNvPr id="3" name="Content Placeholder 2"/>
+          <p:cNvSpPr>
+            <a:spLocks noGrp="1"/>
+          </p:cNvSpPr>
+          <p:nvPr>
+            <p:ph idx="1"/>
+          </p:nvPr>
+        </p:nvSpPr>
+        <p:spPr/>
+        <p:txBody>
+          <a:bodyPr/>
+          <a:lstStyle/>
+          <a:p>
+            <a:pPr marL="571500" indent="-571500">
+              <a:buFont typeface="Arial" panose="020B0604020202020204" pitchFamily="34" charset="0"/>
+              <a:buChar char="•"/>
+            </a:pPr>
+            <a:r>
+              <a:rPr lang="en-US" dirty="0"/>
+              <a:t>New catalog objects</a:t>
+            </a:r>
+          </a:p>
+          <a:p>
+            <a:pPr marL="1147527" lvl="1" indent="-571500">
+              <a:buFont typeface="Arial" panose="020B0604020202020204" pitchFamily="34" charset="0"/>
+              <a:buChar char="•"/>
+            </a:pPr>
+            <a:r>
+              <a:rPr lang="en-US" dirty="0" err="1"/>
+              <a:t>sys.</a:t>
+            </a:r>
+            <a:r>
+              <a:rPr lang="en-US" dirty="0" err="1">
+                <a:solidFill>
+                  <a:srgbClr val="0070C0"/>
+                </a:solidFill>
+              </a:rPr>
+              <a:t>periods</a:t>
+            </a:r>
+            <a:r>
+              <a:rPr lang="en-US" dirty="0"/>
+              <a:t> (view)</a:t>
+            </a:r>
+          </a:p>
+          <a:p>
+            <a:pPr marL="1147527" lvl="1" indent="-571500">
+              <a:buFont typeface="Arial" panose="020B0604020202020204" pitchFamily="34" charset="0"/>
+              <a:buChar char="•"/>
+            </a:pPr>
+            <a:r>
+              <a:rPr lang="en-US" dirty="0" err="1"/>
+              <a:t>sys.</a:t>
+            </a:r>
+            <a:r>
+              <a:rPr lang="en-US" dirty="0" err="1">
+                <a:solidFill>
+                  <a:srgbClr val="0070C0"/>
+                </a:solidFill>
+              </a:rPr>
+              <a:t>tables</a:t>
+            </a:r>
+            <a:r>
+              <a:rPr lang="en-US" dirty="0" err="1"/>
+              <a:t>.</a:t>
+            </a:r>
+            <a:r>
+              <a:rPr lang="en-US" dirty="0" err="1">
+                <a:solidFill>
+                  <a:srgbClr val="00B050"/>
+                </a:solidFill>
+              </a:rPr>
+              <a:t>temporal_type</a:t>
+            </a:r>
+            <a:r>
+              <a:rPr lang="en-US" dirty="0"/>
+              <a:t> (column)</a:t>
+            </a:r>
+          </a:p>
+          <a:p>
+            <a:pPr marL="1147527" lvl="1" indent="-571500">
+              <a:buFont typeface="Arial" panose="020B0604020202020204" pitchFamily="34" charset="0"/>
+              <a:buChar char="•"/>
+            </a:pPr>
+            <a:r>
+              <a:rPr lang="en-US" dirty="0" err="1"/>
+              <a:t>sys.</a:t>
+            </a:r>
+            <a:r>
+              <a:rPr lang="en-US" dirty="0" err="1">
+                <a:solidFill>
+                  <a:srgbClr val="0070C0"/>
+                </a:solidFill>
+              </a:rPr>
+              <a:t>tables</a:t>
+            </a:r>
+            <a:r>
+              <a:rPr lang="en-US" dirty="0" err="1"/>
+              <a:t>.</a:t>
+            </a:r>
+            <a:r>
+              <a:rPr lang="en-US" dirty="0" err="1">
+                <a:solidFill>
+                  <a:srgbClr val="00B050"/>
+                </a:solidFill>
+              </a:rPr>
+              <a:t>temporal_type_desc</a:t>
+            </a:r>
+            <a:r>
+              <a:rPr lang="en-US" dirty="0"/>
+              <a:t> (column)</a:t>
+            </a:r>
+          </a:p>
+          <a:p>
+            <a:pPr marL="1147527" lvl="1" indent="-571500">
+              <a:buFont typeface="Arial" panose="020B0604020202020204" pitchFamily="34" charset="0"/>
+              <a:buChar char="•"/>
+            </a:pPr>
+            <a:r>
+              <a:rPr lang="en-US" dirty="0" err="1"/>
+              <a:t>sys.</a:t>
+            </a:r>
+            <a:r>
+              <a:rPr lang="en-US" dirty="0" err="1">
+                <a:solidFill>
+                  <a:srgbClr val="0070C0"/>
+                </a:solidFill>
+              </a:rPr>
+              <a:t>tables</a:t>
+            </a:r>
+            <a:r>
+              <a:rPr lang="en-US" dirty="0" err="1"/>
+              <a:t>.</a:t>
+            </a:r>
+            <a:r>
+              <a:rPr lang="en-US" dirty="0" err="1">
+                <a:solidFill>
+                  <a:srgbClr val="00B050"/>
+                </a:solidFill>
+              </a:rPr>
+              <a:t>history_table_id</a:t>
+            </a:r>
+            <a:r>
+              <a:rPr lang="en-US" dirty="0"/>
+              <a:t> (column)</a:t>
+            </a:r>
+          </a:p>
+          <a:p>
+            <a:pPr marL="1147527" lvl="1" indent="-571500">
+              <a:buFont typeface="Arial" panose="020B0604020202020204" pitchFamily="34" charset="0"/>
+              <a:buChar char="•"/>
+            </a:pPr>
+            <a:r>
+              <a:rPr lang="en-US" dirty="0" err="1"/>
+              <a:t>sys.</a:t>
+            </a:r>
+            <a:r>
+              <a:rPr lang="en-US" dirty="0" err="1">
+                <a:solidFill>
+                  <a:srgbClr val="0070C0"/>
+                </a:solidFill>
+              </a:rPr>
+              <a:t>columns</a:t>
+            </a:r>
+            <a:r>
+              <a:rPr lang="en-US" dirty="0" err="1"/>
+              <a:t>.</a:t>
+            </a:r>
+            <a:r>
+              <a:rPr lang="en-US" dirty="0" err="1">
+                <a:solidFill>
+                  <a:srgbClr val="00B050"/>
+                </a:solidFill>
+              </a:rPr>
+              <a:t>generated_always_type</a:t>
+            </a:r>
+            <a:r>
+              <a:rPr lang="en-US" dirty="0"/>
+              <a:t> (column)</a:t>
+            </a:r>
+          </a:p>
+          <a:p>
+            <a:pPr marL="1147527" lvl="1" indent="-571500">
+              <a:buFont typeface="Arial" panose="020B0604020202020204" pitchFamily="34" charset="0"/>
+              <a:buChar char="•"/>
+            </a:pPr>
+            <a:r>
+              <a:rPr lang="en-US" dirty="0" err="1"/>
+              <a:t>sys.</a:t>
+            </a:r>
+            <a:r>
+              <a:rPr lang="en-US" dirty="0" err="1">
+                <a:solidFill>
+                  <a:srgbClr val="0070C0"/>
+                </a:solidFill>
+              </a:rPr>
+              <a:t>columns</a:t>
+            </a:r>
+            <a:r>
+              <a:rPr lang="en-US" dirty="0" err="1"/>
+              <a:t>.</a:t>
+            </a:r>
+            <a:r>
+              <a:rPr lang="en-US" dirty="0" err="1">
+                <a:solidFill>
+                  <a:srgbClr val="00B050"/>
+                </a:solidFill>
+              </a:rPr>
+              <a:t>generated_always_type_desc</a:t>
+            </a:r>
+            <a:r>
+              <a:rPr lang="en-US" dirty="0"/>
+              <a:t> (column)</a:t>
+            </a:r>
+          </a:p>
+          <a:p>
+            <a:pPr lvl="1"/>
+            <a:endParaRPr lang="en-US" dirty="0"/>
+          </a:p>
+        </p:txBody>
+      </p:sp>
+    </p:spTree>
+    <p:extLst>
+      <p:ext uri="{BB962C8B-B14F-4D97-AF65-F5344CB8AC3E}">
+        <p14:creationId xmlns:p14="http://schemas.microsoft.com/office/powerpoint/2010/main" val="764752702"/>
+      </p:ext>
+    </p:extLst>
+  </p:cSld>
+  <p:clrMapOvr>
+    <a:masterClrMapping/>
+  </p:clrMapOvr>
+</p:sld>
+</file>
+
 <file path=ppt/theme/theme1.xml><?xml version="1.0" encoding="utf-8"?>
 <a:theme xmlns:a="http://schemas.openxmlformats.org/drawingml/2006/main" name="SQLSatOslo 2016">
   <a:themeElements>

</xml_diff>

<commit_message>
Update title slide for Lincoln 2018.
</commit_message>
<xml_diff>
--- a/Temporal.pptx
+++ b/Temporal.pptx
@@ -2234,7 +2234,7 @@
           <a:graphicData uri="http://schemas.openxmlformats.org/presentationml/2006/ole">
             <mc:AlternateContent xmlns:mc="http://schemas.openxmlformats.org/markup-compatibility/2006">
               <mc:Choice xmlns:v="urn:schemas-microsoft-com:vml" Requires="v">
-                <p:oleObj spid="_x0000_s1059" name="Image" r:id="rId11" imgW="2279520" imgH="1310400" progId="Photoshop.Image.18">
+                <p:oleObj spid="_x0000_s1061" name="Image" r:id="rId11" imgW="2279520" imgH="1310400" progId="Photoshop.Image.18">
                   <p:embed/>
                 </p:oleObj>
               </mc:Choice>
@@ -2697,53 +2697,108 @@
           </a:p>
         </p:txBody>
       </p:sp>
-      <p:sp>
-        <p:nvSpPr>
-          <p:cNvPr id="4" name="TextBox 3">
+      <p:pic>
+        <p:nvPicPr>
+          <p:cNvPr id="5" name="Picture 4">
             <a:extLst>
               <a:ext uri="{FF2B5EF4-FFF2-40B4-BE49-F238E27FC236}">
-                <a16:creationId xmlns:a16="http://schemas.microsoft.com/office/drawing/2014/main" id="{4E95CA58-BC71-4CE1-ACB0-4410970492E6}"/>
+                <a16:creationId xmlns:a16="http://schemas.microsoft.com/office/drawing/2014/main" id="{7DD8DE79-1429-4866-BBF1-3CE9A5DB5409}"/>
               </a:ext>
             </a:extLst>
           </p:cNvPr>
-          <p:cNvSpPr txBox="1"/>
+          <p:cNvPicPr>
+            <a:picLocks noChangeAspect="1"/>
+          </p:cNvPicPr>
+          <p:nvPr/>
+        </p:nvPicPr>
+        <p:blipFill>
+          <a:blip r:embed="rId3"/>
+          <a:stretch>
+            <a:fillRect/>
+          </a:stretch>
+        </p:blipFill>
+        <p:spPr>
+          <a:xfrm>
+            <a:off x="5805488" y="4781264"/>
+            <a:ext cx="5715000" cy="1438275"/>
+          </a:xfrm>
+          <a:prstGeom prst="rect">
+            <a:avLst/>
+          </a:prstGeom>
+        </p:spPr>
+      </p:pic>
+      <p:sp>
+        <p:nvSpPr>
+          <p:cNvPr id="6" name="Rectangle 5">
+            <a:extLst>
+              <a:ext uri="{FF2B5EF4-FFF2-40B4-BE49-F238E27FC236}">
+                <a16:creationId xmlns:a16="http://schemas.microsoft.com/office/drawing/2014/main" id="{B7399187-9BA9-4033-A3C7-DFCB4FB51140}"/>
+              </a:ext>
+            </a:extLst>
+          </p:cNvPr>
+          <p:cNvSpPr/>
           <p:nvPr/>
         </p:nvSpPr>
         <p:spPr>
           <a:xfrm>
-            <a:off x="8392886" y="5196483"/>
-            <a:ext cx="2768033" cy="923330"/>
+            <a:off x="8517924" y="2957384"/>
+            <a:ext cx="2792627" cy="535459"/>
           </a:xfrm>
           <a:prstGeom prst="rect">
             <a:avLst/>
           </a:prstGeom>
-          <a:noFill/>
         </p:spPr>
         <p:txBody>
-          <a:bodyPr wrap="square" rtlCol="0">
+          <a:bodyPr lIns="0" tIns="0" rIns="0" bIns="0" rtlCol="0" anchor="ctr">
             <a:spAutoFit/>
           </a:bodyPr>
           <a:lstStyle/>
           <a:p>
-            <a:pPr algn="r"/>
-            <a:r>
-              <a:rPr lang="en-US" dirty="0"/>
-              <a:t>SQL Saturday #662</a:t>
-            </a:r>
-          </a:p>
-          <a:p>
-            <a:pPr algn="r"/>
-            <a:r>
-              <a:rPr lang="en-US" dirty="0"/>
-              <a:t>Sioux Falls, South Dakota</a:t>
-            </a:r>
-          </a:p>
-          <a:p>
-            <a:pPr algn="r"/>
-            <a:r>
-              <a:rPr lang="en-US" dirty="0"/>
-              <a:t>19 August 2017</a:t>
-            </a:r>
+            <a:pPr algn="l"/>
+            <a:endParaRPr lang="en-US" sz="2400" dirty="0">
+              <a:solidFill>
+                <a:schemeClr val="accent1"/>
+              </a:solidFill>
+            </a:endParaRPr>
+          </a:p>
+        </p:txBody>
+      </p:sp>
+      <p:sp>
+        <p:nvSpPr>
+          <p:cNvPr id="7" name="Rectangle 6">
+            <a:extLst>
+              <a:ext uri="{FF2B5EF4-FFF2-40B4-BE49-F238E27FC236}">
+                <a16:creationId xmlns:a16="http://schemas.microsoft.com/office/drawing/2014/main" id="{2EC523ED-9E17-4757-BA78-035475F32881}"/>
+              </a:ext>
+            </a:extLst>
+          </p:cNvPr>
+          <p:cNvSpPr/>
+          <p:nvPr/>
+        </p:nvSpPr>
+        <p:spPr>
+          <a:xfrm>
+            <a:off x="8583827" y="2878363"/>
+            <a:ext cx="2726724" cy="705096"/>
+          </a:xfrm>
+          <a:prstGeom prst="rect">
+            <a:avLst/>
+          </a:prstGeom>
+          <a:solidFill>
+            <a:schemeClr val="bg1"/>
+          </a:solidFill>
+        </p:spPr>
+        <p:txBody>
+          <a:bodyPr lIns="0" tIns="0" rIns="0" bIns="0" rtlCol="0" anchor="ctr">
+            <a:spAutoFit/>
+          </a:bodyPr>
+          <a:lstStyle/>
+          <a:p>
+            <a:pPr algn="l"/>
+            <a:endParaRPr lang="en-US" sz="2400" dirty="0">
+              <a:solidFill>
+                <a:schemeClr val="accent1"/>
+              </a:solidFill>
+            </a:endParaRPr>
           </a:p>
         </p:txBody>
       </p:sp>

</xml_diff>

<commit_message>
Add info about SQL 2017 temporal enhancements.
</commit_message>
<xml_diff>
--- a/Temporal.pptx
+++ b/Temporal.pptx
@@ -5,7 +5,7 @@
     <p:sldMasterId id="2147483648" r:id="rId1"/>
   </p:sldMasterIdLst>
   <p:notesMasterIdLst>
-    <p:notesMasterId r:id="rId17"/>
+    <p:notesMasterId r:id="rId21"/>
   </p:notesMasterIdLst>
   <p:sldIdLst>
     <p:sldId id="263" r:id="rId2"/>
@@ -22,7 +22,11 @@
     <p:sldId id="276" r:id="rId13"/>
     <p:sldId id="277" r:id="rId14"/>
     <p:sldId id="278" r:id="rId15"/>
-    <p:sldId id="267" r:id="rId16"/>
+    <p:sldId id="331" r:id="rId16"/>
+    <p:sldId id="332" r:id="rId17"/>
+    <p:sldId id="333" r:id="rId18"/>
+    <p:sldId id="334" r:id="rId19"/>
+    <p:sldId id="267" r:id="rId20"/>
   </p:sldIdLst>
   <p:sldSz cx="11520488" cy="6480175"/>
   <p:notesSz cx="6858000" cy="9144000"/>
@@ -222,7 +226,7 @@
           <a:p>
             <a:fld id="{3CD51548-82AA-4A2B-B152-1D3266E0F652}" type="datetimeFigureOut">
               <a:rPr lang="en-US" smtClean="0"/>
-              <a:t>10/18/2018</a:t>
+              <a:t>10/22/2018</a:t>
             </a:fld>
             <a:endParaRPr lang="en-US"/>
           </a:p>
@@ -980,6 +984,114 @@
 </p:notes>
 </file>
 
+<file path=ppt/notesSlides/notesSlide5.xml><?xml version="1.0" encoding="utf-8"?>
+<p:notes xmlns:a="http://schemas.openxmlformats.org/drawingml/2006/main" xmlns:r="http://schemas.openxmlformats.org/officeDocument/2006/relationships" xmlns:p="http://schemas.openxmlformats.org/presentationml/2006/main">
+  <p:cSld>
+    <p:spTree>
+      <p:nvGrpSpPr>
+        <p:cNvPr id="1" name=""/>
+        <p:cNvGrpSpPr/>
+        <p:nvPr/>
+      </p:nvGrpSpPr>
+      <p:grpSpPr>
+        <a:xfrm>
+          <a:off x="0" y="0"/>
+          <a:ext cx="0" cy="0"/>
+          <a:chOff x="0" y="0"/>
+          <a:chExt cx="0" cy="0"/>
+        </a:xfrm>
+      </p:grpSpPr>
+      <p:sp>
+        <p:nvSpPr>
+          <p:cNvPr id="2" name="Slide Image Placeholder 1"/>
+          <p:cNvSpPr>
+            <a:spLocks noGrp="1" noRot="1" noChangeAspect="1"/>
+          </p:cNvSpPr>
+          <p:nvPr>
+            <p:ph type="sldImg"/>
+          </p:nvPr>
+        </p:nvSpPr>
+        <p:spPr/>
+      </p:sp>
+      <p:sp>
+        <p:nvSpPr>
+          <p:cNvPr id="3" name="Notes Placeholder 2"/>
+          <p:cNvSpPr>
+            <a:spLocks noGrp="1"/>
+          </p:cNvSpPr>
+          <p:nvPr>
+            <p:ph type="body" idx="1"/>
+          </p:nvPr>
+        </p:nvSpPr>
+        <p:spPr/>
+        <p:txBody>
+          <a:bodyPr/>
+          <a:lstStyle/>
+          <a:p>
+            <a:r>
+              <a:rPr lang="en-US" dirty="0" smtClean="0"/>
+              <a:t>In order</a:t>
+            </a:r>
+            <a:r>
+              <a:rPr lang="en-US" baseline="0" dirty="0" smtClean="0"/>
+              <a:t> to automatically cleanup old rows, the history table MUST have a clustered index (either </a:t>
+            </a:r>
+            <a:r>
+              <a:rPr lang="en-US" baseline="0" dirty="0" err="1" smtClean="0"/>
+              <a:t>rowstore</a:t>
+            </a:r>
+            <a:r>
+              <a:rPr lang="en-US" baseline="0" dirty="0" smtClean="0"/>
+              <a:t> or </a:t>
+            </a:r>
+            <a:r>
+              <a:rPr lang="en-US" baseline="0" dirty="0" err="1" smtClean="0"/>
+              <a:t>columnstore</a:t>
+            </a:r>
+            <a:r>
+              <a:rPr lang="en-US" baseline="0" dirty="0" smtClean="0"/>
+              <a:t>)</a:t>
+            </a:r>
+            <a:endParaRPr lang="en-US" dirty="0"/>
+          </a:p>
+        </p:txBody>
+      </p:sp>
+      <p:sp>
+        <p:nvSpPr>
+          <p:cNvPr id="4" name="Slide Number Placeholder 3"/>
+          <p:cNvSpPr>
+            <a:spLocks noGrp="1"/>
+          </p:cNvSpPr>
+          <p:nvPr>
+            <p:ph type="sldNum" sz="quarter" idx="10"/>
+          </p:nvPr>
+        </p:nvSpPr>
+        <p:spPr/>
+        <p:txBody>
+          <a:bodyPr/>
+          <a:lstStyle/>
+          <a:p>
+            <a:fld id="{FF7EEA9B-F69F-4E8E-9D98-532317352FF8}" type="slidenum">
+              <a:rPr lang="en-US" smtClean="0"/>
+              <a:t>16</a:t>
+            </a:fld>
+            <a:endParaRPr lang="en-US"/>
+          </a:p>
+        </p:txBody>
+      </p:sp>
+    </p:spTree>
+    <p:extLst>
+      <p:ext uri="{BB962C8B-B14F-4D97-AF65-F5344CB8AC3E}">
+        <p14:creationId xmlns:p14="http://schemas.microsoft.com/office/powerpoint/2010/main" val="3895561385"/>
+      </p:ext>
+    </p:extLst>
+  </p:cSld>
+  <p:clrMapOvr>
+    <a:masterClrMapping/>
+  </p:clrMapOvr>
+</p:notes>
+</file>
+
 <file path=ppt/slideLayouts/slideLayout1.xml><?xml version="1.0" encoding="utf-8"?>
 <p:sldLayout xmlns:a="http://schemas.openxmlformats.org/drawingml/2006/main" xmlns:r="http://schemas.openxmlformats.org/officeDocument/2006/relationships" xmlns:p="http://schemas.openxmlformats.org/presentationml/2006/main" showMasterSp="0" preserve="1" userDrawn="1">
   <p:cSld name="Title">
@@ -1873,7 +1985,7 @@
           <p:cNvPr id="2" name="Title 1">
             <a:extLst>
               <a:ext uri="{FF2B5EF4-FFF2-40B4-BE49-F238E27FC236}">
-                <a16:creationId xmlns:a16="http://schemas.microsoft.com/office/drawing/2014/main" id="{4201C6E0-2B1E-4996-B492-A4FC402035D7}"/>
+                <a16:creationId xmlns:a16="http://schemas.microsoft.com/office/drawing/2014/main" xmlns="" id="{4201C6E0-2B1E-4996-B492-A4FC402035D7}"/>
               </a:ext>
             </a:extLst>
           </p:cNvPr>
@@ -1910,7 +2022,7 @@
           <p:cNvPr id="3" name="Subtitle 2">
             <a:extLst>
               <a:ext uri="{FF2B5EF4-FFF2-40B4-BE49-F238E27FC236}">
-                <a16:creationId xmlns:a16="http://schemas.microsoft.com/office/drawing/2014/main" id="{9E68E92B-3AAB-49BD-A59B-74BF6AB33F68}"/>
+                <a16:creationId xmlns:a16="http://schemas.microsoft.com/office/drawing/2014/main" xmlns="" id="{9E68E92B-3AAB-49BD-A59B-74BF6AB33F68}"/>
               </a:ext>
             </a:extLst>
           </p:cNvPr>
@@ -1980,7 +2092,7 @@
           <p:cNvPr id="4" name="Date Placeholder 3">
             <a:extLst>
               <a:ext uri="{FF2B5EF4-FFF2-40B4-BE49-F238E27FC236}">
-                <a16:creationId xmlns:a16="http://schemas.microsoft.com/office/drawing/2014/main" id="{4D46CEAF-E5F1-46EF-A459-F56B671AE87A}"/>
+                <a16:creationId xmlns:a16="http://schemas.microsoft.com/office/drawing/2014/main" xmlns="" id="{4D46CEAF-E5F1-46EF-A459-F56B671AE87A}"/>
               </a:ext>
             </a:extLst>
           </p:cNvPr>
@@ -1998,7 +2110,7 @@
           <a:p>
             <a:fld id="{FE6FB770-4321-4C24-8C9E-E85EAE6DAF42}" type="datetimeFigureOut">
               <a:rPr lang="en-US" smtClean="0"/>
-              <a:t>10/18/2018</a:t>
+              <a:t>10/22/2018</a:t>
             </a:fld>
             <a:endParaRPr lang="en-US"/>
           </a:p>
@@ -2009,7 +2121,7 @@
           <p:cNvPr id="5" name="Footer Placeholder 4">
             <a:extLst>
               <a:ext uri="{FF2B5EF4-FFF2-40B4-BE49-F238E27FC236}">
-                <a16:creationId xmlns:a16="http://schemas.microsoft.com/office/drawing/2014/main" id="{AA7CF163-7F1C-4A9C-BA0E-21B2C28E99B5}"/>
+                <a16:creationId xmlns:a16="http://schemas.microsoft.com/office/drawing/2014/main" xmlns="" id="{AA7CF163-7F1C-4A9C-BA0E-21B2C28E99B5}"/>
               </a:ext>
             </a:extLst>
           </p:cNvPr>
@@ -2034,7 +2146,7 @@
           <p:cNvPr id="6" name="Slide Number Placeholder 5">
             <a:extLst>
               <a:ext uri="{FF2B5EF4-FFF2-40B4-BE49-F238E27FC236}">
-                <a16:creationId xmlns:a16="http://schemas.microsoft.com/office/drawing/2014/main" id="{8213F924-2633-48A6-812B-2EAD109B3B92}"/>
+                <a16:creationId xmlns:a16="http://schemas.microsoft.com/office/drawing/2014/main" xmlns="" id="{8213F924-2633-48A6-812B-2EAD109B3B92}"/>
               </a:ext>
             </a:extLst>
           </p:cNvPr>
@@ -2234,7 +2346,7 @@
           <a:graphicData uri="http://schemas.openxmlformats.org/presentationml/2006/ole">
             <mc:AlternateContent xmlns:mc="http://schemas.openxmlformats.org/markup-compatibility/2006">
               <mc:Choice xmlns:v="urn:schemas-microsoft-com:vml" Requires="v">
-                <p:oleObj spid="_x0000_s1061" name="Image" r:id="rId11" imgW="2279520" imgH="1310400" progId="Photoshop.Image.18">
+                <p:oleObj spid="_x0000_s1063" name="Image" r:id="rId11" imgW="2279520" imgH="1310400" progId="Photoshop.Image.18">
                   <p:embed/>
                 </p:oleObj>
               </mc:Choice>
@@ -2692,8 +2804,13 @@
           <a:p>
             <a:r>
               <a:rPr lang="en-US" dirty="0"/>
-              <a:t>Temporal Tables in SQL Server 2016</a:t>
-            </a:r>
+              <a:t>Temporal Tables in SQL Server </a:t>
+            </a:r>
+            <a:r>
+              <a:rPr lang="en-US" dirty="0" smtClean="0"/>
+              <a:t>2016 / 2017</a:t>
+            </a:r>
+            <a:endParaRPr lang="en-US" dirty="0"/>
           </a:p>
         </p:txBody>
       </p:sp>
@@ -2702,7 +2819,7 @@
           <p:cNvPr id="5" name="Picture 4">
             <a:extLst>
               <a:ext uri="{FF2B5EF4-FFF2-40B4-BE49-F238E27FC236}">
-                <a16:creationId xmlns:a16="http://schemas.microsoft.com/office/drawing/2014/main" id="{7DD8DE79-1429-4866-BBF1-3CE9A5DB5409}"/>
+                <a16:creationId xmlns:a16="http://schemas.microsoft.com/office/drawing/2014/main" xmlns="" id="{7DD8DE79-1429-4866-BBF1-3CE9A5DB5409}"/>
               </a:ext>
             </a:extLst>
           </p:cNvPr>
@@ -2732,7 +2849,7 @@
           <p:cNvPr id="6" name="Rectangle 5">
             <a:extLst>
               <a:ext uri="{FF2B5EF4-FFF2-40B4-BE49-F238E27FC236}">
-                <a16:creationId xmlns:a16="http://schemas.microsoft.com/office/drawing/2014/main" id="{B7399187-9BA9-4033-A3C7-DFCB4FB51140}"/>
+                <a16:creationId xmlns:a16="http://schemas.microsoft.com/office/drawing/2014/main" xmlns="" id="{B7399187-9BA9-4033-A3C7-DFCB4FB51140}"/>
               </a:ext>
             </a:extLst>
           </p:cNvPr>
@@ -2768,7 +2885,7 @@
           <p:cNvPr id="7" name="Rectangle 6">
             <a:extLst>
               <a:ext uri="{FF2B5EF4-FFF2-40B4-BE49-F238E27FC236}">
-                <a16:creationId xmlns:a16="http://schemas.microsoft.com/office/drawing/2014/main" id="{2EC523ED-9E17-4757-BA78-035475F32881}"/>
+                <a16:creationId xmlns:a16="http://schemas.microsoft.com/office/drawing/2014/main" xmlns="" id="{2EC523ED-9E17-4757-BA78-035475F32881}"/>
               </a:ext>
             </a:extLst>
           </p:cNvPr>
@@ -2837,7 +2954,7 @@
           <p:cNvPr id="2" name="Title 1">
             <a:extLst>
               <a:ext uri="{FF2B5EF4-FFF2-40B4-BE49-F238E27FC236}">
-                <a16:creationId xmlns:a16="http://schemas.microsoft.com/office/drawing/2014/main" id="{FEF5F440-7918-4A6B-9C7C-C25F5B4AB5DD}"/>
+                <a16:creationId xmlns:a16="http://schemas.microsoft.com/office/drawing/2014/main" xmlns="" id="{FEF5F440-7918-4A6B-9C7C-C25F5B4AB5DD}"/>
               </a:ext>
             </a:extLst>
           </p:cNvPr>
@@ -2865,7 +2982,7 @@
           <p:cNvPr id="3" name="Content Placeholder 2">
             <a:extLst>
               <a:ext uri="{FF2B5EF4-FFF2-40B4-BE49-F238E27FC236}">
-                <a16:creationId xmlns:a16="http://schemas.microsoft.com/office/drawing/2014/main" id="{9E20F2C1-4D76-4D3B-8502-4FA0575D48CD}"/>
+                <a16:creationId xmlns:a16="http://schemas.microsoft.com/office/drawing/2014/main" xmlns="" id="{9E20F2C1-4D76-4D3B-8502-4FA0575D48CD}"/>
               </a:ext>
             </a:extLst>
           </p:cNvPr>
@@ -2893,7 +3010,7 @@
           <p:cNvPr id="4" name="Picture 3">
             <a:extLst>
               <a:ext uri="{FF2B5EF4-FFF2-40B4-BE49-F238E27FC236}">
-                <a16:creationId xmlns:a16="http://schemas.microsoft.com/office/drawing/2014/main" id="{91F19CE3-C79C-4B4E-9DFB-953E12007E9A}"/>
+                <a16:creationId xmlns:a16="http://schemas.microsoft.com/office/drawing/2014/main" xmlns="" id="{91F19CE3-C79C-4B4E-9DFB-953E12007E9A}"/>
               </a:ext>
             </a:extLst>
           </p:cNvPr>
@@ -3074,14 +3191,14 @@
                 <a:gridCol w="5514808">
                   <a:extLst>
                     <a:ext uri="{9D8B030D-6E8A-4147-A177-3AD203B41FA5}">
-                      <a16:colId xmlns:a16="http://schemas.microsoft.com/office/drawing/2014/main" val="2893081794"/>
+                      <a16:colId xmlns:a16="http://schemas.microsoft.com/office/drawing/2014/main" xmlns="" val="2893081794"/>
                     </a:ext>
                   </a:extLst>
                 </a:gridCol>
                 <a:gridCol w="5514808">
                   <a:extLst>
                     <a:ext uri="{9D8B030D-6E8A-4147-A177-3AD203B41FA5}">
-                      <a16:colId xmlns:a16="http://schemas.microsoft.com/office/drawing/2014/main" val="353638004"/>
+                      <a16:colId xmlns:a16="http://schemas.microsoft.com/office/drawing/2014/main" xmlns="" val="353638004"/>
                     </a:ext>
                   </a:extLst>
                 </a:gridCol>
@@ -3249,7 +3366,7 @@
                 </a:tc>
                 <a:extLst>
                   <a:ext uri="{0D108BD9-81ED-4DB2-BD59-A6C34878D82A}">
-                    <a16:rowId xmlns:a16="http://schemas.microsoft.com/office/drawing/2014/main" val="2804491224"/>
+                    <a16:rowId xmlns:a16="http://schemas.microsoft.com/office/drawing/2014/main" xmlns="" val="2804491224"/>
                   </a:ext>
                 </a:extLst>
               </a:tr>
@@ -3339,7 +3456,7 @@
                 </a:tc>
                 <a:extLst>
                   <a:ext uri="{0D108BD9-81ED-4DB2-BD59-A6C34878D82A}">
-                    <a16:rowId xmlns:a16="http://schemas.microsoft.com/office/drawing/2014/main" val="2127768561"/>
+                    <a16:rowId xmlns:a16="http://schemas.microsoft.com/office/drawing/2014/main" xmlns="" val="2127768561"/>
                   </a:ext>
                 </a:extLst>
               </a:tr>
@@ -3381,7 +3498,7 @@
                 </a:tc>
                 <a:extLst>
                   <a:ext uri="{0D108BD9-81ED-4DB2-BD59-A6C34878D82A}">
-                    <a16:rowId xmlns:a16="http://schemas.microsoft.com/office/drawing/2014/main" val="1001698893"/>
+                    <a16:rowId xmlns:a16="http://schemas.microsoft.com/office/drawing/2014/main" xmlns="" val="1001698893"/>
                   </a:ext>
                 </a:extLst>
               </a:tr>
@@ -3515,7 +3632,7 @@
                 </a:tc>
                 <a:extLst>
                   <a:ext uri="{0D108BD9-81ED-4DB2-BD59-A6C34878D82A}">
-                    <a16:rowId xmlns:a16="http://schemas.microsoft.com/office/drawing/2014/main" val="2404271991"/>
+                    <a16:rowId xmlns:a16="http://schemas.microsoft.com/office/drawing/2014/main" xmlns="" val="2404271991"/>
                   </a:ext>
                 </a:extLst>
               </a:tr>
@@ -3662,7 +3779,7 @@
                 </a:tc>
                 <a:extLst>
                   <a:ext uri="{0D108BD9-81ED-4DB2-BD59-A6C34878D82A}">
-                    <a16:rowId xmlns:a16="http://schemas.microsoft.com/office/drawing/2014/main" val="671247449"/>
+                    <a16:rowId xmlns:a16="http://schemas.microsoft.com/office/drawing/2014/main" xmlns="" val="671247449"/>
                   </a:ext>
                 </a:extLst>
               </a:tr>
@@ -3854,7 +3971,7 @@
                 </a:tc>
                 <a:extLst>
                   <a:ext uri="{0D108BD9-81ED-4DB2-BD59-A6C34878D82A}">
-                    <a16:rowId xmlns:a16="http://schemas.microsoft.com/office/drawing/2014/main" val="3036776198"/>
+                    <a16:rowId xmlns:a16="http://schemas.microsoft.com/office/drawing/2014/main" xmlns="" val="3036776198"/>
                   </a:ext>
                 </a:extLst>
               </a:tr>
@@ -4667,6 +4784,1434 @@
 </file>
 
 <file path=ppt/slides/slide15.xml><?xml version="1.0" encoding="utf-8"?>
+<p:sld xmlns:a="http://schemas.openxmlformats.org/drawingml/2006/main" xmlns:r="http://schemas.openxmlformats.org/officeDocument/2006/relationships" xmlns:p="http://schemas.openxmlformats.org/presentationml/2006/main">
+  <p:cSld>
+    <p:spTree>
+      <p:nvGrpSpPr>
+        <p:cNvPr id="1" name=""/>
+        <p:cNvGrpSpPr/>
+        <p:nvPr/>
+      </p:nvGrpSpPr>
+      <p:grpSpPr>
+        <a:xfrm>
+          <a:off x="0" y="0"/>
+          <a:ext cx="0" cy="0"/>
+          <a:chOff x="0" y="0"/>
+          <a:chExt cx="0" cy="0"/>
+        </a:xfrm>
+      </p:grpSpPr>
+      <p:sp>
+        <p:nvSpPr>
+          <p:cNvPr id="2" name="Title 1"/>
+          <p:cNvSpPr>
+            <a:spLocks noGrp="1"/>
+          </p:cNvSpPr>
+          <p:nvPr>
+            <p:ph type="title"/>
+          </p:nvPr>
+        </p:nvSpPr>
+        <p:spPr/>
+        <p:txBody>
+          <a:bodyPr/>
+          <a:lstStyle/>
+          <a:p>
+            <a:r>
+              <a:rPr lang="en-US" dirty="0" smtClean="0"/>
+              <a:t>SQL 2017 Enhancements: Retention</a:t>
+            </a:r>
+            <a:endParaRPr lang="en-US" dirty="0"/>
+          </a:p>
+        </p:txBody>
+      </p:sp>
+      <p:sp>
+        <p:nvSpPr>
+          <p:cNvPr id="3" name="Content Placeholder 2"/>
+          <p:cNvSpPr>
+            <a:spLocks noGrp="1"/>
+          </p:cNvSpPr>
+          <p:nvPr>
+            <p:ph idx="1"/>
+          </p:nvPr>
+        </p:nvSpPr>
+        <p:spPr/>
+        <p:txBody>
+          <a:bodyPr>
+            <a:normAutofit lnSpcReduction="10000"/>
+          </a:bodyPr>
+          <a:lstStyle/>
+          <a:p>
+            <a:r>
+              <a:rPr lang="en-US" dirty="0">
+                <a:solidFill>
+                  <a:srgbClr val="008000"/>
+                </a:solidFill>
+                <a:latin typeface="Consolas" panose="020B0609020204030204" pitchFamily="49" charset="0"/>
+              </a:rPr>
+              <a:t>-- Note: This </a:t>
+            </a:r>
+            <a:r>
+              <a:rPr lang="en-US" dirty="0" smtClean="0">
+                <a:solidFill>
+                  <a:srgbClr val="008000"/>
+                </a:solidFill>
+                <a:latin typeface="Consolas" panose="020B0609020204030204" pitchFamily="49" charset="0"/>
+              </a:rPr>
+              <a:t>is usually </a:t>
+            </a:r>
+            <a:r>
+              <a:rPr lang="en-US" dirty="0">
+                <a:solidFill>
+                  <a:srgbClr val="008000"/>
+                </a:solidFill>
+                <a:latin typeface="Consolas" panose="020B0609020204030204" pitchFamily="49" charset="0"/>
+              </a:rPr>
+              <a:t>ON by </a:t>
+            </a:r>
+            <a:r>
+              <a:rPr lang="en-US" dirty="0" smtClean="0">
+                <a:solidFill>
+                  <a:srgbClr val="008000"/>
+                </a:solidFill>
+                <a:latin typeface="Consolas" panose="020B0609020204030204" pitchFamily="49" charset="0"/>
+              </a:rPr>
+              <a:t>default</a:t>
+            </a:r>
+          </a:p>
+          <a:p>
+            <a:r>
+              <a:rPr lang="en-US" dirty="0" smtClean="0">
+                <a:solidFill>
+                  <a:srgbClr val="0000FF"/>
+                </a:solidFill>
+                <a:latin typeface="Consolas" panose="020B0609020204030204" pitchFamily="49" charset="0"/>
+              </a:rPr>
+              <a:t>alter</a:t>
+            </a:r>
+            <a:r>
+              <a:rPr lang="en-US" dirty="0" smtClean="0">
+                <a:solidFill>
+                  <a:srgbClr val="000000"/>
+                </a:solidFill>
+                <a:latin typeface="Consolas" panose="020B0609020204030204" pitchFamily="49" charset="0"/>
+              </a:rPr>
+              <a:t> </a:t>
+            </a:r>
+            <a:r>
+              <a:rPr lang="en-US" dirty="0">
+                <a:solidFill>
+                  <a:srgbClr val="0000FF"/>
+                </a:solidFill>
+                <a:latin typeface="Consolas" panose="020B0609020204030204" pitchFamily="49" charset="0"/>
+              </a:rPr>
+              <a:t>database</a:t>
+            </a:r>
+            <a:r>
+              <a:rPr lang="en-US" dirty="0">
+                <a:solidFill>
+                  <a:srgbClr val="000000"/>
+                </a:solidFill>
+                <a:latin typeface="Consolas" panose="020B0609020204030204" pitchFamily="49" charset="0"/>
+              </a:rPr>
+              <a:t> </a:t>
+            </a:r>
+            <a:r>
+              <a:rPr lang="en-US" dirty="0" err="1">
+                <a:solidFill>
+                  <a:srgbClr val="000000"/>
+                </a:solidFill>
+                <a:latin typeface="Consolas" panose="020B0609020204030204" pitchFamily="49" charset="0"/>
+              </a:rPr>
+              <a:t>AutoTracker</a:t>
+            </a:r>
+            <a:r>
+              <a:rPr lang="en-US" dirty="0">
+                <a:solidFill>
+                  <a:srgbClr val="000000"/>
+                </a:solidFill>
+                <a:latin typeface="Consolas" panose="020B0609020204030204" pitchFamily="49" charset="0"/>
+              </a:rPr>
+              <a:t> </a:t>
+            </a:r>
+            <a:r>
+              <a:rPr lang="en-US" dirty="0">
+                <a:solidFill>
+                  <a:srgbClr val="0000FF"/>
+                </a:solidFill>
+                <a:latin typeface="Consolas" panose="020B0609020204030204" pitchFamily="49" charset="0"/>
+              </a:rPr>
+              <a:t>set</a:t>
+            </a:r>
+            <a:r>
+              <a:rPr lang="en-US" dirty="0">
+                <a:solidFill>
+                  <a:srgbClr val="000000"/>
+                </a:solidFill>
+                <a:latin typeface="Consolas" panose="020B0609020204030204" pitchFamily="49" charset="0"/>
+              </a:rPr>
+              <a:t> </a:t>
+            </a:r>
+            <a:r>
+              <a:rPr lang="en-US" dirty="0" err="1">
+                <a:solidFill>
+                  <a:srgbClr val="0000FF"/>
+                </a:solidFill>
+                <a:latin typeface="Consolas" panose="020B0609020204030204" pitchFamily="49" charset="0"/>
+              </a:rPr>
+              <a:t>temporal_history_retention</a:t>
+            </a:r>
+            <a:r>
+              <a:rPr lang="en-US" dirty="0">
+                <a:solidFill>
+                  <a:srgbClr val="000000"/>
+                </a:solidFill>
+                <a:latin typeface="Consolas" panose="020B0609020204030204" pitchFamily="49" charset="0"/>
+              </a:rPr>
+              <a:t> </a:t>
+            </a:r>
+            <a:r>
+              <a:rPr lang="en-US" dirty="0">
+                <a:solidFill>
+                  <a:srgbClr val="0000FF"/>
+                </a:solidFill>
+                <a:latin typeface="Consolas" panose="020B0609020204030204" pitchFamily="49" charset="0"/>
+              </a:rPr>
+              <a:t>on</a:t>
+            </a:r>
+            <a:r>
+              <a:rPr lang="en-US" dirty="0">
+                <a:solidFill>
+                  <a:srgbClr val="808080"/>
+                </a:solidFill>
+                <a:latin typeface="Consolas" panose="020B0609020204030204" pitchFamily="49" charset="0"/>
+              </a:rPr>
+              <a:t>;</a:t>
+            </a:r>
+            <a:endParaRPr lang="en-US" dirty="0">
+              <a:solidFill>
+                <a:srgbClr val="000000"/>
+              </a:solidFill>
+              <a:latin typeface="Consolas" panose="020B0609020204030204" pitchFamily="49" charset="0"/>
+            </a:endParaRPr>
+          </a:p>
+          <a:p>
+            <a:endParaRPr lang="en-US" dirty="0" smtClean="0">
+              <a:solidFill>
+                <a:srgbClr val="0000FF"/>
+              </a:solidFill>
+              <a:latin typeface="Consolas" panose="020B0609020204030204" pitchFamily="49" charset="0"/>
+            </a:endParaRPr>
+          </a:p>
+          <a:p>
+            <a:r>
+              <a:rPr lang="en-US" dirty="0" smtClean="0">
+                <a:solidFill>
+                  <a:srgbClr val="0000FF"/>
+                </a:solidFill>
+                <a:latin typeface="Consolas" panose="020B0609020204030204" pitchFamily="49" charset="0"/>
+              </a:rPr>
+              <a:t>select</a:t>
+            </a:r>
+            <a:r>
+              <a:rPr lang="en-US" dirty="0" smtClean="0">
+                <a:solidFill>
+                  <a:srgbClr val="000000"/>
+                </a:solidFill>
+                <a:latin typeface="Consolas" panose="020B0609020204030204" pitchFamily="49" charset="0"/>
+              </a:rPr>
+              <a:t> </a:t>
+            </a:r>
+            <a:r>
+              <a:rPr lang="en-US" dirty="0" err="1">
+                <a:solidFill>
+                  <a:srgbClr val="000000"/>
+                </a:solidFill>
+                <a:latin typeface="Consolas" panose="020B0609020204030204" pitchFamily="49" charset="0"/>
+              </a:rPr>
+              <a:t>is_temporal_history_retention_enabled</a:t>
+            </a:r>
+            <a:endParaRPr lang="en-US" dirty="0">
+              <a:solidFill>
+                <a:srgbClr val="000000"/>
+              </a:solidFill>
+              <a:latin typeface="Consolas" panose="020B0609020204030204" pitchFamily="49" charset="0"/>
+            </a:endParaRPr>
+          </a:p>
+          <a:p>
+            <a:r>
+              <a:rPr lang="en-US" dirty="0">
+                <a:solidFill>
+                  <a:srgbClr val="0000FF"/>
+                </a:solidFill>
+                <a:latin typeface="Consolas" panose="020B0609020204030204" pitchFamily="49" charset="0"/>
+              </a:rPr>
+              <a:t>from</a:t>
+            </a:r>
+            <a:r>
+              <a:rPr lang="en-US" dirty="0">
+                <a:solidFill>
+                  <a:srgbClr val="000000"/>
+                </a:solidFill>
+                <a:latin typeface="Consolas" panose="020B0609020204030204" pitchFamily="49" charset="0"/>
+              </a:rPr>
+              <a:t> </a:t>
+            </a:r>
+            <a:r>
+              <a:rPr lang="en-US" dirty="0" err="1">
+                <a:solidFill>
+                  <a:srgbClr val="00FF00"/>
+                </a:solidFill>
+                <a:latin typeface="Consolas" panose="020B0609020204030204" pitchFamily="49" charset="0"/>
+              </a:rPr>
+              <a:t>sys</a:t>
+            </a:r>
+            <a:r>
+              <a:rPr lang="en-US" dirty="0" err="1">
+                <a:solidFill>
+                  <a:srgbClr val="808080"/>
+                </a:solidFill>
+                <a:latin typeface="Consolas" panose="020B0609020204030204" pitchFamily="49" charset="0"/>
+              </a:rPr>
+              <a:t>.</a:t>
+            </a:r>
+            <a:r>
+              <a:rPr lang="en-US" dirty="0" err="1">
+                <a:solidFill>
+                  <a:srgbClr val="00FF00"/>
+                </a:solidFill>
+                <a:latin typeface="Consolas" panose="020B0609020204030204" pitchFamily="49" charset="0"/>
+              </a:rPr>
+              <a:t>databases</a:t>
+            </a:r>
+            <a:endParaRPr lang="en-US" dirty="0">
+              <a:solidFill>
+                <a:srgbClr val="000000"/>
+              </a:solidFill>
+              <a:latin typeface="Consolas" panose="020B0609020204030204" pitchFamily="49" charset="0"/>
+            </a:endParaRPr>
+          </a:p>
+          <a:p>
+            <a:r>
+              <a:rPr lang="en-US" dirty="0">
+                <a:solidFill>
+                  <a:srgbClr val="0000FF"/>
+                </a:solidFill>
+                <a:latin typeface="Consolas" panose="020B0609020204030204" pitchFamily="49" charset="0"/>
+              </a:rPr>
+              <a:t>where</a:t>
+            </a:r>
+            <a:r>
+              <a:rPr lang="en-US" dirty="0">
+                <a:solidFill>
+                  <a:srgbClr val="000000"/>
+                </a:solidFill>
+                <a:latin typeface="Consolas" panose="020B0609020204030204" pitchFamily="49" charset="0"/>
+              </a:rPr>
+              <a:t> </a:t>
+            </a:r>
+            <a:r>
+              <a:rPr lang="en-US" dirty="0">
+                <a:solidFill>
+                  <a:srgbClr val="0000FF"/>
+                </a:solidFill>
+                <a:latin typeface="Consolas" panose="020B0609020204030204" pitchFamily="49" charset="0"/>
+              </a:rPr>
+              <a:t>name</a:t>
+            </a:r>
+            <a:r>
+              <a:rPr lang="en-US" dirty="0">
+                <a:solidFill>
+                  <a:srgbClr val="000000"/>
+                </a:solidFill>
+                <a:latin typeface="Consolas" panose="020B0609020204030204" pitchFamily="49" charset="0"/>
+              </a:rPr>
+              <a:t> </a:t>
+            </a:r>
+            <a:r>
+              <a:rPr lang="en-US" dirty="0">
+                <a:solidFill>
+                  <a:srgbClr val="808080"/>
+                </a:solidFill>
+                <a:latin typeface="Consolas" panose="020B0609020204030204" pitchFamily="49" charset="0"/>
+              </a:rPr>
+              <a:t>=</a:t>
+            </a:r>
+            <a:r>
+              <a:rPr lang="en-US" dirty="0">
+                <a:solidFill>
+                  <a:srgbClr val="000000"/>
+                </a:solidFill>
+                <a:latin typeface="Consolas" panose="020B0609020204030204" pitchFamily="49" charset="0"/>
+              </a:rPr>
+              <a:t> </a:t>
+            </a:r>
+            <a:r>
+              <a:rPr lang="en-US" dirty="0">
+                <a:solidFill>
+                  <a:srgbClr val="FF0000"/>
+                </a:solidFill>
+                <a:latin typeface="Consolas" panose="020B0609020204030204" pitchFamily="49" charset="0"/>
+              </a:rPr>
+              <a:t>'</a:t>
+            </a:r>
+            <a:r>
+              <a:rPr lang="en-US" dirty="0" err="1">
+                <a:solidFill>
+                  <a:srgbClr val="FF0000"/>
+                </a:solidFill>
+                <a:latin typeface="Consolas" panose="020B0609020204030204" pitchFamily="49" charset="0"/>
+              </a:rPr>
+              <a:t>AutoTracker</a:t>
+            </a:r>
+            <a:r>
+              <a:rPr lang="en-US" dirty="0">
+                <a:solidFill>
+                  <a:srgbClr val="FF0000"/>
+                </a:solidFill>
+                <a:latin typeface="Consolas" panose="020B0609020204030204" pitchFamily="49" charset="0"/>
+              </a:rPr>
+              <a:t>'</a:t>
+            </a:r>
+            <a:r>
+              <a:rPr lang="en-US" dirty="0">
+                <a:solidFill>
+                  <a:srgbClr val="808080"/>
+                </a:solidFill>
+                <a:latin typeface="Consolas" panose="020B0609020204030204" pitchFamily="49" charset="0"/>
+              </a:rPr>
+              <a:t>;</a:t>
+            </a:r>
+            <a:endParaRPr lang="en-US" dirty="0">
+              <a:solidFill>
+                <a:srgbClr val="000000"/>
+              </a:solidFill>
+              <a:latin typeface="Consolas" panose="020B0609020204030204" pitchFamily="49" charset="0"/>
+            </a:endParaRPr>
+          </a:p>
+          <a:p>
+            <a:endParaRPr lang="en-US" dirty="0"/>
+          </a:p>
+        </p:txBody>
+      </p:sp>
+    </p:spTree>
+    <p:extLst>
+      <p:ext uri="{BB962C8B-B14F-4D97-AF65-F5344CB8AC3E}">
+        <p14:creationId xmlns:p14="http://schemas.microsoft.com/office/powerpoint/2010/main" val="1259701937"/>
+      </p:ext>
+    </p:extLst>
+  </p:cSld>
+  <p:clrMapOvr>
+    <a:masterClrMapping/>
+  </p:clrMapOvr>
+</p:sld>
+</file>
+
+<file path=ppt/slides/slide16.xml><?xml version="1.0" encoding="utf-8"?>
+<p:sld xmlns:a="http://schemas.openxmlformats.org/drawingml/2006/main" xmlns:r="http://schemas.openxmlformats.org/officeDocument/2006/relationships" xmlns:p="http://schemas.openxmlformats.org/presentationml/2006/main">
+  <p:cSld>
+    <p:spTree>
+      <p:nvGrpSpPr>
+        <p:cNvPr id="1" name=""/>
+        <p:cNvGrpSpPr/>
+        <p:nvPr/>
+      </p:nvGrpSpPr>
+      <p:grpSpPr>
+        <a:xfrm>
+          <a:off x="0" y="0"/>
+          <a:ext cx="0" cy="0"/>
+          <a:chOff x="0" y="0"/>
+          <a:chExt cx="0" cy="0"/>
+        </a:xfrm>
+      </p:grpSpPr>
+      <p:sp>
+        <p:nvSpPr>
+          <p:cNvPr id="2" name="Title 1"/>
+          <p:cNvSpPr>
+            <a:spLocks noGrp="1"/>
+          </p:cNvSpPr>
+          <p:nvPr>
+            <p:ph type="title"/>
+          </p:nvPr>
+        </p:nvSpPr>
+        <p:spPr/>
+        <p:txBody>
+          <a:bodyPr/>
+          <a:lstStyle/>
+          <a:p>
+            <a:r>
+              <a:rPr lang="en-US" dirty="0"/>
+              <a:t>SQL 2017 Enhancements: Retention</a:t>
+            </a:r>
+          </a:p>
+        </p:txBody>
+      </p:sp>
+      <p:sp>
+        <p:nvSpPr>
+          <p:cNvPr id="3" name="Content Placeholder 2"/>
+          <p:cNvSpPr>
+            <a:spLocks noGrp="1"/>
+          </p:cNvSpPr>
+          <p:nvPr>
+            <p:ph idx="1"/>
+          </p:nvPr>
+        </p:nvSpPr>
+        <p:spPr/>
+        <p:txBody>
+          <a:bodyPr>
+            <a:normAutofit/>
+          </a:bodyPr>
+          <a:lstStyle/>
+          <a:p>
+            <a:r>
+              <a:rPr lang="en-US" dirty="0">
+                <a:solidFill>
+                  <a:srgbClr val="0000FF"/>
+                </a:solidFill>
+                <a:latin typeface="Consolas" panose="020B0609020204030204" pitchFamily="49" charset="0"/>
+              </a:rPr>
+              <a:t>create</a:t>
+            </a:r>
+            <a:r>
+              <a:rPr lang="en-US" dirty="0">
+                <a:solidFill>
+                  <a:srgbClr val="000000"/>
+                </a:solidFill>
+                <a:latin typeface="Consolas" panose="020B0609020204030204" pitchFamily="49" charset="0"/>
+              </a:rPr>
+              <a:t> </a:t>
+            </a:r>
+            <a:r>
+              <a:rPr lang="en-US" dirty="0">
+                <a:solidFill>
+                  <a:srgbClr val="0000FF"/>
+                </a:solidFill>
+                <a:latin typeface="Consolas" panose="020B0609020204030204" pitchFamily="49" charset="0"/>
+              </a:rPr>
+              <a:t>table</a:t>
+            </a:r>
+            <a:r>
+              <a:rPr lang="en-US" dirty="0">
+                <a:solidFill>
+                  <a:srgbClr val="000000"/>
+                </a:solidFill>
+                <a:latin typeface="Consolas" panose="020B0609020204030204" pitchFamily="49" charset="0"/>
+              </a:rPr>
+              <a:t> </a:t>
+            </a:r>
+            <a:r>
+              <a:rPr lang="en-US" dirty="0" err="1">
+                <a:solidFill>
+                  <a:srgbClr val="000000"/>
+                </a:solidFill>
+                <a:latin typeface="Consolas" panose="020B0609020204030204" pitchFamily="49" charset="0"/>
+              </a:rPr>
+              <a:t>dbo</a:t>
+            </a:r>
+            <a:r>
+              <a:rPr lang="en-US" dirty="0" err="1">
+                <a:solidFill>
+                  <a:srgbClr val="808080"/>
+                </a:solidFill>
+                <a:latin typeface="Consolas" panose="020B0609020204030204" pitchFamily="49" charset="0"/>
+              </a:rPr>
+              <a:t>.</a:t>
+            </a:r>
+            <a:r>
+              <a:rPr lang="en-US" dirty="0" err="1">
+                <a:solidFill>
+                  <a:srgbClr val="000000"/>
+                </a:solidFill>
+                <a:latin typeface="Consolas" panose="020B0609020204030204" pitchFamily="49" charset="0"/>
+              </a:rPr>
+              <a:t>Customer</a:t>
+            </a:r>
+            <a:endParaRPr lang="en-US" dirty="0">
+              <a:solidFill>
+                <a:srgbClr val="000000"/>
+              </a:solidFill>
+              <a:latin typeface="Consolas" panose="020B0609020204030204" pitchFamily="49" charset="0"/>
+            </a:endParaRPr>
+          </a:p>
+          <a:p>
+            <a:r>
+              <a:rPr lang="en-US" dirty="0">
+                <a:solidFill>
+                  <a:srgbClr val="808080"/>
+                </a:solidFill>
+                <a:latin typeface="Consolas" panose="020B0609020204030204" pitchFamily="49" charset="0"/>
+              </a:rPr>
+              <a:t>(</a:t>
+            </a:r>
+            <a:endParaRPr lang="en-US" dirty="0">
+              <a:solidFill>
+                <a:srgbClr val="000000"/>
+              </a:solidFill>
+              <a:latin typeface="Consolas" panose="020B0609020204030204" pitchFamily="49" charset="0"/>
+            </a:endParaRPr>
+          </a:p>
+          <a:p>
+            <a:r>
+              <a:rPr lang="en-US" dirty="0" smtClean="0">
+                <a:solidFill>
+                  <a:srgbClr val="000000"/>
+                </a:solidFill>
+                <a:latin typeface="Consolas" panose="020B0609020204030204" pitchFamily="49" charset="0"/>
+              </a:rPr>
+              <a:t>…</a:t>
+            </a:r>
+            <a:endParaRPr lang="en-US" dirty="0">
+              <a:solidFill>
+                <a:srgbClr val="000000"/>
+              </a:solidFill>
+              <a:latin typeface="Consolas" panose="020B0609020204030204" pitchFamily="49" charset="0"/>
+            </a:endParaRPr>
+          </a:p>
+          <a:p>
+            <a:r>
+              <a:rPr lang="en-US" dirty="0" smtClean="0">
+                <a:solidFill>
+                  <a:srgbClr val="808080"/>
+                </a:solidFill>
+                <a:latin typeface="Consolas" panose="020B0609020204030204" pitchFamily="49" charset="0"/>
+              </a:rPr>
+              <a:t>)</a:t>
+            </a:r>
+            <a:endParaRPr lang="en-US" dirty="0">
+              <a:solidFill>
+                <a:srgbClr val="000000"/>
+              </a:solidFill>
+              <a:latin typeface="Consolas" panose="020B0609020204030204" pitchFamily="49" charset="0"/>
+            </a:endParaRPr>
+          </a:p>
+          <a:p>
+            <a:r>
+              <a:rPr lang="en-US" dirty="0">
+                <a:solidFill>
+                  <a:srgbClr val="0000FF"/>
+                </a:solidFill>
+                <a:latin typeface="Consolas" panose="020B0609020204030204" pitchFamily="49" charset="0"/>
+              </a:rPr>
+              <a:t>with </a:t>
+            </a:r>
+            <a:r>
+              <a:rPr lang="en-US" dirty="0">
+                <a:solidFill>
+                  <a:srgbClr val="808080"/>
+                </a:solidFill>
+                <a:latin typeface="Consolas" panose="020B0609020204030204" pitchFamily="49" charset="0"/>
+              </a:rPr>
+              <a:t>(</a:t>
+            </a:r>
+            <a:r>
+              <a:rPr lang="en-US" dirty="0" err="1">
+                <a:solidFill>
+                  <a:srgbClr val="0000FF"/>
+                </a:solidFill>
+                <a:latin typeface="Consolas" panose="020B0609020204030204" pitchFamily="49" charset="0"/>
+              </a:rPr>
+              <a:t>system_versioning</a:t>
+            </a:r>
+            <a:r>
+              <a:rPr lang="en-US" dirty="0">
+                <a:solidFill>
+                  <a:srgbClr val="000000"/>
+                </a:solidFill>
+                <a:latin typeface="Consolas" panose="020B0609020204030204" pitchFamily="49" charset="0"/>
+              </a:rPr>
+              <a:t> </a:t>
+            </a:r>
+            <a:r>
+              <a:rPr lang="en-US" dirty="0">
+                <a:solidFill>
+                  <a:srgbClr val="808080"/>
+                </a:solidFill>
+                <a:latin typeface="Consolas" panose="020B0609020204030204" pitchFamily="49" charset="0"/>
+              </a:rPr>
+              <a:t>=</a:t>
+            </a:r>
+            <a:r>
+              <a:rPr lang="en-US" dirty="0">
+                <a:solidFill>
+                  <a:srgbClr val="000000"/>
+                </a:solidFill>
+                <a:latin typeface="Consolas" panose="020B0609020204030204" pitchFamily="49" charset="0"/>
+              </a:rPr>
+              <a:t> </a:t>
+            </a:r>
+            <a:r>
+              <a:rPr lang="en-US" dirty="0">
+                <a:solidFill>
+                  <a:srgbClr val="0000FF"/>
+                </a:solidFill>
+                <a:latin typeface="Consolas" panose="020B0609020204030204" pitchFamily="49" charset="0"/>
+              </a:rPr>
+              <a:t>on</a:t>
+            </a:r>
+            <a:endParaRPr lang="en-US" dirty="0">
+              <a:solidFill>
+                <a:srgbClr val="000000"/>
+              </a:solidFill>
+              <a:latin typeface="Consolas" panose="020B0609020204030204" pitchFamily="49" charset="0"/>
+            </a:endParaRPr>
+          </a:p>
+          <a:p>
+            <a:r>
+              <a:rPr lang="en-US" dirty="0">
+                <a:solidFill>
+                  <a:srgbClr val="808080"/>
+                </a:solidFill>
+                <a:latin typeface="Consolas" panose="020B0609020204030204" pitchFamily="49" charset="0"/>
+              </a:rPr>
+              <a:t>(</a:t>
+            </a:r>
+            <a:r>
+              <a:rPr lang="en-US" dirty="0" err="1">
+                <a:solidFill>
+                  <a:srgbClr val="000000"/>
+                </a:solidFill>
+                <a:latin typeface="Consolas" panose="020B0609020204030204" pitchFamily="49" charset="0"/>
+              </a:rPr>
+              <a:t>history_table</a:t>
+            </a:r>
+            <a:r>
+              <a:rPr lang="en-US" dirty="0">
+                <a:solidFill>
+                  <a:srgbClr val="000000"/>
+                </a:solidFill>
+                <a:latin typeface="Consolas" panose="020B0609020204030204" pitchFamily="49" charset="0"/>
+              </a:rPr>
+              <a:t> </a:t>
+            </a:r>
+            <a:r>
+              <a:rPr lang="en-US" dirty="0">
+                <a:solidFill>
+                  <a:srgbClr val="808080"/>
+                </a:solidFill>
+                <a:latin typeface="Consolas" panose="020B0609020204030204" pitchFamily="49" charset="0"/>
+              </a:rPr>
+              <a:t>=</a:t>
+            </a:r>
+            <a:r>
+              <a:rPr lang="en-US" dirty="0">
+                <a:solidFill>
+                  <a:srgbClr val="000000"/>
+                </a:solidFill>
+                <a:latin typeface="Consolas" panose="020B0609020204030204" pitchFamily="49" charset="0"/>
+              </a:rPr>
+              <a:t> </a:t>
+            </a:r>
+            <a:r>
+              <a:rPr lang="en-US" dirty="0" err="1">
+                <a:solidFill>
+                  <a:srgbClr val="000000"/>
+                </a:solidFill>
+                <a:latin typeface="Consolas" panose="020B0609020204030204" pitchFamily="49" charset="0"/>
+              </a:rPr>
+              <a:t>history</a:t>
+            </a:r>
+            <a:r>
+              <a:rPr lang="en-US" dirty="0" err="1">
+                <a:solidFill>
+                  <a:srgbClr val="808080"/>
+                </a:solidFill>
+                <a:latin typeface="Consolas" panose="020B0609020204030204" pitchFamily="49" charset="0"/>
+              </a:rPr>
+              <a:t>.</a:t>
+            </a:r>
+            <a:r>
+              <a:rPr lang="en-US" dirty="0" err="1">
+                <a:solidFill>
+                  <a:srgbClr val="000000"/>
+                </a:solidFill>
+                <a:latin typeface="Consolas" panose="020B0609020204030204" pitchFamily="49" charset="0"/>
+              </a:rPr>
+              <a:t>CustomerHistory</a:t>
+            </a:r>
+            <a:r>
+              <a:rPr lang="en-US" dirty="0">
+                <a:solidFill>
+                  <a:srgbClr val="808080"/>
+                </a:solidFill>
+                <a:latin typeface="Consolas" panose="020B0609020204030204" pitchFamily="49" charset="0"/>
+              </a:rPr>
+              <a:t>,</a:t>
+            </a:r>
+            <a:endParaRPr lang="en-US" dirty="0">
+              <a:solidFill>
+                <a:srgbClr val="000000"/>
+              </a:solidFill>
+              <a:latin typeface="Consolas" panose="020B0609020204030204" pitchFamily="49" charset="0"/>
+            </a:endParaRPr>
+          </a:p>
+          <a:p>
+            <a:r>
+              <a:rPr lang="en-US" dirty="0" err="1">
+                <a:solidFill>
+                  <a:srgbClr val="000000"/>
+                </a:solidFill>
+                <a:highlight>
+                  <a:srgbClr val="FFFF00"/>
+                </a:highlight>
+                <a:latin typeface="Consolas" panose="020B0609020204030204" pitchFamily="49" charset="0"/>
+                <a:ea typeface="Calibri" panose="020F0502020204030204" pitchFamily="34" charset="0"/>
+              </a:rPr>
+              <a:t>history_retention_period</a:t>
+            </a:r>
+            <a:r>
+              <a:rPr lang="en-US" dirty="0">
+                <a:solidFill>
+                  <a:srgbClr val="000000"/>
+                </a:solidFill>
+                <a:highlight>
+                  <a:srgbClr val="FFFF00"/>
+                </a:highlight>
+                <a:latin typeface="Consolas" panose="020B0609020204030204" pitchFamily="49" charset="0"/>
+                <a:ea typeface="Calibri" panose="020F0502020204030204" pitchFamily="34" charset="0"/>
+              </a:rPr>
+              <a:t> </a:t>
+            </a:r>
+            <a:r>
+              <a:rPr lang="en-US" dirty="0">
+                <a:solidFill>
+                  <a:srgbClr val="808080"/>
+                </a:solidFill>
+                <a:highlight>
+                  <a:srgbClr val="FFFF00"/>
+                </a:highlight>
+                <a:latin typeface="Consolas" panose="020B0609020204030204" pitchFamily="49" charset="0"/>
+                <a:ea typeface="Calibri" panose="020F0502020204030204" pitchFamily="34" charset="0"/>
+              </a:rPr>
+              <a:t>=</a:t>
+            </a:r>
+            <a:r>
+              <a:rPr lang="en-US" dirty="0">
+                <a:solidFill>
+                  <a:srgbClr val="000000"/>
+                </a:solidFill>
+                <a:highlight>
+                  <a:srgbClr val="FFFF00"/>
+                </a:highlight>
+                <a:latin typeface="Consolas" panose="020B0609020204030204" pitchFamily="49" charset="0"/>
+                <a:ea typeface="Calibri" panose="020F0502020204030204" pitchFamily="34" charset="0"/>
+              </a:rPr>
+              <a:t> 3 months</a:t>
+            </a:r>
+            <a:r>
+              <a:rPr lang="en-US" dirty="0" smtClean="0">
+                <a:solidFill>
+                  <a:srgbClr val="808080"/>
+                </a:solidFill>
+                <a:latin typeface="Consolas" panose="020B0609020204030204" pitchFamily="49" charset="0"/>
+              </a:rPr>
+              <a:t>));</a:t>
+            </a:r>
+            <a:endParaRPr lang="en-US" dirty="0"/>
+          </a:p>
+        </p:txBody>
+      </p:sp>
+    </p:spTree>
+    <p:extLst>
+      <p:ext uri="{BB962C8B-B14F-4D97-AF65-F5344CB8AC3E}">
+        <p14:creationId xmlns:p14="http://schemas.microsoft.com/office/powerpoint/2010/main" val="2266385365"/>
+      </p:ext>
+    </p:extLst>
+  </p:cSld>
+  <p:clrMapOvr>
+    <a:masterClrMapping/>
+  </p:clrMapOvr>
+</p:sld>
+</file>
+
+<file path=ppt/slides/slide17.xml><?xml version="1.0" encoding="utf-8"?>
+<p:sld xmlns:a="http://schemas.openxmlformats.org/drawingml/2006/main" xmlns:r="http://schemas.openxmlformats.org/officeDocument/2006/relationships" xmlns:p="http://schemas.openxmlformats.org/presentationml/2006/main">
+  <p:cSld>
+    <p:spTree>
+      <p:nvGrpSpPr>
+        <p:cNvPr id="1" name=""/>
+        <p:cNvGrpSpPr/>
+        <p:nvPr/>
+      </p:nvGrpSpPr>
+      <p:grpSpPr>
+        <a:xfrm>
+          <a:off x="0" y="0"/>
+          <a:ext cx="0" cy="0"/>
+          <a:chOff x="0" y="0"/>
+          <a:chExt cx="0" cy="0"/>
+        </a:xfrm>
+      </p:grpSpPr>
+      <p:sp>
+        <p:nvSpPr>
+          <p:cNvPr id="2" name="Title 1"/>
+          <p:cNvSpPr>
+            <a:spLocks noGrp="1"/>
+          </p:cNvSpPr>
+          <p:nvPr>
+            <p:ph type="title"/>
+          </p:nvPr>
+        </p:nvSpPr>
+        <p:spPr/>
+        <p:txBody>
+          <a:bodyPr/>
+          <a:lstStyle/>
+          <a:p>
+            <a:r>
+              <a:rPr lang="en-US" dirty="0"/>
+              <a:t>SQL 2017 Enhancements: Retention</a:t>
+            </a:r>
+          </a:p>
+        </p:txBody>
+      </p:sp>
+      <p:sp>
+        <p:nvSpPr>
+          <p:cNvPr id="3" name="Content Placeholder 2"/>
+          <p:cNvSpPr>
+            <a:spLocks noGrp="1"/>
+          </p:cNvSpPr>
+          <p:nvPr>
+            <p:ph idx="1"/>
+          </p:nvPr>
+        </p:nvSpPr>
+        <p:spPr/>
+        <p:txBody>
+          <a:bodyPr/>
+          <a:lstStyle/>
+          <a:p>
+            <a:r>
+              <a:rPr lang="en-US" dirty="0">
+                <a:solidFill>
+                  <a:srgbClr val="0000FF"/>
+                </a:solidFill>
+                <a:latin typeface="Consolas" panose="020B0609020204030204" pitchFamily="49" charset="0"/>
+              </a:rPr>
+              <a:t>alter</a:t>
+            </a:r>
+            <a:r>
+              <a:rPr lang="en-US" dirty="0">
+                <a:solidFill>
+                  <a:srgbClr val="000000"/>
+                </a:solidFill>
+                <a:latin typeface="Consolas" panose="020B0609020204030204" pitchFamily="49" charset="0"/>
+              </a:rPr>
+              <a:t> </a:t>
+            </a:r>
+            <a:r>
+              <a:rPr lang="en-US" dirty="0">
+                <a:solidFill>
+                  <a:srgbClr val="0000FF"/>
+                </a:solidFill>
+                <a:latin typeface="Consolas" panose="020B0609020204030204" pitchFamily="49" charset="0"/>
+              </a:rPr>
+              <a:t>table</a:t>
+            </a:r>
+            <a:r>
+              <a:rPr lang="en-US" dirty="0">
+                <a:solidFill>
+                  <a:srgbClr val="000000"/>
+                </a:solidFill>
+                <a:latin typeface="Consolas" panose="020B0609020204030204" pitchFamily="49" charset="0"/>
+              </a:rPr>
+              <a:t> </a:t>
+            </a:r>
+            <a:r>
+              <a:rPr lang="en-US" dirty="0" err="1">
+                <a:solidFill>
+                  <a:srgbClr val="000000"/>
+                </a:solidFill>
+                <a:latin typeface="Consolas" panose="020B0609020204030204" pitchFamily="49" charset="0"/>
+              </a:rPr>
+              <a:t>dbo</a:t>
+            </a:r>
+            <a:r>
+              <a:rPr lang="en-US" dirty="0" err="1">
+                <a:solidFill>
+                  <a:srgbClr val="808080"/>
+                </a:solidFill>
+                <a:latin typeface="Consolas" panose="020B0609020204030204" pitchFamily="49" charset="0"/>
+              </a:rPr>
+              <a:t>.</a:t>
+            </a:r>
+            <a:r>
+              <a:rPr lang="en-US" dirty="0" err="1">
+                <a:solidFill>
+                  <a:srgbClr val="000000"/>
+                </a:solidFill>
+                <a:latin typeface="Consolas" panose="020B0609020204030204" pitchFamily="49" charset="0"/>
+              </a:rPr>
+              <a:t>Customer</a:t>
+            </a:r>
+            <a:endParaRPr lang="en-US" dirty="0">
+              <a:solidFill>
+                <a:srgbClr val="000000"/>
+              </a:solidFill>
+              <a:latin typeface="Consolas" panose="020B0609020204030204" pitchFamily="49" charset="0"/>
+            </a:endParaRPr>
+          </a:p>
+          <a:p>
+            <a:r>
+              <a:rPr lang="en-US" dirty="0">
+                <a:solidFill>
+                  <a:srgbClr val="0000FF"/>
+                </a:solidFill>
+                <a:latin typeface="Consolas" panose="020B0609020204030204" pitchFamily="49" charset="0"/>
+              </a:rPr>
+              <a:t>set </a:t>
+            </a:r>
+            <a:r>
+              <a:rPr lang="en-US" dirty="0">
+                <a:solidFill>
+                  <a:srgbClr val="808080"/>
+                </a:solidFill>
+                <a:latin typeface="Consolas" panose="020B0609020204030204" pitchFamily="49" charset="0"/>
+              </a:rPr>
+              <a:t>(</a:t>
+            </a:r>
+            <a:r>
+              <a:rPr lang="en-US" dirty="0" err="1">
+                <a:solidFill>
+                  <a:srgbClr val="0000FF"/>
+                </a:solidFill>
+                <a:latin typeface="Consolas" panose="020B0609020204030204" pitchFamily="49" charset="0"/>
+              </a:rPr>
+              <a:t>system_versioning</a:t>
+            </a:r>
+            <a:r>
+              <a:rPr lang="en-US" dirty="0">
+                <a:solidFill>
+                  <a:srgbClr val="000000"/>
+                </a:solidFill>
+                <a:latin typeface="Consolas" panose="020B0609020204030204" pitchFamily="49" charset="0"/>
+              </a:rPr>
+              <a:t> </a:t>
+            </a:r>
+            <a:r>
+              <a:rPr lang="en-US" dirty="0">
+                <a:solidFill>
+                  <a:srgbClr val="808080"/>
+                </a:solidFill>
+                <a:latin typeface="Consolas" panose="020B0609020204030204" pitchFamily="49" charset="0"/>
+              </a:rPr>
+              <a:t>=</a:t>
+            </a:r>
+            <a:r>
+              <a:rPr lang="en-US" dirty="0">
+                <a:solidFill>
+                  <a:srgbClr val="000000"/>
+                </a:solidFill>
+                <a:latin typeface="Consolas" panose="020B0609020204030204" pitchFamily="49" charset="0"/>
+              </a:rPr>
+              <a:t> </a:t>
+            </a:r>
+            <a:r>
+              <a:rPr lang="en-US" dirty="0">
+                <a:solidFill>
+                  <a:srgbClr val="0000FF"/>
+                </a:solidFill>
+                <a:latin typeface="Consolas" panose="020B0609020204030204" pitchFamily="49" charset="0"/>
+              </a:rPr>
+              <a:t>on</a:t>
+            </a:r>
+            <a:endParaRPr lang="en-US" dirty="0">
+              <a:solidFill>
+                <a:srgbClr val="000000"/>
+              </a:solidFill>
+              <a:latin typeface="Consolas" panose="020B0609020204030204" pitchFamily="49" charset="0"/>
+            </a:endParaRPr>
+          </a:p>
+          <a:p>
+            <a:r>
+              <a:rPr lang="en-US" dirty="0">
+                <a:solidFill>
+                  <a:srgbClr val="808080"/>
+                </a:solidFill>
+                <a:latin typeface="Consolas" panose="020B0609020204030204" pitchFamily="49" charset="0"/>
+              </a:rPr>
+              <a:t>(</a:t>
+            </a:r>
+            <a:r>
+              <a:rPr lang="en-US" dirty="0" err="1">
+                <a:solidFill>
+                  <a:srgbClr val="000000"/>
+                </a:solidFill>
+                <a:latin typeface="Consolas" panose="020B0609020204030204" pitchFamily="49" charset="0"/>
+              </a:rPr>
+              <a:t>history_retention_period</a:t>
+            </a:r>
+            <a:r>
+              <a:rPr lang="en-US" dirty="0">
+                <a:solidFill>
+                  <a:srgbClr val="000000"/>
+                </a:solidFill>
+                <a:latin typeface="Consolas" panose="020B0609020204030204" pitchFamily="49" charset="0"/>
+              </a:rPr>
+              <a:t> </a:t>
+            </a:r>
+            <a:r>
+              <a:rPr lang="en-US" dirty="0">
+                <a:solidFill>
+                  <a:srgbClr val="808080"/>
+                </a:solidFill>
+                <a:latin typeface="Consolas" panose="020B0609020204030204" pitchFamily="49" charset="0"/>
+              </a:rPr>
+              <a:t>=</a:t>
+            </a:r>
+            <a:r>
+              <a:rPr lang="en-US" dirty="0">
+                <a:solidFill>
+                  <a:srgbClr val="000000"/>
+                </a:solidFill>
+                <a:latin typeface="Consolas" panose="020B0609020204030204" pitchFamily="49" charset="0"/>
+              </a:rPr>
+              <a:t> 7 weeks</a:t>
+            </a:r>
+            <a:r>
+              <a:rPr lang="en-US" dirty="0">
+                <a:solidFill>
+                  <a:srgbClr val="808080"/>
+                </a:solidFill>
+                <a:latin typeface="Consolas" panose="020B0609020204030204" pitchFamily="49" charset="0"/>
+              </a:rPr>
+              <a:t>));</a:t>
+            </a:r>
+            <a:endParaRPr lang="en-US" dirty="0">
+              <a:solidFill>
+                <a:srgbClr val="000000"/>
+              </a:solidFill>
+              <a:latin typeface="Consolas" panose="020B0609020204030204" pitchFamily="49" charset="0"/>
+            </a:endParaRPr>
+          </a:p>
+          <a:p>
+            <a:endParaRPr lang="en-US" dirty="0"/>
+          </a:p>
+        </p:txBody>
+      </p:sp>
+    </p:spTree>
+    <p:extLst>
+      <p:ext uri="{BB962C8B-B14F-4D97-AF65-F5344CB8AC3E}">
+        <p14:creationId xmlns:p14="http://schemas.microsoft.com/office/powerpoint/2010/main" val="4013226823"/>
+      </p:ext>
+    </p:extLst>
+  </p:cSld>
+  <p:clrMapOvr>
+    <a:masterClrMapping/>
+  </p:clrMapOvr>
+</p:sld>
+</file>
+
+<file path=ppt/slides/slide18.xml><?xml version="1.0" encoding="utf-8"?>
+<p:sld xmlns:a="http://schemas.openxmlformats.org/drawingml/2006/main" xmlns:r="http://schemas.openxmlformats.org/officeDocument/2006/relationships" xmlns:p="http://schemas.openxmlformats.org/presentationml/2006/main">
+  <p:cSld>
+    <p:spTree>
+      <p:nvGrpSpPr>
+        <p:cNvPr id="1" name=""/>
+        <p:cNvGrpSpPr/>
+        <p:nvPr/>
+      </p:nvGrpSpPr>
+      <p:grpSpPr>
+        <a:xfrm>
+          <a:off x="0" y="0"/>
+          <a:ext cx="0" cy="0"/>
+          <a:chOff x="0" y="0"/>
+          <a:chExt cx="0" cy="0"/>
+        </a:xfrm>
+      </p:grpSpPr>
+      <p:sp>
+        <p:nvSpPr>
+          <p:cNvPr id="2" name="Title 1"/>
+          <p:cNvSpPr>
+            <a:spLocks noGrp="1"/>
+          </p:cNvSpPr>
+          <p:nvPr>
+            <p:ph type="title"/>
+          </p:nvPr>
+        </p:nvSpPr>
+        <p:spPr/>
+        <p:txBody>
+          <a:bodyPr/>
+          <a:lstStyle/>
+          <a:p>
+            <a:r>
+              <a:rPr lang="en-US" dirty="0"/>
+              <a:t>SQL 2017 Enhancements: Retention</a:t>
+            </a:r>
+          </a:p>
+        </p:txBody>
+      </p:sp>
+      <p:sp>
+        <p:nvSpPr>
+          <p:cNvPr id="3" name="Content Placeholder 2"/>
+          <p:cNvSpPr>
+            <a:spLocks noGrp="1"/>
+          </p:cNvSpPr>
+          <p:nvPr>
+            <p:ph idx="1"/>
+          </p:nvPr>
+        </p:nvSpPr>
+        <p:spPr/>
+        <p:txBody>
+          <a:bodyPr/>
+          <a:lstStyle/>
+          <a:p>
+            <a:r>
+              <a:rPr lang="en-US" dirty="0">
+                <a:solidFill>
+                  <a:srgbClr val="0000FF"/>
+                </a:solidFill>
+                <a:latin typeface="Consolas" panose="020B0609020204030204" pitchFamily="49" charset="0"/>
+              </a:rPr>
+              <a:t>select</a:t>
+            </a:r>
+            <a:r>
+              <a:rPr lang="en-US" dirty="0">
+                <a:solidFill>
+                  <a:srgbClr val="000000"/>
+                </a:solidFill>
+                <a:latin typeface="Consolas" panose="020B0609020204030204" pitchFamily="49" charset="0"/>
+              </a:rPr>
+              <a:t> </a:t>
+            </a:r>
+            <a:r>
+              <a:rPr lang="en-US" dirty="0" err="1">
+                <a:solidFill>
+                  <a:srgbClr val="000000"/>
+                </a:solidFill>
+                <a:latin typeface="Consolas" panose="020B0609020204030204" pitchFamily="49" charset="0"/>
+              </a:rPr>
+              <a:t>history_retention_period</a:t>
+            </a:r>
+            <a:r>
+              <a:rPr lang="en-US" dirty="0">
+                <a:solidFill>
+                  <a:srgbClr val="808080"/>
+                </a:solidFill>
+                <a:latin typeface="Consolas" panose="020B0609020204030204" pitchFamily="49" charset="0"/>
+              </a:rPr>
+              <a:t>,</a:t>
+            </a:r>
+            <a:endParaRPr lang="en-US" dirty="0">
+              <a:solidFill>
+                <a:srgbClr val="000000"/>
+              </a:solidFill>
+              <a:latin typeface="Consolas" panose="020B0609020204030204" pitchFamily="49" charset="0"/>
+            </a:endParaRPr>
+          </a:p>
+          <a:p>
+            <a:r>
+              <a:rPr lang="en-US" dirty="0" err="1">
+                <a:solidFill>
+                  <a:srgbClr val="000000"/>
+                </a:solidFill>
+                <a:latin typeface="Consolas" panose="020B0609020204030204" pitchFamily="49" charset="0"/>
+              </a:rPr>
+              <a:t>history_retention_period_unit</a:t>
+            </a:r>
+            <a:r>
+              <a:rPr lang="en-US" dirty="0">
+                <a:solidFill>
+                  <a:srgbClr val="808080"/>
+                </a:solidFill>
+                <a:latin typeface="Consolas" panose="020B0609020204030204" pitchFamily="49" charset="0"/>
+              </a:rPr>
+              <a:t>,</a:t>
+            </a:r>
+            <a:endParaRPr lang="en-US" dirty="0">
+              <a:solidFill>
+                <a:srgbClr val="000000"/>
+              </a:solidFill>
+              <a:latin typeface="Consolas" panose="020B0609020204030204" pitchFamily="49" charset="0"/>
+            </a:endParaRPr>
+          </a:p>
+          <a:p>
+            <a:r>
+              <a:rPr lang="en-US" dirty="0" err="1">
+                <a:solidFill>
+                  <a:srgbClr val="000000"/>
+                </a:solidFill>
+                <a:latin typeface="Consolas" panose="020B0609020204030204" pitchFamily="49" charset="0"/>
+              </a:rPr>
+              <a:t>history_retention_period_unit_desc</a:t>
+            </a:r>
+            <a:endParaRPr lang="en-US" dirty="0">
+              <a:solidFill>
+                <a:srgbClr val="000000"/>
+              </a:solidFill>
+              <a:latin typeface="Consolas" panose="020B0609020204030204" pitchFamily="49" charset="0"/>
+            </a:endParaRPr>
+          </a:p>
+          <a:p>
+            <a:r>
+              <a:rPr lang="en-US" dirty="0">
+                <a:solidFill>
+                  <a:srgbClr val="0000FF"/>
+                </a:solidFill>
+                <a:latin typeface="Consolas" panose="020B0609020204030204" pitchFamily="49" charset="0"/>
+              </a:rPr>
+              <a:t>from</a:t>
+            </a:r>
+            <a:r>
+              <a:rPr lang="en-US" dirty="0">
+                <a:solidFill>
+                  <a:srgbClr val="000000"/>
+                </a:solidFill>
+                <a:latin typeface="Consolas" panose="020B0609020204030204" pitchFamily="49" charset="0"/>
+              </a:rPr>
+              <a:t> </a:t>
+            </a:r>
+            <a:r>
+              <a:rPr lang="en-US" dirty="0" err="1">
+                <a:solidFill>
+                  <a:srgbClr val="00FF00"/>
+                </a:solidFill>
+                <a:latin typeface="Consolas" panose="020B0609020204030204" pitchFamily="49" charset="0"/>
+              </a:rPr>
+              <a:t>sys</a:t>
+            </a:r>
+            <a:r>
+              <a:rPr lang="en-US" dirty="0" err="1">
+                <a:solidFill>
+                  <a:srgbClr val="808080"/>
+                </a:solidFill>
+                <a:latin typeface="Consolas" panose="020B0609020204030204" pitchFamily="49" charset="0"/>
+              </a:rPr>
+              <a:t>.</a:t>
+            </a:r>
+            <a:r>
+              <a:rPr lang="en-US" dirty="0" err="1">
+                <a:solidFill>
+                  <a:srgbClr val="00FF00"/>
+                </a:solidFill>
+                <a:latin typeface="Consolas" panose="020B0609020204030204" pitchFamily="49" charset="0"/>
+              </a:rPr>
+              <a:t>tables</a:t>
+            </a:r>
+            <a:endParaRPr lang="en-US" dirty="0">
+              <a:solidFill>
+                <a:srgbClr val="000000"/>
+              </a:solidFill>
+              <a:latin typeface="Consolas" panose="020B0609020204030204" pitchFamily="49" charset="0"/>
+            </a:endParaRPr>
+          </a:p>
+          <a:p>
+            <a:r>
+              <a:rPr lang="en-US" dirty="0">
+                <a:solidFill>
+                  <a:srgbClr val="0000FF"/>
+                </a:solidFill>
+                <a:latin typeface="Consolas" panose="020B0609020204030204" pitchFamily="49" charset="0"/>
+              </a:rPr>
+              <a:t>where</a:t>
+            </a:r>
+            <a:r>
+              <a:rPr lang="en-US" dirty="0">
+                <a:solidFill>
+                  <a:srgbClr val="000000"/>
+                </a:solidFill>
+                <a:latin typeface="Consolas" panose="020B0609020204030204" pitchFamily="49" charset="0"/>
+              </a:rPr>
+              <a:t> </a:t>
+            </a:r>
+            <a:r>
+              <a:rPr lang="en-US" dirty="0">
+                <a:solidFill>
+                  <a:srgbClr val="0000FF"/>
+                </a:solidFill>
+                <a:latin typeface="Consolas" panose="020B0609020204030204" pitchFamily="49" charset="0"/>
+              </a:rPr>
+              <a:t>name</a:t>
+            </a:r>
+            <a:r>
+              <a:rPr lang="en-US" dirty="0">
+                <a:solidFill>
+                  <a:srgbClr val="000000"/>
+                </a:solidFill>
+                <a:latin typeface="Consolas" panose="020B0609020204030204" pitchFamily="49" charset="0"/>
+              </a:rPr>
+              <a:t> </a:t>
+            </a:r>
+            <a:r>
+              <a:rPr lang="en-US" dirty="0">
+                <a:solidFill>
+                  <a:srgbClr val="808080"/>
+                </a:solidFill>
+                <a:latin typeface="Consolas" panose="020B0609020204030204" pitchFamily="49" charset="0"/>
+              </a:rPr>
+              <a:t>=</a:t>
+            </a:r>
+            <a:r>
+              <a:rPr lang="en-US" dirty="0">
+                <a:solidFill>
+                  <a:srgbClr val="000000"/>
+                </a:solidFill>
+                <a:latin typeface="Consolas" panose="020B0609020204030204" pitchFamily="49" charset="0"/>
+              </a:rPr>
+              <a:t> </a:t>
+            </a:r>
+            <a:r>
+              <a:rPr lang="en-US" dirty="0">
+                <a:solidFill>
+                  <a:srgbClr val="FF0000"/>
+                </a:solidFill>
+                <a:latin typeface="Consolas" panose="020B0609020204030204" pitchFamily="49" charset="0"/>
+              </a:rPr>
+              <a:t>'Customer'</a:t>
+            </a:r>
+            <a:r>
+              <a:rPr lang="en-US" dirty="0">
+                <a:solidFill>
+                  <a:srgbClr val="808080"/>
+                </a:solidFill>
+                <a:latin typeface="Consolas" panose="020B0609020204030204" pitchFamily="49" charset="0"/>
+              </a:rPr>
+              <a:t>;</a:t>
+            </a:r>
+            <a:endParaRPr lang="en-US" dirty="0">
+              <a:solidFill>
+                <a:srgbClr val="000000"/>
+              </a:solidFill>
+              <a:latin typeface="Consolas" panose="020B0609020204030204" pitchFamily="49" charset="0"/>
+            </a:endParaRPr>
+          </a:p>
+          <a:p>
+            <a:endParaRPr lang="en-US" dirty="0"/>
+          </a:p>
+        </p:txBody>
+      </p:sp>
+      <p:pic>
+        <p:nvPicPr>
+          <p:cNvPr id="4" name="Picture 3"/>
+          <p:cNvPicPr>
+            <a:picLocks noChangeAspect="1"/>
+          </p:cNvPicPr>
+          <p:nvPr/>
+        </p:nvPicPr>
+        <p:blipFill>
+          <a:blip r:embed="rId2"/>
+          <a:stretch>
+            <a:fillRect/>
+          </a:stretch>
+        </p:blipFill>
+        <p:spPr>
+          <a:xfrm>
+            <a:off x="361038" y="4836319"/>
+            <a:ext cx="10687782" cy="923350"/>
+          </a:xfrm>
+          <a:prstGeom prst="rect">
+            <a:avLst/>
+          </a:prstGeom>
+        </p:spPr>
+      </p:pic>
+    </p:spTree>
+    <p:extLst>
+      <p:ext uri="{BB962C8B-B14F-4D97-AF65-F5344CB8AC3E}">
+        <p14:creationId xmlns:p14="http://schemas.microsoft.com/office/powerpoint/2010/main" val="3710255657"/>
+      </p:ext>
+    </p:extLst>
+  </p:cSld>
+  <p:clrMapOvr>
+    <a:masterClrMapping/>
+  </p:clrMapOvr>
+</p:sld>
+</file>
+
+<file path=ppt/slides/slide19.xml><?xml version="1.0" encoding="utf-8"?>
 <p:sld xmlns:a="http://schemas.openxmlformats.org/drawingml/2006/main" xmlns:r="http://schemas.openxmlformats.org/officeDocument/2006/relationships" xmlns:p="http://schemas.openxmlformats.org/presentationml/2006/main">
   <p:cSld>
     <p:spTree>
@@ -4943,7 +6488,7 @@
           <p:cNvPr id="3" name="Picture 2">
             <a:extLst>
               <a:ext uri="{FF2B5EF4-FFF2-40B4-BE49-F238E27FC236}">
-                <a16:creationId xmlns:a16="http://schemas.microsoft.com/office/drawing/2014/main" id="{A9286C29-9126-4571-9735-B95317D213CC}"/>
+                <a16:creationId xmlns:a16="http://schemas.microsoft.com/office/drawing/2014/main" xmlns="" id="{A9286C29-9126-4571-9735-B95317D213CC}"/>
               </a:ext>
             </a:extLst>
           </p:cNvPr>
@@ -4979,7 +6524,7 @@
           <p:cNvPr id="4" name="Picture 3">
             <a:extLst>
               <a:ext uri="{FF2B5EF4-FFF2-40B4-BE49-F238E27FC236}">
-                <a16:creationId xmlns:a16="http://schemas.microsoft.com/office/drawing/2014/main" id="{BAC822C5-4CE3-4B98-99E5-1F7D839A837D}"/>
+                <a16:creationId xmlns:a16="http://schemas.microsoft.com/office/drawing/2014/main" xmlns="" id="{BAC822C5-4CE3-4B98-99E5-1F7D839A837D}"/>
               </a:ext>
             </a:extLst>
           </p:cNvPr>
@@ -5039,7 +6584,7 @@
           <p:cNvPr id="4" name="Title 3">
             <a:extLst>
               <a:ext uri="{FF2B5EF4-FFF2-40B4-BE49-F238E27FC236}">
-                <a16:creationId xmlns:a16="http://schemas.microsoft.com/office/drawing/2014/main" id="{DB3BAB0A-7820-48FF-876E-E014417133F2}"/>
+                <a16:creationId xmlns:a16="http://schemas.microsoft.com/office/drawing/2014/main" xmlns="" id="{DB3BAB0A-7820-48FF-876E-E014417133F2}"/>
               </a:ext>
             </a:extLst>
           </p:cNvPr>
@@ -5110,7 +6655,7 @@
           <p:cNvPr id="5" name="Picture 4">
             <a:extLst>
               <a:ext uri="{FF2B5EF4-FFF2-40B4-BE49-F238E27FC236}">
-                <a16:creationId xmlns:a16="http://schemas.microsoft.com/office/drawing/2014/main" id="{0CC62F39-664E-4631-A598-63A82E8EB6AE}"/>
+                <a16:creationId xmlns:a16="http://schemas.microsoft.com/office/drawing/2014/main" xmlns="" id="{0CC62F39-664E-4631-A598-63A82E8EB6AE}"/>
               </a:ext>
             </a:extLst>
           </p:cNvPr>
@@ -5140,7 +6685,7 @@
           <p:cNvPr id="6" name="Picture 5">
             <a:extLst>
               <a:ext uri="{FF2B5EF4-FFF2-40B4-BE49-F238E27FC236}">
-                <a16:creationId xmlns:a16="http://schemas.microsoft.com/office/drawing/2014/main" id="{D1A30FF0-6CA3-4374-8BA8-78B1AD560D1D}"/>
+                <a16:creationId xmlns:a16="http://schemas.microsoft.com/office/drawing/2014/main" xmlns="" id="{D1A30FF0-6CA3-4374-8BA8-78B1AD560D1D}"/>
               </a:ext>
             </a:extLst>
           </p:cNvPr>
@@ -5170,7 +6715,7 @@
           <p:cNvPr id="7" name="Picture 6">
             <a:extLst>
               <a:ext uri="{FF2B5EF4-FFF2-40B4-BE49-F238E27FC236}">
-                <a16:creationId xmlns:a16="http://schemas.microsoft.com/office/drawing/2014/main" id="{E6FC29D2-D5DF-462B-B7AA-895E90348F83}"/>
+                <a16:creationId xmlns:a16="http://schemas.microsoft.com/office/drawing/2014/main" xmlns="" id="{E6FC29D2-D5DF-462B-B7AA-895E90348F83}"/>
               </a:ext>
             </a:extLst>
           </p:cNvPr>
@@ -5200,7 +6745,7 @@
           <p:cNvPr id="8" name="Picture 7">
             <a:extLst>
               <a:ext uri="{FF2B5EF4-FFF2-40B4-BE49-F238E27FC236}">
-                <a16:creationId xmlns:a16="http://schemas.microsoft.com/office/drawing/2014/main" id="{C47E3F5C-7C56-480A-96F4-FA98588E48B2}"/>
+                <a16:creationId xmlns:a16="http://schemas.microsoft.com/office/drawing/2014/main" xmlns="" id="{C47E3F5C-7C56-480A-96F4-FA98588E48B2}"/>
               </a:ext>
             </a:extLst>
           </p:cNvPr>
@@ -5230,7 +6775,7 @@
           <p:cNvPr id="9" name="Picture 8">
             <a:extLst>
               <a:ext uri="{FF2B5EF4-FFF2-40B4-BE49-F238E27FC236}">
-                <a16:creationId xmlns:a16="http://schemas.microsoft.com/office/drawing/2014/main" id="{484AEAF2-D350-43F1-872D-65D38243C28B}"/>
+                <a16:creationId xmlns:a16="http://schemas.microsoft.com/office/drawing/2014/main" xmlns="" id="{484AEAF2-D350-43F1-872D-65D38243C28B}"/>
               </a:ext>
             </a:extLst>
           </p:cNvPr>
@@ -5260,7 +6805,7 @@
           <p:cNvPr id="10" name="Picture 9">
             <a:extLst>
               <a:ext uri="{FF2B5EF4-FFF2-40B4-BE49-F238E27FC236}">
-                <a16:creationId xmlns:a16="http://schemas.microsoft.com/office/drawing/2014/main" id="{478583F5-ECC0-43CC-98A1-DDB18CD7263A}"/>
+                <a16:creationId xmlns:a16="http://schemas.microsoft.com/office/drawing/2014/main" xmlns="" id="{478583F5-ECC0-43CC-98A1-DDB18CD7263A}"/>
               </a:ext>
             </a:extLst>
           </p:cNvPr>
@@ -5290,7 +6835,7 @@
           <p:cNvPr id="11" name="Picture 10">
             <a:extLst>
               <a:ext uri="{FF2B5EF4-FFF2-40B4-BE49-F238E27FC236}">
-                <a16:creationId xmlns:a16="http://schemas.microsoft.com/office/drawing/2014/main" id="{4F23858C-4E6B-4F82-95CE-A8A639FC9838}"/>
+                <a16:creationId xmlns:a16="http://schemas.microsoft.com/office/drawing/2014/main" xmlns="" id="{4F23858C-4E6B-4F82-95CE-A8A639FC9838}"/>
               </a:ext>
             </a:extLst>
           </p:cNvPr>
@@ -5320,7 +6865,7 @@
           <p:cNvPr id="12" name="Picture 11">
             <a:extLst>
               <a:ext uri="{FF2B5EF4-FFF2-40B4-BE49-F238E27FC236}">
-                <a16:creationId xmlns:a16="http://schemas.microsoft.com/office/drawing/2014/main" id="{A31FF75D-163F-41F3-96DC-48D29E816B50}"/>
+                <a16:creationId xmlns:a16="http://schemas.microsoft.com/office/drawing/2014/main" xmlns="" id="{A31FF75D-163F-41F3-96DC-48D29E816B50}"/>
               </a:ext>
             </a:extLst>
           </p:cNvPr>
@@ -5350,7 +6895,7 @@
           <p:cNvPr id="13" name="Picture 12">
             <a:extLst>
               <a:ext uri="{FF2B5EF4-FFF2-40B4-BE49-F238E27FC236}">
-                <a16:creationId xmlns:a16="http://schemas.microsoft.com/office/drawing/2014/main" id="{F6C8614E-34FE-4D87-852E-B868DCF339B5}"/>
+                <a16:creationId xmlns:a16="http://schemas.microsoft.com/office/drawing/2014/main" xmlns="" id="{F6C8614E-34FE-4D87-852E-B868DCF339B5}"/>
               </a:ext>
             </a:extLst>
           </p:cNvPr>
@@ -5380,7 +6925,7 @@
           <p:cNvPr id="14" name="Picture 13">
             <a:extLst>
               <a:ext uri="{FF2B5EF4-FFF2-40B4-BE49-F238E27FC236}">
-                <a16:creationId xmlns:a16="http://schemas.microsoft.com/office/drawing/2014/main" id="{5F5E19BE-1F35-47A5-8D21-D7C7132DB17C}"/>
+                <a16:creationId xmlns:a16="http://schemas.microsoft.com/office/drawing/2014/main" xmlns="" id="{5F5E19BE-1F35-47A5-8D21-D7C7132DB17C}"/>
               </a:ext>
             </a:extLst>
           </p:cNvPr>
@@ -5410,7 +6955,7 @@
           <p:cNvPr id="15" name="Picture 14">
             <a:extLst>
               <a:ext uri="{FF2B5EF4-FFF2-40B4-BE49-F238E27FC236}">
-                <a16:creationId xmlns:a16="http://schemas.microsoft.com/office/drawing/2014/main" id="{A36F6D16-0282-430E-88FF-094CD1190972}"/>
+                <a16:creationId xmlns:a16="http://schemas.microsoft.com/office/drawing/2014/main" xmlns="" id="{A36F6D16-0282-430E-88FF-094CD1190972}"/>
               </a:ext>
             </a:extLst>
           </p:cNvPr>
@@ -5440,7 +6985,7 @@
           <p:cNvPr id="16" name="Picture 15">
             <a:extLst>
               <a:ext uri="{FF2B5EF4-FFF2-40B4-BE49-F238E27FC236}">
-                <a16:creationId xmlns:a16="http://schemas.microsoft.com/office/drawing/2014/main" id="{8EDE4C16-99D6-41DC-B64B-B9122A9A1311}"/>
+                <a16:creationId xmlns:a16="http://schemas.microsoft.com/office/drawing/2014/main" xmlns="" id="{8EDE4C16-99D6-41DC-B64B-B9122A9A1311}"/>
               </a:ext>
             </a:extLst>
           </p:cNvPr>
@@ -5470,7 +7015,7 @@
           <p:cNvPr id="17" name="Picture 16">
             <a:extLst>
               <a:ext uri="{FF2B5EF4-FFF2-40B4-BE49-F238E27FC236}">
-                <a16:creationId xmlns:a16="http://schemas.microsoft.com/office/drawing/2014/main" id="{30E65BC6-D2EE-4167-819D-87420E5A306B}"/>
+                <a16:creationId xmlns:a16="http://schemas.microsoft.com/office/drawing/2014/main" xmlns="" id="{30E65BC6-D2EE-4167-819D-87420E5A306B}"/>
               </a:ext>
             </a:extLst>
           </p:cNvPr>
@@ -5530,7 +7075,7 @@
           <p:cNvPr id="4" name="Title 3">
             <a:extLst>
               <a:ext uri="{FF2B5EF4-FFF2-40B4-BE49-F238E27FC236}">
-                <a16:creationId xmlns:a16="http://schemas.microsoft.com/office/drawing/2014/main" id="{DB3BAB0A-7820-48FF-876E-E014417133F2}"/>
+                <a16:creationId xmlns:a16="http://schemas.microsoft.com/office/drawing/2014/main" xmlns="" id="{DB3BAB0A-7820-48FF-876E-E014417133F2}"/>
               </a:ext>
             </a:extLst>
           </p:cNvPr>
@@ -5588,7 +7133,7 @@
           <p:cNvPr id="11" name="Picture 10">
             <a:extLst>
               <a:ext uri="{FF2B5EF4-FFF2-40B4-BE49-F238E27FC236}">
-                <a16:creationId xmlns:a16="http://schemas.microsoft.com/office/drawing/2014/main" id="{4F23858C-4E6B-4F82-95CE-A8A639FC9838}"/>
+                <a16:creationId xmlns:a16="http://schemas.microsoft.com/office/drawing/2014/main" xmlns="" id="{4F23858C-4E6B-4F82-95CE-A8A639FC9838}"/>
               </a:ext>
             </a:extLst>
           </p:cNvPr>
@@ -5618,7 +7163,7 @@
           <p:cNvPr id="13" name="Picture 12">
             <a:extLst>
               <a:ext uri="{FF2B5EF4-FFF2-40B4-BE49-F238E27FC236}">
-                <a16:creationId xmlns:a16="http://schemas.microsoft.com/office/drawing/2014/main" id="{F6C8614E-34FE-4D87-852E-B868DCF339B5}"/>
+                <a16:creationId xmlns:a16="http://schemas.microsoft.com/office/drawing/2014/main" xmlns="" id="{F6C8614E-34FE-4D87-852E-B868DCF339B5}"/>
               </a:ext>
             </a:extLst>
           </p:cNvPr>
@@ -5648,7 +7193,7 @@
           <p:cNvPr id="17" name="Title 3">
             <a:extLst>
               <a:ext uri="{FF2B5EF4-FFF2-40B4-BE49-F238E27FC236}">
-                <a16:creationId xmlns:a16="http://schemas.microsoft.com/office/drawing/2014/main" id="{A69161EA-F69F-4DE0-9839-1EBAEE583CD4}"/>
+                <a16:creationId xmlns:a16="http://schemas.microsoft.com/office/drawing/2014/main" xmlns="" id="{A69161EA-F69F-4DE0-9839-1EBAEE583CD4}"/>
               </a:ext>
             </a:extLst>
           </p:cNvPr>
@@ -5756,7 +7301,7 @@
           <p:cNvPr id="3" name="Picture 2">
             <a:extLst>
               <a:ext uri="{FF2B5EF4-FFF2-40B4-BE49-F238E27FC236}">
-                <a16:creationId xmlns:a16="http://schemas.microsoft.com/office/drawing/2014/main" id="{0C652F43-2BDF-49F1-B59E-0DD8DCD409BA}"/>
+                <a16:creationId xmlns:a16="http://schemas.microsoft.com/office/drawing/2014/main" xmlns="" id="{0C652F43-2BDF-49F1-B59E-0DD8DCD409BA}"/>
               </a:ext>
             </a:extLst>
           </p:cNvPr>
@@ -5816,7 +7361,7 @@
           <p:cNvPr id="4" name="Title 3">
             <a:extLst>
               <a:ext uri="{FF2B5EF4-FFF2-40B4-BE49-F238E27FC236}">
-                <a16:creationId xmlns:a16="http://schemas.microsoft.com/office/drawing/2014/main" id="{DB3BAB0A-7820-48FF-876E-E014417133F2}"/>
+                <a16:creationId xmlns:a16="http://schemas.microsoft.com/office/drawing/2014/main" xmlns="" id="{DB3BAB0A-7820-48FF-876E-E014417133F2}"/>
               </a:ext>
             </a:extLst>
           </p:cNvPr>
@@ -5874,7 +7419,7 @@
           <p:cNvPr id="17" name="Title 3">
             <a:extLst>
               <a:ext uri="{FF2B5EF4-FFF2-40B4-BE49-F238E27FC236}">
-                <a16:creationId xmlns:a16="http://schemas.microsoft.com/office/drawing/2014/main" id="{A69161EA-F69F-4DE0-9839-1EBAEE583CD4}"/>
+                <a16:creationId xmlns:a16="http://schemas.microsoft.com/office/drawing/2014/main" xmlns="" id="{A69161EA-F69F-4DE0-9839-1EBAEE583CD4}"/>
               </a:ext>
             </a:extLst>
           </p:cNvPr>
@@ -6012,7 +7557,7 @@
           <p:cNvPr id="2" name="Picture 1">
             <a:extLst>
               <a:ext uri="{FF2B5EF4-FFF2-40B4-BE49-F238E27FC236}">
-                <a16:creationId xmlns:a16="http://schemas.microsoft.com/office/drawing/2014/main" id="{9B688A74-3A79-4659-926F-D39293345FA0}"/>
+                <a16:creationId xmlns:a16="http://schemas.microsoft.com/office/drawing/2014/main" xmlns="" id="{9B688A74-3A79-4659-926F-D39293345FA0}"/>
               </a:ext>
             </a:extLst>
           </p:cNvPr>
@@ -6072,7 +7617,7 @@
           <p:cNvPr id="4" name="Title 3">
             <a:extLst>
               <a:ext uri="{FF2B5EF4-FFF2-40B4-BE49-F238E27FC236}">
-                <a16:creationId xmlns:a16="http://schemas.microsoft.com/office/drawing/2014/main" id="{DB3BAB0A-7820-48FF-876E-E014417133F2}"/>
+                <a16:creationId xmlns:a16="http://schemas.microsoft.com/office/drawing/2014/main" xmlns="" id="{DB3BAB0A-7820-48FF-876E-E014417133F2}"/>
               </a:ext>
             </a:extLst>
           </p:cNvPr>
@@ -6130,7 +7675,7 @@
           <p:cNvPr id="17" name="Title 3">
             <a:extLst>
               <a:ext uri="{FF2B5EF4-FFF2-40B4-BE49-F238E27FC236}">
-                <a16:creationId xmlns:a16="http://schemas.microsoft.com/office/drawing/2014/main" id="{A69161EA-F69F-4DE0-9839-1EBAEE583CD4}"/>
+                <a16:creationId xmlns:a16="http://schemas.microsoft.com/office/drawing/2014/main" xmlns="" id="{A69161EA-F69F-4DE0-9839-1EBAEE583CD4}"/>
               </a:ext>
             </a:extLst>
           </p:cNvPr>
@@ -6201,7 +7746,7 @@
           <p:cNvPr id="2" name="Picture 1">
             <a:extLst>
               <a:ext uri="{FF2B5EF4-FFF2-40B4-BE49-F238E27FC236}">
-                <a16:creationId xmlns:a16="http://schemas.microsoft.com/office/drawing/2014/main" id="{5B32C4DB-4C02-42F1-AEF9-B3ADF510EF00}"/>
+                <a16:creationId xmlns:a16="http://schemas.microsoft.com/office/drawing/2014/main" xmlns="" id="{5B32C4DB-4C02-42F1-AEF9-B3ADF510EF00}"/>
               </a:ext>
             </a:extLst>
           </p:cNvPr>
@@ -6231,7 +7776,7 @@
           <p:cNvPr id="3" name="Picture 2">
             <a:extLst>
               <a:ext uri="{FF2B5EF4-FFF2-40B4-BE49-F238E27FC236}">
-                <a16:creationId xmlns:a16="http://schemas.microsoft.com/office/drawing/2014/main" id="{D35D47F0-2F2E-4F76-BF3D-CF227092C586}"/>
+                <a16:creationId xmlns:a16="http://schemas.microsoft.com/office/drawing/2014/main" xmlns="" id="{D35D47F0-2F2E-4F76-BF3D-CF227092C586}"/>
               </a:ext>
             </a:extLst>
           </p:cNvPr>
@@ -7307,7 +8852,7 @@
           <p:cNvPr id="2" name="Title 1">
             <a:extLst>
               <a:ext uri="{FF2B5EF4-FFF2-40B4-BE49-F238E27FC236}">
-                <a16:creationId xmlns:a16="http://schemas.microsoft.com/office/drawing/2014/main" id="{C9BFF397-973F-4CF4-B089-7CF11ECD75B3}"/>
+                <a16:creationId xmlns:a16="http://schemas.microsoft.com/office/drawing/2014/main" xmlns="" id="{C9BFF397-973F-4CF4-B089-7CF11ECD75B3}"/>
               </a:ext>
             </a:extLst>
           </p:cNvPr>
@@ -7335,7 +8880,7 @@
           <p:cNvPr id="3" name="Content Placeholder 2">
             <a:extLst>
               <a:ext uri="{FF2B5EF4-FFF2-40B4-BE49-F238E27FC236}">
-                <a16:creationId xmlns:a16="http://schemas.microsoft.com/office/drawing/2014/main" id="{2C4E2FAE-1993-45F8-901A-679941B185E8}"/>
+                <a16:creationId xmlns:a16="http://schemas.microsoft.com/office/drawing/2014/main" xmlns="" id="{2C4E2FAE-1993-45F8-901A-679941B185E8}"/>
               </a:ext>
             </a:extLst>
           </p:cNvPr>

</xml_diff>

<commit_message>
Update title slide for Chattanooga.
</commit_message>
<xml_diff>
--- a/Temporal.pptx
+++ b/Temporal.pptx
@@ -2121,7 +2121,7 @@
           <a:graphicData uri="http://schemas.openxmlformats.org/presentationml/2006/ole">
             <mc:AlternateContent xmlns:mc="http://schemas.openxmlformats.org/markup-compatibility/2006">
               <mc:Choice xmlns:v="urn:schemas-microsoft-com:vml" Requires="v">
-                <p:oleObj spid="_x0000_s1064" name="Image" r:id="rId10" imgW="2279520" imgH="1310400" progId="Photoshop.Image.18">
+                <p:oleObj spid="_x0000_s1065" name="Image" r:id="rId10" imgW="2279520" imgH="1310400" progId="Photoshop.Image.18">
                   <p:embed/>
                 </p:oleObj>
               </mc:Choice>
@@ -2583,36 +2583,6 @@
           </a:p>
         </p:txBody>
       </p:sp>
-      <p:pic>
-        <p:nvPicPr>
-          <p:cNvPr id="5" name="Picture 4">
-            <a:extLst>
-              <a:ext uri="{FF2B5EF4-FFF2-40B4-BE49-F238E27FC236}">
-                <a16:creationId xmlns:a16="http://schemas.microsoft.com/office/drawing/2014/main" id="{7DD8DE79-1429-4866-BBF1-3CE9A5DB5409}"/>
-              </a:ext>
-            </a:extLst>
-          </p:cNvPr>
-          <p:cNvPicPr>
-            <a:picLocks noChangeAspect="1"/>
-          </p:cNvPicPr>
-          <p:nvPr/>
-        </p:nvPicPr>
-        <p:blipFill>
-          <a:blip r:embed="rId3"/>
-          <a:stretch>
-            <a:fillRect/>
-          </a:stretch>
-        </p:blipFill>
-        <p:spPr>
-          <a:xfrm>
-            <a:off x="5805488" y="4781264"/>
-            <a:ext cx="5715000" cy="1438275"/>
-          </a:xfrm>
-          <a:prstGeom prst="rect">
-            <a:avLst/>
-          </a:prstGeom>
-        </p:spPr>
-      </p:pic>
       <p:sp>
         <p:nvSpPr>
           <p:cNvPr id="6" name="Rectangle 5">
@@ -2688,6 +2658,36 @@
           </a:p>
         </p:txBody>
       </p:sp>
+      <p:pic>
+        <p:nvPicPr>
+          <p:cNvPr id="4" name="Picture 3">
+            <a:extLst>
+              <a:ext uri="{FF2B5EF4-FFF2-40B4-BE49-F238E27FC236}">
+                <a16:creationId xmlns:a16="http://schemas.microsoft.com/office/drawing/2014/main" id="{64169D5C-04C1-49B6-AFF6-803E2632EA53}"/>
+              </a:ext>
+            </a:extLst>
+          </p:cNvPr>
+          <p:cNvPicPr>
+            <a:picLocks noChangeAspect="1"/>
+          </p:cNvPicPr>
+          <p:nvPr/>
+        </p:nvPicPr>
+        <p:blipFill>
+          <a:blip r:embed="rId3"/>
+          <a:stretch>
+            <a:fillRect/>
+          </a:stretch>
+        </p:blipFill>
+        <p:spPr>
+          <a:xfrm>
+            <a:off x="5806440" y="4782312"/>
+            <a:ext cx="5715000" cy="1088571"/>
+          </a:xfrm>
+          <a:prstGeom prst="rect">
+            <a:avLst/>
+          </a:prstGeom>
+        </p:spPr>
+      </p:pic>
     </p:spTree>
     <p:extLst>
       <p:ext uri="{BB962C8B-B14F-4D97-AF65-F5344CB8AC3E}">

</xml_diff>

<commit_message>
Update demo slide graphic.
</commit_message>
<xml_diff>
--- a/Temporal.pptx
+++ b/Temporal.pptx
@@ -12,7 +12,7 @@
     <p:sldId id="330" r:id="rId3"/>
     <p:sldId id="268" r:id="rId4"/>
     <p:sldId id="266" r:id="rId5"/>
-    <p:sldId id="269" r:id="rId6"/>
+    <p:sldId id="303" r:id="rId6"/>
     <p:sldId id="275" r:id="rId7"/>
     <p:sldId id="276" r:id="rId8"/>
     <p:sldId id="277" r:id="rId9"/>
@@ -969,7 +969,7 @@
     </p:spTree>
     <p:extLst>
       <p:ext uri="{BB962C8B-B14F-4D97-AF65-F5344CB8AC3E}">
-        <p14:creationId xmlns:p14="http://schemas.microsoft.com/office/powerpoint/2010/main" val="2619065509"/>
+        <p14:creationId xmlns:p14="http://schemas.microsoft.com/office/powerpoint/2010/main" val="3170287645"/>
       </p:ext>
     </p:extLst>
   </p:cSld>
@@ -2121,7 +2121,7 @@
           <a:graphicData uri="http://schemas.openxmlformats.org/presentationml/2006/ole">
             <mc:AlternateContent xmlns:mc="http://schemas.openxmlformats.org/markup-compatibility/2006">
               <mc:Choice xmlns:v="urn:schemas-microsoft-com:vml" Requires="v">
-                <p:oleObj spid="_x0000_s1065" name="Image" r:id="rId10" imgW="2279520" imgH="1310400" progId="Photoshop.Image.18">
+                <p:oleObj spid="_x0000_s1066" name="Image" r:id="rId10" imgW="2279520" imgH="1310400" progId="Photoshop.Image.18">
                   <p:embed/>
                 </p:oleObj>
               </mc:Choice>
@@ -5591,9 +5591,16 @@
             <p:ph idx="1"/>
           </p:nvPr>
         </p:nvSpPr>
-        <p:spPr/>
+        <p:spPr>
+          <a:xfrm>
+            <a:off x="640106" y="1302682"/>
+            <a:ext cx="8123055" cy="4405846"/>
+          </a:xfrm>
+        </p:spPr>
         <p:txBody>
-          <a:bodyPr/>
+          <a:bodyPr>
+            <a:normAutofit/>
+          </a:bodyPr>
           <a:lstStyle/>
           <a:p>
             <a:r>
@@ -5605,13 +5612,7 @@
       </p:sp>
       <p:pic>
         <p:nvPicPr>
-          <p:cNvPr id="4" name="Picture 3">
-            <a:extLst>
-              <a:ext uri="{FF2B5EF4-FFF2-40B4-BE49-F238E27FC236}">
-                <a16:creationId xmlns:a16="http://schemas.microsoft.com/office/drawing/2014/main" id="{91F19CE3-C79C-4B4E-9DFB-953E12007E9A}"/>
-              </a:ext>
-            </a:extLst>
-          </p:cNvPr>
+          <p:cNvPr id="5" name="Picture 4"/>
           <p:cNvPicPr>
             <a:picLocks noChangeAspect="1"/>
           </p:cNvPicPr>
@@ -5625,8 +5626,8 @@
         </p:blipFill>
         <p:spPr>
           <a:xfrm>
-            <a:off x="2689551" y="2106386"/>
-            <a:ext cx="8650665" cy="4033570"/>
+            <a:off x="493776" y="2011680"/>
+            <a:ext cx="8666495" cy="4032504"/>
           </a:xfrm>
           <a:prstGeom prst="rect">
             <a:avLst/>
@@ -5636,7 +5637,7 @@
     </p:spTree>
     <p:extLst>
       <p:ext uri="{BB962C8B-B14F-4D97-AF65-F5344CB8AC3E}">
-        <p14:creationId xmlns:p14="http://schemas.microsoft.com/office/powerpoint/2010/main" val="2154506968"/>
+        <p14:creationId xmlns:p14="http://schemas.microsoft.com/office/powerpoint/2010/main" val="1814270274"/>
       </p:ext>
     </p:extLst>
   </p:cSld>

</xml_diff>

<commit_message>
Fix session link in About Me slide.
</commit_message>
<xml_diff>
--- a/Temporal.pptx
+++ b/Temporal.pptx
@@ -221,7 +221,7 @@
           <a:p>
             <a:fld id="{3CD51548-82AA-4A2B-B152-1D3266E0F652}" type="datetimeFigureOut">
               <a:rPr lang="en-US" smtClean="0"/>
-              <a:t>5/12/2019</a:t>
+              <a:t>6/10/2019</a:t>
             </a:fld>
             <a:endParaRPr lang="en-US"/>
           </a:p>
@@ -2121,7 +2121,7 @@
           <a:graphicData uri="http://schemas.openxmlformats.org/presentationml/2006/ole">
             <mc:AlternateContent xmlns:mc="http://schemas.openxmlformats.org/markup-compatibility/2006">
               <mc:Choice xmlns:v="urn:schemas-microsoft-com:vml" Requires="v">
-                <p:oleObj spid="_x0000_s1066" name="Image" r:id="rId10" imgW="2279520" imgH="1310400" progId="Photoshop.Image.18">
+                <p:oleObj spid="_x0000_s1067" name="Image" r:id="rId10" imgW="2279520" imgH="1310400" progId="Photoshop.Image.18">
                   <p:embed/>
                 </p:oleObj>
               </mc:Choice>
@@ -2423,7 +2423,7 @@
       </a:lvl9pPr>
     </p:otherStyle>
   </p:txStyles>
-  <p:extLst mod="1">
+  <p:extLst>
     <p:ext uri="{27BBF7A9-308A-43DC-89C8-2F10F3537804}">
       <p15:sldGuideLst xmlns:p15="http://schemas.microsoft.com/office/powerpoint/2012/main">
         <p15:guide id="1" orient="horz" pos="2381" userDrawn="1">
@@ -5217,7 +5217,7 @@
             </a:pPr>
             <a:r>
               <a:rPr lang="en-US" sz="2835" dirty="0"/>
-              <a:t>www.tf3604.com/internals</a:t>
+              <a:t>www.tf3604.com/temporal</a:t>
             </a:r>
           </a:p>
         </p:txBody>

</xml_diff>

<commit_message>
Add reference/link to temporal data capture.
</commit_message>
<xml_diff>
--- a/Temporal.pptx
+++ b/Temporal.pptx
@@ -2121,7 +2121,7 @@
           <a:graphicData uri="http://schemas.openxmlformats.org/presentationml/2006/ole">
             <mc:AlternateContent xmlns:mc="http://schemas.openxmlformats.org/markup-compatibility/2006">
               <mc:Choice xmlns:v="urn:schemas-microsoft-com:vml" Requires="v">
-                <p:oleObj spid="_x0000_s1072" name="Image" r:id="rId10" imgW="2279520" imgH="1310400" progId="Photoshop.Image.18">
+                <p:oleObj spid="_x0000_s1074" name="Image" r:id="rId10" imgW="2279520" imgH="1310400" progId="Photoshop.Image.18">
                   <p:embed/>
                 </p:oleObj>
               </mc:Choice>
@@ -5221,13 +5221,8 @@
             </a:pPr>
             <a:r>
               <a:rPr lang="en-US" dirty="0"/>
-              <a:t>Other purposes – but </a:t>
-            </a:r>
-            <a:r>
-              <a:rPr lang="en-US"/>
-              <a:t>with complexity / caveats</a:t>
-            </a:r>
-            <a:endParaRPr lang="en-US" dirty="0"/>
+              <a:t>Other purposes – but with complexity / caveats</a:t>
+            </a:r>
           </a:p>
           <a:p>
             <a:pPr marL="1147527" lvl="1" indent="-571500">
@@ -5246,8 +5241,15 @@
             </a:pPr>
             <a:r>
               <a:rPr lang="en-US" dirty="0"/>
-              <a:t>Change detection</a:t>
-            </a:r>
+              <a:t>Change detection / </a:t>
+            </a:r>
+            <a:r>
+              <a:rPr lang="en-US" dirty="0">
+                <a:hlinkClick r:id="rId3"/>
+              </a:rPr>
+              <a:t>Temporal data capture</a:t>
+            </a:r>
+            <a:endParaRPr lang="en-US" dirty="0"/>
           </a:p>
           <a:p>
             <a:pPr marL="1147527" lvl="1" indent="-571500">
@@ -5258,13 +5260,6 @@
               <a:rPr lang="en-US" dirty="0"/>
               <a:t>Slowly-changing dimensions</a:t>
             </a:r>
-          </a:p>
-          <a:p>
-            <a:pPr marL="1147527" lvl="1" indent="-571500">
-              <a:buFont typeface="Arial" panose="020B0604020202020204" pitchFamily="34" charset="0"/>
-              <a:buChar char="•"/>
-            </a:pPr>
-            <a:endParaRPr lang="en-US" dirty="0"/>
           </a:p>
         </p:txBody>
       </p:sp>

</xml_diff>

<commit_message>
Separate post-demo slides as an 'Appendix.'
</commit_message>
<xml_diff>
--- a/Temporal.pptx
+++ b/Temporal.pptx
@@ -5,7 +5,7 @@
     <p:sldMasterId id="2147483648" r:id="rId1"/>
   </p:sldMasterIdLst>
   <p:notesMasterIdLst>
-    <p:notesMasterId r:id="rId16"/>
+    <p:notesMasterId r:id="rId17"/>
   </p:notesMasterIdLst>
   <p:sldIdLst>
     <p:sldId id="263" r:id="rId2"/>
@@ -13,15 +13,16 @@
     <p:sldId id="268" r:id="rId4"/>
     <p:sldId id="266" r:id="rId5"/>
     <p:sldId id="303" r:id="rId6"/>
-    <p:sldId id="275" r:id="rId7"/>
-    <p:sldId id="276" r:id="rId8"/>
-    <p:sldId id="277" r:id="rId9"/>
-    <p:sldId id="278" r:id="rId10"/>
-    <p:sldId id="331" r:id="rId11"/>
-    <p:sldId id="332" r:id="rId12"/>
-    <p:sldId id="333" r:id="rId13"/>
-    <p:sldId id="334" r:id="rId14"/>
-    <p:sldId id="267" r:id="rId15"/>
+    <p:sldId id="335" r:id="rId7"/>
+    <p:sldId id="275" r:id="rId8"/>
+    <p:sldId id="276" r:id="rId9"/>
+    <p:sldId id="277" r:id="rId10"/>
+    <p:sldId id="278" r:id="rId11"/>
+    <p:sldId id="331" r:id="rId12"/>
+    <p:sldId id="332" r:id="rId13"/>
+    <p:sldId id="333" r:id="rId14"/>
+    <p:sldId id="334" r:id="rId15"/>
+    <p:sldId id="267" r:id="rId16"/>
   </p:sldIdLst>
   <p:sldSz cx="11520488" cy="6480175"/>
   <p:notesSz cx="6858000" cy="9144000"/>
@@ -1068,7 +1069,7 @@
           <a:p>
             <a:fld id="{FF7EEA9B-F69F-4E8E-9D98-532317352FF8}" type="slidenum">
               <a:rPr lang="en-US" smtClean="0"/>
-              <a:t>11</a:t>
+              <a:t>12</a:t>
             </a:fld>
             <a:endParaRPr lang="en-US"/>
           </a:p>
@@ -2121,7 +2122,7 @@
           <a:graphicData uri="http://schemas.openxmlformats.org/presentationml/2006/ole">
             <mc:AlternateContent xmlns:mc="http://schemas.openxmlformats.org/markup-compatibility/2006">
               <mc:Choice xmlns:v="urn:schemas-microsoft-com:vml" Requires="v">
-                <p:oleObj spid="_x0000_s1074" name="Image" r:id="rId10" imgW="2279520" imgH="1310400" progId="Photoshop.Image.18">
+                <p:oleObj spid="_x0000_s1078" name="Image" r:id="rId10" imgW="2279520" imgH="1310400" progId="Photoshop.Image.18">
                   <p:embed/>
                 </p:oleObj>
               </mc:Choice>
@@ -2735,7 +2736,7 @@
           <a:p>
             <a:r>
               <a:rPr lang="en-US" dirty="0"/>
-              <a:t>SQL 2017 Enhancements: Retention</a:t>
+              <a:t>Summary</a:t>
             </a:r>
           </a:p>
         </p:txBody>
@@ -2752,332 +2753,212 @@
         </p:nvSpPr>
         <p:spPr/>
         <p:txBody>
-          <a:bodyPr>
-            <a:normAutofit lnSpcReduction="10000"/>
-          </a:bodyPr>
+          <a:bodyPr/>
           <a:lstStyle/>
           <a:p>
-            <a:r>
-              <a:rPr lang="en-US" dirty="0">
-                <a:solidFill>
-                  <a:srgbClr val="008000"/>
-                </a:solidFill>
-                <a:latin typeface="Consolas" panose="020B0609020204030204" pitchFamily="49" charset="0"/>
-              </a:rPr>
-              <a:t>-- Note: This is usually ON by default</a:t>
-            </a:r>
-          </a:p>
-          <a:p>
-            <a:r>
-              <a:rPr lang="en-US" dirty="0">
-                <a:solidFill>
-                  <a:srgbClr val="0000FF"/>
-                </a:solidFill>
-                <a:latin typeface="Consolas" panose="020B0609020204030204" pitchFamily="49" charset="0"/>
-              </a:rPr>
-              <a:t>alter</a:t>
-            </a:r>
-            <a:r>
-              <a:rPr lang="en-US" dirty="0">
-                <a:solidFill>
-                  <a:srgbClr val="000000"/>
-                </a:solidFill>
-                <a:latin typeface="Consolas" panose="020B0609020204030204" pitchFamily="49" charset="0"/>
-              </a:rPr>
-              <a:t> </a:t>
-            </a:r>
-            <a:r>
-              <a:rPr lang="en-US" dirty="0">
-                <a:solidFill>
-                  <a:srgbClr val="0000FF"/>
-                </a:solidFill>
-                <a:latin typeface="Consolas" panose="020B0609020204030204" pitchFamily="49" charset="0"/>
-              </a:rPr>
-              <a:t>database</a:t>
-            </a:r>
-            <a:r>
-              <a:rPr lang="en-US" dirty="0">
-                <a:solidFill>
-                  <a:srgbClr val="000000"/>
-                </a:solidFill>
-                <a:latin typeface="Consolas" panose="020B0609020204030204" pitchFamily="49" charset="0"/>
-              </a:rPr>
-              <a:t> </a:t>
+            <a:pPr marL="571500" indent="-571500">
+              <a:buFont typeface="Arial" panose="020B0604020202020204" pitchFamily="34" charset="0"/>
+              <a:buChar char="•"/>
+            </a:pPr>
+            <a:r>
+              <a:rPr lang="en-US" dirty="0"/>
+              <a:t>New catalog objects</a:t>
+            </a:r>
+          </a:p>
+          <a:p>
+            <a:pPr marL="1147527" lvl="1" indent="-571500">
+              <a:buFont typeface="Arial" panose="020B0604020202020204" pitchFamily="34" charset="0"/>
+              <a:buChar char="•"/>
+            </a:pPr>
+            <a:r>
+              <a:rPr lang="en-US" dirty="0" err="1"/>
+              <a:t>sys.</a:t>
             </a:r>
             <a:r>
               <a:rPr lang="en-US" dirty="0" err="1">
                 <a:solidFill>
-                  <a:srgbClr val="000000"/>
-                </a:solidFill>
-                <a:latin typeface="Consolas" panose="020B0609020204030204" pitchFamily="49" charset="0"/>
-              </a:rPr>
-              <a:t>AutoTracker</a:t>
-            </a:r>
-            <a:r>
-              <a:rPr lang="en-US" dirty="0">
-                <a:solidFill>
-                  <a:srgbClr val="000000"/>
-                </a:solidFill>
-                <a:latin typeface="Consolas" panose="020B0609020204030204" pitchFamily="49" charset="0"/>
-              </a:rPr>
-              <a:t> </a:t>
-            </a:r>
-            <a:r>
-              <a:rPr lang="en-US" dirty="0">
-                <a:solidFill>
-                  <a:srgbClr val="0000FF"/>
-                </a:solidFill>
-                <a:latin typeface="Consolas" panose="020B0609020204030204" pitchFamily="49" charset="0"/>
-              </a:rPr>
-              <a:t>set</a:t>
-            </a:r>
-            <a:r>
-              <a:rPr lang="en-US" dirty="0">
-                <a:solidFill>
-                  <a:srgbClr val="000000"/>
-                </a:solidFill>
-                <a:latin typeface="Consolas" panose="020B0609020204030204" pitchFamily="49" charset="0"/>
-              </a:rPr>
-              <a:t> </a:t>
+                  <a:srgbClr val="0070C0"/>
+                </a:solidFill>
+              </a:rPr>
+              <a:t>periods</a:t>
+            </a:r>
+            <a:r>
+              <a:rPr lang="en-US" dirty="0"/>
+              <a:t> (view)</a:t>
+            </a:r>
+          </a:p>
+          <a:p>
+            <a:pPr marL="1147527" lvl="1" indent="-571500">
+              <a:buFont typeface="Arial" panose="020B0604020202020204" pitchFamily="34" charset="0"/>
+              <a:buChar char="•"/>
+            </a:pPr>
+            <a:r>
+              <a:rPr lang="en-US" dirty="0" err="1"/>
+              <a:t>sys.</a:t>
             </a:r>
             <a:r>
               <a:rPr lang="en-US" dirty="0" err="1">
                 <a:solidFill>
-                  <a:srgbClr val="0000FF"/>
-                </a:solidFill>
-                <a:latin typeface="Consolas" panose="020B0609020204030204" pitchFamily="49" charset="0"/>
-              </a:rPr>
-              <a:t>temporal_history_retention</a:t>
-            </a:r>
-            <a:r>
-              <a:rPr lang="en-US" dirty="0">
-                <a:solidFill>
-                  <a:srgbClr val="000000"/>
-                </a:solidFill>
-                <a:latin typeface="Consolas" panose="020B0609020204030204" pitchFamily="49" charset="0"/>
-              </a:rPr>
-              <a:t> </a:t>
-            </a:r>
-            <a:r>
-              <a:rPr lang="en-US" dirty="0">
-                <a:solidFill>
-                  <a:srgbClr val="0000FF"/>
-                </a:solidFill>
-                <a:latin typeface="Consolas" panose="020B0609020204030204" pitchFamily="49" charset="0"/>
-              </a:rPr>
-              <a:t>on</a:t>
-            </a:r>
-            <a:r>
-              <a:rPr lang="en-US" dirty="0">
-                <a:solidFill>
-                  <a:srgbClr val="808080"/>
-                </a:solidFill>
-                <a:latin typeface="Consolas" panose="020B0609020204030204" pitchFamily="49" charset="0"/>
-              </a:rPr>
-              <a:t>;</a:t>
-            </a:r>
-            <a:endParaRPr lang="en-US" dirty="0">
-              <a:solidFill>
-                <a:srgbClr val="000000"/>
-              </a:solidFill>
-              <a:latin typeface="Consolas" panose="020B0609020204030204" pitchFamily="49" charset="0"/>
-            </a:endParaRPr>
-          </a:p>
-          <a:p>
-            <a:endParaRPr lang="en-US" dirty="0">
-              <a:solidFill>
-                <a:srgbClr val="0000FF"/>
-              </a:solidFill>
-              <a:latin typeface="Consolas" panose="020B0609020204030204" pitchFamily="49" charset="0"/>
-            </a:endParaRPr>
-          </a:p>
-          <a:p>
-            <a:r>
-              <a:rPr lang="en-US" dirty="0">
-                <a:solidFill>
-                  <a:srgbClr val="0000FF"/>
-                </a:solidFill>
-                <a:latin typeface="Consolas" panose="020B0609020204030204" pitchFamily="49" charset="0"/>
-              </a:rPr>
-              <a:t>select</a:t>
-            </a:r>
-            <a:r>
-              <a:rPr lang="en-US" dirty="0">
-                <a:solidFill>
-                  <a:srgbClr val="000000"/>
-                </a:solidFill>
-                <a:latin typeface="Consolas" panose="020B0609020204030204" pitchFamily="49" charset="0"/>
-              </a:rPr>
-              <a:t> </a:t>
+                  <a:srgbClr val="0070C0"/>
+                </a:solidFill>
+              </a:rPr>
+              <a:t>tables</a:t>
+            </a:r>
+            <a:r>
+              <a:rPr lang="en-US" dirty="0" err="1"/>
+              <a:t>.</a:t>
             </a:r>
             <a:r>
               <a:rPr lang="en-US" dirty="0" err="1">
                 <a:solidFill>
-                  <a:srgbClr val="000000"/>
-                </a:solidFill>
-                <a:latin typeface="Consolas" panose="020B0609020204030204" pitchFamily="49" charset="0"/>
-              </a:rPr>
-              <a:t>is_temporal_history_retention_enabled</a:t>
-            </a:r>
-            <a:endParaRPr lang="en-US" dirty="0">
-              <a:solidFill>
-                <a:srgbClr val="000000"/>
-              </a:solidFill>
-              <a:latin typeface="Consolas" panose="020B0609020204030204" pitchFamily="49" charset="0"/>
-            </a:endParaRPr>
-          </a:p>
-          <a:p>
-            <a:r>
-              <a:rPr lang="en-US" dirty="0">
-                <a:solidFill>
-                  <a:srgbClr val="0000FF"/>
-                </a:solidFill>
-                <a:latin typeface="Consolas" panose="020B0609020204030204" pitchFamily="49" charset="0"/>
-              </a:rPr>
-              <a:t>from</a:t>
-            </a:r>
-            <a:r>
-              <a:rPr lang="en-US" dirty="0">
-                <a:solidFill>
-                  <a:srgbClr val="000000"/>
-                </a:solidFill>
-                <a:latin typeface="Consolas" panose="020B0609020204030204" pitchFamily="49" charset="0"/>
-              </a:rPr>
-              <a:t> </a:t>
+                  <a:srgbClr val="00B050"/>
+                </a:solidFill>
+              </a:rPr>
+              <a:t>temporal_type</a:t>
+            </a:r>
+            <a:r>
+              <a:rPr lang="en-US" dirty="0"/>
+              <a:t> (column)</a:t>
+            </a:r>
+          </a:p>
+          <a:p>
+            <a:pPr marL="1147527" lvl="1" indent="-571500">
+              <a:buFont typeface="Arial" panose="020B0604020202020204" pitchFamily="34" charset="0"/>
+              <a:buChar char="•"/>
+            </a:pPr>
+            <a:r>
+              <a:rPr lang="en-US" dirty="0" err="1"/>
+              <a:t>sys.</a:t>
             </a:r>
             <a:r>
               <a:rPr lang="en-US" dirty="0" err="1">
                 <a:solidFill>
-                  <a:srgbClr val="00FF00"/>
-                </a:solidFill>
-                <a:latin typeface="Consolas" panose="020B0609020204030204" pitchFamily="49" charset="0"/>
-              </a:rPr>
-              <a:t>sys</a:t>
+                  <a:srgbClr val="0070C0"/>
+                </a:solidFill>
+              </a:rPr>
+              <a:t>tables</a:t>
+            </a:r>
+            <a:r>
+              <a:rPr lang="en-US" dirty="0" err="1"/>
+              <a:t>.</a:t>
             </a:r>
             <a:r>
               <a:rPr lang="en-US" dirty="0" err="1">
                 <a:solidFill>
-                  <a:srgbClr val="808080"/>
-                </a:solidFill>
-                <a:latin typeface="Consolas" panose="020B0609020204030204" pitchFamily="49" charset="0"/>
-              </a:rPr>
+                  <a:srgbClr val="00B050"/>
+                </a:solidFill>
+              </a:rPr>
+              <a:t>temporal_type_desc</a:t>
+            </a:r>
+            <a:r>
+              <a:rPr lang="en-US" dirty="0"/>
+              <a:t> (column)</a:t>
+            </a:r>
+          </a:p>
+          <a:p>
+            <a:pPr marL="1147527" lvl="1" indent="-571500">
+              <a:buFont typeface="Arial" panose="020B0604020202020204" pitchFamily="34" charset="0"/>
+              <a:buChar char="•"/>
+            </a:pPr>
+            <a:r>
+              <a:rPr lang="en-US" dirty="0" err="1"/>
+              <a:t>sys.</a:t>
+            </a:r>
+            <a:r>
+              <a:rPr lang="en-US" dirty="0" err="1">
+                <a:solidFill>
+                  <a:srgbClr val="0070C0"/>
+                </a:solidFill>
+              </a:rPr>
+              <a:t>tables</a:t>
+            </a:r>
+            <a:r>
+              <a:rPr lang="en-US" dirty="0" err="1"/>
               <a:t>.</a:t>
             </a:r>
             <a:r>
               <a:rPr lang="en-US" dirty="0" err="1">
                 <a:solidFill>
-                  <a:srgbClr val="00FF00"/>
-                </a:solidFill>
-                <a:latin typeface="Consolas" panose="020B0609020204030204" pitchFamily="49" charset="0"/>
-              </a:rPr>
-              <a:t>databases</a:t>
-            </a:r>
-            <a:endParaRPr lang="en-US" dirty="0">
-              <a:solidFill>
-                <a:srgbClr val="000000"/>
-              </a:solidFill>
-              <a:latin typeface="Consolas" panose="020B0609020204030204" pitchFamily="49" charset="0"/>
-            </a:endParaRPr>
-          </a:p>
-          <a:p>
-            <a:r>
-              <a:rPr lang="en-US" dirty="0">
-                <a:solidFill>
-                  <a:srgbClr val="0000FF"/>
-                </a:solidFill>
-                <a:latin typeface="Consolas" panose="020B0609020204030204" pitchFamily="49" charset="0"/>
-              </a:rPr>
-              <a:t>where</a:t>
-            </a:r>
-            <a:r>
-              <a:rPr lang="en-US" dirty="0">
-                <a:solidFill>
-                  <a:srgbClr val="000000"/>
-                </a:solidFill>
-                <a:latin typeface="Consolas" panose="020B0609020204030204" pitchFamily="49" charset="0"/>
-              </a:rPr>
-              <a:t> </a:t>
-            </a:r>
-            <a:r>
-              <a:rPr lang="en-US" dirty="0">
-                <a:solidFill>
-                  <a:srgbClr val="0000FF"/>
-                </a:solidFill>
-                <a:latin typeface="Consolas" panose="020B0609020204030204" pitchFamily="49" charset="0"/>
-              </a:rPr>
-              <a:t>name</a:t>
-            </a:r>
-            <a:r>
-              <a:rPr lang="en-US" dirty="0">
-                <a:solidFill>
-                  <a:srgbClr val="000000"/>
-                </a:solidFill>
-                <a:latin typeface="Consolas" panose="020B0609020204030204" pitchFamily="49" charset="0"/>
-              </a:rPr>
-              <a:t> </a:t>
-            </a:r>
-            <a:r>
-              <a:rPr lang="en-US" dirty="0">
-                <a:solidFill>
-                  <a:srgbClr val="808080"/>
-                </a:solidFill>
-                <a:latin typeface="Consolas" panose="020B0609020204030204" pitchFamily="49" charset="0"/>
-              </a:rPr>
-              <a:t>=</a:t>
-            </a:r>
-            <a:r>
-              <a:rPr lang="en-US" dirty="0">
-                <a:solidFill>
-                  <a:srgbClr val="000000"/>
-                </a:solidFill>
-                <a:latin typeface="Consolas" panose="020B0609020204030204" pitchFamily="49" charset="0"/>
-              </a:rPr>
-              <a:t> </a:t>
-            </a:r>
-            <a:r>
-              <a:rPr lang="en-US" dirty="0">
-                <a:solidFill>
-                  <a:srgbClr val="FF0000"/>
-                </a:solidFill>
-                <a:latin typeface="Consolas" panose="020B0609020204030204" pitchFamily="49" charset="0"/>
-              </a:rPr>
-              <a:t>'</a:t>
+                  <a:srgbClr val="00B050"/>
+                </a:solidFill>
+              </a:rPr>
+              <a:t>history_table_id</a:t>
+            </a:r>
+            <a:r>
+              <a:rPr lang="en-US" dirty="0"/>
+              <a:t> (column)</a:t>
+            </a:r>
+          </a:p>
+          <a:p>
+            <a:pPr marL="1147527" lvl="1" indent="-571500">
+              <a:buFont typeface="Arial" panose="020B0604020202020204" pitchFamily="34" charset="0"/>
+              <a:buChar char="•"/>
+            </a:pPr>
+            <a:r>
+              <a:rPr lang="en-US" dirty="0" err="1"/>
+              <a:t>sys.</a:t>
             </a:r>
             <a:r>
               <a:rPr lang="en-US" dirty="0" err="1">
                 <a:solidFill>
-                  <a:srgbClr val="FF0000"/>
-                </a:solidFill>
-                <a:latin typeface="Consolas" panose="020B0609020204030204" pitchFamily="49" charset="0"/>
-              </a:rPr>
-              <a:t>AutoTracker</a:t>
-            </a:r>
-            <a:r>
-              <a:rPr lang="en-US" dirty="0">
-                <a:solidFill>
-                  <a:srgbClr val="FF0000"/>
-                </a:solidFill>
-                <a:latin typeface="Consolas" panose="020B0609020204030204" pitchFamily="49" charset="0"/>
-              </a:rPr>
-              <a:t>'</a:t>
-            </a:r>
-            <a:r>
-              <a:rPr lang="en-US" dirty="0">
-                <a:solidFill>
-                  <a:srgbClr val="808080"/>
-                </a:solidFill>
-                <a:latin typeface="Consolas" panose="020B0609020204030204" pitchFamily="49" charset="0"/>
-              </a:rPr>
-              <a:t>;</a:t>
-            </a:r>
-            <a:endParaRPr lang="en-US" dirty="0">
-              <a:solidFill>
-                <a:srgbClr val="000000"/>
-              </a:solidFill>
-              <a:latin typeface="Consolas" panose="020B0609020204030204" pitchFamily="49" charset="0"/>
-            </a:endParaRPr>
-          </a:p>
-          <a:p>
+                  <a:srgbClr val="0070C0"/>
+                </a:solidFill>
+              </a:rPr>
+              <a:t>columns</a:t>
+            </a:r>
+            <a:r>
+              <a:rPr lang="en-US" dirty="0" err="1"/>
+              <a:t>.</a:t>
+            </a:r>
+            <a:r>
+              <a:rPr lang="en-US" dirty="0" err="1">
+                <a:solidFill>
+                  <a:srgbClr val="00B050"/>
+                </a:solidFill>
+              </a:rPr>
+              <a:t>generated_always_type</a:t>
+            </a:r>
+            <a:r>
+              <a:rPr lang="en-US" dirty="0"/>
+              <a:t> (column)</a:t>
+            </a:r>
+          </a:p>
+          <a:p>
+            <a:pPr marL="1147527" lvl="1" indent="-571500">
+              <a:buFont typeface="Arial" panose="020B0604020202020204" pitchFamily="34" charset="0"/>
+              <a:buChar char="•"/>
+            </a:pPr>
+            <a:r>
+              <a:rPr lang="en-US" dirty="0" err="1"/>
+              <a:t>sys.</a:t>
+            </a:r>
+            <a:r>
+              <a:rPr lang="en-US" dirty="0" err="1">
+                <a:solidFill>
+                  <a:srgbClr val="0070C0"/>
+                </a:solidFill>
+              </a:rPr>
+              <a:t>columns</a:t>
+            </a:r>
+            <a:r>
+              <a:rPr lang="en-US" dirty="0" err="1"/>
+              <a:t>.</a:t>
+            </a:r>
+            <a:r>
+              <a:rPr lang="en-US" dirty="0" err="1">
+                <a:solidFill>
+                  <a:srgbClr val="00B050"/>
+                </a:solidFill>
+              </a:rPr>
+              <a:t>generated_always_type_desc</a:t>
+            </a:r>
+            <a:r>
+              <a:rPr lang="en-US" dirty="0"/>
+              <a:t> (column)</a:t>
+            </a:r>
+          </a:p>
+          <a:p>
+            <a:pPr lvl="1"/>
             <a:endParaRPr lang="en-US" dirty="0"/>
           </a:p>
         </p:txBody>
@@ -3085,7 +2966,7 @@
     </p:spTree>
     <p:extLst>
       <p:ext uri="{BB962C8B-B14F-4D97-AF65-F5344CB8AC3E}">
-        <p14:creationId xmlns:p14="http://schemas.microsoft.com/office/powerpoint/2010/main" val="1259701937"/>
+        <p14:creationId xmlns:p14="http://schemas.microsoft.com/office/powerpoint/2010/main" val="764752702"/>
       </p:ext>
     </p:extLst>
   </p:cSld>
@@ -3147,18 +3028,29 @@
         <p:spPr/>
         <p:txBody>
           <a:bodyPr>
-            <a:normAutofit/>
+            <a:normAutofit lnSpcReduction="10000"/>
           </a:bodyPr>
           <a:lstStyle/>
           <a:p>
             <a:r>
               <a:rPr lang="en-US" dirty="0">
                 <a:solidFill>
+                  <a:srgbClr val="008000"/>
+                </a:solidFill>
+                <a:latin typeface="Consolas" panose="020B0609020204030204" pitchFamily="49" charset="0"/>
+              </a:rPr>
+              <a:t>-- Note: This is usually ON by default</a:t>
+            </a:r>
+          </a:p>
+          <a:p>
+            <a:r>
+              <a:rPr lang="en-US" dirty="0">
+                <a:solidFill>
                   <a:srgbClr val="0000FF"/>
                 </a:solidFill>
                 <a:latin typeface="Consolas" panose="020B0609020204030204" pitchFamily="49" charset="0"/>
               </a:rPr>
-              <a:t>create</a:t>
+              <a:t>alter</a:t>
             </a:r>
             <a:r>
               <a:rPr lang="en-US" dirty="0">
@@ -3176,7 +3068,7 @@
                 </a:solidFill>
                 <a:latin typeface="Consolas" panose="020B0609020204030204" pitchFamily="49" charset="0"/>
               </a:rPr>
-              <a:t>table</a:t>
+              <a:t>database</a:t>
             </a:r>
             <a:r>
               <a:rPr lang="en-US" dirty="0">
@@ -3194,25 +3086,70 @@
                 </a:solidFill>
                 <a:latin typeface="Consolas" panose="020B0609020204030204" pitchFamily="49" charset="0"/>
               </a:rPr>
-              <a:t>dbo</a:t>
+              <a:t>AutoTracker</a:t>
+            </a:r>
+            <a:r>
+              <a:rPr lang="en-US" dirty="0">
+                <a:solidFill>
+                  <a:srgbClr val="000000"/>
+                </a:solidFill>
+                <a:latin typeface="Consolas" panose="020B0609020204030204" pitchFamily="49" charset="0"/>
+              </a:rPr>
+              <a:t> </a:t>
+            </a:r>
+            <a:r>
+              <a:rPr lang="en-US" dirty="0">
+                <a:solidFill>
+                  <a:srgbClr val="0000FF"/>
+                </a:solidFill>
+                <a:latin typeface="Consolas" panose="020B0609020204030204" pitchFamily="49" charset="0"/>
+              </a:rPr>
+              <a:t>set</a:t>
+            </a:r>
+            <a:r>
+              <a:rPr lang="en-US" dirty="0">
+                <a:solidFill>
+                  <a:srgbClr val="000000"/>
+                </a:solidFill>
+                <a:latin typeface="Consolas" panose="020B0609020204030204" pitchFamily="49" charset="0"/>
+              </a:rPr>
+              <a:t> </a:t>
             </a:r>
             <a:r>
               <a:rPr lang="en-US" dirty="0" err="1">
                 <a:solidFill>
+                  <a:srgbClr val="0000FF"/>
+                </a:solidFill>
+                <a:latin typeface="Consolas" panose="020B0609020204030204" pitchFamily="49" charset="0"/>
+              </a:rPr>
+              <a:t>temporal_history_retention</a:t>
+            </a:r>
+            <a:r>
+              <a:rPr lang="en-US" dirty="0">
+                <a:solidFill>
+                  <a:srgbClr val="000000"/>
+                </a:solidFill>
+                <a:latin typeface="Consolas" panose="020B0609020204030204" pitchFamily="49" charset="0"/>
+              </a:rPr>
+              <a:t> </a:t>
+            </a:r>
+            <a:r>
+              <a:rPr lang="en-US" dirty="0">
+                <a:solidFill>
+                  <a:srgbClr val="0000FF"/>
+                </a:solidFill>
+                <a:latin typeface="Consolas" panose="020B0609020204030204" pitchFamily="49" charset="0"/>
+              </a:rPr>
+              <a:t>on</a:t>
+            </a:r>
+            <a:r>
+              <a:rPr lang="en-US" dirty="0">
+                <a:solidFill>
                   <a:srgbClr val="808080"/>
                 </a:solidFill>
                 <a:latin typeface="Consolas" panose="020B0609020204030204" pitchFamily="49" charset="0"/>
               </a:rPr>
-              <a:t>.</a:t>
-            </a:r>
-            <a:r>
-              <a:rPr lang="en-US" dirty="0" err="1">
-                <a:solidFill>
-                  <a:srgbClr val="000000"/>
-                </a:solidFill>
-                <a:latin typeface="Consolas" panose="020B0609020204030204" pitchFamily="49" charset="0"/>
-              </a:rPr>
-              <a:t>Customer</a:t>
+              <a:t>;</a:t>
             </a:r>
             <a:endParaRPr lang="en-US" dirty="0">
               <a:solidFill>
@@ -3222,14 +3159,40 @@
             </a:endParaRPr>
           </a:p>
           <a:p>
-            <a:r>
-              <a:rPr lang="en-US" dirty="0">
-                <a:solidFill>
-                  <a:srgbClr val="808080"/>
-                </a:solidFill>
-                <a:latin typeface="Consolas" panose="020B0609020204030204" pitchFamily="49" charset="0"/>
-              </a:rPr>
-              <a:t>(</a:t>
+            <a:endParaRPr lang="en-US" dirty="0">
+              <a:solidFill>
+                <a:srgbClr val="0000FF"/>
+              </a:solidFill>
+              <a:latin typeface="Consolas" panose="020B0609020204030204" pitchFamily="49" charset="0"/>
+            </a:endParaRPr>
+          </a:p>
+          <a:p>
+            <a:r>
+              <a:rPr lang="en-US" dirty="0">
+                <a:solidFill>
+                  <a:srgbClr val="0000FF"/>
+                </a:solidFill>
+                <a:latin typeface="Consolas" panose="020B0609020204030204" pitchFamily="49" charset="0"/>
+              </a:rPr>
+              <a:t>select</a:t>
+            </a:r>
+            <a:r>
+              <a:rPr lang="en-US" dirty="0">
+                <a:solidFill>
+                  <a:srgbClr val="000000"/>
+                </a:solidFill>
+                <a:latin typeface="Consolas" panose="020B0609020204030204" pitchFamily="49" charset="0"/>
+              </a:rPr>
+              <a:t> </a:t>
+            </a:r>
+            <a:r>
+              <a:rPr lang="en-US" dirty="0" err="1">
+                <a:solidFill>
+                  <a:srgbClr val="000000"/>
+                </a:solidFill>
+                <a:latin typeface="Consolas" panose="020B0609020204030204" pitchFamily="49" charset="0"/>
+              </a:rPr>
+              <a:t>is_temporal_history_retention_enabled</a:t>
             </a:r>
             <a:endParaRPr lang="en-US" dirty="0">
               <a:solidFill>
@@ -3242,22 +3205,47 @@
             <a:r>
               <a:rPr lang="en-US" dirty="0">
                 <a:solidFill>
+                  <a:srgbClr val="0000FF"/>
+                </a:solidFill>
+                <a:latin typeface="Consolas" panose="020B0609020204030204" pitchFamily="49" charset="0"/>
+              </a:rPr>
+              <a:t>from</a:t>
+            </a:r>
+            <a:r>
+              <a:rPr lang="en-US" dirty="0">
+                <a:solidFill>
                   <a:srgbClr val="000000"/>
                 </a:solidFill>
                 <a:latin typeface="Consolas" panose="020B0609020204030204" pitchFamily="49" charset="0"/>
               </a:rPr>
-              <a:t>…</a:t>
-            </a:r>
-          </a:p>
-          <a:p>
-            <a:r>
-              <a:rPr lang="en-US" dirty="0">
+              <a:t> </a:t>
+            </a:r>
+            <a:r>
+              <a:rPr lang="en-US" dirty="0" err="1">
+                <a:solidFill>
+                  <a:srgbClr val="00FF00"/>
+                </a:solidFill>
+                <a:latin typeface="Consolas" panose="020B0609020204030204" pitchFamily="49" charset="0"/>
+              </a:rPr>
+              <a:t>sys</a:t>
+            </a:r>
+            <a:r>
+              <a:rPr lang="en-US" dirty="0" err="1">
                 <a:solidFill>
                   <a:srgbClr val="808080"/>
                 </a:solidFill>
                 <a:latin typeface="Consolas" panose="020B0609020204030204" pitchFamily="49" charset="0"/>
               </a:rPr>
-              <a:t>)</a:t>
+              <a:t>.</a:t>
+            </a:r>
+            <a:r>
+              <a:rPr lang="en-US" dirty="0" err="1">
+                <a:solidFill>
+                  <a:srgbClr val="00FF00"/>
+                </a:solidFill>
+                <a:latin typeface="Consolas" panose="020B0609020204030204" pitchFamily="49" charset="0"/>
+              </a:rPr>
+              <a:t>databases</a:t>
             </a:r>
             <a:endParaRPr lang="en-US" dirty="0">
               <a:solidFill>
@@ -3274,7 +3262,34 @@
                 </a:solidFill>
                 <a:latin typeface="Consolas" panose="020B0609020204030204" pitchFamily="49" charset="0"/>
               </a:rPr>
-              <a:t>with </a:t>
+              <a:t>where</a:t>
+            </a:r>
+            <a:r>
+              <a:rPr lang="en-US" dirty="0">
+                <a:solidFill>
+                  <a:srgbClr val="000000"/>
+                </a:solidFill>
+                <a:latin typeface="Consolas" panose="020B0609020204030204" pitchFamily="49" charset="0"/>
+              </a:rPr>
+              <a:t> </a:t>
+            </a:r>
+            <a:r>
+              <a:rPr lang="en-US" dirty="0">
+                <a:solidFill>
+                  <a:srgbClr val="0000FF"/>
+                </a:solidFill>
+                <a:latin typeface="Consolas" panose="020B0609020204030204" pitchFamily="49" charset="0"/>
+              </a:rPr>
+              <a:t>name</a:t>
+            </a:r>
+            <a:r>
+              <a:rPr lang="en-US" dirty="0">
+                <a:solidFill>
+                  <a:srgbClr val="000000"/>
+                </a:solidFill>
+                <a:latin typeface="Consolas" panose="020B0609020204030204" pitchFamily="49" charset="0"/>
+              </a:rPr>
+              <a:t> </a:t>
             </a:r>
             <a:r>
               <a:rPr lang="en-US" dirty="0">
@@ -3283,25 +3298,43 @@
                 </a:solidFill>
                 <a:latin typeface="Consolas" panose="020B0609020204030204" pitchFamily="49" charset="0"/>
               </a:rPr>
-              <a:t>(</a:t>
+              <a:t>=</a:t>
+            </a:r>
+            <a:r>
+              <a:rPr lang="en-US" dirty="0">
+                <a:solidFill>
+                  <a:srgbClr val="000000"/>
+                </a:solidFill>
+                <a:latin typeface="Consolas" panose="020B0609020204030204" pitchFamily="49" charset="0"/>
+              </a:rPr>
+              <a:t> </a:t>
+            </a:r>
+            <a:r>
+              <a:rPr lang="en-US" dirty="0">
+                <a:solidFill>
+                  <a:srgbClr val="FF0000"/>
+                </a:solidFill>
+                <a:latin typeface="Consolas" panose="020B0609020204030204" pitchFamily="49" charset="0"/>
+              </a:rPr>
+              <a:t>'</a:t>
             </a:r>
             <a:r>
               <a:rPr lang="en-US" dirty="0" err="1">
                 <a:solidFill>
-                  <a:srgbClr val="0000FF"/>
-                </a:solidFill>
-                <a:latin typeface="Consolas" panose="020B0609020204030204" pitchFamily="49" charset="0"/>
-              </a:rPr>
-              <a:t>system_versioning</a:t>
-            </a:r>
-            <a:r>
-              <a:rPr lang="en-US" dirty="0">
-                <a:solidFill>
-                  <a:srgbClr val="000000"/>
-                </a:solidFill>
-                <a:latin typeface="Consolas" panose="020B0609020204030204" pitchFamily="49" charset="0"/>
-              </a:rPr>
-              <a:t> </a:t>
+                  <a:srgbClr val="FF0000"/>
+                </a:solidFill>
+                <a:latin typeface="Consolas" panose="020B0609020204030204" pitchFamily="49" charset="0"/>
+              </a:rPr>
+              <a:t>AutoTracker</a:t>
+            </a:r>
+            <a:r>
+              <a:rPr lang="en-US" dirty="0">
+                <a:solidFill>
+                  <a:srgbClr val="FF0000"/>
+                </a:solidFill>
+                <a:latin typeface="Consolas" panose="020B0609020204030204" pitchFamily="49" charset="0"/>
+              </a:rPr>
+              <a:t>'</a:t>
             </a:r>
             <a:r>
               <a:rPr lang="en-US" dirty="0">
@@ -3310,25 +3343,7 @@
                 </a:solidFill>
                 <a:latin typeface="Consolas" panose="020B0609020204030204" pitchFamily="49" charset="0"/>
               </a:rPr>
-              <a:t>=</a:t>
-            </a:r>
-            <a:r>
-              <a:rPr lang="en-US" dirty="0">
-                <a:solidFill>
-                  <a:srgbClr val="000000"/>
-                </a:solidFill>
-                <a:latin typeface="Consolas" panose="020B0609020204030204" pitchFamily="49" charset="0"/>
-              </a:rPr>
-              <a:t> </a:t>
-            </a:r>
-            <a:r>
-              <a:rPr lang="en-US" dirty="0">
-                <a:solidFill>
-                  <a:srgbClr val="0000FF"/>
-                </a:solidFill>
-                <a:latin typeface="Consolas" panose="020B0609020204030204" pitchFamily="49" charset="0"/>
-              </a:rPr>
-              <a:t>on</a:t>
+              <a:t>;</a:t>
             </a:r>
             <a:endParaRPr lang="en-US" dirty="0">
               <a:solidFill>
@@ -3338,156 +3353,6 @@
             </a:endParaRPr>
           </a:p>
           <a:p>
-            <a:r>
-              <a:rPr lang="en-US" dirty="0">
-                <a:solidFill>
-                  <a:srgbClr val="808080"/>
-                </a:solidFill>
-                <a:latin typeface="Consolas" panose="020B0609020204030204" pitchFamily="49" charset="0"/>
-              </a:rPr>
-              <a:t>(</a:t>
-            </a:r>
-            <a:r>
-              <a:rPr lang="en-US" dirty="0" err="1">
-                <a:solidFill>
-                  <a:srgbClr val="000000"/>
-                </a:solidFill>
-                <a:latin typeface="Consolas" panose="020B0609020204030204" pitchFamily="49" charset="0"/>
-              </a:rPr>
-              <a:t>history_table</a:t>
-            </a:r>
-            <a:r>
-              <a:rPr lang="en-US" dirty="0">
-                <a:solidFill>
-                  <a:srgbClr val="000000"/>
-                </a:solidFill>
-                <a:latin typeface="Consolas" panose="020B0609020204030204" pitchFamily="49" charset="0"/>
-              </a:rPr>
-              <a:t> </a:t>
-            </a:r>
-            <a:r>
-              <a:rPr lang="en-US" dirty="0">
-                <a:solidFill>
-                  <a:srgbClr val="808080"/>
-                </a:solidFill>
-                <a:latin typeface="Consolas" panose="020B0609020204030204" pitchFamily="49" charset="0"/>
-              </a:rPr>
-              <a:t>=</a:t>
-            </a:r>
-            <a:r>
-              <a:rPr lang="en-US" dirty="0">
-                <a:solidFill>
-                  <a:srgbClr val="000000"/>
-                </a:solidFill>
-                <a:latin typeface="Consolas" panose="020B0609020204030204" pitchFamily="49" charset="0"/>
-              </a:rPr>
-              <a:t> </a:t>
-            </a:r>
-            <a:r>
-              <a:rPr lang="en-US" dirty="0" err="1">
-                <a:solidFill>
-                  <a:srgbClr val="000000"/>
-                </a:solidFill>
-                <a:latin typeface="Consolas" panose="020B0609020204030204" pitchFamily="49" charset="0"/>
-              </a:rPr>
-              <a:t>history</a:t>
-            </a:r>
-            <a:r>
-              <a:rPr lang="en-US" dirty="0" err="1">
-                <a:solidFill>
-                  <a:srgbClr val="808080"/>
-                </a:solidFill>
-                <a:latin typeface="Consolas" panose="020B0609020204030204" pitchFamily="49" charset="0"/>
-              </a:rPr>
-              <a:t>.</a:t>
-            </a:r>
-            <a:r>
-              <a:rPr lang="en-US" dirty="0" err="1">
-                <a:solidFill>
-                  <a:srgbClr val="000000"/>
-                </a:solidFill>
-                <a:latin typeface="Consolas" panose="020B0609020204030204" pitchFamily="49" charset="0"/>
-              </a:rPr>
-              <a:t>CustomerHistory</a:t>
-            </a:r>
-            <a:r>
-              <a:rPr lang="en-US" dirty="0">
-                <a:solidFill>
-                  <a:srgbClr val="808080"/>
-                </a:solidFill>
-                <a:latin typeface="Consolas" panose="020B0609020204030204" pitchFamily="49" charset="0"/>
-              </a:rPr>
-              <a:t>,</a:t>
-            </a:r>
-            <a:endParaRPr lang="en-US" dirty="0">
-              <a:solidFill>
-                <a:srgbClr val="000000"/>
-              </a:solidFill>
-              <a:latin typeface="Consolas" panose="020B0609020204030204" pitchFamily="49" charset="0"/>
-            </a:endParaRPr>
-          </a:p>
-          <a:p>
-            <a:r>
-              <a:rPr lang="en-US" dirty="0" err="1">
-                <a:solidFill>
-                  <a:srgbClr val="000000"/>
-                </a:solidFill>
-                <a:highlight>
-                  <a:srgbClr val="FFFF00"/>
-                </a:highlight>
-                <a:latin typeface="Consolas" panose="020B0609020204030204" pitchFamily="49" charset="0"/>
-                <a:ea typeface="Calibri" panose="020F0502020204030204" pitchFamily="34" charset="0"/>
-              </a:rPr>
-              <a:t>history_retention_period</a:t>
-            </a:r>
-            <a:r>
-              <a:rPr lang="en-US" dirty="0">
-                <a:solidFill>
-                  <a:srgbClr val="000000"/>
-                </a:solidFill>
-                <a:highlight>
-                  <a:srgbClr val="FFFF00"/>
-                </a:highlight>
-                <a:latin typeface="Consolas" panose="020B0609020204030204" pitchFamily="49" charset="0"/>
-                <a:ea typeface="Calibri" panose="020F0502020204030204" pitchFamily="34" charset="0"/>
-              </a:rPr>
-              <a:t> </a:t>
-            </a:r>
-            <a:r>
-              <a:rPr lang="en-US" dirty="0">
-                <a:solidFill>
-                  <a:srgbClr val="808080"/>
-                </a:solidFill>
-                <a:highlight>
-                  <a:srgbClr val="FFFF00"/>
-                </a:highlight>
-                <a:latin typeface="Consolas" panose="020B0609020204030204" pitchFamily="49" charset="0"/>
-                <a:ea typeface="Calibri" panose="020F0502020204030204" pitchFamily="34" charset="0"/>
-              </a:rPr>
-              <a:t>=</a:t>
-            </a:r>
-            <a:r>
-              <a:rPr lang="en-US" dirty="0">
-                <a:solidFill>
-                  <a:srgbClr val="000000"/>
-                </a:solidFill>
-                <a:highlight>
-                  <a:srgbClr val="FFFF00"/>
-                </a:highlight>
-                <a:latin typeface="Consolas" panose="020B0609020204030204" pitchFamily="49" charset="0"/>
-                <a:ea typeface="Calibri" panose="020F0502020204030204" pitchFamily="34" charset="0"/>
-              </a:rPr>
-              <a:t> 3 months</a:t>
-            </a:r>
-            <a:r>
-              <a:rPr lang="en-US" dirty="0">
-                <a:solidFill>
-                  <a:srgbClr val="808080"/>
-                </a:solidFill>
-                <a:latin typeface="Consolas" panose="020B0609020204030204" pitchFamily="49" charset="0"/>
-              </a:rPr>
-              <a:t>));</a:t>
-            </a:r>
             <a:endParaRPr lang="en-US" dirty="0"/>
           </a:p>
         </p:txBody>
@@ -3495,7 +3360,7 @@
     </p:spTree>
     <p:extLst>
       <p:ext uri="{BB962C8B-B14F-4D97-AF65-F5344CB8AC3E}">
-        <p14:creationId xmlns:p14="http://schemas.microsoft.com/office/powerpoint/2010/main" val="2266385365"/>
+        <p14:creationId xmlns:p14="http://schemas.microsoft.com/office/powerpoint/2010/main" val="1259701937"/>
       </p:ext>
     </p:extLst>
   </p:cSld>
@@ -3556,7 +3421,9 @@
         </p:nvSpPr>
         <p:spPr/>
         <p:txBody>
-          <a:bodyPr/>
+          <a:bodyPr>
+            <a:normAutofit/>
+          </a:bodyPr>
           <a:lstStyle/>
           <a:p>
             <a:r>
@@ -3566,7 +3433,7 @@
                 </a:solidFill>
                 <a:latin typeface="Consolas" panose="020B0609020204030204" pitchFamily="49" charset="0"/>
               </a:rPr>
-              <a:t>alter</a:t>
+              <a:t>create</a:t>
             </a:r>
             <a:r>
               <a:rPr lang="en-US" dirty="0">
@@ -3633,65 +3500,11 @@
             <a:r>
               <a:rPr lang="en-US" dirty="0">
                 <a:solidFill>
-                  <a:srgbClr val="0000FF"/>
-                </a:solidFill>
-                <a:latin typeface="Consolas" panose="020B0609020204030204" pitchFamily="49" charset="0"/>
-              </a:rPr>
-              <a:t>set </a:t>
-            </a:r>
-            <a:r>
-              <a:rPr lang="en-US" dirty="0">
-                <a:solidFill>
                   <a:srgbClr val="808080"/>
                 </a:solidFill>
                 <a:latin typeface="Consolas" panose="020B0609020204030204" pitchFamily="49" charset="0"/>
               </a:rPr>
               <a:t>(</a:t>
-            </a:r>
-            <a:r>
-              <a:rPr lang="en-US" dirty="0" err="1">
-                <a:solidFill>
-                  <a:srgbClr val="0000FF"/>
-                </a:solidFill>
-                <a:latin typeface="Consolas" panose="020B0609020204030204" pitchFamily="49" charset="0"/>
-              </a:rPr>
-              <a:t>system_versioning</a:t>
-            </a:r>
-            <a:r>
-              <a:rPr lang="en-US" dirty="0">
-                <a:solidFill>
-                  <a:srgbClr val="000000"/>
-                </a:solidFill>
-                <a:latin typeface="Consolas" panose="020B0609020204030204" pitchFamily="49" charset="0"/>
-              </a:rPr>
-              <a:t> </a:t>
-            </a:r>
-            <a:r>
-              <a:rPr lang="en-US" dirty="0">
-                <a:solidFill>
-                  <a:srgbClr val="808080"/>
-                </a:solidFill>
-                <a:latin typeface="Consolas" panose="020B0609020204030204" pitchFamily="49" charset="0"/>
-              </a:rPr>
-              <a:t>=</a:t>
-            </a:r>
-            <a:r>
-              <a:rPr lang="en-US" dirty="0">
-                <a:solidFill>
-                  <a:srgbClr val="000000"/>
-                </a:solidFill>
-                <a:latin typeface="Consolas" panose="020B0609020204030204" pitchFamily="49" charset="0"/>
-              </a:rPr>
-              <a:t> </a:t>
-            </a:r>
-            <a:r>
-              <a:rPr lang="en-US" dirty="0">
-                <a:solidFill>
-                  <a:srgbClr val="0000FF"/>
-                </a:solidFill>
-                <a:latin typeface="Consolas" panose="020B0609020204030204" pitchFamily="49" charset="0"/>
-              </a:rPr>
-              <a:t>on</a:t>
             </a:r>
             <a:endParaRPr lang="en-US" dirty="0">
               <a:solidFill>
@@ -3704,56 +3517,22 @@
             <a:r>
               <a:rPr lang="en-US" dirty="0">
                 <a:solidFill>
+                  <a:srgbClr val="000000"/>
+                </a:solidFill>
+                <a:latin typeface="Consolas" panose="020B0609020204030204" pitchFamily="49" charset="0"/>
+              </a:rPr>
+              <a:t>…</a:t>
+            </a:r>
+          </a:p>
+          <a:p>
+            <a:r>
+              <a:rPr lang="en-US" dirty="0">
+                <a:solidFill>
                   <a:srgbClr val="808080"/>
                 </a:solidFill>
                 <a:latin typeface="Consolas" panose="020B0609020204030204" pitchFamily="49" charset="0"/>
               </a:rPr>
-              <a:t>(</a:t>
-            </a:r>
-            <a:r>
-              <a:rPr lang="en-US" dirty="0" err="1">
-                <a:solidFill>
-                  <a:srgbClr val="000000"/>
-                </a:solidFill>
-                <a:latin typeface="Consolas" panose="020B0609020204030204" pitchFamily="49" charset="0"/>
-              </a:rPr>
-              <a:t>history_retention_period</a:t>
-            </a:r>
-            <a:r>
-              <a:rPr lang="en-US" dirty="0">
-                <a:solidFill>
-                  <a:srgbClr val="000000"/>
-                </a:solidFill>
-                <a:latin typeface="Consolas" panose="020B0609020204030204" pitchFamily="49" charset="0"/>
-              </a:rPr>
-              <a:t> </a:t>
-            </a:r>
-            <a:r>
-              <a:rPr lang="en-US" dirty="0">
-                <a:solidFill>
-                  <a:srgbClr val="808080"/>
-                </a:solidFill>
-                <a:latin typeface="Consolas" panose="020B0609020204030204" pitchFamily="49" charset="0"/>
-              </a:rPr>
-              <a:t>=</a:t>
-            </a:r>
-            <a:r>
-              <a:rPr lang="en-US" dirty="0">
-                <a:solidFill>
-                  <a:srgbClr val="000000"/>
-                </a:solidFill>
-                <a:latin typeface="Consolas" panose="020B0609020204030204" pitchFamily="49" charset="0"/>
-              </a:rPr>
-              <a:t> 7 weeks</a:t>
-            </a:r>
-            <a:r>
-              <a:rPr lang="en-US" dirty="0">
-                <a:solidFill>
-                  <a:srgbClr val="808080"/>
-                </a:solidFill>
-                <a:latin typeface="Consolas" panose="020B0609020204030204" pitchFamily="49" charset="0"/>
-              </a:rPr>
-              <a:t>));</a:t>
+              <a:t>)</a:t>
             </a:r>
             <a:endParaRPr lang="en-US" dirty="0">
               <a:solidFill>
@@ -3763,6 +3542,227 @@
             </a:endParaRPr>
           </a:p>
           <a:p>
+            <a:r>
+              <a:rPr lang="en-US" dirty="0">
+                <a:solidFill>
+                  <a:srgbClr val="0000FF"/>
+                </a:solidFill>
+                <a:latin typeface="Consolas" panose="020B0609020204030204" pitchFamily="49" charset="0"/>
+              </a:rPr>
+              <a:t>with </a:t>
+            </a:r>
+            <a:r>
+              <a:rPr lang="en-US" dirty="0">
+                <a:solidFill>
+                  <a:srgbClr val="808080"/>
+                </a:solidFill>
+                <a:latin typeface="Consolas" panose="020B0609020204030204" pitchFamily="49" charset="0"/>
+              </a:rPr>
+              <a:t>(</a:t>
+            </a:r>
+            <a:r>
+              <a:rPr lang="en-US" dirty="0" err="1">
+                <a:solidFill>
+                  <a:srgbClr val="0000FF"/>
+                </a:solidFill>
+                <a:latin typeface="Consolas" panose="020B0609020204030204" pitchFamily="49" charset="0"/>
+              </a:rPr>
+              <a:t>system_versioning</a:t>
+            </a:r>
+            <a:r>
+              <a:rPr lang="en-US" dirty="0">
+                <a:solidFill>
+                  <a:srgbClr val="000000"/>
+                </a:solidFill>
+                <a:latin typeface="Consolas" panose="020B0609020204030204" pitchFamily="49" charset="0"/>
+              </a:rPr>
+              <a:t> </a:t>
+            </a:r>
+            <a:r>
+              <a:rPr lang="en-US" dirty="0">
+                <a:solidFill>
+                  <a:srgbClr val="808080"/>
+                </a:solidFill>
+                <a:latin typeface="Consolas" panose="020B0609020204030204" pitchFamily="49" charset="0"/>
+              </a:rPr>
+              <a:t>=</a:t>
+            </a:r>
+            <a:r>
+              <a:rPr lang="en-US" dirty="0">
+                <a:solidFill>
+                  <a:srgbClr val="000000"/>
+                </a:solidFill>
+                <a:latin typeface="Consolas" panose="020B0609020204030204" pitchFamily="49" charset="0"/>
+              </a:rPr>
+              <a:t> </a:t>
+            </a:r>
+            <a:r>
+              <a:rPr lang="en-US" dirty="0">
+                <a:solidFill>
+                  <a:srgbClr val="0000FF"/>
+                </a:solidFill>
+                <a:latin typeface="Consolas" panose="020B0609020204030204" pitchFamily="49" charset="0"/>
+              </a:rPr>
+              <a:t>on</a:t>
+            </a:r>
+            <a:endParaRPr lang="en-US" dirty="0">
+              <a:solidFill>
+                <a:srgbClr val="000000"/>
+              </a:solidFill>
+              <a:latin typeface="Consolas" panose="020B0609020204030204" pitchFamily="49" charset="0"/>
+            </a:endParaRPr>
+          </a:p>
+          <a:p>
+            <a:r>
+              <a:rPr lang="en-US" dirty="0">
+                <a:solidFill>
+                  <a:srgbClr val="808080"/>
+                </a:solidFill>
+                <a:latin typeface="Consolas" panose="020B0609020204030204" pitchFamily="49" charset="0"/>
+              </a:rPr>
+              <a:t>(</a:t>
+            </a:r>
+            <a:r>
+              <a:rPr lang="en-US" dirty="0" err="1">
+                <a:solidFill>
+                  <a:srgbClr val="000000"/>
+                </a:solidFill>
+                <a:latin typeface="Consolas" panose="020B0609020204030204" pitchFamily="49" charset="0"/>
+              </a:rPr>
+              <a:t>history_table</a:t>
+            </a:r>
+            <a:r>
+              <a:rPr lang="en-US" dirty="0">
+                <a:solidFill>
+                  <a:srgbClr val="000000"/>
+                </a:solidFill>
+                <a:latin typeface="Consolas" panose="020B0609020204030204" pitchFamily="49" charset="0"/>
+              </a:rPr>
+              <a:t> </a:t>
+            </a:r>
+            <a:r>
+              <a:rPr lang="en-US" dirty="0">
+                <a:solidFill>
+                  <a:srgbClr val="808080"/>
+                </a:solidFill>
+                <a:latin typeface="Consolas" panose="020B0609020204030204" pitchFamily="49" charset="0"/>
+              </a:rPr>
+              <a:t>=</a:t>
+            </a:r>
+            <a:r>
+              <a:rPr lang="en-US" dirty="0">
+                <a:solidFill>
+                  <a:srgbClr val="000000"/>
+                </a:solidFill>
+                <a:latin typeface="Consolas" panose="020B0609020204030204" pitchFamily="49" charset="0"/>
+              </a:rPr>
+              <a:t> </a:t>
+            </a:r>
+            <a:r>
+              <a:rPr lang="en-US" dirty="0" err="1">
+                <a:solidFill>
+                  <a:srgbClr val="000000"/>
+                </a:solidFill>
+                <a:latin typeface="Consolas" panose="020B0609020204030204" pitchFamily="49" charset="0"/>
+              </a:rPr>
+              <a:t>history</a:t>
+            </a:r>
+            <a:r>
+              <a:rPr lang="en-US" dirty="0" err="1">
+                <a:solidFill>
+                  <a:srgbClr val="808080"/>
+                </a:solidFill>
+                <a:latin typeface="Consolas" panose="020B0609020204030204" pitchFamily="49" charset="0"/>
+              </a:rPr>
+              <a:t>.</a:t>
+            </a:r>
+            <a:r>
+              <a:rPr lang="en-US" dirty="0" err="1">
+                <a:solidFill>
+                  <a:srgbClr val="000000"/>
+                </a:solidFill>
+                <a:latin typeface="Consolas" panose="020B0609020204030204" pitchFamily="49" charset="0"/>
+              </a:rPr>
+              <a:t>CustomerHistory</a:t>
+            </a:r>
+            <a:r>
+              <a:rPr lang="en-US" dirty="0">
+                <a:solidFill>
+                  <a:srgbClr val="808080"/>
+                </a:solidFill>
+                <a:latin typeface="Consolas" panose="020B0609020204030204" pitchFamily="49" charset="0"/>
+              </a:rPr>
+              <a:t>,</a:t>
+            </a:r>
+            <a:endParaRPr lang="en-US" dirty="0">
+              <a:solidFill>
+                <a:srgbClr val="000000"/>
+              </a:solidFill>
+              <a:latin typeface="Consolas" panose="020B0609020204030204" pitchFamily="49" charset="0"/>
+            </a:endParaRPr>
+          </a:p>
+          <a:p>
+            <a:r>
+              <a:rPr lang="en-US" dirty="0" err="1">
+                <a:solidFill>
+                  <a:srgbClr val="000000"/>
+                </a:solidFill>
+                <a:highlight>
+                  <a:srgbClr val="FFFF00"/>
+                </a:highlight>
+                <a:latin typeface="Consolas" panose="020B0609020204030204" pitchFamily="49" charset="0"/>
+                <a:ea typeface="Calibri" panose="020F0502020204030204" pitchFamily="34" charset="0"/>
+              </a:rPr>
+              <a:t>history_retention_period</a:t>
+            </a:r>
+            <a:r>
+              <a:rPr lang="en-US" dirty="0">
+                <a:solidFill>
+                  <a:srgbClr val="000000"/>
+                </a:solidFill>
+                <a:highlight>
+                  <a:srgbClr val="FFFF00"/>
+                </a:highlight>
+                <a:latin typeface="Consolas" panose="020B0609020204030204" pitchFamily="49" charset="0"/>
+                <a:ea typeface="Calibri" panose="020F0502020204030204" pitchFamily="34" charset="0"/>
+              </a:rPr>
+              <a:t> </a:t>
+            </a:r>
+            <a:r>
+              <a:rPr lang="en-US" dirty="0">
+                <a:solidFill>
+                  <a:srgbClr val="808080"/>
+                </a:solidFill>
+                <a:highlight>
+                  <a:srgbClr val="FFFF00"/>
+                </a:highlight>
+                <a:latin typeface="Consolas" panose="020B0609020204030204" pitchFamily="49" charset="0"/>
+                <a:ea typeface="Calibri" panose="020F0502020204030204" pitchFamily="34" charset="0"/>
+              </a:rPr>
+              <a:t>=</a:t>
+            </a:r>
+            <a:r>
+              <a:rPr lang="en-US" dirty="0">
+                <a:solidFill>
+                  <a:srgbClr val="000000"/>
+                </a:solidFill>
+                <a:highlight>
+                  <a:srgbClr val="FFFF00"/>
+                </a:highlight>
+                <a:latin typeface="Consolas" panose="020B0609020204030204" pitchFamily="49" charset="0"/>
+                <a:ea typeface="Calibri" panose="020F0502020204030204" pitchFamily="34" charset="0"/>
+              </a:rPr>
+              <a:t> 3 months</a:t>
+            </a:r>
+            <a:r>
+              <a:rPr lang="en-US" dirty="0">
+                <a:solidFill>
+                  <a:srgbClr val="808080"/>
+                </a:solidFill>
+                <a:latin typeface="Consolas" panose="020B0609020204030204" pitchFamily="49" charset="0"/>
+              </a:rPr>
+              <a:t>));</a:t>
+            </a:r>
             <a:endParaRPr lang="en-US" dirty="0"/>
           </a:p>
         </p:txBody>
@@ -3770,7 +3770,7 @@
     </p:spTree>
     <p:extLst>
       <p:ext uri="{BB962C8B-B14F-4D97-AF65-F5344CB8AC3E}">
-        <p14:creationId xmlns:p14="http://schemas.microsoft.com/office/powerpoint/2010/main" val="4013226823"/>
+        <p14:creationId xmlns:p14="http://schemas.microsoft.com/office/powerpoint/2010/main" val="2266385365"/>
       </p:ext>
     </p:extLst>
   </p:cSld>
@@ -3841,7 +3841,7 @@
                 </a:solidFill>
                 <a:latin typeface="Consolas" panose="020B0609020204030204" pitchFamily="49" charset="0"/>
               </a:rPr>
-              <a:t>select</a:t>
+              <a:t>alter</a:t>
             </a:r>
             <a:r>
               <a:rPr lang="en-US" dirty="0">
@@ -3853,22 +3853,49 @@
               <a:t> </a:t>
             </a:r>
             <a:r>
+              <a:rPr lang="en-US" dirty="0">
+                <a:solidFill>
+                  <a:srgbClr val="0000FF"/>
+                </a:solidFill>
+                <a:latin typeface="Consolas" panose="020B0609020204030204" pitchFamily="49" charset="0"/>
+              </a:rPr>
+              <a:t>table</a:t>
+            </a:r>
+            <a:r>
+              <a:rPr lang="en-US" dirty="0">
+                <a:solidFill>
+                  <a:srgbClr val="000000"/>
+                </a:solidFill>
+                <a:latin typeface="Consolas" panose="020B0609020204030204" pitchFamily="49" charset="0"/>
+              </a:rPr>
+              <a:t> </a:t>
+            </a:r>
+            <a:r>
               <a:rPr lang="en-US" dirty="0" err="1">
                 <a:solidFill>
                   <a:srgbClr val="000000"/>
                 </a:solidFill>
                 <a:latin typeface="Consolas" panose="020B0609020204030204" pitchFamily="49" charset="0"/>
               </a:rPr>
-              <a:t>history_retention_period</a:t>
-            </a:r>
-            <a:r>
-              <a:rPr lang="en-US" dirty="0">
+              <a:t>dbo</a:t>
+            </a:r>
+            <a:r>
+              <a:rPr lang="en-US" dirty="0" err="1">
                 <a:solidFill>
                   <a:srgbClr val="808080"/>
                 </a:solidFill>
                 <a:latin typeface="Consolas" panose="020B0609020204030204" pitchFamily="49" charset="0"/>
               </a:rPr>
-              <a:t>,</a:t>
+              <a:t>.</a:t>
+            </a:r>
+            <a:r>
+              <a:rPr lang="en-US" dirty="0" err="1">
+                <a:solidFill>
+                  <a:srgbClr val="000000"/>
+                </a:solidFill>
+                <a:latin typeface="Consolas" panose="020B0609020204030204" pitchFamily="49" charset="0"/>
+              </a:rPr>
+              <a:t>Customer</a:t>
             </a:r>
             <a:endParaRPr lang="en-US" dirty="0">
               <a:solidFill>
@@ -3879,13 +3906,40 @@
           </a:p>
           <a:p>
             <a:r>
+              <a:rPr lang="en-US" dirty="0">
+                <a:solidFill>
+                  <a:srgbClr val="0000FF"/>
+                </a:solidFill>
+                <a:latin typeface="Consolas" panose="020B0609020204030204" pitchFamily="49" charset="0"/>
+              </a:rPr>
+              <a:t>set </a:t>
+            </a:r>
+            <a:r>
+              <a:rPr lang="en-US" dirty="0">
+                <a:solidFill>
+                  <a:srgbClr val="808080"/>
+                </a:solidFill>
+                <a:latin typeface="Consolas" panose="020B0609020204030204" pitchFamily="49" charset="0"/>
+              </a:rPr>
+              <a:t>(</a:t>
+            </a:r>
+            <a:r>
               <a:rPr lang="en-US" dirty="0" err="1">
                 <a:solidFill>
+                  <a:srgbClr val="0000FF"/>
+                </a:solidFill>
+                <a:latin typeface="Consolas" panose="020B0609020204030204" pitchFamily="49" charset="0"/>
+              </a:rPr>
+              <a:t>system_versioning</a:t>
+            </a:r>
+            <a:r>
+              <a:rPr lang="en-US" dirty="0">
+                <a:solidFill>
                   <a:srgbClr val="000000"/>
                 </a:solidFill>
                 <a:latin typeface="Consolas" panose="020B0609020204030204" pitchFamily="49" charset="0"/>
               </a:rPr>
-              <a:t>history_retention_period_unit</a:t>
+              <a:t> </a:t>
             </a:r>
             <a:r>
               <a:rPr lang="en-US" dirty="0">
@@ -3894,7 +3948,25 @@
                 </a:solidFill>
                 <a:latin typeface="Consolas" panose="020B0609020204030204" pitchFamily="49" charset="0"/>
               </a:rPr>
-              <a:t>,</a:t>
+              <a:t>=</a:t>
+            </a:r>
+            <a:r>
+              <a:rPr lang="en-US" dirty="0">
+                <a:solidFill>
+                  <a:srgbClr val="000000"/>
+                </a:solidFill>
+                <a:latin typeface="Consolas" panose="020B0609020204030204" pitchFamily="49" charset="0"/>
+              </a:rPr>
+              <a:t> </a:t>
+            </a:r>
+            <a:r>
+              <a:rPr lang="en-US" dirty="0">
+                <a:solidFill>
+                  <a:srgbClr val="0000FF"/>
+                </a:solidFill>
+                <a:latin typeface="Consolas" panose="020B0609020204030204" pitchFamily="49" charset="0"/>
+              </a:rPr>
+              <a:t>on</a:t>
             </a:r>
             <a:endParaRPr lang="en-US" dirty="0">
               <a:solidFill>
@@ -3905,13 +3977,58 @@
           </a:p>
           <a:p>
             <a:r>
+              <a:rPr lang="en-US" dirty="0">
+                <a:solidFill>
+                  <a:srgbClr val="808080"/>
+                </a:solidFill>
+                <a:latin typeface="Consolas" panose="020B0609020204030204" pitchFamily="49" charset="0"/>
+              </a:rPr>
+              <a:t>(</a:t>
+            </a:r>
+            <a:r>
               <a:rPr lang="en-US" dirty="0" err="1">
                 <a:solidFill>
                   <a:srgbClr val="000000"/>
                 </a:solidFill>
                 <a:latin typeface="Consolas" panose="020B0609020204030204" pitchFamily="49" charset="0"/>
               </a:rPr>
-              <a:t>history_retention_period_unit_desc</a:t>
+              <a:t>history_retention_period</a:t>
+            </a:r>
+            <a:r>
+              <a:rPr lang="en-US" dirty="0">
+                <a:solidFill>
+                  <a:srgbClr val="000000"/>
+                </a:solidFill>
+                <a:latin typeface="Consolas" panose="020B0609020204030204" pitchFamily="49" charset="0"/>
+              </a:rPr>
+              <a:t> </a:t>
+            </a:r>
+            <a:r>
+              <a:rPr lang="en-US" dirty="0">
+                <a:solidFill>
+                  <a:srgbClr val="808080"/>
+                </a:solidFill>
+                <a:latin typeface="Consolas" panose="020B0609020204030204" pitchFamily="49" charset="0"/>
+              </a:rPr>
+              <a:t>=</a:t>
+            </a:r>
+            <a:r>
+              <a:rPr lang="en-US" dirty="0">
+                <a:solidFill>
+                  <a:srgbClr val="000000"/>
+                </a:solidFill>
+                <a:latin typeface="Consolas" panose="020B0609020204030204" pitchFamily="49" charset="0"/>
+              </a:rPr>
+              <a:t> 7 weeks</a:t>
+            </a:r>
+            <a:r>
+              <a:rPr lang="en-US" dirty="0">
+                <a:solidFill>
+                  <a:srgbClr val="808080"/>
+                </a:solidFill>
+                <a:latin typeface="Consolas" panose="020B0609020204030204" pitchFamily="49" charset="0"/>
+              </a:rPr>
+              <a:t>));</a:t>
             </a:r>
             <a:endParaRPr lang="en-US" dirty="0">
               <a:solidFill>
@@ -3921,171 +4038,14 @@
             </a:endParaRPr>
           </a:p>
           <a:p>
-            <a:r>
-              <a:rPr lang="en-US" dirty="0">
-                <a:solidFill>
-                  <a:srgbClr val="0000FF"/>
-                </a:solidFill>
-                <a:latin typeface="Consolas" panose="020B0609020204030204" pitchFamily="49" charset="0"/>
-              </a:rPr>
-              <a:t>from</a:t>
-            </a:r>
-            <a:r>
-              <a:rPr lang="en-US" dirty="0">
-                <a:solidFill>
-                  <a:srgbClr val="000000"/>
-                </a:solidFill>
-                <a:latin typeface="Consolas" panose="020B0609020204030204" pitchFamily="49" charset="0"/>
-              </a:rPr>
-              <a:t> </a:t>
-            </a:r>
-            <a:r>
-              <a:rPr lang="en-US" dirty="0" err="1">
-                <a:solidFill>
-                  <a:srgbClr val="00FF00"/>
-                </a:solidFill>
-                <a:latin typeface="Consolas" panose="020B0609020204030204" pitchFamily="49" charset="0"/>
-              </a:rPr>
-              <a:t>sys</a:t>
-            </a:r>
-            <a:r>
-              <a:rPr lang="en-US" dirty="0" err="1">
-                <a:solidFill>
-                  <a:srgbClr val="808080"/>
-                </a:solidFill>
-                <a:latin typeface="Consolas" panose="020B0609020204030204" pitchFamily="49" charset="0"/>
-              </a:rPr>
-              <a:t>.</a:t>
-            </a:r>
-            <a:r>
-              <a:rPr lang="en-US" dirty="0" err="1">
-                <a:solidFill>
-                  <a:srgbClr val="00FF00"/>
-                </a:solidFill>
-                <a:latin typeface="Consolas" panose="020B0609020204030204" pitchFamily="49" charset="0"/>
-              </a:rPr>
-              <a:t>tables</a:t>
-            </a:r>
-            <a:endParaRPr lang="en-US" dirty="0">
-              <a:solidFill>
-                <a:srgbClr val="000000"/>
-              </a:solidFill>
-              <a:latin typeface="Consolas" panose="020B0609020204030204" pitchFamily="49" charset="0"/>
-            </a:endParaRPr>
-          </a:p>
-          <a:p>
-            <a:r>
-              <a:rPr lang="en-US" dirty="0">
-                <a:solidFill>
-                  <a:srgbClr val="0000FF"/>
-                </a:solidFill>
-                <a:latin typeface="Consolas" panose="020B0609020204030204" pitchFamily="49" charset="0"/>
-              </a:rPr>
-              <a:t>where</a:t>
-            </a:r>
-            <a:r>
-              <a:rPr lang="en-US" dirty="0">
-                <a:solidFill>
-                  <a:srgbClr val="000000"/>
-                </a:solidFill>
-                <a:latin typeface="Consolas" panose="020B0609020204030204" pitchFamily="49" charset="0"/>
-              </a:rPr>
-              <a:t> </a:t>
-            </a:r>
-            <a:r>
-              <a:rPr lang="en-US" dirty="0">
-                <a:solidFill>
-                  <a:srgbClr val="0000FF"/>
-                </a:solidFill>
-                <a:latin typeface="Consolas" panose="020B0609020204030204" pitchFamily="49" charset="0"/>
-              </a:rPr>
-              <a:t>name</a:t>
-            </a:r>
-            <a:r>
-              <a:rPr lang="en-US" dirty="0">
-                <a:solidFill>
-                  <a:srgbClr val="000000"/>
-                </a:solidFill>
-                <a:latin typeface="Consolas" panose="020B0609020204030204" pitchFamily="49" charset="0"/>
-              </a:rPr>
-              <a:t> </a:t>
-            </a:r>
-            <a:r>
-              <a:rPr lang="en-US" dirty="0">
-                <a:solidFill>
-                  <a:srgbClr val="808080"/>
-                </a:solidFill>
-                <a:latin typeface="Consolas" panose="020B0609020204030204" pitchFamily="49" charset="0"/>
-              </a:rPr>
-              <a:t>=</a:t>
-            </a:r>
-            <a:r>
-              <a:rPr lang="en-US" dirty="0">
-                <a:solidFill>
-                  <a:srgbClr val="000000"/>
-                </a:solidFill>
-                <a:latin typeface="Consolas" panose="020B0609020204030204" pitchFamily="49" charset="0"/>
-              </a:rPr>
-              <a:t> </a:t>
-            </a:r>
-            <a:r>
-              <a:rPr lang="en-US" dirty="0">
-                <a:solidFill>
-                  <a:srgbClr val="FF0000"/>
-                </a:solidFill>
-                <a:latin typeface="Consolas" panose="020B0609020204030204" pitchFamily="49" charset="0"/>
-              </a:rPr>
-              <a:t>'Customer'</a:t>
-            </a:r>
-            <a:r>
-              <a:rPr lang="en-US" dirty="0">
-                <a:solidFill>
-                  <a:srgbClr val="808080"/>
-                </a:solidFill>
-                <a:latin typeface="Consolas" panose="020B0609020204030204" pitchFamily="49" charset="0"/>
-              </a:rPr>
-              <a:t>;</a:t>
-            </a:r>
-            <a:endParaRPr lang="en-US" dirty="0">
-              <a:solidFill>
-                <a:srgbClr val="000000"/>
-              </a:solidFill>
-              <a:latin typeface="Consolas" panose="020B0609020204030204" pitchFamily="49" charset="0"/>
-            </a:endParaRPr>
-          </a:p>
-          <a:p>
             <a:endParaRPr lang="en-US" dirty="0"/>
           </a:p>
         </p:txBody>
       </p:sp>
-      <p:pic>
-        <p:nvPicPr>
-          <p:cNvPr id="4" name="Picture 3"/>
-          <p:cNvPicPr>
-            <a:picLocks noChangeAspect="1"/>
-          </p:cNvPicPr>
-          <p:nvPr/>
-        </p:nvPicPr>
-        <p:blipFill>
-          <a:blip r:embed="rId2"/>
-          <a:stretch>
-            <a:fillRect/>
-          </a:stretch>
-        </p:blipFill>
-        <p:spPr>
-          <a:xfrm>
-            <a:off x="361038" y="4836319"/>
-            <a:ext cx="10687782" cy="923350"/>
-          </a:xfrm>
-          <a:prstGeom prst="rect">
-            <a:avLst/>
-          </a:prstGeom>
-        </p:spPr>
-      </p:pic>
     </p:spTree>
     <p:extLst>
       <p:ext uri="{BB962C8B-B14F-4D97-AF65-F5344CB8AC3E}">
-        <p14:creationId xmlns:p14="http://schemas.microsoft.com/office/powerpoint/2010/main" val="3710255657"/>
+        <p14:creationId xmlns:p14="http://schemas.microsoft.com/office/powerpoint/2010/main" val="4013226823"/>
       </p:ext>
     </p:extLst>
   </p:cSld>
@@ -4129,6 +4089,321 @@
           <a:p>
             <a:r>
               <a:rPr lang="en-US" dirty="0"/>
+              <a:t>SQL 2017 Enhancements: Retention</a:t>
+            </a:r>
+          </a:p>
+        </p:txBody>
+      </p:sp>
+      <p:sp>
+        <p:nvSpPr>
+          <p:cNvPr id="3" name="Content Placeholder 2"/>
+          <p:cNvSpPr>
+            <a:spLocks noGrp="1"/>
+          </p:cNvSpPr>
+          <p:nvPr>
+            <p:ph idx="1"/>
+          </p:nvPr>
+        </p:nvSpPr>
+        <p:spPr/>
+        <p:txBody>
+          <a:bodyPr/>
+          <a:lstStyle/>
+          <a:p>
+            <a:r>
+              <a:rPr lang="en-US" dirty="0">
+                <a:solidFill>
+                  <a:srgbClr val="0000FF"/>
+                </a:solidFill>
+                <a:latin typeface="Consolas" panose="020B0609020204030204" pitchFamily="49" charset="0"/>
+              </a:rPr>
+              <a:t>select</a:t>
+            </a:r>
+            <a:r>
+              <a:rPr lang="en-US" dirty="0">
+                <a:solidFill>
+                  <a:srgbClr val="000000"/>
+                </a:solidFill>
+                <a:latin typeface="Consolas" panose="020B0609020204030204" pitchFamily="49" charset="0"/>
+              </a:rPr>
+              <a:t> </a:t>
+            </a:r>
+            <a:r>
+              <a:rPr lang="en-US" dirty="0" err="1">
+                <a:solidFill>
+                  <a:srgbClr val="000000"/>
+                </a:solidFill>
+                <a:latin typeface="Consolas" panose="020B0609020204030204" pitchFamily="49" charset="0"/>
+              </a:rPr>
+              <a:t>history_retention_period</a:t>
+            </a:r>
+            <a:r>
+              <a:rPr lang="en-US" dirty="0">
+                <a:solidFill>
+                  <a:srgbClr val="808080"/>
+                </a:solidFill>
+                <a:latin typeface="Consolas" panose="020B0609020204030204" pitchFamily="49" charset="0"/>
+              </a:rPr>
+              <a:t>,</a:t>
+            </a:r>
+            <a:endParaRPr lang="en-US" dirty="0">
+              <a:solidFill>
+                <a:srgbClr val="000000"/>
+              </a:solidFill>
+              <a:latin typeface="Consolas" panose="020B0609020204030204" pitchFamily="49" charset="0"/>
+            </a:endParaRPr>
+          </a:p>
+          <a:p>
+            <a:r>
+              <a:rPr lang="en-US" dirty="0" err="1">
+                <a:solidFill>
+                  <a:srgbClr val="000000"/>
+                </a:solidFill>
+                <a:latin typeface="Consolas" panose="020B0609020204030204" pitchFamily="49" charset="0"/>
+              </a:rPr>
+              <a:t>history_retention_period_unit</a:t>
+            </a:r>
+            <a:r>
+              <a:rPr lang="en-US" dirty="0">
+                <a:solidFill>
+                  <a:srgbClr val="808080"/>
+                </a:solidFill>
+                <a:latin typeface="Consolas" panose="020B0609020204030204" pitchFamily="49" charset="0"/>
+              </a:rPr>
+              <a:t>,</a:t>
+            </a:r>
+            <a:endParaRPr lang="en-US" dirty="0">
+              <a:solidFill>
+                <a:srgbClr val="000000"/>
+              </a:solidFill>
+              <a:latin typeface="Consolas" panose="020B0609020204030204" pitchFamily="49" charset="0"/>
+            </a:endParaRPr>
+          </a:p>
+          <a:p>
+            <a:r>
+              <a:rPr lang="en-US" dirty="0" err="1">
+                <a:solidFill>
+                  <a:srgbClr val="000000"/>
+                </a:solidFill>
+                <a:latin typeface="Consolas" panose="020B0609020204030204" pitchFamily="49" charset="0"/>
+              </a:rPr>
+              <a:t>history_retention_period_unit_desc</a:t>
+            </a:r>
+            <a:endParaRPr lang="en-US" dirty="0">
+              <a:solidFill>
+                <a:srgbClr val="000000"/>
+              </a:solidFill>
+              <a:latin typeface="Consolas" panose="020B0609020204030204" pitchFamily="49" charset="0"/>
+            </a:endParaRPr>
+          </a:p>
+          <a:p>
+            <a:r>
+              <a:rPr lang="en-US" dirty="0">
+                <a:solidFill>
+                  <a:srgbClr val="0000FF"/>
+                </a:solidFill>
+                <a:latin typeface="Consolas" panose="020B0609020204030204" pitchFamily="49" charset="0"/>
+              </a:rPr>
+              <a:t>from</a:t>
+            </a:r>
+            <a:r>
+              <a:rPr lang="en-US" dirty="0">
+                <a:solidFill>
+                  <a:srgbClr val="000000"/>
+                </a:solidFill>
+                <a:latin typeface="Consolas" panose="020B0609020204030204" pitchFamily="49" charset="0"/>
+              </a:rPr>
+              <a:t> </a:t>
+            </a:r>
+            <a:r>
+              <a:rPr lang="en-US" dirty="0" err="1">
+                <a:solidFill>
+                  <a:srgbClr val="00FF00"/>
+                </a:solidFill>
+                <a:latin typeface="Consolas" panose="020B0609020204030204" pitchFamily="49" charset="0"/>
+              </a:rPr>
+              <a:t>sys</a:t>
+            </a:r>
+            <a:r>
+              <a:rPr lang="en-US" dirty="0" err="1">
+                <a:solidFill>
+                  <a:srgbClr val="808080"/>
+                </a:solidFill>
+                <a:latin typeface="Consolas" panose="020B0609020204030204" pitchFamily="49" charset="0"/>
+              </a:rPr>
+              <a:t>.</a:t>
+            </a:r>
+            <a:r>
+              <a:rPr lang="en-US" dirty="0" err="1">
+                <a:solidFill>
+                  <a:srgbClr val="00FF00"/>
+                </a:solidFill>
+                <a:latin typeface="Consolas" panose="020B0609020204030204" pitchFamily="49" charset="0"/>
+              </a:rPr>
+              <a:t>tables</a:t>
+            </a:r>
+            <a:endParaRPr lang="en-US" dirty="0">
+              <a:solidFill>
+                <a:srgbClr val="000000"/>
+              </a:solidFill>
+              <a:latin typeface="Consolas" panose="020B0609020204030204" pitchFamily="49" charset="0"/>
+            </a:endParaRPr>
+          </a:p>
+          <a:p>
+            <a:r>
+              <a:rPr lang="en-US" dirty="0">
+                <a:solidFill>
+                  <a:srgbClr val="0000FF"/>
+                </a:solidFill>
+                <a:latin typeface="Consolas" panose="020B0609020204030204" pitchFamily="49" charset="0"/>
+              </a:rPr>
+              <a:t>where</a:t>
+            </a:r>
+            <a:r>
+              <a:rPr lang="en-US" dirty="0">
+                <a:solidFill>
+                  <a:srgbClr val="000000"/>
+                </a:solidFill>
+                <a:latin typeface="Consolas" panose="020B0609020204030204" pitchFamily="49" charset="0"/>
+              </a:rPr>
+              <a:t> </a:t>
+            </a:r>
+            <a:r>
+              <a:rPr lang="en-US" dirty="0">
+                <a:solidFill>
+                  <a:srgbClr val="0000FF"/>
+                </a:solidFill>
+                <a:latin typeface="Consolas" panose="020B0609020204030204" pitchFamily="49" charset="0"/>
+              </a:rPr>
+              <a:t>name</a:t>
+            </a:r>
+            <a:r>
+              <a:rPr lang="en-US" dirty="0">
+                <a:solidFill>
+                  <a:srgbClr val="000000"/>
+                </a:solidFill>
+                <a:latin typeface="Consolas" panose="020B0609020204030204" pitchFamily="49" charset="0"/>
+              </a:rPr>
+              <a:t> </a:t>
+            </a:r>
+            <a:r>
+              <a:rPr lang="en-US" dirty="0">
+                <a:solidFill>
+                  <a:srgbClr val="808080"/>
+                </a:solidFill>
+                <a:latin typeface="Consolas" panose="020B0609020204030204" pitchFamily="49" charset="0"/>
+              </a:rPr>
+              <a:t>=</a:t>
+            </a:r>
+            <a:r>
+              <a:rPr lang="en-US" dirty="0">
+                <a:solidFill>
+                  <a:srgbClr val="000000"/>
+                </a:solidFill>
+                <a:latin typeface="Consolas" panose="020B0609020204030204" pitchFamily="49" charset="0"/>
+              </a:rPr>
+              <a:t> </a:t>
+            </a:r>
+            <a:r>
+              <a:rPr lang="en-US" dirty="0">
+                <a:solidFill>
+                  <a:srgbClr val="FF0000"/>
+                </a:solidFill>
+                <a:latin typeface="Consolas" panose="020B0609020204030204" pitchFamily="49" charset="0"/>
+              </a:rPr>
+              <a:t>'Customer'</a:t>
+            </a:r>
+            <a:r>
+              <a:rPr lang="en-US" dirty="0">
+                <a:solidFill>
+                  <a:srgbClr val="808080"/>
+                </a:solidFill>
+                <a:latin typeface="Consolas" panose="020B0609020204030204" pitchFamily="49" charset="0"/>
+              </a:rPr>
+              <a:t>;</a:t>
+            </a:r>
+            <a:endParaRPr lang="en-US" dirty="0">
+              <a:solidFill>
+                <a:srgbClr val="000000"/>
+              </a:solidFill>
+              <a:latin typeface="Consolas" panose="020B0609020204030204" pitchFamily="49" charset="0"/>
+            </a:endParaRPr>
+          </a:p>
+          <a:p>
+            <a:endParaRPr lang="en-US" dirty="0"/>
+          </a:p>
+        </p:txBody>
+      </p:sp>
+      <p:pic>
+        <p:nvPicPr>
+          <p:cNvPr id="4" name="Picture 3"/>
+          <p:cNvPicPr>
+            <a:picLocks noChangeAspect="1"/>
+          </p:cNvPicPr>
+          <p:nvPr/>
+        </p:nvPicPr>
+        <p:blipFill>
+          <a:blip r:embed="rId2"/>
+          <a:stretch>
+            <a:fillRect/>
+          </a:stretch>
+        </p:blipFill>
+        <p:spPr>
+          <a:xfrm>
+            <a:off x="361038" y="4836319"/>
+            <a:ext cx="10687782" cy="923350"/>
+          </a:xfrm>
+          <a:prstGeom prst="rect">
+            <a:avLst/>
+          </a:prstGeom>
+        </p:spPr>
+      </p:pic>
+    </p:spTree>
+    <p:extLst>
+      <p:ext uri="{BB962C8B-B14F-4D97-AF65-F5344CB8AC3E}">
+        <p14:creationId xmlns:p14="http://schemas.microsoft.com/office/powerpoint/2010/main" val="3710255657"/>
+      </p:ext>
+    </p:extLst>
+  </p:cSld>
+  <p:clrMapOvr>
+    <a:masterClrMapping/>
+  </p:clrMapOvr>
+</p:sld>
+</file>
+
+<file path=ppt/slides/slide15.xml><?xml version="1.0" encoding="utf-8"?>
+<p:sld xmlns:a="http://schemas.openxmlformats.org/drawingml/2006/main" xmlns:r="http://schemas.openxmlformats.org/officeDocument/2006/relationships" xmlns:p="http://schemas.openxmlformats.org/presentationml/2006/main">
+  <p:cSld>
+    <p:spTree>
+      <p:nvGrpSpPr>
+        <p:cNvPr id="1" name=""/>
+        <p:cNvGrpSpPr/>
+        <p:nvPr/>
+      </p:nvGrpSpPr>
+      <p:grpSpPr>
+        <a:xfrm>
+          <a:off x="0" y="0"/>
+          <a:ext cx="0" cy="0"/>
+          <a:chOff x="0" y="0"/>
+          <a:chExt cx="0" cy="0"/>
+        </a:xfrm>
+      </p:grpSpPr>
+      <p:sp>
+        <p:nvSpPr>
+          <p:cNvPr id="2" name="Title 1"/>
+          <p:cNvSpPr>
+            <a:spLocks noGrp="1"/>
+          </p:cNvSpPr>
+          <p:nvPr>
+            <p:ph type="title"/>
+          </p:nvPr>
+        </p:nvSpPr>
+        <p:spPr/>
+        <p:txBody>
+          <a:bodyPr/>
+          <a:lstStyle/>
+          <a:p>
+            <a:r>
+              <a:rPr lang="en-US" dirty="0"/>
               <a:t>Thank You</a:t>
             </a:r>
           </a:p>
@@ -4183,9 +4458,10 @@
           <a:p>
             <a:pPr lvl="1"/>
             <a:r>
-              <a:rPr lang="en-US" dirty="0"/>
-              <a:t>Sample database</a:t>
-            </a:r>
+              <a:rPr lang="en-US"/>
+              <a:t>Sample databases</a:t>
+            </a:r>
+            <a:endParaRPr lang="en-US" dirty="0"/>
           </a:p>
           <a:p>
             <a:pPr lvl="1"/>
@@ -5533,6 +5809,77 @@
       </p:grpSpPr>
       <p:sp>
         <p:nvSpPr>
+          <p:cNvPr id="2" name="Title 1">
+            <a:extLst>
+              <a:ext uri="{FF2B5EF4-FFF2-40B4-BE49-F238E27FC236}">
+                <a16:creationId xmlns:a16="http://schemas.microsoft.com/office/drawing/2014/main" id="{E169A762-FDA9-4320-A910-D0B123182421}"/>
+              </a:ext>
+            </a:extLst>
+          </p:cNvPr>
+          <p:cNvSpPr>
+            <a:spLocks noGrp="1"/>
+          </p:cNvSpPr>
+          <p:nvPr>
+            <p:ph type="title"/>
+          </p:nvPr>
+        </p:nvSpPr>
+        <p:spPr>
+          <a:xfrm>
+            <a:off x="361038" y="2153953"/>
+            <a:ext cx="10800000" cy="2172268"/>
+          </a:xfrm>
+        </p:spPr>
+        <p:txBody>
+          <a:bodyPr/>
+          <a:lstStyle/>
+          <a:p>
+            <a:pPr algn="ctr"/>
+            <a:r>
+              <a:rPr lang="en-US" sz="6000" dirty="0"/>
+              <a:t>Appendix</a:t>
+            </a:r>
+            <a:br>
+              <a:rPr lang="en-US" dirty="0"/>
+            </a:br>
+            <a:r>
+              <a:rPr lang="en-US" dirty="0"/>
+              <a:t>Usage summary</a:t>
+            </a:r>
+          </a:p>
+        </p:txBody>
+      </p:sp>
+    </p:spTree>
+    <p:extLst>
+      <p:ext uri="{BB962C8B-B14F-4D97-AF65-F5344CB8AC3E}">
+        <p14:creationId xmlns:p14="http://schemas.microsoft.com/office/powerpoint/2010/main" val="187260308"/>
+      </p:ext>
+    </p:extLst>
+  </p:cSld>
+  <p:clrMapOvr>
+    <a:masterClrMapping/>
+  </p:clrMapOvr>
+</p:sld>
+</file>
+
+<file path=ppt/slides/slide7.xml><?xml version="1.0" encoding="utf-8"?>
+<p:sld xmlns:a="http://schemas.openxmlformats.org/drawingml/2006/main" xmlns:r="http://schemas.openxmlformats.org/officeDocument/2006/relationships" xmlns:p="http://schemas.openxmlformats.org/presentationml/2006/main">
+  <p:cSld>
+    <p:spTree>
+      <p:nvGrpSpPr>
+        <p:cNvPr id="1" name=""/>
+        <p:cNvGrpSpPr/>
+        <p:nvPr/>
+      </p:nvGrpSpPr>
+      <p:grpSpPr>
+        <a:xfrm>
+          <a:off x="0" y="0"/>
+          <a:ext cx="0" cy="0"/>
+          <a:chOff x="0" y="0"/>
+          <a:chExt cx="0" cy="0"/>
+        </a:xfrm>
+      </p:grpSpPr>
+      <p:sp>
+        <p:nvSpPr>
           <p:cNvPr id="2" name="Title 1"/>
           <p:cNvSpPr>
             <a:spLocks noGrp="1"/>
@@ -5590,7 +5937,7 @@
 </p:sld>
 </file>
 
-<file path=ppt/slides/slide7.xml><?xml version="1.0" encoding="utf-8"?>
+<file path=ppt/slides/slide8.xml><?xml version="1.0" encoding="utf-8"?>
 <p:sld xmlns:a="http://schemas.openxmlformats.org/drawingml/2006/main" xmlns:r="http://schemas.openxmlformats.org/officeDocument/2006/relationships" xmlns:p="http://schemas.openxmlformats.org/presentationml/2006/main">
   <p:cSld>
     <p:spTree>
@@ -6458,523 +6805,6 @@
 </p:sld>
 </file>
 
-<file path=ppt/slides/slide8.xml><?xml version="1.0" encoding="utf-8"?>
-<p:sld xmlns:a="http://schemas.openxmlformats.org/drawingml/2006/main" xmlns:r="http://schemas.openxmlformats.org/officeDocument/2006/relationships" xmlns:p="http://schemas.openxmlformats.org/presentationml/2006/main">
-  <p:cSld>
-    <p:spTree>
-      <p:nvGrpSpPr>
-        <p:cNvPr id="1" name=""/>
-        <p:cNvGrpSpPr/>
-        <p:nvPr/>
-      </p:nvGrpSpPr>
-      <p:grpSpPr>
-        <a:xfrm>
-          <a:off x="0" y="0"/>
-          <a:ext cx="0" cy="0"/>
-          <a:chOff x="0" y="0"/>
-          <a:chExt cx="0" cy="0"/>
-        </a:xfrm>
-      </p:grpSpPr>
-      <p:sp>
-        <p:nvSpPr>
-          <p:cNvPr id="2" name="Title 1"/>
-          <p:cNvSpPr>
-            <a:spLocks noGrp="1"/>
-          </p:cNvSpPr>
-          <p:nvPr>
-            <p:ph type="title"/>
-          </p:nvPr>
-        </p:nvSpPr>
-        <p:spPr/>
-        <p:txBody>
-          <a:bodyPr/>
-          <a:lstStyle/>
-          <a:p>
-            <a:r>
-              <a:rPr lang="en-US" dirty="0"/>
-              <a:t>Summary</a:t>
-            </a:r>
-          </a:p>
-        </p:txBody>
-      </p:sp>
-      <p:sp>
-        <p:nvSpPr>
-          <p:cNvPr id="3" name="Content Placeholder 2"/>
-          <p:cNvSpPr>
-            <a:spLocks noGrp="1"/>
-          </p:cNvSpPr>
-          <p:nvPr>
-            <p:ph idx="1"/>
-          </p:nvPr>
-        </p:nvSpPr>
-        <p:spPr/>
-        <p:txBody>
-          <a:bodyPr/>
-          <a:lstStyle/>
-          <a:p>
-            <a:r>
-              <a:rPr lang="en-US" dirty="0">
-                <a:solidFill>
-                  <a:srgbClr val="0000FF"/>
-                </a:solidFill>
-                <a:highlight>
-                  <a:srgbClr val="FFFFFF"/>
-                </a:highlight>
-                <a:latin typeface="Consolas" panose="020B0609020204030204" pitchFamily="49" charset="0"/>
-              </a:rPr>
-              <a:t>select</a:t>
-            </a:r>
-            <a:r>
-              <a:rPr lang="en-US" dirty="0">
-                <a:solidFill>
-                  <a:srgbClr val="000000"/>
-                </a:solidFill>
-                <a:highlight>
-                  <a:srgbClr val="FFFFFF"/>
-                </a:highlight>
-                <a:latin typeface="Consolas" panose="020B0609020204030204" pitchFamily="49" charset="0"/>
-              </a:rPr>
-              <a:t> </a:t>
-            </a:r>
-          </a:p>
-          <a:p>
-            <a:r>
-              <a:rPr lang="en-US" dirty="0">
-                <a:solidFill>
-                  <a:srgbClr val="000000"/>
-                </a:solidFill>
-                <a:highlight>
-                  <a:srgbClr val="FFFFFF"/>
-                </a:highlight>
-                <a:latin typeface="Consolas" panose="020B0609020204030204" pitchFamily="49" charset="0"/>
-              </a:rPr>
-              <a:t>	</a:t>
-            </a:r>
-            <a:r>
-              <a:rPr lang="en-US" dirty="0">
-                <a:solidFill>
-                  <a:srgbClr val="FF00FF"/>
-                </a:solidFill>
-                <a:highlight>
-                  <a:srgbClr val="FFFFFF"/>
-                </a:highlight>
-                <a:latin typeface="Consolas" panose="020B0609020204030204" pitchFamily="49" charset="0"/>
-              </a:rPr>
-              <a:t>cast</a:t>
-            </a:r>
-            <a:r>
-              <a:rPr lang="en-US" dirty="0">
-                <a:solidFill>
-                  <a:srgbClr val="808080"/>
-                </a:solidFill>
-                <a:highlight>
-                  <a:srgbClr val="FFFFFF"/>
-                </a:highlight>
-                <a:latin typeface="Consolas" panose="020B0609020204030204" pitchFamily="49" charset="0"/>
-              </a:rPr>
-              <a:t>(</a:t>
-            </a:r>
-            <a:r>
-              <a:rPr lang="en-US" dirty="0">
-                <a:solidFill>
-                  <a:srgbClr val="FF0000"/>
-                </a:solidFill>
-                <a:highlight>
-                  <a:srgbClr val="FFFFFF"/>
-                </a:highlight>
-                <a:latin typeface="Consolas" panose="020B0609020204030204" pitchFamily="49" charset="0"/>
-              </a:rPr>
-              <a:t>'2017-06-10 10:10:00'</a:t>
-            </a:r>
-            <a:r>
-              <a:rPr lang="en-US" dirty="0">
-                <a:solidFill>
-                  <a:srgbClr val="000000"/>
-                </a:solidFill>
-                <a:highlight>
-                  <a:srgbClr val="FFFFFF"/>
-                </a:highlight>
-                <a:latin typeface="Consolas" panose="020B0609020204030204" pitchFamily="49" charset="0"/>
-              </a:rPr>
-              <a:t> </a:t>
-            </a:r>
-            <a:r>
-              <a:rPr lang="en-US" dirty="0">
-                <a:solidFill>
-                  <a:srgbClr val="0000FF"/>
-                </a:solidFill>
-                <a:highlight>
-                  <a:srgbClr val="FFFFFF"/>
-                </a:highlight>
-                <a:latin typeface="Consolas" panose="020B0609020204030204" pitchFamily="49" charset="0"/>
-              </a:rPr>
-              <a:t>as</a:t>
-            </a:r>
-            <a:r>
-              <a:rPr lang="en-US" dirty="0">
-                <a:solidFill>
-                  <a:srgbClr val="000000"/>
-                </a:solidFill>
-                <a:highlight>
-                  <a:srgbClr val="FFFFFF"/>
-                </a:highlight>
-                <a:latin typeface="Consolas" panose="020B0609020204030204" pitchFamily="49" charset="0"/>
-              </a:rPr>
-              <a:t> </a:t>
-            </a:r>
-            <a:r>
-              <a:rPr lang="en-US" dirty="0">
-                <a:solidFill>
-                  <a:srgbClr val="0000FF"/>
-                </a:solidFill>
-                <a:highlight>
-                  <a:srgbClr val="FFFFFF"/>
-                </a:highlight>
-                <a:latin typeface="Consolas" panose="020B0609020204030204" pitchFamily="49" charset="0"/>
-              </a:rPr>
-              <a:t>datetime2</a:t>
-            </a:r>
-            <a:r>
-              <a:rPr lang="en-US" dirty="0">
-                <a:solidFill>
-                  <a:srgbClr val="808080"/>
-                </a:solidFill>
-                <a:highlight>
-                  <a:srgbClr val="FFFFFF"/>
-                </a:highlight>
-                <a:latin typeface="Consolas" panose="020B0609020204030204" pitchFamily="49" charset="0"/>
-              </a:rPr>
-              <a:t>)</a:t>
-            </a:r>
-            <a:endParaRPr lang="en-US" dirty="0">
-              <a:solidFill>
-                <a:srgbClr val="FF0000"/>
-              </a:solidFill>
-              <a:highlight>
-                <a:srgbClr val="FFFFFF"/>
-              </a:highlight>
-              <a:latin typeface="Consolas" panose="020B0609020204030204" pitchFamily="49" charset="0"/>
-            </a:endParaRPr>
-          </a:p>
-          <a:p>
-            <a:r>
-              <a:rPr lang="en-US" dirty="0">
-                <a:solidFill>
-                  <a:srgbClr val="FF0000"/>
-                </a:solidFill>
-                <a:highlight>
-                  <a:srgbClr val="FFFFFF"/>
-                </a:highlight>
-                <a:latin typeface="Consolas" panose="020B0609020204030204" pitchFamily="49" charset="0"/>
-              </a:rPr>
-              <a:t>	</a:t>
-            </a:r>
-            <a:r>
-              <a:rPr lang="en-US" dirty="0">
-                <a:solidFill>
-                  <a:srgbClr val="0000FF"/>
-                </a:solidFill>
-                <a:highlight>
-                  <a:srgbClr val="FFFFFF"/>
-                </a:highlight>
-                <a:latin typeface="Consolas" panose="020B0609020204030204" pitchFamily="49" charset="0"/>
-              </a:rPr>
-              <a:t>at</a:t>
-            </a:r>
-            <a:r>
-              <a:rPr lang="en-US" dirty="0">
-                <a:solidFill>
-                  <a:srgbClr val="000000"/>
-                </a:solidFill>
-                <a:highlight>
-                  <a:srgbClr val="FFFFFF"/>
-                </a:highlight>
-                <a:latin typeface="Consolas" panose="020B0609020204030204" pitchFamily="49" charset="0"/>
-              </a:rPr>
-              <a:t> </a:t>
-            </a:r>
-            <a:r>
-              <a:rPr lang="en-US" dirty="0">
-                <a:solidFill>
-                  <a:srgbClr val="0000FF"/>
-                </a:solidFill>
-                <a:highlight>
-                  <a:srgbClr val="FFFFFF"/>
-                </a:highlight>
-                <a:latin typeface="Consolas" panose="020B0609020204030204" pitchFamily="49" charset="0"/>
-              </a:rPr>
-              <a:t>time</a:t>
-            </a:r>
-            <a:r>
-              <a:rPr lang="en-US" dirty="0">
-                <a:solidFill>
-                  <a:srgbClr val="000000"/>
-                </a:solidFill>
-                <a:highlight>
-                  <a:srgbClr val="FFFFFF"/>
-                </a:highlight>
-                <a:latin typeface="Consolas" panose="020B0609020204030204" pitchFamily="49" charset="0"/>
-              </a:rPr>
-              <a:t> </a:t>
-            </a:r>
-            <a:r>
-              <a:rPr lang="en-US" dirty="0">
-                <a:solidFill>
-                  <a:srgbClr val="0000FF"/>
-                </a:solidFill>
-                <a:highlight>
-                  <a:srgbClr val="FFFFFF"/>
-                </a:highlight>
-                <a:latin typeface="Consolas" panose="020B0609020204030204" pitchFamily="49" charset="0"/>
-              </a:rPr>
-              <a:t>zone</a:t>
-            </a:r>
-            <a:r>
-              <a:rPr lang="en-US" dirty="0">
-                <a:solidFill>
-                  <a:srgbClr val="000000"/>
-                </a:solidFill>
-                <a:highlight>
-                  <a:srgbClr val="FFFFFF"/>
-                </a:highlight>
-                <a:latin typeface="Consolas" panose="020B0609020204030204" pitchFamily="49" charset="0"/>
-              </a:rPr>
-              <a:t> </a:t>
-            </a:r>
-            <a:r>
-              <a:rPr lang="en-US" dirty="0">
-                <a:solidFill>
-                  <a:srgbClr val="FF0000"/>
-                </a:solidFill>
-                <a:highlight>
-                  <a:srgbClr val="FFFFFF"/>
-                </a:highlight>
-                <a:latin typeface="Consolas" panose="020B0609020204030204" pitchFamily="49" charset="0"/>
-              </a:rPr>
-              <a:t>'Central Standard Time' 	</a:t>
-            </a:r>
-            <a:r>
-              <a:rPr lang="en-US" dirty="0">
-                <a:solidFill>
-                  <a:srgbClr val="0000FF"/>
-                </a:solidFill>
-                <a:highlight>
-                  <a:srgbClr val="FFFFFF"/>
-                </a:highlight>
-                <a:latin typeface="Consolas" panose="020B0609020204030204" pitchFamily="49" charset="0"/>
-              </a:rPr>
-              <a:t>at</a:t>
-            </a:r>
-            <a:r>
-              <a:rPr lang="en-US" dirty="0">
-                <a:solidFill>
-                  <a:srgbClr val="000000"/>
-                </a:solidFill>
-                <a:highlight>
-                  <a:srgbClr val="FFFFFF"/>
-                </a:highlight>
-                <a:latin typeface="Consolas" panose="020B0609020204030204" pitchFamily="49" charset="0"/>
-              </a:rPr>
-              <a:t> </a:t>
-            </a:r>
-            <a:r>
-              <a:rPr lang="en-US" dirty="0">
-                <a:solidFill>
-                  <a:srgbClr val="0000FF"/>
-                </a:solidFill>
-                <a:highlight>
-                  <a:srgbClr val="FFFFFF"/>
-                </a:highlight>
-                <a:latin typeface="Consolas" panose="020B0609020204030204" pitchFamily="49" charset="0"/>
-              </a:rPr>
-              <a:t>time</a:t>
-            </a:r>
-            <a:r>
-              <a:rPr lang="en-US" dirty="0">
-                <a:solidFill>
-                  <a:srgbClr val="000000"/>
-                </a:solidFill>
-                <a:highlight>
-                  <a:srgbClr val="FFFFFF"/>
-                </a:highlight>
-                <a:latin typeface="Consolas" panose="020B0609020204030204" pitchFamily="49" charset="0"/>
-              </a:rPr>
-              <a:t> </a:t>
-            </a:r>
-            <a:r>
-              <a:rPr lang="en-US" dirty="0">
-                <a:solidFill>
-                  <a:srgbClr val="0000FF"/>
-                </a:solidFill>
-                <a:highlight>
-                  <a:srgbClr val="FFFFFF"/>
-                </a:highlight>
-                <a:latin typeface="Consolas" panose="020B0609020204030204" pitchFamily="49" charset="0"/>
-              </a:rPr>
-              <a:t>zone</a:t>
-            </a:r>
-            <a:r>
-              <a:rPr lang="en-US" dirty="0">
-                <a:solidFill>
-                  <a:srgbClr val="000000"/>
-                </a:solidFill>
-                <a:highlight>
-                  <a:srgbClr val="FFFFFF"/>
-                </a:highlight>
-                <a:latin typeface="Consolas" panose="020B0609020204030204" pitchFamily="49" charset="0"/>
-              </a:rPr>
-              <a:t> </a:t>
-            </a:r>
-            <a:r>
-              <a:rPr lang="en-US">
-                <a:solidFill>
-                  <a:srgbClr val="FF0000"/>
-                </a:solidFill>
-                <a:highlight>
-                  <a:srgbClr val="FFFFFF"/>
-                </a:highlight>
-                <a:latin typeface="Consolas" panose="020B0609020204030204" pitchFamily="49" charset="0"/>
-              </a:rPr>
-              <a:t>'UTC'</a:t>
-            </a:r>
-            <a:r>
-              <a:rPr lang="en-US">
-                <a:solidFill>
-                  <a:srgbClr val="808080"/>
-                </a:solidFill>
-                <a:highlight>
-                  <a:srgbClr val="FFFFFF"/>
-                </a:highlight>
-                <a:latin typeface="Consolas" panose="020B0609020204030204" pitchFamily="49" charset="0"/>
-              </a:rPr>
-              <a:t>;</a:t>
-            </a:r>
-          </a:p>
-          <a:p>
-            <a:endParaRPr lang="en-US" dirty="0">
-              <a:solidFill>
-                <a:srgbClr val="808080"/>
-              </a:solidFill>
-              <a:highlight>
-                <a:srgbClr val="FFFFFF"/>
-              </a:highlight>
-              <a:latin typeface="Consolas" panose="020B0609020204030204" pitchFamily="49" charset="0"/>
-            </a:endParaRPr>
-          </a:p>
-          <a:p>
-            <a:r>
-              <a:rPr lang="en-US" dirty="0">
-                <a:solidFill>
-                  <a:srgbClr val="0000FF"/>
-                </a:solidFill>
-                <a:highlight>
-                  <a:srgbClr val="FFFFFF"/>
-                </a:highlight>
-                <a:latin typeface="Consolas" panose="020B0609020204030204" pitchFamily="49" charset="0"/>
-              </a:rPr>
-              <a:t>select</a:t>
-            </a:r>
-            <a:r>
-              <a:rPr lang="en-US" dirty="0">
-                <a:solidFill>
-                  <a:srgbClr val="000000"/>
-                </a:solidFill>
-                <a:highlight>
-                  <a:srgbClr val="FFFFFF"/>
-                </a:highlight>
-                <a:latin typeface="Consolas" panose="020B0609020204030204" pitchFamily="49" charset="0"/>
-              </a:rPr>
-              <a:t> </a:t>
-            </a:r>
-            <a:r>
-              <a:rPr lang="en-US" dirty="0">
-                <a:solidFill>
-                  <a:srgbClr val="808080"/>
-                </a:solidFill>
-                <a:highlight>
-                  <a:srgbClr val="FFFFFF"/>
-                </a:highlight>
-                <a:latin typeface="Consolas" panose="020B0609020204030204" pitchFamily="49" charset="0"/>
-              </a:rPr>
-              <a:t>*</a:t>
-            </a:r>
-            <a:r>
-              <a:rPr lang="en-US" dirty="0">
-                <a:solidFill>
-                  <a:srgbClr val="000000"/>
-                </a:solidFill>
-                <a:highlight>
-                  <a:srgbClr val="FFFFFF"/>
-                </a:highlight>
-                <a:latin typeface="Consolas" panose="020B0609020204030204" pitchFamily="49" charset="0"/>
-              </a:rPr>
-              <a:t> </a:t>
-            </a:r>
-            <a:r>
-              <a:rPr lang="en-US" dirty="0">
-                <a:solidFill>
-                  <a:srgbClr val="0000FF"/>
-                </a:solidFill>
-                <a:highlight>
-                  <a:srgbClr val="FFFFFF"/>
-                </a:highlight>
-                <a:latin typeface="Consolas" panose="020B0609020204030204" pitchFamily="49" charset="0"/>
-              </a:rPr>
-              <a:t>from</a:t>
-            </a:r>
-            <a:r>
-              <a:rPr lang="en-US" dirty="0">
-                <a:solidFill>
-                  <a:srgbClr val="000000"/>
-                </a:solidFill>
-                <a:highlight>
-                  <a:srgbClr val="FFFFFF"/>
-                </a:highlight>
-                <a:latin typeface="Consolas" panose="020B0609020204030204" pitchFamily="49" charset="0"/>
-              </a:rPr>
-              <a:t> </a:t>
-            </a:r>
-            <a:r>
-              <a:rPr lang="en-US" dirty="0" err="1">
-                <a:solidFill>
-                  <a:srgbClr val="00B050"/>
-                </a:solidFill>
-                <a:highlight>
-                  <a:srgbClr val="FFFFFF"/>
-                </a:highlight>
-                <a:latin typeface="Consolas" panose="020B0609020204030204" pitchFamily="49" charset="0"/>
-              </a:rPr>
-              <a:t>sys.time_zone_info</a:t>
-            </a:r>
-            <a:r>
-              <a:rPr lang="en-US" dirty="0">
-                <a:solidFill>
-                  <a:srgbClr val="808080"/>
-                </a:solidFill>
-                <a:highlight>
-                  <a:srgbClr val="FFFFFF"/>
-                </a:highlight>
-                <a:latin typeface="Consolas" panose="020B0609020204030204" pitchFamily="49" charset="0"/>
-              </a:rPr>
-              <a:t>;</a:t>
-            </a:r>
-            <a:endParaRPr lang="en-US" dirty="0"/>
-          </a:p>
-        </p:txBody>
-      </p:sp>
-    </p:spTree>
-    <p:extLst>
-      <p:ext uri="{BB962C8B-B14F-4D97-AF65-F5344CB8AC3E}">
-        <p14:creationId xmlns:p14="http://schemas.microsoft.com/office/powerpoint/2010/main" val="4235235981"/>
-      </p:ext>
-    </p:extLst>
-  </p:cSld>
-  <p:clrMapOvr>
-    <a:masterClrMapping/>
-  </p:clrMapOvr>
-</p:sld>
-</file>
-
 <file path=ppt/slides/slide9.xml><?xml version="1.0" encoding="utf-8"?>
 <p:sld xmlns:a="http://schemas.openxmlformats.org/drawingml/2006/main" xmlns:r="http://schemas.openxmlformats.org/officeDocument/2006/relationships" xmlns:p="http://schemas.openxmlformats.org/presentationml/2006/main">
   <p:cSld>
@@ -7029,209 +6859,452 @@
           <a:bodyPr/>
           <a:lstStyle/>
           <a:p>
-            <a:pPr marL="571500" indent="-571500">
-              <a:buFont typeface="Arial" panose="020B0604020202020204" pitchFamily="34" charset="0"/>
-              <a:buChar char="•"/>
-            </a:pPr>
-            <a:r>
-              <a:rPr lang="en-US" dirty="0"/>
-              <a:t>New catalog objects</a:t>
-            </a:r>
-          </a:p>
-          <a:p>
-            <a:pPr marL="1147527" lvl="1" indent="-571500">
-              <a:buFont typeface="Arial" panose="020B0604020202020204" pitchFamily="34" charset="0"/>
-              <a:buChar char="•"/>
-            </a:pPr>
-            <a:r>
-              <a:rPr lang="en-US" dirty="0" err="1"/>
-              <a:t>sys.</a:t>
+            <a:r>
+              <a:rPr lang="en-US" dirty="0">
+                <a:solidFill>
+                  <a:srgbClr val="0000FF"/>
+                </a:solidFill>
+                <a:highlight>
+                  <a:srgbClr val="FFFFFF"/>
+                </a:highlight>
+                <a:latin typeface="Consolas" panose="020B0609020204030204" pitchFamily="49" charset="0"/>
+              </a:rPr>
+              <a:t>select</a:t>
+            </a:r>
+            <a:r>
+              <a:rPr lang="en-US" dirty="0">
+                <a:solidFill>
+                  <a:srgbClr val="000000"/>
+                </a:solidFill>
+                <a:highlight>
+                  <a:srgbClr val="FFFFFF"/>
+                </a:highlight>
+                <a:latin typeface="Consolas" panose="020B0609020204030204" pitchFamily="49" charset="0"/>
+              </a:rPr>
+              <a:t> </a:t>
+            </a:r>
+          </a:p>
+          <a:p>
+            <a:r>
+              <a:rPr lang="en-US" dirty="0">
+                <a:solidFill>
+                  <a:srgbClr val="000000"/>
+                </a:solidFill>
+                <a:highlight>
+                  <a:srgbClr val="FFFFFF"/>
+                </a:highlight>
+                <a:latin typeface="Consolas" panose="020B0609020204030204" pitchFamily="49" charset="0"/>
+              </a:rPr>
+              <a:t>	</a:t>
+            </a:r>
+            <a:r>
+              <a:rPr lang="en-US" dirty="0">
+                <a:solidFill>
+                  <a:srgbClr val="FF00FF"/>
+                </a:solidFill>
+                <a:highlight>
+                  <a:srgbClr val="FFFFFF"/>
+                </a:highlight>
+                <a:latin typeface="Consolas" panose="020B0609020204030204" pitchFamily="49" charset="0"/>
+              </a:rPr>
+              <a:t>cast</a:t>
+            </a:r>
+            <a:r>
+              <a:rPr lang="en-US" dirty="0">
+                <a:solidFill>
+                  <a:srgbClr val="808080"/>
+                </a:solidFill>
+                <a:highlight>
+                  <a:srgbClr val="FFFFFF"/>
+                </a:highlight>
+                <a:latin typeface="Consolas" panose="020B0609020204030204" pitchFamily="49" charset="0"/>
+              </a:rPr>
+              <a:t>(</a:t>
+            </a:r>
+            <a:r>
+              <a:rPr lang="en-US" dirty="0">
+                <a:solidFill>
+                  <a:srgbClr val="FF0000"/>
+                </a:solidFill>
+                <a:highlight>
+                  <a:srgbClr val="FFFFFF"/>
+                </a:highlight>
+                <a:latin typeface="Consolas" panose="020B0609020204030204" pitchFamily="49" charset="0"/>
+              </a:rPr>
+              <a:t>'2017-06-10 10:10:00'</a:t>
+            </a:r>
+            <a:r>
+              <a:rPr lang="en-US" dirty="0">
+                <a:solidFill>
+                  <a:srgbClr val="000000"/>
+                </a:solidFill>
+                <a:highlight>
+                  <a:srgbClr val="FFFFFF"/>
+                </a:highlight>
+                <a:latin typeface="Consolas" panose="020B0609020204030204" pitchFamily="49" charset="0"/>
+              </a:rPr>
+              <a:t> </a:t>
+            </a:r>
+            <a:r>
+              <a:rPr lang="en-US" dirty="0">
+                <a:solidFill>
+                  <a:srgbClr val="0000FF"/>
+                </a:solidFill>
+                <a:highlight>
+                  <a:srgbClr val="FFFFFF"/>
+                </a:highlight>
+                <a:latin typeface="Consolas" panose="020B0609020204030204" pitchFamily="49" charset="0"/>
+              </a:rPr>
+              <a:t>as</a:t>
+            </a:r>
+            <a:r>
+              <a:rPr lang="en-US" dirty="0">
+                <a:solidFill>
+                  <a:srgbClr val="000000"/>
+                </a:solidFill>
+                <a:highlight>
+                  <a:srgbClr val="FFFFFF"/>
+                </a:highlight>
+                <a:latin typeface="Consolas" panose="020B0609020204030204" pitchFamily="49" charset="0"/>
+              </a:rPr>
+              <a:t> </a:t>
+            </a:r>
+            <a:r>
+              <a:rPr lang="en-US" dirty="0">
+                <a:solidFill>
+                  <a:srgbClr val="0000FF"/>
+                </a:solidFill>
+                <a:highlight>
+                  <a:srgbClr val="FFFFFF"/>
+                </a:highlight>
+                <a:latin typeface="Consolas" panose="020B0609020204030204" pitchFamily="49" charset="0"/>
+              </a:rPr>
+              <a:t>datetime2</a:t>
+            </a:r>
+            <a:r>
+              <a:rPr lang="en-US" dirty="0">
+                <a:solidFill>
+                  <a:srgbClr val="808080"/>
+                </a:solidFill>
+                <a:highlight>
+                  <a:srgbClr val="FFFFFF"/>
+                </a:highlight>
+                <a:latin typeface="Consolas" panose="020B0609020204030204" pitchFamily="49" charset="0"/>
+              </a:rPr>
+              <a:t>)</a:t>
+            </a:r>
+            <a:endParaRPr lang="en-US" dirty="0">
+              <a:solidFill>
+                <a:srgbClr val="FF0000"/>
+              </a:solidFill>
+              <a:highlight>
+                <a:srgbClr val="FFFFFF"/>
+              </a:highlight>
+              <a:latin typeface="Consolas" panose="020B0609020204030204" pitchFamily="49" charset="0"/>
+            </a:endParaRPr>
+          </a:p>
+          <a:p>
+            <a:r>
+              <a:rPr lang="en-US" dirty="0">
+                <a:solidFill>
+                  <a:srgbClr val="FF0000"/>
+                </a:solidFill>
+                <a:highlight>
+                  <a:srgbClr val="FFFFFF"/>
+                </a:highlight>
+                <a:latin typeface="Consolas" panose="020B0609020204030204" pitchFamily="49" charset="0"/>
+              </a:rPr>
+              <a:t>	</a:t>
+            </a:r>
+            <a:r>
+              <a:rPr lang="en-US" dirty="0">
+                <a:solidFill>
+                  <a:srgbClr val="0000FF"/>
+                </a:solidFill>
+                <a:highlight>
+                  <a:srgbClr val="FFFFFF"/>
+                </a:highlight>
+                <a:latin typeface="Consolas" panose="020B0609020204030204" pitchFamily="49" charset="0"/>
+              </a:rPr>
+              <a:t>at</a:t>
+            </a:r>
+            <a:r>
+              <a:rPr lang="en-US" dirty="0">
+                <a:solidFill>
+                  <a:srgbClr val="000000"/>
+                </a:solidFill>
+                <a:highlight>
+                  <a:srgbClr val="FFFFFF"/>
+                </a:highlight>
+                <a:latin typeface="Consolas" panose="020B0609020204030204" pitchFamily="49" charset="0"/>
+              </a:rPr>
+              <a:t> </a:t>
+            </a:r>
+            <a:r>
+              <a:rPr lang="en-US" dirty="0">
+                <a:solidFill>
+                  <a:srgbClr val="0000FF"/>
+                </a:solidFill>
+                <a:highlight>
+                  <a:srgbClr val="FFFFFF"/>
+                </a:highlight>
+                <a:latin typeface="Consolas" panose="020B0609020204030204" pitchFamily="49" charset="0"/>
+              </a:rPr>
+              <a:t>time</a:t>
+            </a:r>
+            <a:r>
+              <a:rPr lang="en-US" dirty="0">
+                <a:solidFill>
+                  <a:srgbClr val="000000"/>
+                </a:solidFill>
+                <a:highlight>
+                  <a:srgbClr val="FFFFFF"/>
+                </a:highlight>
+                <a:latin typeface="Consolas" panose="020B0609020204030204" pitchFamily="49" charset="0"/>
+              </a:rPr>
+              <a:t> </a:t>
+            </a:r>
+            <a:r>
+              <a:rPr lang="en-US" dirty="0">
+                <a:solidFill>
+                  <a:srgbClr val="0000FF"/>
+                </a:solidFill>
+                <a:highlight>
+                  <a:srgbClr val="FFFFFF"/>
+                </a:highlight>
+                <a:latin typeface="Consolas" panose="020B0609020204030204" pitchFamily="49" charset="0"/>
+              </a:rPr>
+              <a:t>zone</a:t>
+            </a:r>
+            <a:r>
+              <a:rPr lang="en-US" dirty="0">
+                <a:solidFill>
+                  <a:srgbClr val="000000"/>
+                </a:solidFill>
+                <a:highlight>
+                  <a:srgbClr val="FFFFFF"/>
+                </a:highlight>
+                <a:latin typeface="Consolas" panose="020B0609020204030204" pitchFamily="49" charset="0"/>
+              </a:rPr>
+              <a:t> </a:t>
+            </a:r>
+            <a:r>
+              <a:rPr lang="en-US" dirty="0">
+                <a:solidFill>
+                  <a:srgbClr val="FF0000"/>
+                </a:solidFill>
+                <a:highlight>
+                  <a:srgbClr val="FFFFFF"/>
+                </a:highlight>
+                <a:latin typeface="Consolas" panose="020B0609020204030204" pitchFamily="49" charset="0"/>
+              </a:rPr>
+              <a:t>'Central Standard Time' 	</a:t>
+            </a:r>
+            <a:r>
+              <a:rPr lang="en-US" dirty="0">
+                <a:solidFill>
+                  <a:srgbClr val="0000FF"/>
+                </a:solidFill>
+                <a:highlight>
+                  <a:srgbClr val="FFFFFF"/>
+                </a:highlight>
+                <a:latin typeface="Consolas" panose="020B0609020204030204" pitchFamily="49" charset="0"/>
+              </a:rPr>
+              <a:t>at</a:t>
+            </a:r>
+            <a:r>
+              <a:rPr lang="en-US" dirty="0">
+                <a:solidFill>
+                  <a:srgbClr val="000000"/>
+                </a:solidFill>
+                <a:highlight>
+                  <a:srgbClr val="FFFFFF"/>
+                </a:highlight>
+                <a:latin typeface="Consolas" panose="020B0609020204030204" pitchFamily="49" charset="0"/>
+              </a:rPr>
+              <a:t> </a:t>
+            </a:r>
+            <a:r>
+              <a:rPr lang="en-US" dirty="0">
+                <a:solidFill>
+                  <a:srgbClr val="0000FF"/>
+                </a:solidFill>
+                <a:highlight>
+                  <a:srgbClr val="FFFFFF"/>
+                </a:highlight>
+                <a:latin typeface="Consolas" panose="020B0609020204030204" pitchFamily="49" charset="0"/>
+              </a:rPr>
+              <a:t>time</a:t>
+            </a:r>
+            <a:r>
+              <a:rPr lang="en-US" dirty="0">
+                <a:solidFill>
+                  <a:srgbClr val="000000"/>
+                </a:solidFill>
+                <a:highlight>
+                  <a:srgbClr val="FFFFFF"/>
+                </a:highlight>
+                <a:latin typeface="Consolas" panose="020B0609020204030204" pitchFamily="49" charset="0"/>
+              </a:rPr>
+              <a:t> </a:t>
+            </a:r>
+            <a:r>
+              <a:rPr lang="en-US" dirty="0">
+                <a:solidFill>
+                  <a:srgbClr val="0000FF"/>
+                </a:solidFill>
+                <a:highlight>
+                  <a:srgbClr val="FFFFFF"/>
+                </a:highlight>
+                <a:latin typeface="Consolas" panose="020B0609020204030204" pitchFamily="49" charset="0"/>
+              </a:rPr>
+              <a:t>zone</a:t>
+            </a:r>
+            <a:r>
+              <a:rPr lang="en-US" dirty="0">
+                <a:solidFill>
+                  <a:srgbClr val="000000"/>
+                </a:solidFill>
+                <a:highlight>
+                  <a:srgbClr val="FFFFFF"/>
+                </a:highlight>
+                <a:latin typeface="Consolas" panose="020B0609020204030204" pitchFamily="49" charset="0"/>
+              </a:rPr>
+              <a:t> </a:t>
+            </a:r>
+            <a:r>
+              <a:rPr lang="en-US">
+                <a:solidFill>
+                  <a:srgbClr val="FF0000"/>
+                </a:solidFill>
+                <a:highlight>
+                  <a:srgbClr val="FFFFFF"/>
+                </a:highlight>
+                <a:latin typeface="Consolas" panose="020B0609020204030204" pitchFamily="49" charset="0"/>
+              </a:rPr>
+              <a:t>'UTC'</a:t>
+            </a:r>
+            <a:r>
+              <a:rPr lang="en-US">
+                <a:solidFill>
+                  <a:srgbClr val="808080"/>
+                </a:solidFill>
+                <a:highlight>
+                  <a:srgbClr val="FFFFFF"/>
+                </a:highlight>
+                <a:latin typeface="Consolas" panose="020B0609020204030204" pitchFamily="49" charset="0"/>
+              </a:rPr>
+              <a:t>;</a:t>
+            </a:r>
+          </a:p>
+          <a:p>
+            <a:endParaRPr lang="en-US" dirty="0">
+              <a:solidFill>
+                <a:srgbClr val="808080"/>
+              </a:solidFill>
+              <a:highlight>
+                <a:srgbClr val="FFFFFF"/>
+              </a:highlight>
+              <a:latin typeface="Consolas" panose="020B0609020204030204" pitchFamily="49" charset="0"/>
+            </a:endParaRPr>
+          </a:p>
+          <a:p>
+            <a:r>
+              <a:rPr lang="en-US" dirty="0">
+                <a:solidFill>
+                  <a:srgbClr val="0000FF"/>
+                </a:solidFill>
+                <a:highlight>
+                  <a:srgbClr val="FFFFFF"/>
+                </a:highlight>
+                <a:latin typeface="Consolas" panose="020B0609020204030204" pitchFamily="49" charset="0"/>
+              </a:rPr>
+              <a:t>select</a:t>
+            </a:r>
+            <a:r>
+              <a:rPr lang="en-US" dirty="0">
+                <a:solidFill>
+                  <a:srgbClr val="000000"/>
+                </a:solidFill>
+                <a:highlight>
+                  <a:srgbClr val="FFFFFF"/>
+                </a:highlight>
+                <a:latin typeface="Consolas" panose="020B0609020204030204" pitchFamily="49" charset="0"/>
+              </a:rPr>
+              <a:t> </a:t>
+            </a:r>
+            <a:r>
+              <a:rPr lang="en-US" dirty="0">
+                <a:solidFill>
+                  <a:srgbClr val="808080"/>
+                </a:solidFill>
+                <a:highlight>
+                  <a:srgbClr val="FFFFFF"/>
+                </a:highlight>
+                <a:latin typeface="Consolas" panose="020B0609020204030204" pitchFamily="49" charset="0"/>
+              </a:rPr>
+              <a:t>*</a:t>
+            </a:r>
+            <a:r>
+              <a:rPr lang="en-US" dirty="0">
+                <a:solidFill>
+                  <a:srgbClr val="000000"/>
+                </a:solidFill>
+                <a:highlight>
+                  <a:srgbClr val="FFFFFF"/>
+                </a:highlight>
+                <a:latin typeface="Consolas" panose="020B0609020204030204" pitchFamily="49" charset="0"/>
+              </a:rPr>
+              <a:t> </a:t>
+            </a:r>
+            <a:r>
+              <a:rPr lang="en-US" dirty="0">
+                <a:solidFill>
+                  <a:srgbClr val="0000FF"/>
+                </a:solidFill>
+                <a:highlight>
+                  <a:srgbClr val="FFFFFF"/>
+                </a:highlight>
+                <a:latin typeface="Consolas" panose="020B0609020204030204" pitchFamily="49" charset="0"/>
+              </a:rPr>
+              <a:t>from</a:t>
+            </a:r>
+            <a:r>
+              <a:rPr lang="en-US" dirty="0">
+                <a:solidFill>
+                  <a:srgbClr val="000000"/>
+                </a:solidFill>
+                <a:highlight>
+                  <a:srgbClr val="FFFFFF"/>
+                </a:highlight>
+                <a:latin typeface="Consolas" panose="020B0609020204030204" pitchFamily="49" charset="0"/>
+              </a:rPr>
+              <a:t> </a:t>
             </a:r>
             <a:r>
               <a:rPr lang="en-US" dirty="0" err="1">
                 <a:solidFill>
-                  <a:srgbClr val="0070C0"/>
-                </a:solidFill>
-              </a:rPr>
-              <a:t>periods</a:t>
-            </a:r>
-            <a:r>
-              <a:rPr lang="en-US" dirty="0"/>
-              <a:t> (view)</a:t>
-            </a:r>
-          </a:p>
-          <a:p>
-            <a:pPr marL="1147527" lvl="1" indent="-571500">
-              <a:buFont typeface="Arial" panose="020B0604020202020204" pitchFamily="34" charset="0"/>
-              <a:buChar char="•"/>
-            </a:pPr>
-            <a:r>
-              <a:rPr lang="en-US" dirty="0" err="1"/>
-              <a:t>sys.</a:t>
-            </a:r>
-            <a:r>
-              <a:rPr lang="en-US" dirty="0" err="1">
-                <a:solidFill>
-                  <a:srgbClr val="0070C0"/>
-                </a:solidFill>
-              </a:rPr>
-              <a:t>tables</a:t>
-            </a:r>
-            <a:r>
-              <a:rPr lang="en-US" dirty="0" err="1"/>
-              <a:t>.</a:t>
-            </a:r>
-            <a:r>
-              <a:rPr lang="en-US" dirty="0" err="1">
-                <a:solidFill>
                   <a:srgbClr val="00B050"/>
                 </a:solidFill>
-              </a:rPr>
-              <a:t>temporal_type</a:t>
-            </a:r>
-            <a:r>
-              <a:rPr lang="en-US" dirty="0"/>
-              <a:t> (column)</a:t>
-            </a:r>
-          </a:p>
-          <a:p>
-            <a:pPr marL="1147527" lvl="1" indent="-571500">
-              <a:buFont typeface="Arial" panose="020B0604020202020204" pitchFamily="34" charset="0"/>
-              <a:buChar char="•"/>
-            </a:pPr>
-            <a:r>
-              <a:rPr lang="en-US" dirty="0" err="1"/>
-              <a:t>sys.</a:t>
-            </a:r>
-            <a:r>
-              <a:rPr lang="en-US" dirty="0" err="1">
-                <a:solidFill>
-                  <a:srgbClr val="0070C0"/>
-                </a:solidFill>
-              </a:rPr>
-              <a:t>tables</a:t>
-            </a:r>
-            <a:r>
-              <a:rPr lang="en-US" dirty="0" err="1"/>
-              <a:t>.</a:t>
-            </a:r>
-            <a:r>
-              <a:rPr lang="en-US" dirty="0" err="1">
-                <a:solidFill>
-                  <a:srgbClr val="00B050"/>
-                </a:solidFill>
-              </a:rPr>
-              <a:t>temporal_type_desc</a:t>
-            </a:r>
-            <a:r>
-              <a:rPr lang="en-US" dirty="0"/>
-              <a:t> (column)</a:t>
-            </a:r>
-          </a:p>
-          <a:p>
-            <a:pPr marL="1147527" lvl="1" indent="-571500">
-              <a:buFont typeface="Arial" panose="020B0604020202020204" pitchFamily="34" charset="0"/>
-              <a:buChar char="•"/>
-            </a:pPr>
-            <a:r>
-              <a:rPr lang="en-US" dirty="0" err="1"/>
-              <a:t>sys.</a:t>
-            </a:r>
-            <a:r>
-              <a:rPr lang="en-US" dirty="0" err="1">
-                <a:solidFill>
-                  <a:srgbClr val="0070C0"/>
-                </a:solidFill>
-              </a:rPr>
-              <a:t>tables</a:t>
-            </a:r>
-            <a:r>
-              <a:rPr lang="en-US" dirty="0" err="1"/>
-              <a:t>.</a:t>
-            </a:r>
-            <a:r>
-              <a:rPr lang="en-US" dirty="0" err="1">
-                <a:solidFill>
-                  <a:srgbClr val="00B050"/>
-                </a:solidFill>
-              </a:rPr>
-              <a:t>history_table_id</a:t>
-            </a:r>
-            <a:r>
-              <a:rPr lang="en-US" dirty="0"/>
-              <a:t> (column)</a:t>
-            </a:r>
-          </a:p>
-          <a:p>
-            <a:pPr marL="1147527" lvl="1" indent="-571500">
-              <a:buFont typeface="Arial" panose="020B0604020202020204" pitchFamily="34" charset="0"/>
-              <a:buChar char="•"/>
-            </a:pPr>
-            <a:r>
-              <a:rPr lang="en-US" dirty="0" err="1"/>
-              <a:t>sys.</a:t>
-            </a:r>
-            <a:r>
-              <a:rPr lang="en-US" dirty="0" err="1">
-                <a:solidFill>
-                  <a:srgbClr val="0070C0"/>
-                </a:solidFill>
-              </a:rPr>
-              <a:t>columns</a:t>
-            </a:r>
-            <a:r>
-              <a:rPr lang="en-US" dirty="0" err="1"/>
-              <a:t>.</a:t>
-            </a:r>
-            <a:r>
-              <a:rPr lang="en-US" dirty="0" err="1">
-                <a:solidFill>
-                  <a:srgbClr val="00B050"/>
-                </a:solidFill>
-              </a:rPr>
-              <a:t>generated_always_type</a:t>
-            </a:r>
-            <a:r>
-              <a:rPr lang="en-US" dirty="0"/>
-              <a:t> (column)</a:t>
-            </a:r>
-          </a:p>
-          <a:p>
-            <a:pPr marL="1147527" lvl="1" indent="-571500">
-              <a:buFont typeface="Arial" panose="020B0604020202020204" pitchFamily="34" charset="0"/>
-              <a:buChar char="•"/>
-            </a:pPr>
-            <a:r>
-              <a:rPr lang="en-US" dirty="0" err="1"/>
-              <a:t>sys.</a:t>
-            </a:r>
-            <a:r>
-              <a:rPr lang="en-US" dirty="0" err="1">
-                <a:solidFill>
-                  <a:srgbClr val="0070C0"/>
-                </a:solidFill>
-              </a:rPr>
-              <a:t>columns</a:t>
-            </a:r>
-            <a:r>
-              <a:rPr lang="en-US" dirty="0" err="1"/>
-              <a:t>.</a:t>
-            </a:r>
-            <a:r>
-              <a:rPr lang="en-US" dirty="0" err="1">
-                <a:solidFill>
-                  <a:srgbClr val="00B050"/>
-                </a:solidFill>
-              </a:rPr>
-              <a:t>generated_always_type_desc</a:t>
-            </a:r>
-            <a:r>
-              <a:rPr lang="en-US" dirty="0"/>
-              <a:t> (column)</a:t>
-            </a:r>
-          </a:p>
-          <a:p>
-            <a:pPr lvl="1"/>
+                <a:highlight>
+                  <a:srgbClr val="FFFFFF"/>
+                </a:highlight>
+                <a:latin typeface="Consolas" panose="020B0609020204030204" pitchFamily="49" charset="0"/>
+              </a:rPr>
+              <a:t>sys.time_zone_info</a:t>
+            </a:r>
+            <a:r>
+              <a:rPr lang="en-US" dirty="0">
+                <a:solidFill>
+                  <a:srgbClr val="808080"/>
+                </a:solidFill>
+                <a:highlight>
+                  <a:srgbClr val="FFFFFF"/>
+                </a:highlight>
+                <a:latin typeface="Consolas" panose="020B0609020204030204" pitchFamily="49" charset="0"/>
+              </a:rPr>
+              <a:t>;</a:t>
+            </a:r>
             <a:endParaRPr lang="en-US" dirty="0"/>
           </a:p>
         </p:txBody>
@@ -7239,7 +7312,7 @@
     </p:spTree>
     <p:extLst>
       <p:ext uri="{BB962C8B-B14F-4D97-AF65-F5344CB8AC3E}">
-        <p14:creationId xmlns:p14="http://schemas.microsoft.com/office/powerpoint/2010/main" val="764752702"/>
+        <p14:creationId xmlns:p14="http://schemas.microsoft.com/office/powerpoint/2010/main" val="4235235981"/>
       </p:ext>
     </p:extLst>
   </p:cSld>

</xml_diff>

<commit_message>
Add Louisville logo to title slide.
</commit_message>
<xml_diff>
--- a/Temporal.pptx
+++ b/Temporal.pptx
@@ -222,7 +222,7 @@
           <a:p>
             <a:fld id="{3CD51548-82AA-4A2B-B152-1D3266E0F652}" type="datetimeFigureOut">
               <a:rPr lang="en-US" smtClean="0"/>
-              <a:t>06/19/2019</a:t>
+              <a:t>7/13/2019</a:t>
             </a:fld>
             <a:endParaRPr lang="en-US"/>
           </a:p>
@@ -2122,7 +2122,7 @@
           <a:graphicData uri="http://schemas.openxmlformats.org/presentationml/2006/ole">
             <mc:AlternateContent xmlns:mc="http://schemas.openxmlformats.org/markup-compatibility/2006">
               <mc:Choice xmlns:v="urn:schemas-microsoft-com:vml" Requires="v">
-                <p:oleObj spid="_x0000_s1079" name="Image" r:id="rId10" imgW="2279520" imgH="1310400" progId="Photoshop.Image.18">
+                <p:oleObj spid="_x0000_s1080" name="Image" r:id="rId10" imgW="2279520" imgH="1310400" progId="Photoshop.Image.18">
                   <p:embed/>
                 </p:oleObj>
               </mc:Choice>
@@ -2589,7 +2589,7 @@
           <p:cNvPr id="6" name="Rectangle 5">
             <a:extLst>
               <a:ext uri="{FF2B5EF4-FFF2-40B4-BE49-F238E27FC236}">
-                <a16:creationId xmlns:a16="http://schemas.microsoft.com/office/drawing/2014/main" xmlns="" id="{B7399187-9BA9-4033-A3C7-DFCB4FB51140}"/>
+                <a16:creationId xmlns:a16="http://schemas.microsoft.com/office/drawing/2014/main" id="{B7399187-9BA9-4033-A3C7-DFCB4FB51140}"/>
               </a:ext>
             </a:extLst>
           </p:cNvPr>
@@ -2625,7 +2625,7 @@
           <p:cNvPr id="7" name="Rectangle 6">
             <a:extLst>
               <a:ext uri="{FF2B5EF4-FFF2-40B4-BE49-F238E27FC236}">
-                <a16:creationId xmlns:a16="http://schemas.microsoft.com/office/drawing/2014/main" xmlns="" id="{2EC523ED-9E17-4757-BA78-035475F32881}"/>
+                <a16:creationId xmlns:a16="http://schemas.microsoft.com/office/drawing/2014/main" id="{2EC523ED-9E17-4757-BA78-035475F32881}"/>
               </a:ext>
             </a:extLst>
           </p:cNvPr>
@@ -2661,10 +2661,10 @@
       </p:sp>
       <p:pic>
         <p:nvPicPr>
-          <p:cNvPr id="4" name="Picture 3">
+          <p:cNvPr id="5" name="Picture 4">
             <a:extLst>
               <a:ext uri="{FF2B5EF4-FFF2-40B4-BE49-F238E27FC236}">
-                <a16:creationId xmlns:a16="http://schemas.microsoft.com/office/drawing/2014/main" xmlns="" id="{64169D5C-04C1-49B6-AFF6-803E2632EA53}"/>
+                <a16:creationId xmlns:a16="http://schemas.microsoft.com/office/drawing/2014/main" id="{7A4D9EC6-60B2-4F4C-9D45-5E83C5C148A9}"/>
               </a:ext>
             </a:extLst>
           </p:cNvPr>
@@ -2682,7 +2682,7 @@
         <p:spPr>
           <a:xfrm>
             <a:off x="5806440" y="4782312"/>
-            <a:ext cx="5715000" cy="1088571"/>
+            <a:ext cx="5715000" cy="1428750"/>
           </a:xfrm>
           <a:prstGeom prst="rect">
             <a:avLst/>
@@ -2973,13 +2973,6 @@
   <p:clrMapOvr>
     <a:masterClrMapping/>
   </p:clrMapOvr>
-  <p:timing>
-    <p:tnLst>
-      <p:par>
-        <p:cTn id="1" dur="indefinite" restart="never" nodeType="tmRoot"/>
-      </p:par>
-    </p:tnLst>
-  </p:timing>
 </p:sld>
 </file>
 
@@ -3374,13 +3367,6 @@
   <p:clrMapOvr>
     <a:masterClrMapping/>
   </p:clrMapOvr>
-  <p:timing>
-    <p:tnLst>
-      <p:par>
-        <p:cTn id="1" dur="indefinite" restart="never" nodeType="tmRoot"/>
-      </p:par>
-    </p:tnLst>
-  </p:timing>
 </p:sld>
 </file>
 
@@ -3791,13 +3777,6 @@
   <p:clrMapOvr>
     <a:masterClrMapping/>
   </p:clrMapOvr>
-  <p:timing>
-    <p:tnLst>
-      <p:par>
-        <p:cTn id="1" dur="indefinite" restart="never" nodeType="tmRoot"/>
-      </p:par>
-    </p:tnLst>
-  </p:timing>
 </p:sld>
 </file>
 
@@ -4073,13 +4052,6 @@
   <p:clrMapOvr>
     <a:masterClrMapping/>
   </p:clrMapOvr>
-  <p:timing>
-    <p:tnLst>
-      <p:par>
-        <p:cTn id="1" dur="indefinite" restart="never" nodeType="tmRoot"/>
-      </p:par>
-    </p:tnLst>
-  </p:timing>
 </p:sld>
 </file>
 
@@ -4784,7 +4756,7 @@
           <p:cNvPr id="10" name="Group 9">
             <a:extLst>
               <a:ext uri="{FF2B5EF4-FFF2-40B4-BE49-F238E27FC236}">
-                <a16:creationId xmlns:a16="http://schemas.microsoft.com/office/drawing/2014/main" xmlns="" id="{E58C60E0-346D-408D-8161-D9CFFB10EFF7}"/>
+                <a16:creationId xmlns:a16="http://schemas.microsoft.com/office/drawing/2014/main" id="{E58C60E0-346D-408D-8161-D9CFFB10EFF7}"/>
               </a:ext>
             </a:extLst>
           </p:cNvPr>
@@ -5360,7 +5332,7 @@
           <p:cNvPr id="16" name="Straight Connector 15">
             <a:extLst>
               <a:ext uri="{FF2B5EF4-FFF2-40B4-BE49-F238E27FC236}">
-                <a16:creationId xmlns:a16="http://schemas.microsoft.com/office/drawing/2014/main" xmlns="" id="{BE4EC1EE-F40A-4286-AF9F-AD7FAB0C5527}"/>
+                <a16:creationId xmlns:a16="http://schemas.microsoft.com/office/drawing/2014/main" id="{BE4EC1EE-F40A-4286-AF9F-AD7FAB0C5527}"/>
               </a:ext>
             </a:extLst>
           </p:cNvPr>
@@ -5408,13 +5380,6 @@
   <p:clrMapOvr>
     <a:masterClrMapping/>
   </p:clrMapOvr>
-  <p:timing>
-    <p:tnLst>
-      <p:par>
-        <p:cTn id="1" dur="indefinite" restart="never" nodeType="tmRoot"/>
-      </p:par>
-    </p:tnLst>
-  </p:timing>
 </p:sld>
 </file>
 
@@ -5440,7 +5405,7 @@
           <p:cNvPr id="2" name="Title 1">
             <a:extLst>
               <a:ext uri="{FF2B5EF4-FFF2-40B4-BE49-F238E27FC236}">
-                <a16:creationId xmlns:a16="http://schemas.microsoft.com/office/drawing/2014/main" xmlns="" id="{C9BFF397-973F-4CF4-B089-7CF11ECD75B3}"/>
+                <a16:creationId xmlns:a16="http://schemas.microsoft.com/office/drawing/2014/main" id="{C9BFF397-973F-4CF4-B089-7CF11ECD75B3}"/>
               </a:ext>
             </a:extLst>
           </p:cNvPr>
@@ -5468,7 +5433,7 @@
           <p:cNvPr id="3" name="Content Placeholder 2">
             <a:extLst>
               <a:ext uri="{FF2B5EF4-FFF2-40B4-BE49-F238E27FC236}">
-                <a16:creationId xmlns:a16="http://schemas.microsoft.com/office/drawing/2014/main" xmlns="" id="{2C4E2FAE-1993-45F8-901A-679941B185E8}"/>
+                <a16:creationId xmlns:a16="http://schemas.microsoft.com/office/drawing/2014/main" id="{2C4E2FAE-1993-45F8-901A-679941B185E8}"/>
               </a:ext>
             </a:extLst>
           </p:cNvPr>
@@ -6091,13 +6056,6 @@
   <p:clrMapOvr>
     <a:masterClrMapping/>
   </p:clrMapOvr>
-  <p:timing>
-    <p:tnLst>
-      <p:par>
-        <p:cTn id="1" dur="indefinite" restart="never" nodeType="tmRoot"/>
-      </p:par>
-    </p:tnLst>
-  </p:timing>
 </p:sld>
 </file>
 
@@ -6123,7 +6081,7 @@
           <p:cNvPr id="2" name="Title 1">
             <a:extLst>
               <a:ext uri="{FF2B5EF4-FFF2-40B4-BE49-F238E27FC236}">
-                <a16:creationId xmlns:a16="http://schemas.microsoft.com/office/drawing/2014/main" xmlns="" id="{FEF5F440-7918-4A6B-9C7C-C25F5B4AB5DD}"/>
+                <a16:creationId xmlns:a16="http://schemas.microsoft.com/office/drawing/2014/main" id="{FEF5F440-7918-4A6B-9C7C-C25F5B4AB5DD}"/>
               </a:ext>
             </a:extLst>
           </p:cNvPr>
@@ -6151,7 +6109,7 @@
           <p:cNvPr id="3" name="Content Placeholder 2">
             <a:extLst>
               <a:ext uri="{FF2B5EF4-FFF2-40B4-BE49-F238E27FC236}">
-                <a16:creationId xmlns:a16="http://schemas.microsoft.com/office/drawing/2014/main" xmlns="" id="{9E20F2C1-4D76-4D3B-8502-4FA0575D48CD}"/>
+                <a16:creationId xmlns:a16="http://schemas.microsoft.com/office/drawing/2014/main" id="{9E20F2C1-4D76-4D3B-8502-4FA0575D48CD}"/>
               </a:ext>
             </a:extLst>
           </p:cNvPr>
@@ -6215,13 +6173,6 @@
   <p:clrMapOvr>
     <a:masterClrMapping/>
   </p:clrMapOvr>
-  <p:timing>
-    <p:tnLst>
-      <p:par>
-        <p:cTn id="1" dur="indefinite" restart="never" nodeType="tmRoot"/>
-      </p:par>
-    </p:tnLst>
-  </p:timing>
 </p:sld>
 </file>
 
@@ -6247,7 +6198,7 @@
           <p:cNvPr id="2" name="Title 1">
             <a:extLst>
               <a:ext uri="{FF2B5EF4-FFF2-40B4-BE49-F238E27FC236}">
-                <a16:creationId xmlns:a16="http://schemas.microsoft.com/office/drawing/2014/main" xmlns="" id="{E169A762-FDA9-4320-A910-D0B123182421}"/>
+                <a16:creationId xmlns:a16="http://schemas.microsoft.com/office/drawing/2014/main" id="{E169A762-FDA9-4320-A910-D0B123182421}"/>
               </a:ext>
             </a:extLst>
           </p:cNvPr>
@@ -6273,10 +6224,6 @@
               <a:rPr lang="en-US" sz="6000" dirty="0"/>
               <a:t>Appendix</a:t>
             </a:r>
-            <a:r>
-              <a:rPr lang="en-US" dirty="0"/>
-              <a:t/>
-            </a:r>
             <a:br>
               <a:rPr lang="en-US" dirty="0"/>
             </a:br>
@@ -6297,13 +6244,6 @@
   <p:clrMapOvr>
     <a:masterClrMapping/>
   </p:clrMapOvr>
-  <p:timing>
-    <p:tnLst>
-      <p:par>
-        <p:cTn id="1" dur="indefinite" restart="never" nodeType="tmRoot"/>
-      </p:par>
-    </p:tnLst>
-  </p:timing>
 </p:sld>
 </file>
 
@@ -6380,13 +6320,6 @@
   <p:clrMapOvr>
     <a:masterClrMapping/>
   </p:clrMapOvr>
-  <p:timing>
-    <p:tnLst>
-      <p:par>
-        <p:cTn id="1" dur="indefinite" restart="never" nodeType="tmRoot"/>
-      </p:par>
-    </p:tnLst>
-  </p:timing>
 </p:sld>
 </file>
 
@@ -6457,14 +6390,14 @@
                 <a:gridCol w="5514808">
                   <a:extLst>
                     <a:ext uri="{9D8B030D-6E8A-4147-A177-3AD203B41FA5}">
-                      <a16:colId xmlns:a16="http://schemas.microsoft.com/office/drawing/2014/main" xmlns="" val="2893081794"/>
+                      <a16:colId xmlns:a16="http://schemas.microsoft.com/office/drawing/2014/main" val="2893081794"/>
                     </a:ext>
                   </a:extLst>
                 </a:gridCol>
                 <a:gridCol w="5514808">
                   <a:extLst>
                     <a:ext uri="{9D8B030D-6E8A-4147-A177-3AD203B41FA5}">
-                      <a16:colId xmlns:a16="http://schemas.microsoft.com/office/drawing/2014/main" xmlns="" val="353638004"/>
+                      <a16:colId xmlns:a16="http://schemas.microsoft.com/office/drawing/2014/main" val="353638004"/>
                     </a:ext>
                   </a:extLst>
                 </a:gridCol>
@@ -6632,7 +6565,7 @@
                 </a:tc>
                 <a:extLst>
                   <a:ext uri="{0D108BD9-81ED-4DB2-BD59-A6C34878D82A}">
-                    <a16:rowId xmlns:a16="http://schemas.microsoft.com/office/drawing/2014/main" xmlns="" val="2804491224"/>
+                    <a16:rowId xmlns:a16="http://schemas.microsoft.com/office/drawing/2014/main" val="2804491224"/>
                   </a:ext>
                 </a:extLst>
               </a:tr>
@@ -6722,7 +6655,7 @@
                 </a:tc>
                 <a:extLst>
                   <a:ext uri="{0D108BD9-81ED-4DB2-BD59-A6C34878D82A}">
-                    <a16:rowId xmlns:a16="http://schemas.microsoft.com/office/drawing/2014/main" xmlns="" val="2127768561"/>
+                    <a16:rowId xmlns:a16="http://schemas.microsoft.com/office/drawing/2014/main" val="2127768561"/>
                   </a:ext>
                 </a:extLst>
               </a:tr>
@@ -6764,7 +6697,7 @@
                 </a:tc>
                 <a:extLst>
                   <a:ext uri="{0D108BD9-81ED-4DB2-BD59-A6C34878D82A}">
-                    <a16:rowId xmlns:a16="http://schemas.microsoft.com/office/drawing/2014/main" xmlns="" val="1001698893"/>
+                    <a16:rowId xmlns:a16="http://schemas.microsoft.com/office/drawing/2014/main" val="1001698893"/>
                   </a:ext>
                 </a:extLst>
               </a:tr>
@@ -6898,7 +6831,7 @@
                 </a:tc>
                 <a:extLst>
                   <a:ext uri="{0D108BD9-81ED-4DB2-BD59-A6C34878D82A}">
-                    <a16:rowId xmlns:a16="http://schemas.microsoft.com/office/drawing/2014/main" xmlns="" val="2404271991"/>
+                    <a16:rowId xmlns:a16="http://schemas.microsoft.com/office/drawing/2014/main" val="2404271991"/>
                   </a:ext>
                 </a:extLst>
               </a:tr>
@@ -7045,7 +6978,7 @@
                 </a:tc>
                 <a:extLst>
                   <a:ext uri="{0D108BD9-81ED-4DB2-BD59-A6C34878D82A}">
-                    <a16:rowId xmlns:a16="http://schemas.microsoft.com/office/drawing/2014/main" xmlns="" val="671247449"/>
+                    <a16:rowId xmlns:a16="http://schemas.microsoft.com/office/drawing/2014/main" val="671247449"/>
                   </a:ext>
                 </a:extLst>
               </a:tr>
@@ -7237,7 +7170,7 @@
                 </a:tc>
                 <a:extLst>
                   <a:ext uri="{0D108BD9-81ED-4DB2-BD59-A6C34878D82A}">
-                    <a16:rowId xmlns:a16="http://schemas.microsoft.com/office/drawing/2014/main" xmlns="" val="3036776198"/>
+                    <a16:rowId xmlns:a16="http://schemas.microsoft.com/office/drawing/2014/main" val="3036776198"/>
                   </a:ext>
                 </a:extLst>
               </a:tr>
@@ -7255,13 +7188,6 @@
   <p:clrMapOvr>
     <a:masterClrMapping/>
   </p:clrMapOvr>
-  <p:timing>
-    <p:tnLst>
-      <p:par>
-        <p:cTn id="1" dur="indefinite" restart="never" nodeType="tmRoot"/>
-      </p:par>
-    </p:tnLst>
-  </p:timing>
 </p:sld>
 </file>
 
@@ -7779,13 +7705,6 @@
   <p:clrMapOvr>
     <a:masterClrMapping/>
   </p:clrMapOvr>
-  <p:timing>
-    <p:tnLst>
-      <p:par>
-        <p:cTn id="1" dur="indefinite" restart="never" nodeType="tmRoot"/>
-      </p:par>
-    </p:tnLst>
-  </p:timing>
 </p:sld>
 </file>
 

</xml_diff>